<commit_message>
(Issue #132) Rough skeleton of Jared's content.  This is likely too much content for 30 minutes.
</commit_message>
<xml_diff>
--- a/computational-expts.pptx
+++ b/computational-expts.pptx
@@ -5,13 +5,31 @@
     <p:sldMasterId id="2147483935" r:id="rId4"/>
   </p:sldMasterIdLst>
   <p:notesMasterIdLst>
-    <p:notesMasterId r:id="rId6"/>
+    <p:notesMasterId r:id="rId24"/>
   </p:notesMasterIdLst>
   <p:handoutMasterIdLst>
-    <p:handoutMasterId r:id="rId7"/>
+    <p:handoutMasterId r:id="rId25"/>
   </p:handoutMasterIdLst>
   <p:sldIdLst>
     <p:sldId id="256" r:id="rId5"/>
+    <p:sldId id="321" r:id="rId6"/>
+    <p:sldId id="322" r:id="rId7"/>
+    <p:sldId id="324" r:id="rId8"/>
+    <p:sldId id="325" r:id="rId9"/>
+    <p:sldId id="340" r:id="rId10"/>
+    <p:sldId id="326" r:id="rId11"/>
+    <p:sldId id="327" r:id="rId12"/>
+    <p:sldId id="328" r:id="rId13"/>
+    <p:sldId id="330" r:id="rId14"/>
+    <p:sldId id="331" r:id="rId15"/>
+    <p:sldId id="329" r:id="rId16"/>
+    <p:sldId id="332" r:id="rId17"/>
+    <p:sldId id="337" r:id="rId18"/>
+    <p:sldId id="333" r:id="rId19"/>
+    <p:sldId id="336" r:id="rId20"/>
+    <p:sldId id="335" r:id="rId21"/>
+    <p:sldId id="338" r:id="rId22"/>
+    <p:sldId id="339" r:id="rId23"/>
   </p:sldIdLst>
   <p:sldSz cx="12188825" cy="6858000"/>
   <p:notesSz cx="7010400" cy="9296400"/>
@@ -255,7 +273,7 @@
           <a:p>
             <a:fld id="{0B842F42-2CE9-4E35-95C1-410DC08A50B1}" type="datetimeFigureOut">
               <a:rPr lang="en-US" smtClean="0"/>
-              <a:t>7/10/2022</a:t>
+              <a:t>7/19/22</a:t>
             </a:fld>
             <a:endParaRPr lang="en-US"/>
           </a:p>
@@ -420,7 +438,7 @@
           <a:p>
             <a:fld id="{6F282904-F315-4730-8D91-37D99E141A6F}" type="datetimeFigureOut">
               <a:rPr lang="en-US" smtClean="0"/>
-              <a:t>7/10/2022</a:t>
+              <a:t>7/19/22</a:t>
             </a:fld>
             <a:endParaRPr lang="en-US"/>
           </a:p>
@@ -685,6 +703,806 @@
     </a:lvl9pPr>
   </p:notesStyle>
 </p:notesMaster>
+</file>
+
+<file path=ppt/notesSlides/notesSlide1.xml><?xml version="1.0" encoding="utf-8"?>
+<p:notes xmlns:a="http://schemas.openxmlformats.org/drawingml/2006/main" xmlns:r="http://schemas.openxmlformats.org/officeDocument/2006/relationships" xmlns:p="http://schemas.openxmlformats.org/presentationml/2006/main">
+  <p:cSld>
+    <p:spTree>
+      <p:nvGrpSpPr>
+        <p:cNvPr id="1" name=""/>
+        <p:cNvGrpSpPr/>
+        <p:nvPr/>
+      </p:nvGrpSpPr>
+      <p:grpSpPr>
+        <a:xfrm>
+          <a:off x="0" y="0"/>
+          <a:ext cx="0" cy="0"/>
+          <a:chOff x="0" y="0"/>
+          <a:chExt cx="0" cy="0"/>
+        </a:xfrm>
+      </p:grpSpPr>
+      <p:sp>
+        <p:nvSpPr>
+          <p:cNvPr id="2" name="Slide Image Placeholder 1"/>
+          <p:cNvSpPr>
+            <a:spLocks noGrp="1" noRot="1" noChangeAspect="1"/>
+          </p:cNvSpPr>
+          <p:nvPr>
+            <p:ph type="sldImg"/>
+          </p:nvPr>
+        </p:nvSpPr>
+        <p:spPr/>
+      </p:sp>
+      <p:sp>
+        <p:nvSpPr>
+          <p:cNvPr id="3" name="Notes Placeholder 2"/>
+          <p:cNvSpPr>
+            <a:spLocks noGrp="1"/>
+          </p:cNvSpPr>
+          <p:nvPr>
+            <p:ph type="body" idx="1"/>
+          </p:nvPr>
+        </p:nvSpPr>
+        <p:spPr/>
+        <p:txBody>
+          <a:bodyPr/>
+          <a:lstStyle/>
+          <a:p>
+            <a:r>
+              <a:rPr lang="en-US" dirty="0"/>
+              <a:t>Examples are difficulties of lab notebooks and documentation.  We have many tools to help us, but difficulties can grow when  N tools scaled out.    Extra layers of automation can add more effort and decrease maintainability.</a:t>
+            </a:r>
+          </a:p>
+          <a:p>
+            <a:endParaRPr lang="en-US" dirty="0"/>
+          </a:p>
+          <a:p>
+            <a:r>
+              <a:rPr lang="en-US" dirty="0"/>
+              <a:t>One thing that is easier is version control – time travel and reversibility!</a:t>
+            </a:r>
+          </a:p>
+        </p:txBody>
+      </p:sp>
+      <p:sp>
+        <p:nvSpPr>
+          <p:cNvPr id="4" name="Slide Number Placeholder 3"/>
+          <p:cNvSpPr>
+            <a:spLocks noGrp="1"/>
+          </p:cNvSpPr>
+          <p:nvPr>
+            <p:ph type="sldNum" sz="quarter" idx="5"/>
+          </p:nvPr>
+        </p:nvSpPr>
+        <p:spPr/>
+        <p:txBody>
+          <a:bodyPr/>
+          <a:lstStyle/>
+          <a:p>
+            <a:fld id="{54E672D7-8E2D-4611-973D-F4591A707C34}" type="slidenum">
+              <a:rPr lang="en-US" smtClean="0"/>
+              <a:t>3</a:t>
+            </a:fld>
+            <a:endParaRPr lang="en-US"/>
+          </a:p>
+        </p:txBody>
+      </p:sp>
+    </p:spTree>
+    <p:extLst>
+      <p:ext uri="{BB962C8B-B14F-4D97-AF65-F5344CB8AC3E}">
+        <p14:creationId xmlns:p14="http://schemas.microsoft.com/office/powerpoint/2010/main" val="2465532174"/>
+      </p:ext>
+    </p:extLst>
+  </p:cSld>
+  <p:clrMapOvr>
+    <a:masterClrMapping/>
+  </p:clrMapOvr>
+</p:notes>
+</file>
+
+<file path=ppt/notesSlides/notesSlide2.xml><?xml version="1.0" encoding="utf-8"?>
+<p:notes xmlns:a="http://schemas.openxmlformats.org/drawingml/2006/main" xmlns:r="http://schemas.openxmlformats.org/officeDocument/2006/relationships" xmlns:p="http://schemas.openxmlformats.org/presentationml/2006/main">
+  <p:cSld>
+    <p:spTree>
+      <p:nvGrpSpPr>
+        <p:cNvPr id="1" name=""/>
+        <p:cNvGrpSpPr/>
+        <p:nvPr/>
+      </p:nvGrpSpPr>
+      <p:grpSpPr>
+        <a:xfrm>
+          <a:off x="0" y="0"/>
+          <a:ext cx="0" cy="0"/>
+          <a:chOff x="0" y="0"/>
+          <a:chExt cx="0" cy="0"/>
+        </a:xfrm>
+      </p:grpSpPr>
+      <p:sp>
+        <p:nvSpPr>
+          <p:cNvPr id="2" name="Slide Image Placeholder 1"/>
+          <p:cNvSpPr>
+            <a:spLocks noGrp="1" noRot="1" noChangeAspect="1"/>
+          </p:cNvSpPr>
+          <p:nvPr>
+            <p:ph type="sldImg"/>
+          </p:nvPr>
+        </p:nvSpPr>
+        <p:spPr/>
+      </p:sp>
+      <p:sp>
+        <p:nvSpPr>
+          <p:cNvPr id="3" name="Notes Placeholder 2"/>
+          <p:cNvSpPr>
+            <a:spLocks noGrp="1"/>
+          </p:cNvSpPr>
+          <p:nvPr>
+            <p:ph type="body" idx="1"/>
+          </p:nvPr>
+        </p:nvSpPr>
+        <p:spPr/>
+        <p:txBody>
+          <a:bodyPr/>
+          <a:lstStyle/>
+          <a:p>
+            <a:r>
+              <a:rPr lang="en-US" dirty="0"/>
+              <a:t>Phrases in bold are immediately applicable.  Others will require some translation.</a:t>
+            </a:r>
+          </a:p>
+        </p:txBody>
+      </p:sp>
+      <p:sp>
+        <p:nvSpPr>
+          <p:cNvPr id="4" name="Slide Number Placeholder 3"/>
+          <p:cNvSpPr>
+            <a:spLocks noGrp="1"/>
+          </p:cNvSpPr>
+          <p:nvPr>
+            <p:ph type="sldNum" sz="quarter" idx="5"/>
+          </p:nvPr>
+        </p:nvSpPr>
+        <p:spPr/>
+        <p:txBody>
+          <a:bodyPr/>
+          <a:lstStyle/>
+          <a:p>
+            <a:fld id="{54E672D7-8E2D-4611-973D-F4591A707C34}" type="slidenum">
+              <a:rPr lang="en-US" smtClean="0"/>
+              <a:t>4</a:t>
+            </a:fld>
+            <a:endParaRPr lang="en-US"/>
+          </a:p>
+        </p:txBody>
+      </p:sp>
+    </p:spTree>
+    <p:extLst>
+      <p:ext uri="{BB962C8B-B14F-4D97-AF65-F5344CB8AC3E}">
+        <p14:creationId xmlns:p14="http://schemas.microsoft.com/office/powerpoint/2010/main" val="1961129978"/>
+      </p:ext>
+    </p:extLst>
+  </p:cSld>
+  <p:clrMapOvr>
+    <a:masterClrMapping/>
+  </p:clrMapOvr>
+</p:notes>
+</file>
+
+<file path=ppt/notesSlides/notesSlide3.xml><?xml version="1.0" encoding="utf-8"?>
+<p:notes xmlns:a="http://schemas.openxmlformats.org/drawingml/2006/main" xmlns:r="http://schemas.openxmlformats.org/officeDocument/2006/relationships" xmlns:p="http://schemas.openxmlformats.org/presentationml/2006/main">
+  <p:cSld>
+    <p:spTree>
+      <p:nvGrpSpPr>
+        <p:cNvPr id="1" name=""/>
+        <p:cNvGrpSpPr/>
+        <p:nvPr/>
+      </p:nvGrpSpPr>
+      <p:grpSpPr>
+        <a:xfrm>
+          <a:off x="0" y="0"/>
+          <a:ext cx="0" cy="0"/>
+          <a:chOff x="0" y="0"/>
+          <a:chExt cx="0" cy="0"/>
+        </a:xfrm>
+      </p:grpSpPr>
+      <p:sp>
+        <p:nvSpPr>
+          <p:cNvPr id="2" name="Slide Image Placeholder 1"/>
+          <p:cNvSpPr>
+            <a:spLocks noGrp="1" noRot="1" noChangeAspect="1"/>
+          </p:cNvSpPr>
+          <p:nvPr>
+            <p:ph type="sldImg"/>
+          </p:nvPr>
+        </p:nvSpPr>
+        <p:spPr/>
+      </p:sp>
+      <p:sp>
+        <p:nvSpPr>
+          <p:cNvPr id="3" name="Notes Placeholder 2"/>
+          <p:cNvSpPr>
+            <a:spLocks noGrp="1"/>
+          </p:cNvSpPr>
+          <p:nvPr>
+            <p:ph type="body" idx="1"/>
+          </p:nvPr>
+        </p:nvSpPr>
+        <p:spPr/>
+        <p:txBody>
+          <a:bodyPr/>
+          <a:lstStyle/>
+          <a:p>
+            <a:r>
+              <a:rPr lang="en-US" dirty="0"/>
+              <a:t>Should you only be able to use a container or </a:t>
+            </a:r>
+            <a:r>
+              <a:rPr lang="en-US" dirty="0" err="1"/>
+              <a:t>Spack</a:t>
+            </a:r>
+            <a:r>
+              <a:rPr lang="en-US" dirty="0"/>
+              <a:t> once you have understood all pitfalls associated with setting up a SW environment?  Example, should you know what tools to use to sanity check an env/container?</a:t>
+            </a:r>
+          </a:p>
+          <a:p>
+            <a:endParaRPr lang="en-US" dirty="0"/>
+          </a:p>
+          <a:p>
+            <a:r>
+              <a:rPr lang="en-US" dirty="0"/>
+              <a:t>This is analogous to the idea of an apprenticeship.  When someone wants to work with metal, they might be given a chunk of metal and metal file.  There job is to work until they turn it into a cube with just the file.  After that, they can use more sophisticated tools.  Know your tools.</a:t>
+            </a:r>
+          </a:p>
+          <a:p>
+            <a:endParaRPr lang="en-US" dirty="0"/>
+          </a:p>
+          <a:p>
+            <a:r>
+              <a:rPr lang="en-US" dirty="0"/>
+              <a:t>One example are libraries with optional variables with no explanation of what they do or guidance about how to set them.  I have heard of cases where they might refer to an article, but that article doesn’t help.</a:t>
+            </a:r>
+          </a:p>
+        </p:txBody>
+      </p:sp>
+      <p:sp>
+        <p:nvSpPr>
+          <p:cNvPr id="4" name="Slide Number Placeholder 3"/>
+          <p:cNvSpPr>
+            <a:spLocks noGrp="1"/>
+          </p:cNvSpPr>
+          <p:nvPr>
+            <p:ph type="sldNum" sz="quarter" idx="5"/>
+          </p:nvPr>
+        </p:nvSpPr>
+        <p:spPr/>
+        <p:txBody>
+          <a:bodyPr/>
+          <a:lstStyle/>
+          <a:p>
+            <a:fld id="{54E672D7-8E2D-4611-973D-F4591A707C34}" type="slidenum">
+              <a:rPr lang="en-US" smtClean="0"/>
+              <a:t>5</a:t>
+            </a:fld>
+            <a:endParaRPr lang="en-US"/>
+          </a:p>
+        </p:txBody>
+      </p:sp>
+    </p:spTree>
+    <p:extLst>
+      <p:ext uri="{BB962C8B-B14F-4D97-AF65-F5344CB8AC3E}">
+        <p14:creationId xmlns:p14="http://schemas.microsoft.com/office/powerpoint/2010/main" val="3415607376"/>
+      </p:ext>
+    </p:extLst>
+  </p:cSld>
+  <p:clrMapOvr>
+    <a:masterClrMapping/>
+  </p:clrMapOvr>
+</p:notes>
+</file>
+
+<file path=ppt/notesSlides/notesSlide4.xml><?xml version="1.0" encoding="utf-8"?>
+<p:notes xmlns:a="http://schemas.openxmlformats.org/drawingml/2006/main" xmlns:r="http://schemas.openxmlformats.org/officeDocument/2006/relationships" xmlns:p="http://schemas.openxmlformats.org/presentationml/2006/main">
+  <p:cSld>
+    <p:spTree>
+      <p:nvGrpSpPr>
+        <p:cNvPr id="1" name=""/>
+        <p:cNvGrpSpPr/>
+        <p:nvPr/>
+      </p:nvGrpSpPr>
+      <p:grpSpPr>
+        <a:xfrm>
+          <a:off x="0" y="0"/>
+          <a:ext cx="0" cy="0"/>
+          <a:chOff x="0" y="0"/>
+          <a:chExt cx="0" cy="0"/>
+        </a:xfrm>
+      </p:grpSpPr>
+      <p:sp>
+        <p:nvSpPr>
+          <p:cNvPr id="2" name="Slide Image Placeholder 1"/>
+          <p:cNvSpPr>
+            <a:spLocks noGrp="1" noRot="1" noChangeAspect="1"/>
+          </p:cNvSpPr>
+          <p:nvPr>
+            <p:ph type="sldImg"/>
+          </p:nvPr>
+        </p:nvSpPr>
+        <p:spPr/>
+      </p:sp>
+      <p:sp>
+        <p:nvSpPr>
+          <p:cNvPr id="3" name="Notes Placeholder 2"/>
+          <p:cNvSpPr>
+            <a:spLocks noGrp="1"/>
+          </p:cNvSpPr>
+          <p:nvPr>
+            <p:ph type="body" idx="1"/>
+          </p:nvPr>
+        </p:nvSpPr>
+        <p:spPr/>
+        <p:txBody>
+          <a:bodyPr/>
+          <a:lstStyle/>
+          <a:p>
+            <a:r>
+              <a:rPr lang="en-US" dirty="0"/>
+              <a:t>Point out that we had to abstract out some of the wisdoms to understand how they relate to the computational science world.  If we abstract out more, these just say be disciplined and don’t be lazy.</a:t>
+            </a:r>
+          </a:p>
+        </p:txBody>
+      </p:sp>
+      <p:sp>
+        <p:nvSpPr>
+          <p:cNvPr id="4" name="Slide Number Placeholder 3"/>
+          <p:cNvSpPr>
+            <a:spLocks noGrp="1"/>
+          </p:cNvSpPr>
+          <p:nvPr>
+            <p:ph type="sldNum" sz="quarter" idx="5"/>
+          </p:nvPr>
+        </p:nvSpPr>
+        <p:spPr/>
+        <p:txBody>
+          <a:bodyPr/>
+          <a:lstStyle/>
+          <a:p>
+            <a:fld id="{54E672D7-8E2D-4611-973D-F4591A707C34}" type="slidenum">
+              <a:rPr lang="en-US" smtClean="0"/>
+              <a:t>8</a:t>
+            </a:fld>
+            <a:endParaRPr lang="en-US"/>
+          </a:p>
+        </p:txBody>
+      </p:sp>
+    </p:spTree>
+    <p:extLst>
+      <p:ext uri="{BB962C8B-B14F-4D97-AF65-F5344CB8AC3E}">
+        <p14:creationId xmlns:p14="http://schemas.microsoft.com/office/powerpoint/2010/main" val="878311816"/>
+      </p:ext>
+    </p:extLst>
+  </p:cSld>
+  <p:clrMapOvr>
+    <a:masterClrMapping/>
+  </p:clrMapOvr>
+</p:notes>
+</file>
+
+<file path=ppt/notesSlides/notesSlide5.xml><?xml version="1.0" encoding="utf-8"?>
+<p:notes xmlns:a="http://schemas.openxmlformats.org/drawingml/2006/main" xmlns:r="http://schemas.openxmlformats.org/officeDocument/2006/relationships" xmlns:p="http://schemas.openxmlformats.org/presentationml/2006/main">
+  <p:cSld>
+    <p:spTree>
+      <p:nvGrpSpPr>
+        <p:cNvPr id="1" name=""/>
+        <p:cNvGrpSpPr/>
+        <p:nvPr/>
+      </p:nvGrpSpPr>
+      <p:grpSpPr>
+        <a:xfrm>
+          <a:off x="0" y="0"/>
+          <a:ext cx="0" cy="0"/>
+          <a:chOff x="0" y="0"/>
+          <a:chExt cx="0" cy="0"/>
+        </a:xfrm>
+      </p:grpSpPr>
+      <p:sp>
+        <p:nvSpPr>
+          <p:cNvPr id="2" name="Slide Image Placeholder 1"/>
+          <p:cNvSpPr>
+            <a:spLocks noGrp="1" noRot="1" noChangeAspect="1"/>
+          </p:cNvSpPr>
+          <p:nvPr>
+            <p:ph type="sldImg"/>
+          </p:nvPr>
+        </p:nvSpPr>
+        <p:spPr/>
+      </p:sp>
+      <p:sp>
+        <p:nvSpPr>
+          <p:cNvPr id="3" name="Notes Placeholder 2"/>
+          <p:cNvSpPr>
+            <a:spLocks noGrp="1"/>
+          </p:cNvSpPr>
+          <p:nvPr>
+            <p:ph type="body" idx="1"/>
+          </p:nvPr>
+        </p:nvSpPr>
+        <p:spPr/>
+        <p:txBody>
+          <a:bodyPr/>
+          <a:lstStyle/>
+          <a:p>
+            <a:pPr marL="0" marR="0" lvl="0" indent="0" algn="l" defTabSz="914400" rtl="0" eaLnBrk="1" fontAlgn="auto" latinLnBrk="0" hangingPunct="1">
+              <a:lnSpc>
+                <a:spcPct val="100000"/>
+              </a:lnSpc>
+              <a:spcBef>
+                <a:spcPts val="0"/>
+              </a:spcBef>
+              <a:spcAft>
+                <a:spcPts val="0"/>
+              </a:spcAft>
+              <a:buClrTx/>
+              <a:buSzTx/>
+              <a:buFontTx/>
+              <a:buNone/>
+              <a:tabLst/>
+              <a:defRPr/>
+            </a:pPr>
+            <a:r>
+              <a:rPr lang="en-US" dirty="0"/>
+              <a:t>Again, easier to do when I am in the same environment every day and it is under my control.</a:t>
+            </a:r>
+          </a:p>
+          <a:p>
+            <a:endParaRPr lang="en-US" dirty="0"/>
+          </a:p>
+          <a:p>
+            <a:r>
+              <a:rPr lang="en-US" dirty="0"/>
+              <a:t>This is where we can talk about observatory environment.  It is an operational environment.  Everything is ready to go and we only concentrate on the task at hand.  If you are making big, decisions that require thought, something has gone deeply wrong.</a:t>
+            </a:r>
+          </a:p>
+          <a:p>
+            <a:endParaRPr lang="en-US" dirty="0"/>
+          </a:p>
+          <a:p>
+            <a:r>
+              <a:rPr lang="en-US" dirty="0"/>
+              <a:t>Use Carlo’s quote “in-flight airplane repair.”</a:t>
+            </a:r>
+          </a:p>
+        </p:txBody>
+      </p:sp>
+      <p:sp>
+        <p:nvSpPr>
+          <p:cNvPr id="4" name="Slide Number Placeholder 3"/>
+          <p:cNvSpPr>
+            <a:spLocks noGrp="1"/>
+          </p:cNvSpPr>
+          <p:nvPr>
+            <p:ph type="sldNum" sz="quarter" idx="5"/>
+          </p:nvPr>
+        </p:nvSpPr>
+        <p:spPr/>
+        <p:txBody>
+          <a:bodyPr/>
+          <a:lstStyle/>
+          <a:p>
+            <a:fld id="{54E672D7-8E2D-4611-973D-F4591A707C34}" type="slidenum">
+              <a:rPr lang="en-US" smtClean="0"/>
+              <a:t>9</a:t>
+            </a:fld>
+            <a:endParaRPr lang="en-US"/>
+          </a:p>
+        </p:txBody>
+      </p:sp>
+    </p:spTree>
+    <p:extLst>
+      <p:ext uri="{BB962C8B-B14F-4D97-AF65-F5344CB8AC3E}">
+        <p14:creationId xmlns:p14="http://schemas.microsoft.com/office/powerpoint/2010/main" val="3300594518"/>
+      </p:ext>
+    </p:extLst>
+  </p:cSld>
+  <p:clrMapOvr>
+    <a:masterClrMapping/>
+  </p:clrMapOvr>
+</p:notes>
+</file>
+
+<file path=ppt/notesSlides/notesSlide6.xml><?xml version="1.0" encoding="utf-8"?>
+<p:notes xmlns:a="http://schemas.openxmlformats.org/drawingml/2006/main" xmlns:r="http://schemas.openxmlformats.org/officeDocument/2006/relationships" xmlns:p="http://schemas.openxmlformats.org/presentationml/2006/main">
+  <p:cSld>
+    <p:spTree>
+      <p:nvGrpSpPr>
+        <p:cNvPr id="1" name=""/>
+        <p:cNvGrpSpPr/>
+        <p:nvPr/>
+      </p:nvGrpSpPr>
+      <p:grpSpPr>
+        <a:xfrm>
+          <a:off x="0" y="0"/>
+          <a:ext cx="0" cy="0"/>
+          <a:chOff x="0" y="0"/>
+          <a:chExt cx="0" cy="0"/>
+        </a:xfrm>
+      </p:grpSpPr>
+      <p:sp>
+        <p:nvSpPr>
+          <p:cNvPr id="2" name="Slide Image Placeholder 1"/>
+          <p:cNvSpPr>
+            <a:spLocks noGrp="1" noRot="1" noChangeAspect="1"/>
+          </p:cNvSpPr>
+          <p:nvPr>
+            <p:ph type="sldImg"/>
+          </p:nvPr>
+        </p:nvSpPr>
+        <p:spPr/>
+      </p:sp>
+      <p:sp>
+        <p:nvSpPr>
+          <p:cNvPr id="3" name="Notes Placeholder 2"/>
+          <p:cNvSpPr>
+            <a:spLocks noGrp="1"/>
+          </p:cNvSpPr>
+          <p:nvPr>
+            <p:ph type="body" idx="1"/>
+          </p:nvPr>
+        </p:nvSpPr>
+        <p:spPr/>
+        <p:txBody>
+          <a:bodyPr/>
+          <a:lstStyle/>
+          <a:p>
+            <a:r>
+              <a:rPr lang="en-US" dirty="0"/>
+              <a:t>Let’s say that I want to execute a study on the same system on which I have built up testing.  Can the study just use the external dependencies built up for testing?  Bad idea if the people who manage the tests aren’t involved in the study.  They might update the libraries without my knowledge in the middle of the study.  More work, but cleaner with obvious ownership and easier communication.</a:t>
+            </a:r>
+          </a:p>
+        </p:txBody>
+      </p:sp>
+      <p:sp>
+        <p:nvSpPr>
+          <p:cNvPr id="4" name="Slide Number Placeholder 3"/>
+          <p:cNvSpPr>
+            <a:spLocks noGrp="1"/>
+          </p:cNvSpPr>
+          <p:nvPr>
+            <p:ph type="sldNum" sz="quarter" idx="5"/>
+          </p:nvPr>
+        </p:nvSpPr>
+        <p:spPr/>
+        <p:txBody>
+          <a:bodyPr/>
+          <a:lstStyle/>
+          <a:p>
+            <a:fld id="{54E672D7-8E2D-4611-973D-F4591A707C34}" type="slidenum">
+              <a:rPr lang="en-US" smtClean="0"/>
+              <a:t>10</a:t>
+            </a:fld>
+            <a:endParaRPr lang="en-US"/>
+          </a:p>
+        </p:txBody>
+      </p:sp>
+    </p:spTree>
+    <p:extLst>
+      <p:ext uri="{BB962C8B-B14F-4D97-AF65-F5344CB8AC3E}">
+        <p14:creationId xmlns:p14="http://schemas.microsoft.com/office/powerpoint/2010/main" val="3113909484"/>
+      </p:ext>
+    </p:extLst>
+  </p:cSld>
+  <p:clrMapOvr>
+    <a:masterClrMapping/>
+  </p:clrMapOvr>
+</p:notes>
+</file>
+
+<file path=ppt/notesSlides/notesSlide7.xml><?xml version="1.0" encoding="utf-8"?>
+<p:notes xmlns:a="http://schemas.openxmlformats.org/drawingml/2006/main" xmlns:r="http://schemas.openxmlformats.org/officeDocument/2006/relationships" xmlns:p="http://schemas.openxmlformats.org/presentationml/2006/main">
+  <p:cSld>
+    <p:spTree>
+      <p:nvGrpSpPr>
+        <p:cNvPr id="1" name=""/>
+        <p:cNvGrpSpPr/>
+        <p:nvPr/>
+      </p:nvGrpSpPr>
+      <p:grpSpPr>
+        <a:xfrm>
+          <a:off x="0" y="0"/>
+          <a:ext cx="0" cy="0"/>
+          <a:chOff x="0" y="0"/>
+          <a:chExt cx="0" cy="0"/>
+        </a:xfrm>
+      </p:grpSpPr>
+      <p:sp>
+        <p:nvSpPr>
+          <p:cNvPr id="2" name="Slide Image Placeholder 1"/>
+          <p:cNvSpPr>
+            <a:spLocks noGrp="1" noRot="1" noChangeAspect="1"/>
+          </p:cNvSpPr>
+          <p:nvPr>
+            <p:ph type="sldImg"/>
+          </p:nvPr>
+        </p:nvSpPr>
+        <p:spPr/>
+      </p:sp>
+      <p:sp>
+        <p:nvSpPr>
+          <p:cNvPr id="3" name="Notes Placeholder 2"/>
+          <p:cNvSpPr>
+            <a:spLocks noGrp="1"/>
+          </p:cNvSpPr>
+          <p:nvPr>
+            <p:ph type="body" idx="1"/>
+          </p:nvPr>
+        </p:nvSpPr>
+        <p:spPr/>
+        <p:txBody>
+          <a:bodyPr/>
+          <a:lstStyle/>
+          <a:p>
+            <a:r>
+              <a:rPr lang="en-US" dirty="0"/>
+              <a:t>I see this more and more as projects grow and tasks grow more complex.</a:t>
+            </a:r>
+          </a:p>
+        </p:txBody>
+      </p:sp>
+      <p:sp>
+        <p:nvSpPr>
+          <p:cNvPr id="4" name="Slide Number Placeholder 3"/>
+          <p:cNvSpPr>
+            <a:spLocks noGrp="1"/>
+          </p:cNvSpPr>
+          <p:nvPr>
+            <p:ph type="sldNum" sz="quarter" idx="5"/>
+          </p:nvPr>
+        </p:nvSpPr>
+        <p:spPr/>
+        <p:txBody>
+          <a:bodyPr/>
+          <a:lstStyle/>
+          <a:p>
+            <a:fld id="{54E672D7-8E2D-4611-973D-F4591A707C34}" type="slidenum">
+              <a:rPr lang="en-US" smtClean="0"/>
+              <a:t>11</a:t>
+            </a:fld>
+            <a:endParaRPr lang="en-US"/>
+          </a:p>
+        </p:txBody>
+      </p:sp>
+    </p:spTree>
+    <p:extLst>
+      <p:ext uri="{BB962C8B-B14F-4D97-AF65-F5344CB8AC3E}">
+        <p14:creationId xmlns:p14="http://schemas.microsoft.com/office/powerpoint/2010/main" val="2109074487"/>
+      </p:ext>
+    </p:extLst>
+  </p:cSld>
+  <p:clrMapOvr>
+    <a:masterClrMapping/>
+  </p:clrMapOvr>
+</p:notes>
+</file>
+
+<file path=ppt/notesSlides/notesSlide8.xml><?xml version="1.0" encoding="utf-8"?>
+<p:notes xmlns:a="http://schemas.openxmlformats.org/drawingml/2006/main" xmlns:r="http://schemas.openxmlformats.org/officeDocument/2006/relationships" xmlns:p="http://schemas.openxmlformats.org/presentationml/2006/main">
+  <p:cSld>
+    <p:spTree>
+      <p:nvGrpSpPr>
+        <p:cNvPr id="1" name=""/>
+        <p:cNvGrpSpPr/>
+        <p:nvPr/>
+      </p:nvGrpSpPr>
+      <p:grpSpPr>
+        <a:xfrm>
+          <a:off x="0" y="0"/>
+          <a:ext cx="0" cy="0"/>
+          <a:chOff x="0" y="0"/>
+          <a:chExt cx="0" cy="0"/>
+        </a:xfrm>
+      </p:grpSpPr>
+      <p:sp>
+        <p:nvSpPr>
+          <p:cNvPr id="2" name="Slide Image Placeholder 1"/>
+          <p:cNvSpPr>
+            <a:spLocks noGrp="1" noRot="1" noChangeAspect="1"/>
+          </p:cNvSpPr>
+          <p:nvPr>
+            <p:ph type="sldImg"/>
+          </p:nvPr>
+        </p:nvSpPr>
+        <p:spPr/>
+      </p:sp>
+      <p:sp>
+        <p:nvSpPr>
+          <p:cNvPr id="3" name="Notes Placeholder 2"/>
+          <p:cNvSpPr>
+            <a:spLocks noGrp="1"/>
+          </p:cNvSpPr>
+          <p:nvPr>
+            <p:ph type="body" idx="1"/>
+          </p:nvPr>
+        </p:nvSpPr>
+        <p:spPr/>
+        <p:txBody>
+          <a:bodyPr/>
+          <a:lstStyle/>
+          <a:p>
+            <a:r>
+              <a:rPr lang="en-US" dirty="0"/>
+              <a:t>SW env should prefer platform-specific, </a:t>
+            </a:r>
+            <a:r>
+              <a:rPr lang="en-US" dirty="0" err="1"/>
+              <a:t>exper</a:t>
+            </a:r>
+            <a:r>
+              <a:rPr lang="en-US" dirty="0"/>
+              <a:t>—built modules, then </a:t>
+            </a:r>
+            <a:r>
+              <a:rPr lang="en-US" dirty="0" err="1"/>
+              <a:t>Spack</a:t>
+            </a:r>
+            <a:r>
+              <a:rPr lang="en-US" dirty="0"/>
+              <a:t>, then hand-built dependencies.</a:t>
+            </a:r>
+          </a:p>
+          <a:p>
+            <a:endParaRPr lang="en-US" dirty="0"/>
+          </a:p>
+          <a:p>
+            <a:r>
+              <a:rPr lang="en-US" dirty="0"/>
+              <a:t>Motivate folder structure naming convention in terms of observatory.</a:t>
+            </a:r>
+          </a:p>
+          <a:p>
+            <a:endParaRPr lang="en-US" dirty="0"/>
+          </a:p>
+          <a:p>
+            <a:r>
+              <a:rPr lang="en-US" dirty="0"/>
+              <a:t>Is the bottom-up approach a variant of data-driven design?  My prime goal is to save all data</a:t>
+            </a:r>
+          </a:p>
+        </p:txBody>
+      </p:sp>
+      <p:sp>
+        <p:nvSpPr>
+          <p:cNvPr id="4" name="Slide Number Placeholder 3"/>
+          <p:cNvSpPr>
+            <a:spLocks noGrp="1"/>
+          </p:cNvSpPr>
+          <p:nvPr>
+            <p:ph type="sldNum" sz="quarter" idx="5"/>
+          </p:nvPr>
+        </p:nvSpPr>
+        <p:spPr/>
+        <p:txBody>
+          <a:bodyPr/>
+          <a:lstStyle/>
+          <a:p>
+            <a:fld id="{54E672D7-8E2D-4611-973D-F4591A707C34}" type="slidenum">
+              <a:rPr lang="en-US" smtClean="0"/>
+              <a:t>12</a:t>
+            </a:fld>
+            <a:endParaRPr lang="en-US"/>
+          </a:p>
+        </p:txBody>
+      </p:sp>
+    </p:spTree>
+    <p:extLst>
+      <p:ext uri="{BB962C8B-B14F-4D97-AF65-F5344CB8AC3E}">
+        <p14:creationId xmlns:p14="http://schemas.microsoft.com/office/powerpoint/2010/main" val="300714477"/>
+      </p:ext>
+    </p:extLst>
+  </p:cSld>
+  <p:clrMapOvr>
+    <a:masterClrMapping/>
+  </p:clrMapOvr>
+</p:notes>
 </file>
 
 <file path=ppt/slideLayouts/slideLayout1.xml><?xml version="1.0" encoding="utf-8"?>
@@ -4372,7 +5190,7 @@
         <p:spPr>
           <a:xfrm>
             <a:off x="3176924" y="2085870"/>
-            <a:ext cx="1983235" cy="424732"/>
+            <a:ext cx="6341801" cy="936667"/>
           </a:xfrm>
         </p:spPr>
         <p:txBody>
@@ -4380,42 +5198,40 @@
           <a:lstStyle/>
           <a:p>
             <a:r>
+              <a:rPr lang="en-US" dirty="0" err="1"/>
+              <a:t>Anshu</a:t>
+            </a:r>
+            <a:r>
+              <a:rPr lang="en-US" dirty="0"/>
+              <a:t> Dubey</a:t>
+            </a:r>
+            <a:r>
+              <a:rPr lang="en-US" u="none" dirty="0"/>
+              <a:t> </a:t>
+            </a:r>
+            <a:r>
+              <a:rPr lang="en-US" sz="2000" u="none" dirty="0"/>
+              <a:t>(she/her)</a:t>
+            </a:r>
+            <a:r>
+              <a:rPr lang="en-US" u="none" dirty="0"/>
+              <a:t> &amp; </a:t>
+            </a:r>
+            <a:r>
               <a:rPr lang="en-US" dirty="0"/>
               <a:t>Jared O’Neal</a:t>
             </a:r>
-          </a:p>
-        </p:txBody>
-      </p:sp>
-      <p:sp>
-        <p:nvSpPr>
-          <p:cNvPr id="5" name="Text Placeholder 4">
-            <a:extLst>
-              <a:ext uri="{FF2B5EF4-FFF2-40B4-BE49-F238E27FC236}">
-                <a16:creationId xmlns:a16="http://schemas.microsoft.com/office/drawing/2014/main" id="{65EE6617-5516-4E55-AE7E-7E31417CEDFF}"/>
-              </a:ext>
-            </a:extLst>
-          </p:cNvPr>
-          <p:cNvSpPr>
-            <a:spLocks noGrp="1"/>
-          </p:cNvSpPr>
-          <p:nvPr>
-            <p:ph type="body" sz="quarter" idx="12"/>
-          </p:nvPr>
-        </p:nvSpPr>
-        <p:spPr>
-          <a:xfrm>
-            <a:off x="5073051" y="2134517"/>
-            <a:ext cx="1690167" cy="376085"/>
-          </a:xfrm>
-        </p:spPr>
-        <p:txBody>
-          <a:bodyPr/>
-          <a:lstStyle/>
-          <a:p>
-            <a:r>
-              <a:rPr lang="en-US" dirty="0"/>
+            <a:r>
+              <a:rPr lang="en-US" u="none" dirty="0"/>
+              <a:t> </a:t>
+            </a:r>
+            <a:r>
+              <a:rPr lang="en-US" sz="2000" u="none" dirty="0"/>
               <a:t>(he/him)</a:t>
             </a:r>
+          </a:p>
+          <a:p>
+            <a:endParaRPr lang="en-US" dirty="0"/>
           </a:p>
         </p:txBody>
       </p:sp>
@@ -4517,7 +5333,15 @@
           <a:p>
             <a:r>
               <a:rPr lang="en-US" dirty="0"/>
-              <a:t>Contributors: Jared O’Neal (ANL)</a:t>
+              <a:t>Contributors: </a:t>
+            </a:r>
+            <a:r>
+              <a:rPr lang="en-US" dirty="0" err="1"/>
+              <a:t>Anshu</a:t>
+            </a:r>
+            <a:r>
+              <a:rPr lang="en-US" dirty="0"/>
+              <a:t> Dubey (ANL), Jared O’Neal (ANL)</a:t>
             </a:r>
           </a:p>
         </p:txBody>
@@ -4526,6 +5350,3069 @@
     <p:extLst>
       <p:ext uri="{BB962C8B-B14F-4D97-AF65-F5344CB8AC3E}">
         <p14:creationId xmlns:p14="http://schemas.microsoft.com/office/powerpoint/2010/main" val="2194705569"/>
+      </p:ext>
+    </p:extLst>
+  </p:cSld>
+  <p:clrMapOvr>
+    <a:masterClrMapping/>
+  </p:clrMapOvr>
+</p:sld>
+</file>
+
+<file path=ppt/slides/slide10.xml><?xml version="1.0" encoding="utf-8"?>
+<p:sld xmlns:a="http://schemas.openxmlformats.org/drawingml/2006/main" xmlns:r="http://schemas.openxmlformats.org/officeDocument/2006/relationships" xmlns:p="http://schemas.openxmlformats.org/presentationml/2006/main">
+  <p:cSld>
+    <p:spTree>
+      <p:nvGrpSpPr>
+        <p:cNvPr id="1" name=""/>
+        <p:cNvGrpSpPr/>
+        <p:nvPr/>
+      </p:nvGrpSpPr>
+      <p:grpSpPr>
+        <a:xfrm>
+          <a:off x="0" y="0"/>
+          <a:ext cx="0" cy="0"/>
+          <a:chOff x="0" y="0"/>
+          <a:chExt cx="0" cy="0"/>
+        </a:xfrm>
+      </p:grpSpPr>
+      <p:sp>
+        <p:nvSpPr>
+          <p:cNvPr id="2" name="Title 1">
+            <a:extLst>
+              <a:ext uri="{FF2B5EF4-FFF2-40B4-BE49-F238E27FC236}">
+                <a16:creationId xmlns:a16="http://schemas.microsoft.com/office/drawing/2014/main" id="{B77AD679-6E1D-E8ED-F367-6A37ED51F2EF}"/>
+              </a:ext>
+            </a:extLst>
+          </p:cNvPr>
+          <p:cNvSpPr>
+            <a:spLocks noGrp="1"/>
+          </p:cNvSpPr>
+          <p:nvPr>
+            <p:ph type="title"/>
+          </p:nvPr>
+        </p:nvSpPr>
+        <p:spPr/>
+        <p:txBody>
+          <a:bodyPr/>
+          <a:lstStyle/>
+          <a:p>
+            <a:r>
+              <a:rPr lang="en-US" dirty="0"/>
+              <a:t>Computational laboratory environments</a:t>
+            </a:r>
+          </a:p>
+        </p:txBody>
+      </p:sp>
+      <p:sp>
+        <p:nvSpPr>
+          <p:cNvPr id="3" name="Content Placeholder 2">
+            <a:extLst>
+              <a:ext uri="{FF2B5EF4-FFF2-40B4-BE49-F238E27FC236}">
+                <a16:creationId xmlns:a16="http://schemas.microsoft.com/office/drawing/2014/main" id="{DF78D7BD-F097-E3B9-9122-8F97B9ADD029}"/>
+              </a:ext>
+            </a:extLst>
+          </p:cNvPr>
+          <p:cNvSpPr>
+            <a:spLocks noGrp="1"/>
+          </p:cNvSpPr>
+          <p:nvPr>
+            <p:ph idx="1"/>
+          </p:nvPr>
+        </p:nvSpPr>
+        <p:spPr/>
+        <p:txBody>
+          <a:bodyPr/>
+          <a:lstStyle/>
+          <a:p>
+            <a:pPr marL="0" indent="0">
+              <a:buNone/>
+            </a:pPr>
+            <a:r>
+              <a:rPr lang="en-US" dirty="0"/>
+              <a:t>Rather than a single lab, use many simple, minimal environments</a:t>
+            </a:r>
+          </a:p>
+          <a:p>
+            <a:r>
+              <a:rPr lang="en-US" dirty="0"/>
+              <a:t>Tailor formality, complexity, and automation to each team and each use case</a:t>
+            </a:r>
+          </a:p>
+          <a:p>
+            <a:r>
+              <a:rPr lang="en-US" dirty="0"/>
+              <a:t>Each code repository has dedicated test environment</a:t>
+            </a:r>
+          </a:p>
+          <a:p>
+            <a:r>
+              <a:rPr lang="en-US" dirty="0"/>
+              <a:t>Each developer can have dedicated development environment (optional)</a:t>
+            </a:r>
+          </a:p>
+          <a:p>
+            <a:r>
+              <a:rPr lang="en-US" dirty="0"/>
+              <a:t>One environment per scientific study</a:t>
+            </a:r>
+          </a:p>
+          <a:p>
+            <a:r>
+              <a:rPr lang="en-US" dirty="0"/>
+              <a:t>Environments are encapsulated</a:t>
+            </a:r>
+          </a:p>
+          <a:p>
+            <a:pPr lvl="1"/>
+            <a:r>
+              <a:rPr lang="en-US" dirty="0"/>
+              <a:t>Dedicated documentation</a:t>
+            </a:r>
+          </a:p>
+          <a:p>
+            <a:pPr lvl="1"/>
+            <a:r>
+              <a:rPr lang="en-US" dirty="0"/>
+              <a:t>Dedicated software environments</a:t>
+            </a:r>
+          </a:p>
+          <a:p>
+            <a:pPr lvl="1"/>
+            <a:r>
+              <a:rPr lang="en-US" dirty="0"/>
+              <a:t>Can be updated and managed independently</a:t>
+            </a:r>
+          </a:p>
+          <a:p>
+            <a:pPr marL="346075" lvl="1" indent="0">
+              <a:buNone/>
+            </a:pPr>
+            <a:endParaRPr lang="en-US" dirty="0"/>
+          </a:p>
+          <a:p>
+            <a:pPr lvl="1"/>
+            <a:endParaRPr lang="en-US" dirty="0"/>
+          </a:p>
+        </p:txBody>
+      </p:sp>
+    </p:spTree>
+    <p:extLst>
+      <p:ext uri="{BB962C8B-B14F-4D97-AF65-F5344CB8AC3E}">
+        <p14:creationId xmlns:p14="http://schemas.microsoft.com/office/powerpoint/2010/main" val="3862198704"/>
+      </p:ext>
+    </p:extLst>
+  </p:cSld>
+  <p:clrMapOvr>
+    <a:masterClrMapping/>
+  </p:clrMapOvr>
+</p:sld>
+</file>
+
+<file path=ppt/slides/slide11.xml><?xml version="1.0" encoding="utf-8"?>
+<p:sld xmlns:a="http://schemas.openxmlformats.org/drawingml/2006/main" xmlns:r="http://schemas.openxmlformats.org/officeDocument/2006/relationships" xmlns:p="http://schemas.openxmlformats.org/presentationml/2006/main">
+  <p:cSld>
+    <p:spTree>
+      <p:nvGrpSpPr>
+        <p:cNvPr id="1" name=""/>
+        <p:cNvGrpSpPr/>
+        <p:nvPr/>
+      </p:nvGrpSpPr>
+      <p:grpSpPr>
+        <a:xfrm>
+          <a:off x="0" y="0"/>
+          <a:ext cx="0" cy="0"/>
+          <a:chOff x="0" y="0"/>
+          <a:chExt cx="0" cy="0"/>
+        </a:xfrm>
+      </p:grpSpPr>
+      <p:sp>
+        <p:nvSpPr>
+          <p:cNvPr id="2" name="Title 1">
+            <a:extLst>
+              <a:ext uri="{FF2B5EF4-FFF2-40B4-BE49-F238E27FC236}">
+                <a16:creationId xmlns:a16="http://schemas.microsoft.com/office/drawing/2014/main" id="{86F722ED-6E62-2CD1-6496-CCCBAF9B5475}"/>
+              </a:ext>
+            </a:extLst>
+          </p:cNvPr>
+          <p:cNvSpPr>
+            <a:spLocks noGrp="1"/>
+          </p:cNvSpPr>
+          <p:nvPr>
+            <p:ph type="title"/>
+          </p:nvPr>
+        </p:nvSpPr>
+        <p:spPr/>
+        <p:txBody>
+          <a:bodyPr/>
+          <a:lstStyle/>
+          <a:p>
+            <a:r>
+              <a:rPr lang="en-US" dirty="0"/>
+              <a:t>A system of repositories</a:t>
+            </a:r>
+          </a:p>
+        </p:txBody>
+      </p:sp>
+      <p:sp>
+        <p:nvSpPr>
+          <p:cNvPr id="3" name="Content Placeholder 2">
+            <a:extLst>
+              <a:ext uri="{FF2B5EF4-FFF2-40B4-BE49-F238E27FC236}">
+                <a16:creationId xmlns:a16="http://schemas.microsoft.com/office/drawing/2014/main" id="{465CB0DA-7267-34CF-75B2-87B574CD54D2}"/>
+              </a:ext>
+            </a:extLst>
+          </p:cNvPr>
+          <p:cNvSpPr>
+            <a:spLocks noGrp="1"/>
+          </p:cNvSpPr>
+          <p:nvPr>
+            <p:ph idx="1"/>
+          </p:nvPr>
+        </p:nvSpPr>
+        <p:spPr>
+          <a:xfrm>
+            <a:off x="365760" y="1737360"/>
+            <a:ext cx="5932403" cy="4047778"/>
+          </a:xfrm>
+        </p:spPr>
+        <p:txBody>
+          <a:bodyPr/>
+          <a:lstStyle/>
+          <a:p>
+            <a:r>
+              <a:rPr lang="en-US" dirty="0"/>
+              <a:t>Each environment is built as an individual repository</a:t>
+            </a:r>
+          </a:p>
+          <a:p>
+            <a:r>
+              <a:rPr lang="en-US" dirty="0"/>
+              <a:t>Some complexity transferred to interconnecting repositories</a:t>
+            </a:r>
+          </a:p>
+        </p:txBody>
+      </p:sp>
+      <p:sp>
+        <p:nvSpPr>
+          <p:cNvPr id="4" name="TextBox 3">
+            <a:extLst>
+              <a:ext uri="{FF2B5EF4-FFF2-40B4-BE49-F238E27FC236}">
+                <a16:creationId xmlns:a16="http://schemas.microsoft.com/office/drawing/2014/main" id="{5F24CB53-A7D9-B970-3EB7-8E9DA80782C0}"/>
+              </a:ext>
+            </a:extLst>
+          </p:cNvPr>
+          <p:cNvSpPr txBox="1"/>
+          <p:nvPr/>
+        </p:nvSpPr>
+        <p:spPr>
+          <a:xfrm>
+            <a:off x="5113175" y="4205005"/>
+            <a:ext cx="5803641" cy="1181862"/>
+          </a:xfrm>
+          <a:prstGeom prst="rect">
+            <a:avLst/>
+          </a:prstGeom>
+          <a:noFill/>
+        </p:spPr>
+        <p:txBody>
+          <a:bodyPr wrap="square" lIns="118872" tIns="91440" rIns="118872" bIns="91440" rtlCol="0" anchor="ctr" anchorCtr="0">
+            <a:spAutoFit/>
+          </a:bodyPr>
+          <a:lstStyle/>
+          <a:p>
+            <a:pPr algn="l">
+              <a:lnSpc>
+                <a:spcPct val="90000"/>
+              </a:lnSpc>
+            </a:pPr>
+            <a:r>
+              <a:rPr lang="en-US" dirty="0">
+                <a:solidFill>
+                  <a:srgbClr val="FF0000"/>
+                </a:solidFill>
+              </a:rPr>
+              <a:t>TODO: Add graphic of a group of code repos (e.g., Flash-X, </a:t>
+            </a:r>
+            <a:r>
+              <a:rPr lang="en-US" dirty="0" err="1">
+                <a:solidFill>
+                  <a:srgbClr val="FF0000"/>
+                </a:solidFill>
+              </a:rPr>
+              <a:t>AMReX</a:t>
+            </a:r>
+            <a:r>
+              <a:rPr lang="en-US" dirty="0">
+                <a:solidFill>
+                  <a:srgbClr val="FF0000"/>
+                </a:solidFill>
+              </a:rPr>
+              <a:t>, Paramesh),</a:t>
+            </a:r>
+          </a:p>
+          <a:p>
+            <a:pPr algn="l">
+              <a:lnSpc>
+                <a:spcPct val="90000"/>
+              </a:lnSpc>
+            </a:pPr>
+            <a:r>
+              <a:rPr lang="en-US" dirty="0">
+                <a:solidFill>
+                  <a:srgbClr val="FF0000"/>
+                </a:solidFill>
+              </a:rPr>
+              <a:t>A testing repo, developer repos, and several study repos.</a:t>
+            </a:r>
+          </a:p>
+        </p:txBody>
+      </p:sp>
+    </p:spTree>
+    <p:extLst>
+      <p:ext uri="{BB962C8B-B14F-4D97-AF65-F5344CB8AC3E}">
+        <p14:creationId xmlns:p14="http://schemas.microsoft.com/office/powerpoint/2010/main" val="381376923"/>
+      </p:ext>
+    </p:extLst>
+  </p:cSld>
+  <p:clrMapOvr>
+    <a:masterClrMapping/>
+  </p:clrMapOvr>
+</p:sld>
+</file>
+
+<file path=ppt/slides/slide12.xml><?xml version="1.0" encoding="utf-8"?>
+<p:sld xmlns:a="http://schemas.openxmlformats.org/drawingml/2006/main" xmlns:r="http://schemas.openxmlformats.org/officeDocument/2006/relationships" xmlns:p="http://schemas.openxmlformats.org/presentationml/2006/main">
+  <p:cSld>
+    <p:spTree>
+      <p:nvGrpSpPr>
+        <p:cNvPr id="1" name=""/>
+        <p:cNvGrpSpPr/>
+        <p:nvPr/>
+      </p:nvGrpSpPr>
+      <p:grpSpPr>
+        <a:xfrm>
+          <a:off x="0" y="0"/>
+          <a:ext cx="0" cy="0"/>
+          <a:chOff x="0" y="0"/>
+          <a:chExt cx="0" cy="0"/>
+        </a:xfrm>
+      </p:grpSpPr>
+      <p:sp>
+        <p:nvSpPr>
+          <p:cNvPr id="2" name="Title 1">
+            <a:extLst>
+              <a:ext uri="{FF2B5EF4-FFF2-40B4-BE49-F238E27FC236}">
+                <a16:creationId xmlns:a16="http://schemas.microsoft.com/office/drawing/2014/main" id="{EE630F31-FEFD-5161-910C-768CD5C536A4}"/>
+              </a:ext>
+            </a:extLst>
+          </p:cNvPr>
+          <p:cNvSpPr>
+            <a:spLocks noGrp="1"/>
+          </p:cNvSpPr>
+          <p:nvPr>
+            <p:ph type="title"/>
+          </p:nvPr>
+        </p:nvSpPr>
+        <p:spPr/>
+        <p:txBody>
+          <a:bodyPr/>
+          <a:lstStyle/>
+          <a:p>
+            <a:r>
+              <a:rPr lang="en-US" dirty="0"/>
+              <a:t>Constructing computational lab environment</a:t>
+            </a:r>
+            <a:br>
+              <a:rPr lang="en-US" dirty="0"/>
+            </a:br>
+            <a:r>
+              <a:rPr lang="en-US" sz="2000" b="0" dirty="0"/>
+              <a:t>Start from the bottom</a:t>
+            </a:r>
+          </a:p>
+        </p:txBody>
+      </p:sp>
+      <p:sp>
+        <p:nvSpPr>
+          <p:cNvPr id="3" name="Content Placeholder 2">
+            <a:extLst>
+              <a:ext uri="{FF2B5EF4-FFF2-40B4-BE49-F238E27FC236}">
+                <a16:creationId xmlns:a16="http://schemas.microsoft.com/office/drawing/2014/main" id="{D909A5DF-3E0F-6F11-CCCA-30ADE68482E9}"/>
+              </a:ext>
+            </a:extLst>
+          </p:cNvPr>
+          <p:cNvSpPr>
+            <a:spLocks noGrp="1"/>
+          </p:cNvSpPr>
+          <p:nvPr>
+            <p:ph idx="1"/>
+          </p:nvPr>
+        </p:nvSpPr>
+        <p:spPr>
+          <a:xfrm>
+            <a:off x="365760" y="1345472"/>
+            <a:ext cx="11369809" cy="4047778"/>
+          </a:xfrm>
+        </p:spPr>
+        <p:txBody>
+          <a:bodyPr/>
+          <a:lstStyle/>
+          <a:p>
+            <a:r>
+              <a:rPr lang="en-US" sz="1800" dirty="0"/>
+              <a:t>File storage, protection, maintenance, and sharing</a:t>
+            </a:r>
+          </a:p>
+          <a:p>
+            <a:pPr lvl="1"/>
+            <a:r>
+              <a:rPr lang="en-US" sz="1800" dirty="0"/>
+              <a:t>Try to avoid deep folder structures &amp; long names</a:t>
+            </a:r>
+          </a:p>
+          <a:p>
+            <a:r>
+              <a:rPr lang="en-US" sz="1800" dirty="0"/>
+              <a:t>Construct software environments</a:t>
+            </a:r>
+          </a:p>
+          <a:p>
+            <a:pPr lvl="1"/>
+            <a:r>
+              <a:rPr lang="en-US" sz="1800" dirty="0"/>
+              <a:t>File management tools</a:t>
+            </a:r>
+          </a:p>
+          <a:p>
+            <a:pPr lvl="1"/>
+            <a:r>
+              <a:rPr lang="en-US" sz="1800" dirty="0"/>
+              <a:t>Compilation and libraries (</a:t>
+            </a:r>
+            <a:r>
+              <a:rPr lang="en-US" sz="1800" i="1" dirty="0"/>
+              <a:t>e.g.</a:t>
+            </a:r>
+            <a:r>
+              <a:rPr lang="en-US" sz="1800" dirty="0"/>
+              <a:t>, </a:t>
+            </a:r>
+            <a:r>
+              <a:rPr lang="en-US" sz="1800" dirty="0" err="1"/>
+              <a:t>Spack</a:t>
+            </a:r>
+            <a:r>
+              <a:rPr lang="en-US" sz="1800" dirty="0"/>
+              <a:t> env)</a:t>
+            </a:r>
+          </a:p>
+          <a:p>
+            <a:pPr lvl="1"/>
+            <a:r>
+              <a:rPr lang="en-US" sz="1800" dirty="0"/>
+              <a:t>Data analysis tools (</a:t>
+            </a:r>
+            <a:r>
+              <a:rPr lang="en-US" sz="1800" i="1" dirty="0"/>
+              <a:t>e.g.</a:t>
+            </a:r>
+            <a:r>
+              <a:rPr lang="en-US" sz="1800" dirty="0"/>
+              <a:t>, python virtual env)</a:t>
+            </a:r>
+          </a:p>
+          <a:p>
+            <a:r>
+              <a:rPr lang="en-US" sz="1800" dirty="0"/>
+              <a:t>Platform-specific build information</a:t>
+            </a:r>
+          </a:p>
+          <a:p>
+            <a:r>
+              <a:rPr lang="en-US" sz="1800" dirty="0"/>
+              <a:t>Platform-specific job scripts</a:t>
+            </a:r>
+          </a:p>
+          <a:p>
+            <a:r>
+              <a:rPr lang="en-US" sz="1800" dirty="0"/>
+              <a:t>Testing and verification</a:t>
+            </a:r>
+          </a:p>
+          <a:p>
+            <a:r>
+              <a:rPr lang="en-US" sz="1800" dirty="0"/>
+              <a:t>Analysis tools</a:t>
+            </a:r>
+          </a:p>
+          <a:p>
+            <a:r>
+              <a:rPr lang="en-US" sz="1800" dirty="0"/>
+              <a:t>Documentation infrastructure &amp; scheme</a:t>
+            </a:r>
+          </a:p>
+          <a:p>
+            <a:r>
+              <a:rPr lang="en-US" sz="1800" dirty="0"/>
+              <a:t>Article infrastructure</a:t>
+            </a:r>
+          </a:p>
+          <a:p>
+            <a:pPr marL="0" indent="0">
+              <a:buNone/>
+            </a:pPr>
+            <a:endParaRPr lang="en-US" dirty="0"/>
+          </a:p>
+        </p:txBody>
+      </p:sp>
+      <p:sp>
+        <p:nvSpPr>
+          <p:cNvPr id="4" name="TextBox 3">
+            <a:extLst>
+              <a:ext uri="{FF2B5EF4-FFF2-40B4-BE49-F238E27FC236}">
+                <a16:creationId xmlns:a16="http://schemas.microsoft.com/office/drawing/2014/main" id="{F3ADB0D0-5D15-3A0C-F20E-0CE93BDD6EB5}"/>
+              </a:ext>
+            </a:extLst>
+          </p:cNvPr>
+          <p:cNvSpPr txBox="1"/>
+          <p:nvPr/>
+        </p:nvSpPr>
+        <p:spPr>
+          <a:xfrm>
+            <a:off x="7441552" y="2234917"/>
+            <a:ext cx="3502626" cy="738664"/>
+          </a:xfrm>
+          <a:prstGeom prst="rect">
+            <a:avLst/>
+          </a:prstGeom>
+          <a:noFill/>
+        </p:spPr>
+        <p:txBody>
+          <a:bodyPr wrap="none" lIns="118872" tIns="91440" rIns="118872" bIns="91440" rtlCol="0" anchor="ctr" anchorCtr="0">
+            <a:spAutoFit/>
+          </a:bodyPr>
+          <a:lstStyle/>
+          <a:p>
+            <a:pPr algn="ctr">
+              <a:lnSpc>
+                <a:spcPct val="90000"/>
+              </a:lnSpc>
+            </a:pPr>
+            <a:r>
+              <a:rPr lang="en-US" sz="2000" dirty="0"/>
+              <a:t>Testing environments can be</a:t>
+            </a:r>
+          </a:p>
+          <a:p>
+            <a:pPr algn="ctr">
+              <a:lnSpc>
+                <a:spcPct val="90000"/>
+              </a:lnSpc>
+            </a:pPr>
+            <a:r>
+              <a:rPr lang="en-US" sz="2000" dirty="0"/>
+              <a:t>more complicated</a:t>
+            </a:r>
+          </a:p>
+        </p:txBody>
+      </p:sp>
+      <p:sp>
+        <p:nvSpPr>
+          <p:cNvPr id="5" name="TextBox 4">
+            <a:extLst>
+              <a:ext uri="{FF2B5EF4-FFF2-40B4-BE49-F238E27FC236}">
+                <a16:creationId xmlns:a16="http://schemas.microsoft.com/office/drawing/2014/main" id="{100E82C8-73D2-322D-DC57-F748D1A3FBF9}"/>
+              </a:ext>
+            </a:extLst>
+          </p:cNvPr>
+          <p:cNvSpPr txBox="1"/>
+          <p:nvPr/>
+        </p:nvSpPr>
+        <p:spPr>
+          <a:xfrm>
+            <a:off x="7429722" y="4053379"/>
+            <a:ext cx="3769879" cy="738664"/>
+          </a:xfrm>
+          <a:prstGeom prst="rect">
+            <a:avLst/>
+          </a:prstGeom>
+          <a:noFill/>
+        </p:spPr>
+        <p:txBody>
+          <a:bodyPr wrap="none" lIns="118872" tIns="91440" rIns="118872" bIns="91440" rtlCol="0" anchor="ctr" anchorCtr="0">
+            <a:spAutoFit/>
+          </a:bodyPr>
+          <a:lstStyle/>
+          <a:p>
+            <a:pPr algn="ctr">
+              <a:lnSpc>
+                <a:spcPct val="90000"/>
+              </a:lnSpc>
+            </a:pPr>
+            <a:r>
+              <a:rPr lang="en-US" sz="2000" dirty="0"/>
+              <a:t>Build, test, and officially verify.</a:t>
+            </a:r>
+          </a:p>
+          <a:p>
+            <a:pPr algn="ctr">
+              <a:lnSpc>
+                <a:spcPct val="90000"/>
+              </a:lnSpc>
+            </a:pPr>
+            <a:r>
+              <a:rPr lang="en-US" sz="2000" dirty="0"/>
+              <a:t>Don’t alter or update afterward.</a:t>
+            </a:r>
+          </a:p>
+        </p:txBody>
+      </p:sp>
+    </p:spTree>
+    <p:extLst>
+      <p:ext uri="{BB962C8B-B14F-4D97-AF65-F5344CB8AC3E}">
+        <p14:creationId xmlns:p14="http://schemas.microsoft.com/office/powerpoint/2010/main" val="4177775952"/>
+      </p:ext>
+    </p:extLst>
+  </p:cSld>
+  <p:clrMapOvr>
+    <a:masterClrMapping/>
+  </p:clrMapOvr>
+</p:sld>
+</file>
+
+<file path=ppt/slides/slide13.xml><?xml version="1.0" encoding="utf-8"?>
+<p:sld xmlns:a="http://schemas.openxmlformats.org/drawingml/2006/main" xmlns:r="http://schemas.openxmlformats.org/officeDocument/2006/relationships" xmlns:p="http://schemas.openxmlformats.org/presentationml/2006/main">
+  <p:cSld>
+    <p:spTree>
+      <p:nvGrpSpPr>
+        <p:cNvPr id="1" name=""/>
+        <p:cNvGrpSpPr/>
+        <p:nvPr/>
+      </p:nvGrpSpPr>
+      <p:grpSpPr>
+        <a:xfrm>
+          <a:off x="0" y="0"/>
+          <a:ext cx="0" cy="0"/>
+          <a:chOff x="0" y="0"/>
+          <a:chExt cx="0" cy="0"/>
+        </a:xfrm>
+      </p:grpSpPr>
+      <p:sp>
+        <p:nvSpPr>
+          <p:cNvPr id="2" name="Title 1">
+            <a:extLst>
+              <a:ext uri="{FF2B5EF4-FFF2-40B4-BE49-F238E27FC236}">
+                <a16:creationId xmlns:a16="http://schemas.microsoft.com/office/drawing/2014/main" id="{FD554512-08C1-E3A1-FF75-E001887D8A27}"/>
+              </a:ext>
+            </a:extLst>
+          </p:cNvPr>
+          <p:cNvSpPr>
+            <a:spLocks noGrp="1"/>
+          </p:cNvSpPr>
+          <p:nvPr>
+            <p:ph type="title"/>
+          </p:nvPr>
+        </p:nvSpPr>
+        <p:spPr/>
+        <p:txBody>
+          <a:bodyPr/>
+          <a:lstStyle/>
+          <a:p>
+            <a:r>
+              <a:rPr lang="en-US" dirty="0"/>
+              <a:t>Repos and File Management</a:t>
+            </a:r>
+          </a:p>
+        </p:txBody>
+      </p:sp>
+      <p:sp>
+        <p:nvSpPr>
+          <p:cNvPr id="3" name="Content Placeholder 2">
+            <a:extLst>
+              <a:ext uri="{FF2B5EF4-FFF2-40B4-BE49-F238E27FC236}">
+                <a16:creationId xmlns:a16="http://schemas.microsoft.com/office/drawing/2014/main" id="{FE693A2D-9A47-9CA7-8764-C10E4D00CCF5}"/>
+              </a:ext>
+            </a:extLst>
+          </p:cNvPr>
+          <p:cNvSpPr>
+            <a:spLocks noGrp="1"/>
+          </p:cNvSpPr>
+          <p:nvPr>
+            <p:ph idx="1"/>
+          </p:nvPr>
+        </p:nvSpPr>
+        <p:spPr/>
+        <p:txBody>
+          <a:bodyPr/>
+          <a:lstStyle/>
+          <a:p>
+            <a:r>
+              <a:rPr lang="en-US" dirty="0">
+                <a:solidFill>
+                  <a:srgbClr val="FF0000"/>
+                </a:solidFill>
+              </a:rPr>
+              <a:t>TODO: Explain code repo, study repo, work clone, and data clone.  Add graphic based on GCE and potentially Bebop.  Include env vars?</a:t>
+            </a:r>
+          </a:p>
+        </p:txBody>
+      </p:sp>
+    </p:spTree>
+    <p:extLst>
+      <p:ext uri="{BB962C8B-B14F-4D97-AF65-F5344CB8AC3E}">
+        <p14:creationId xmlns:p14="http://schemas.microsoft.com/office/powerpoint/2010/main" val="3645548046"/>
+      </p:ext>
+    </p:extLst>
+  </p:cSld>
+  <p:clrMapOvr>
+    <a:masterClrMapping/>
+  </p:clrMapOvr>
+</p:sld>
+</file>
+
+<file path=ppt/slides/slide14.xml><?xml version="1.0" encoding="utf-8"?>
+<p:sld xmlns:a="http://schemas.openxmlformats.org/drawingml/2006/main" xmlns:r="http://schemas.openxmlformats.org/officeDocument/2006/relationships" xmlns:p="http://schemas.openxmlformats.org/presentationml/2006/main">
+  <p:cSld>
+    <p:spTree>
+      <p:nvGrpSpPr>
+        <p:cNvPr id="1" name=""/>
+        <p:cNvGrpSpPr/>
+        <p:nvPr/>
+      </p:nvGrpSpPr>
+      <p:grpSpPr>
+        <a:xfrm>
+          <a:off x="0" y="0"/>
+          <a:ext cx="0" cy="0"/>
+          <a:chOff x="0" y="0"/>
+          <a:chExt cx="0" cy="0"/>
+        </a:xfrm>
+      </p:grpSpPr>
+      <p:sp>
+        <p:nvSpPr>
+          <p:cNvPr id="2" name="Title 1">
+            <a:extLst>
+              <a:ext uri="{FF2B5EF4-FFF2-40B4-BE49-F238E27FC236}">
+                <a16:creationId xmlns:a16="http://schemas.microsoft.com/office/drawing/2014/main" id="{F2A03D73-BD96-906C-6176-C03D91364275}"/>
+              </a:ext>
+            </a:extLst>
+          </p:cNvPr>
+          <p:cNvSpPr>
+            <a:spLocks noGrp="1"/>
+          </p:cNvSpPr>
+          <p:nvPr>
+            <p:ph type="title"/>
+          </p:nvPr>
+        </p:nvSpPr>
+        <p:spPr/>
+        <p:txBody>
+          <a:bodyPr/>
+          <a:lstStyle/>
+          <a:p>
+            <a:r>
+              <a:rPr lang="en-US" dirty="0"/>
+              <a:t>Documentation</a:t>
+            </a:r>
+          </a:p>
+        </p:txBody>
+      </p:sp>
+      <p:sp>
+        <p:nvSpPr>
+          <p:cNvPr id="3" name="Content Placeholder 2">
+            <a:extLst>
+              <a:ext uri="{FF2B5EF4-FFF2-40B4-BE49-F238E27FC236}">
+                <a16:creationId xmlns:a16="http://schemas.microsoft.com/office/drawing/2014/main" id="{362A39C8-4CD4-811F-400F-FD3AA5F61C8E}"/>
+              </a:ext>
+            </a:extLst>
+          </p:cNvPr>
+          <p:cNvSpPr>
+            <a:spLocks noGrp="1"/>
+          </p:cNvSpPr>
+          <p:nvPr>
+            <p:ph idx="1"/>
+          </p:nvPr>
+        </p:nvSpPr>
+        <p:spPr>
+          <a:xfrm>
+            <a:off x="365760" y="1405111"/>
+            <a:ext cx="11369809" cy="4047778"/>
+          </a:xfrm>
+        </p:spPr>
+        <p:txBody>
+          <a:bodyPr/>
+          <a:lstStyle/>
+          <a:p>
+            <a:r>
+              <a:rPr lang="en-US" dirty="0"/>
+              <a:t>We don’t want a single 10,000 line README </a:t>
+            </a:r>
+          </a:p>
+          <a:p>
+            <a:r>
+              <a:rPr lang="en-US" dirty="0"/>
+              <a:t>Store data next to its metadata and context so that all can understand how it was created and how to use it appropriately.</a:t>
+            </a:r>
+          </a:p>
+          <a:p>
+            <a:r>
+              <a:rPr lang="en-US" dirty="0"/>
+              <a:t>Need flexibility to structure data and documentation in repo according to needs and how study progresses.</a:t>
+            </a:r>
+          </a:p>
+          <a:p>
+            <a:r>
+              <a:rPr lang="en-US" dirty="0"/>
+              <a:t>Lab notebook for changes to sci instrument.</a:t>
+            </a:r>
+          </a:p>
+          <a:p>
+            <a:pPr lvl="1"/>
+            <a:r>
+              <a:rPr lang="en-US" dirty="0"/>
+              <a:t>Changes in code repo necessary for study</a:t>
+            </a:r>
+          </a:p>
+          <a:p>
+            <a:pPr lvl="1"/>
+            <a:r>
+              <a:rPr lang="en-US" dirty="0"/>
+              <a:t>Changes to SW environments</a:t>
+            </a:r>
+          </a:p>
+          <a:p>
+            <a:pPr lvl="1"/>
+            <a:r>
+              <a:rPr lang="en-US" dirty="0"/>
+              <a:t>Changes to build/job files and build system</a:t>
+            </a:r>
+          </a:p>
+          <a:p>
+            <a:r>
+              <a:rPr lang="en-US" dirty="0"/>
+              <a:t>Lab notebook to detail how experiment was designed and how it was carried out.</a:t>
+            </a:r>
+          </a:p>
+          <a:p>
+            <a:endParaRPr lang="en-US" dirty="0"/>
+          </a:p>
+          <a:p>
+            <a:endParaRPr lang="en-US" dirty="0"/>
+          </a:p>
+        </p:txBody>
+      </p:sp>
+    </p:spTree>
+    <p:extLst>
+      <p:ext uri="{BB962C8B-B14F-4D97-AF65-F5344CB8AC3E}">
+        <p14:creationId xmlns:p14="http://schemas.microsoft.com/office/powerpoint/2010/main" val="2220915559"/>
+      </p:ext>
+    </p:extLst>
+  </p:cSld>
+  <p:clrMapOvr>
+    <a:masterClrMapping/>
+  </p:clrMapOvr>
+</p:sld>
+</file>
+
+<file path=ppt/slides/slide15.xml><?xml version="1.0" encoding="utf-8"?>
+<p:sld xmlns:a="http://schemas.openxmlformats.org/drawingml/2006/main" xmlns:r="http://schemas.openxmlformats.org/officeDocument/2006/relationships" xmlns:p="http://schemas.openxmlformats.org/presentationml/2006/main">
+  <p:cSld>
+    <p:spTree>
+      <p:nvGrpSpPr>
+        <p:cNvPr id="1" name=""/>
+        <p:cNvGrpSpPr/>
+        <p:nvPr/>
+      </p:nvGrpSpPr>
+      <p:grpSpPr>
+        <a:xfrm>
+          <a:off x="0" y="0"/>
+          <a:ext cx="0" cy="0"/>
+          <a:chOff x="0" y="0"/>
+          <a:chExt cx="0" cy="0"/>
+        </a:xfrm>
+      </p:grpSpPr>
+      <p:sp>
+        <p:nvSpPr>
+          <p:cNvPr id="2" name="Title 1">
+            <a:extLst>
+              <a:ext uri="{FF2B5EF4-FFF2-40B4-BE49-F238E27FC236}">
+                <a16:creationId xmlns:a16="http://schemas.microsoft.com/office/drawing/2014/main" id="{461EA918-BC78-2EF1-2539-B2ACDC0E65CE}"/>
+              </a:ext>
+            </a:extLst>
+          </p:cNvPr>
+          <p:cNvSpPr>
+            <a:spLocks noGrp="1"/>
+          </p:cNvSpPr>
+          <p:nvPr>
+            <p:ph type="title"/>
+          </p:nvPr>
+        </p:nvSpPr>
+        <p:spPr/>
+        <p:txBody>
+          <a:bodyPr/>
+          <a:lstStyle/>
+          <a:p>
+            <a:r>
+              <a:rPr lang="en-US" dirty="0"/>
+              <a:t>Documentation: READMEs</a:t>
+            </a:r>
+          </a:p>
+        </p:txBody>
+      </p:sp>
+      <p:sp>
+        <p:nvSpPr>
+          <p:cNvPr id="3" name="Content Placeholder 2">
+            <a:extLst>
+              <a:ext uri="{FF2B5EF4-FFF2-40B4-BE49-F238E27FC236}">
+                <a16:creationId xmlns:a16="http://schemas.microsoft.com/office/drawing/2014/main" id="{DD455FF1-BD49-FBFA-4271-75F52C491A05}"/>
+              </a:ext>
+            </a:extLst>
+          </p:cNvPr>
+          <p:cNvSpPr>
+            <a:spLocks noGrp="1"/>
+          </p:cNvSpPr>
+          <p:nvPr>
+            <p:ph idx="1"/>
+          </p:nvPr>
+        </p:nvSpPr>
+        <p:spPr/>
+        <p:txBody>
+          <a:bodyPr/>
+          <a:lstStyle/>
+          <a:p>
+            <a:r>
+              <a:rPr lang="en-US" dirty="0"/>
+              <a:t>READMEs distributed through folder structure</a:t>
+            </a:r>
+          </a:p>
+          <a:p>
+            <a:r>
+              <a:rPr lang="en-US" dirty="0"/>
+              <a:t>Shouldn’t be too long</a:t>
+            </a:r>
+          </a:p>
+          <a:p>
+            <a:r>
+              <a:rPr lang="en-US" dirty="0"/>
+              <a:t>These should be living docs that function as executive summaries</a:t>
+            </a:r>
+          </a:p>
+          <a:p>
+            <a:r>
+              <a:rPr lang="en-US" dirty="0"/>
+              <a:t>High-level road maps with motivation</a:t>
+            </a:r>
+          </a:p>
+        </p:txBody>
+      </p:sp>
+    </p:spTree>
+    <p:extLst>
+      <p:ext uri="{BB962C8B-B14F-4D97-AF65-F5344CB8AC3E}">
+        <p14:creationId xmlns:p14="http://schemas.microsoft.com/office/powerpoint/2010/main" val="757146945"/>
+      </p:ext>
+    </p:extLst>
+  </p:cSld>
+  <p:clrMapOvr>
+    <a:masterClrMapping/>
+  </p:clrMapOvr>
+</p:sld>
+</file>
+
+<file path=ppt/slides/slide16.xml><?xml version="1.0" encoding="utf-8"?>
+<p:sld xmlns:a="http://schemas.openxmlformats.org/drawingml/2006/main" xmlns:r="http://schemas.openxmlformats.org/officeDocument/2006/relationships" xmlns:p="http://schemas.openxmlformats.org/presentationml/2006/main">
+  <p:cSld>
+    <p:spTree>
+      <p:nvGrpSpPr>
+        <p:cNvPr id="1" name=""/>
+        <p:cNvGrpSpPr/>
+        <p:nvPr/>
+      </p:nvGrpSpPr>
+      <p:grpSpPr>
+        <a:xfrm>
+          <a:off x="0" y="0"/>
+          <a:ext cx="0" cy="0"/>
+          <a:chOff x="0" y="0"/>
+          <a:chExt cx="0" cy="0"/>
+        </a:xfrm>
+      </p:grpSpPr>
+      <p:sp>
+        <p:nvSpPr>
+          <p:cNvPr id="2" name="Title 1">
+            <a:extLst>
+              <a:ext uri="{FF2B5EF4-FFF2-40B4-BE49-F238E27FC236}">
+                <a16:creationId xmlns:a16="http://schemas.microsoft.com/office/drawing/2014/main" id="{138A0DB7-6EBE-EAE7-245C-E8CEB6C1B46B}"/>
+              </a:ext>
+            </a:extLst>
+          </p:cNvPr>
+          <p:cNvSpPr>
+            <a:spLocks noGrp="1"/>
+          </p:cNvSpPr>
+          <p:nvPr>
+            <p:ph type="title"/>
+          </p:nvPr>
+        </p:nvSpPr>
+        <p:spPr/>
+        <p:txBody>
+          <a:bodyPr/>
+          <a:lstStyle/>
+          <a:p>
+            <a:r>
+              <a:rPr lang="en-US" dirty="0"/>
+              <a:t>Documentation: Data context &amp; metadata</a:t>
+            </a:r>
+          </a:p>
+        </p:txBody>
+      </p:sp>
+      <p:sp>
+        <p:nvSpPr>
+          <p:cNvPr id="3" name="Content Placeholder 2">
+            <a:extLst>
+              <a:ext uri="{FF2B5EF4-FFF2-40B4-BE49-F238E27FC236}">
+                <a16:creationId xmlns:a16="http://schemas.microsoft.com/office/drawing/2014/main" id="{13CF6E62-D847-A61B-2158-E6AA4B34F17C}"/>
+              </a:ext>
+            </a:extLst>
+          </p:cNvPr>
+          <p:cNvSpPr>
+            <a:spLocks noGrp="1"/>
+          </p:cNvSpPr>
+          <p:nvPr>
+            <p:ph idx="1"/>
+          </p:nvPr>
+        </p:nvSpPr>
+        <p:spPr/>
+        <p:txBody>
+          <a:bodyPr/>
+          <a:lstStyle/>
+          <a:p>
+            <a:r>
+              <a:rPr lang="en-US" dirty="0"/>
+              <a:t>Try to automate as much as possible</a:t>
+            </a:r>
+          </a:p>
+          <a:p>
+            <a:r>
+              <a:rPr lang="en-US" dirty="0"/>
+              <a:t>Build dates, git hashes, configuration data in file headers</a:t>
+            </a:r>
+          </a:p>
+          <a:p>
+            <a:r>
+              <a:rPr lang="en-US" dirty="0"/>
+              <a:t>A lot of this comes from build &amp; job logs</a:t>
+            </a:r>
+          </a:p>
+        </p:txBody>
+      </p:sp>
+    </p:spTree>
+    <p:extLst>
+      <p:ext uri="{BB962C8B-B14F-4D97-AF65-F5344CB8AC3E}">
+        <p14:creationId xmlns:p14="http://schemas.microsoft.com/office/powerpoint/2010/main" val="1750469919"/>
+      </p:ext>
+    </p:extLst>
+  </p:cSld>
+  <p:clrMapOvr>
+    <a:masterClrMapping/>
+  </p:clrMapOvr>
+</p:sld>
+</file>
+
+<file path=ppt/slides/slide17.xml><?xml version="1.0" encoding="utf-8"?>
+<p:sld xmlns:a="http://schemas.openxmlformats.org/drawingml/2006/main" xmlns:r="http://schemas.openxmlformats.org/officeDocument/2006/relationships" xmlns:p="http://schemas.openxmlformats.org/presentationml/2006/main">
+  <p:cSld>
+    <p:spTree>
+      <p:nvGrpSpPr>
+        <p:cNvPr id="1" name=""/>
+        <p:cNvGrpSpPr/>
+        <p:nvPr/>
+      </p:nvGrpSpPr>
+      <p:grpSpPr>
+        <a:xfrm>
+          <a:off x="0" y="0"/>
+          <a:ext cx="0" cy="0"/>
+          <a:chOff x="0" y="0"/>
+          <a:chExt cx="0" cy="0"/>
+        </a:xfrm>
+      </p:grpSpPr>
+      <p:sp>
+        <p:nvSpPr>
+          <p:cNvPr id="2" name="Title 1">
+            <a:extLst>
+              <a:ext uri="{FF2B5EF4-FFF2-40B4-BE49-F238E27FC236}">
+                <a16:creationId xmlns:a16="http://schemas.microsoft.com/office/drawing/2014/main" id="{E4019461-BF55-DC89-9FF1-089F0D96CE0F}"/>
+              </a:ext>
+            </a:extLst>
+          </p:cNvPr>
+          <p:cNvSpPr>
+            <a:spLocks noGrp="1"/>
+          </p:cNvSpPr>
+          <p:nvPr>
+            <p:ph type="title"/>
+          </p:nvPr>
+        </p:nvSpPr>
+        <p:spPr/>
+        <p:txBody>
+          <a:bodyPr/>
+          <a:lstStyle/>
+          <a:p>
+            <a:r>
+              <a:rPr lang="en-US" dirty="0"/>
+              <a:t>Documentation: </a:t>
+            </a:r>
+            <a:r>
+              <a:rPr lang="en-US" dirty="0" err="1"/>
+              <a:t>Jupyter</a:t>
+            </a:r>
+            <a:r>
+              <a:rPr lang="en-US" dirty="0"/>
+              <a:t> notebooks</a:t>
+            </a:r>
+          </a:p>
+        </p:txBody>
+      </p:sp>
+      <p:sp>
+        <p:nvSpPr>
+          <p:cNvPr id="3" name="Content Placeholder 2">
+            <a:extLst>
+              <a:ext uri="{FF2B5EF4-FFF2-40B4-BE49-F238E27FC236}">
+                <a16:creationId xmlns:a16="http://schemas.microsoft.com/office/drawing/2014/main" id="{4F38CB09-CA6C-8901-732E-A25A6FB14D84}"/>
+              </a:ext>
+            </a:extLst>
+          </p:cNvPr>
+          <p:cNvSpPr>
+            <a:spLocks noGrp="1"/>
+          </p:cNvSpPr>
+          <p:nvPr>
+            <p:ph idx="1"/>
+          </p:nvPr>
+        </p:nvSpPr>
+        <p:spPr/>
+        <p:txBody>
+          <a:bodyPr/>
+          <a:lstStyle/>
+          <a:p>
+            <a:r>
+              <a:rPr lang="en-US" dirty="0"/>
+              <a:t>Jupiter notebook can</a:t>
+            </a:r>
+          </a:p>
+          <a:p>
+            <a:pPr lvl="1"/>
+            <a:r>
+              <a:rPr lang="en-US" dirty="0"/>
+              <a:t>Have experimental design up top</a:t>
+            </a:r>
+          </a:p>
+          <a:p>
+            <a:pPr lvl="1"/>
+            <a:r>
+              <a:rPr lang="en-US" dirty="0"/>
+              <a:t>Detailed, complete lab notebook detailed env setup and data acquisition next.  Followed by analysis.  Can put conclusions top as well.</a:t>
+            </a:r>
+          </a:p>
+          <a:p>
+            <a:r>
+              <a:rPr lang="en-US" dirty="0"/>
+              <a:t>These are interesting as the desire to put documentation in one place for a related set of data yields a document that contains documentation from different levels of the hierarchy.</a:t>
+            </a:r>
+          </a:p>
+        </p:txBody>
+      </p:sp>
+    </p:spTree>
+    <p:extLst>
+      <p:ext uri="{BB962C8B-B14F-4D97-AF65-F5344CB8AC3E}">
+        <p14:creationId xmlns:p14="http://schemas.microsoft.com/office/powerpoint/2010/main" val="904306967"/>
+      </p:ext>
+    </p:extLst>
+  </p:cSld>
+  <p:clrMapOvr>
+    <a:masterClrMapping/>
+  </p:clrMapOvr>
+</p:sld>
+</file>
+
+<file path=ppt/slides/slide18.xml><?xml version="1.0" encoding="utf-8"?>
+<p:sld xmlns:a="http://schemas.openxmlformats.org/drawingml/2006/main" xmlns:r="http://schemas.openxmlformats.org/officeDocument/2006/relationships" xmlns:p="http://schemas.openxmlformats.org/presentationml/2006/main">
+  <p:cSld>
+    <p:spTree>
+      <p:nvGrpSpPr>
+        <p:cNvPr id="1" name=""/>
+        <p:cNvGrpSpPr/>
+        <p:nvPr/>
+      </p:nvGrpSpPr>
+      <p:grpSpPr>
+        <a:xfrm>
+          <a:off x="0" y="0"/>
+          <a:ext cx="0" cy="0"/>
+          <a:chOff x="0" y="0"/>
+          <a:chExt cx="0" cy="0"/>
+        </a:xfrm>
+      </p:grpSpPr>
+      <p:sp>
+        <p:nvSpPr>
+          <p:cNvPr id="2" name="Title 1">
+            <a:extLst>
+              <a:ext uri="{FF2B5EF4-FFF2-40B4-BE49-F238E27FC236}">
+                <a16:creationId xmlns:a16="http://schemas.microsoft.com/office/drawing/2014/main" id="{746A2D5A-6E35-F96F-5E79-5B41AC221D05}"/>
+              </a:ext>
+            </a:extLst>
+          </p:cNvPr>
+          <p:cNvSpPr>
+            <a:spLocks noGrp="1"/>
+          </p:cNvSpPr>
+          <p:nvPr>
+            <p:ph type="title"/>
+          </p:nvPr>
+        </p:nvSpPr>
+        <p:spPr/>
+        <p:txBody>
+          <a:bodyPr/>
+          <a:lstStyle/>
+          <a:p>
+            <a:r>
+              <a:rPr lang="en-US" dirty="0"/>
+              <a:t>Other lab environments</a:t>
+            </a:r>
+          </a:p>
+        </p:txBody>
+      </p:sp>
+      <p:sp>
+        <p:nvSpPr>
+          <p:cNvPr id="3" name="Content Placeholder 2">
+            <a:extLst>
+              <a:ext uri="{FF2B5EF4-FFF2-40B4-BE49-F238E27FC236}">
+                <a16:creationId xmlns:a16="http://schemas.microsoft.com/office/drawing/2014/main" id="{009BAE6A-1E32-3C4B-58A8-10D2890F201C}"/>
+              </a:ext>
+            </a:extLst>
+          </p:cNvPr>
+          <p:cNvSpPr>
+            <a:spLocks noGrp="1"/>
+          </p:cNvSpPr>
+          <p:nvPr>
+            <p:ph idx="1"/>
+          </p:nvPr>
+        </p:nvSpPr>
+        <p:spPr/>
+        <p:txBody>
+          <a:bodyPr/>
+          <a:lstStyle/>
+          <a:p>
+            <a:r>
+              <a:rPr lang="en-US" dirty="0"/>
+              <a:t>Link to Nature paper about building virtual laboratory</a:t>
+            </a:r>
+          </a:p>
+          <a:p>
+            <a:r>
+              <a:rPr lang="en-US" dirty="0"/>
+              <a:t>Aaron’s </a:t>
+            </a:r>
+            <a:r>
+              <a:rPr lang="en-US" dirty="0" err="1"/>
+              <a:t>FlashKit</a:t>
+            </a:r>
+            <a:endParaRPr lang="en-US" dirty="0"/>
+          </a:p>
+          <a:p>
+            <a:r>
+              <a:rPr lang="en-US" dirty="0"/>
+              <a:t>Ivo’s Popper (Former BSSW fellow)</a:t>
+            </a:r>
+          </a:p>
+          <a:p>
+            <a:pPr marL="0" indent="0">
+              <a:buNone/>
+            </a:pPr>
+            <a:endParaRPr lang="en-US" dirty="0"/>
+          </a:p>
+        </p:txBody>
+      </p:sp>
+    </p:spTree>
+    <p:extLst>
+      <p:ext uri="{BB962C8B-B14F-4D97-AF65-F5344CB8AC3E}">
+        <p14:creationId xmlns:p14="http://schemas.microsoft.com/office/powerpoint/2010/main" val="701917171"/>
+      </p:ext>
+    </p:extLst>
+  </p:cSld>
+  <p:clrMapOvr>
+    <a:masterClrMapping/>
+  </p:clrMapOvr>
+</p:sld>
+</file>
+
+<file path=ppt/slides/slide19.xml><?xml version="1.0" encoding="utf-8"?>
+<p:sld xmlns:a="http://schemas.openxmlformats.org/drawingml/2006/main" xmlns:r="http://schemas.openxmlformats.org/officeDocument/2006/relationships" xmlns:p="http://schemas.openxmlformats.org/presentationml/2006/main">
+  <p:cSld>
+    <p:spTree>
+      <p:nvGrpSpPr>
+        <p:cNvPr id="1" name=""/>
+        <p:cNvGrpSpPr/>
+        <p:nvPr/>
+      </p:nvGrpSpPr>
+      <p:grpSpPr>
+        <a:xfrm>
+          <a:off x="0" y="0"/>
+          <a:ext cx="0" cy="0"/>
+          <a:chOff x="0" y="0"/>
+          <a:chExt cx="0" cy="0"/>
+        </a:xfrm>
+      </p:grpSpPr>
+      <p:sp>
+        <p:nvSpPr>
+          <p:cNvPr id="2" name="Title 1">
+            <a:extLst>
+              <a:ext uri="{FF2B5EF4-FFF2-40B4-BE49-F238E27FC236}">
+                <a16:creationId xmlns:a16="http://schemas.microsoft.com/office/drawing/2014/main" id="{10BDA77C-F871-ADA0-6CA2-68C92B681AB0}"/>
+              </a:ext>
+            </a:extLst>
+          </p:cNvPr>
+          <p:cNvSpPr>
+            <a:spLocks noGrp="1"/>
+          </p:cNvSpPr>
+          <p:nvPr>
+            <p:ph type="title"/>
+          </p:nvPr>
+        </p:nvSpPr>
+        <p:spPr/>
+        <p:txBody>
+          <a:bodyPr/>
+          <a:lstStyle/>
+          <a:p>
+            <a:r>
+              <a:rPr lang="en-US" dirty="0"/>
+              <a:t>ANSHU STARTS HERE!</a:t>
+            </a:r>
+          </a:p>
+        </p:txBody>
+      </p:sp>
+      <p:sp>
+        <p:nvSpPr>
+          <p:cNvPr id="3" name="Content Placeholder 2">
+            <a:extLst>
+              <a:ext uri="{FF2B5EF4-FFF2-40B4-BE49-F238E27FC236}">
+                <a16:creationId xmlns:a16="http://schemas.microsoft.com/office/drawing/2014/main" id="{D4EC4D35-E2E4-FD59-2267-84D64A27E32C}"/>
+              </a:ext>
+            </a:extLst>
+          </p:cNvPr>
+          <p:cNvSpPr>
+            <a:spLocks noGrp="1"/>
+          </p:cNvSpPr>
+          <p:nvPr>
+            <p:ph idx="1"/>
+          </p:nvPr>
+        </p:nvSpPr>
+        <p:spPr/>
+        <p:txBody>
+          <a:bodyPr/>
+          <a:lstStyle/>
+          <a:p>
+            <a:endParaRPr lang="en-US"/>
+          </a:p>
+        </p:txBody>
+      </p:sp>
+    </p:spTree>
+    <p:extLst>
+      <p:ext uri="{BB962C8B-B14F-4D97-AF65-F5344CB8AC3E}">
+        <p14:creationId xmlns:p14="http://schemas.microsoft.com/office/powerpoint/2010/main" val="732654816"/>
+      </p:ext>
+    </p:extLst>
+  </p:cSld>
+  <p:clrMapOvr>
+    <a:masterClrMapping/>
+  </p:clrMapOvr>
+</p:sld>
+</file>
+
+<file path=ppt/slides/slide2.xml><?xml version="1.0" encoding="utf-8"?>
+<p:sld xmlns:a="http://schemas.openxmlformats.org/drawingml/2006/main" xmlns:r="http://schemas.openxmlformats.org/officeDocument/2006/relationships" xmlns:p="http://schemas.openxmlformats.org/presentationml/2006/main">
+  <p:cSld>
+    <p:spTree>
+      <p:nvGrpSpPr>
+        <p:cNvPr id="1" name=""/>
+        <p:cNvGrpSpPr/>
+        <p:nvPr/>
+      </p:nvGrpSpPr>
+      <p:grpSpPr>
+        <a:xfrm>
+          <a:off x="0" y="0"/>
+          <a:ext cx="0" cy="0"/>
+          <a:chOff x="0" y="0"/>
+          <a:chExt cx="0" cy="0"/>
+        </a:xfrm>
+      </p:grpSpPr>
+      <p:sp>
+        <p:nvSpPr>
+          <p:cNvPr id="2" name="Title 1">
+            <a:extLst>
+              <a:ext uri="{FF2B5EF4-FFF2-40B4-BE49-F238E27FC236}">
+                <a16:creationId xmlns:a16="http://schemas.microsoft.com/office/drawing/2014/main" id="{EAB11D2D-6F7D-4460-33DC-AE1BC71433E3}"/>
+              </a:ext>
+            </a:extLst>
+          </p:cNvPr>
+          <p:cNvSpPr>
+            <a:spLocks noGrp="1"/>
+          </p:cNvSpPr>
+          <p:nvPr>
+            <p:ph type="title"/>
+          </p:nvPr>
+        </p:nvSpPr>
+        <p:spPr/>
+        <p:txBody>
+          <a:bodyPr/>
+          <a:lstStyle/>
+          <a:p>
+            <a:r>
+              <a:rPr lang="en-US" dirty="0">
+                <a:solidFill>
+                  <a:srgbClr val="FF0000"/>
+                </a:solidFill>
+              </a:rPr>
+              <a:t>TODO: Add license page in accord with official process</a:t>
+            </a:r>
+          </a:p>
+        </p:txBody>
+      </p:sp>
+      <p:sp>
+        <p:nvSpPr>
+          <p:cNvPr id="3" name="Content Placeholder 2">
+            <a:extLst>
+              <a:ext uri="{FF2B5EF4-FFF2-40B4-BE49-F238E27FC236}">
+                <a16:creationId xmlns:a16="http://schemas.microsoft.com/office/drawing/2014/main" id="{A8716687-4F36-A3C7-DF8B-075A834E1B43}"/>
+              </a:ext>
+            </a:extLst>
+          </p:cNvPr>
+          <p:cNvSpPr>
+            <a:spLocks noGrp="1"/>
+          </p:cNvSpPr>
+          <p:nvPr>
+            <p:ph idx="1"/>
+          </p:nvPr>
+        </p:nvSpPr>
+        <p:spPr/>
+        <p:txBody>
+          <a:bodyPr/>
+          <a:lstStyle/>
+          <a:p>
+            <a:endParaRPr lang="en-US" dirty="0"/>
+          </a:p>
+        </p:txBody>
+      </p:sp>
+    </p:spTree>
+    <p:extLst>
+      <p:ext uri="{BB962C8B-B14F-4D97-AF65-F5344CB8AC3E}">
+        <p14:creationId xmlns:p14="http://schemas.microsoft.com/office/powerpoint/2010/main" val="2193331451"/>
+      </p:ext>
+    </p:extLst>
+  </p:cSld>
+  <p:clrMapOvr>
+    <a:masterClrMapping/>
+  </p:clrMapOvr>
+</p:sld>
+</file>
+
+<file path=ppt/slides/slide3.xml><?xml version="1.0" encoding="utf-8"?>
+<p:sld xmlns:a="http://schemas.openxmlformats.org/drawingml/2006/main" xmlns:r="http://schemas.openxmlformats.org/officeDocument/2006/relationships" xmlns:p="http://schemas.openxmlformats.org/presentationml/2006/main">
+  <p:cSld>
+    <p:spTree>
+      <p:nvGrpSpPr>
+        <p:cNvPr id="1" name=""/>
+        <p:cNvGrpSpPr/>
+        <p:nvPr/>
+      </p:nvGrpSpPr>
+      <p:grpSpPr>
+        <a:xfrm>
+          <a:off x="0" y="0"/>
+          <a:ext cx="0" cy="0"/>
+          <a:chOff x="0" y="0"/>
+          <a:chExt cx="0" cy="0"/>
+        </a:xfrm>
+      </p:grpSpPr>
+      <p:sp>
+        <p:nvSpPr>
+          <p:cNvPr id="2" name="Title 1">
+            <a:extLst>
+              <a:ext uri="{FF2B5EF4-FFF2-40B4-BE49-F238E27FC236}">
+                <a16:creationId xmlns:a16="http://schemas.microsoft.com/office/drawing/2014/main" id="{976C0D62-EA03-92D9-C354-F6DBBAE2A161}"/>
+              </a:ext>
+            </a:extLst>
+          </p:cNvPr>
+          <p:cNvSpPr>
+            <a:spLocks noGrp="1"/>
+          </p:cNvSpPr>
+          <p:nvPr>
+            <p:ph type="title"/>
+          </p:nvPr>
+        </p:nvSpPr>
+        <p:spPr/>
+        <p:txBody>
+          <a:bodyPr/>
+          <a:lstStyle/>
+          <a:p>
+            <a:r>
+              <a:rPr lang="en-US" dirty="0"/>
+              <a:t>My high-level experience</a:t>
+            </a:r>
+          </a:p>
+        </p:txBody>
+      </p:sp>
+      <p:sp>
+        <p:nvSpPr>
+          <p:cNvPr id="3" name="Content Placeholder 2">
+            <a:extLst>
+              <a:ext uri="{FF2B5EF4-FFF2-40B4-BE49-F238E27FC236}">
+                <a16:creationId xmlns:a16="http://schemas.microsoft.com/office/drawing/2014/main" id="{C0FE8ED3-F26B-D9BA-DB4F-D33D38F86D90}"/>
+              </a:ext>
+            </a:extLst>
+          </p:cNvPr>
+          <p:cNvSpPr>
+            <a:spLocks noGrp="1"/>
+          </p:cNvSpPr>
+          <p:nvPr>
+            <p:ph idx="1"/>
+          </p:nvPr>
+        </p:nvSpPr>
+        <p:spPr>
+          <a:xfrm>
+            <a:off x="365760" y="1504093"/>
+            <a:ext cx="11369809" cy="4047778"/>
+          </a:xfrm>
+        </p:spPr>
+        <p:txBody>
+          <a:bodyPr/>
+          <a:lstStyle/>
+          <a:p>
+            <a:r>
+              <a:rPr lang="en-US" dirty="0"/>
+              <a:t>Doing computational science work is hard</a:t>
+            </a:r>
+          </a:p>
+          <a:p>
+            <a:r>
+              <a:rPr lang="en-US" dirty="0"/>
+              <a:t>What is supposed to make the work easier can often make it harder</a:t>
+            </a:r>
+          </a:p>
+          <a:p>
+            <a:r>
+              <a:rPr lang="en-US" dirty="0"/>
+              <a:t>I miss simple, physical laboratories</a:t>
+            </a:r>
+          </a:p>
+          <a:p>
+            <a:pPr lvl="1"/>
+            <a:r>
+              <a:rPr lang="en-US" dirty="0"/>
+              <a:t>Work in one space and on the same machines with all tools at hand</a:t>
+            </a:r>
+          </a:p>
+          <a:p>
+            <a:pPr lvl="1"/>
+            <a:r>
+              <a:rPr lang="en-US" dirty="0"/>
+              <a:t>Evolution of machines and tools is slow</a:t>
+            </a:r>
+          </a:p>
+          <a:p>
+            <a:pPr lvl="1"/>
+            <a:r>
+              <a:rPr lang="en-US" dirty="0"/>
+              <a:t>Your collaborators are usually co-located, ready to share, and ready to talk</a:t>
+            </a:r>
+          </a:p>
+          <a:p>
+            <a:pPr lvl="1"/>
+            <a:r>
+              <a:rPr lang="en-US" dirty="0"/>
+              <a:t>Paper lab notebooks are “good enough”</a:t>
+            </a:r>
+          </a:p>
+          <a:p>
+            <a:r>
+              <a:rPr lang="en-US" dirty="0"/>
+              <a:t>I experienced something like an apprenticeship</a:t>
+            </a:r>
+          </a:p>
+          <a:p>
+            <a:r>
+              <a:rPr lang="en-US" dirty="0"/>
+              <a:t>I try to adapt tips, tools, &amp; techniques to computational science world</a:t>
+            </a:r>
+          </a:p>
+        </p:txBody>
+      </p:sp>
+    </p:spTree>
+    <p:extLst>
+      <p:ext uri="{BB962C8B-B14F-4D97-AF65-F5344CB8AC3E}">
+        <p14:creationId xmlns:p14="http://schemas.microsoft.com/office/powerpoint/2010/main" val="65008830"/>
+      </p:ext>
+    </p:extLst>
+  </p:cSld>
+  <p:clrMapOvr>
+    <a:masterClrMapping/>
+  </p:clrMapOvr>
+</p:sld>
+</file>
+
+<file path=ppt/slides/slide4.xml><?xml version="1.0" encoding="utf-8"?>
+<p:sld xmlns:a="http://schemas.openxmlformats.org/drawingml/2006/main" xmlns:r="http://schemas.openxmlformats.org/officeDocument/2006/relationships" xmlns:p="http://schemas.openxmlformats.org/presentationml/2006/main">
+  <p:cSld>
+    <p:spTree>
+      <p:nvGrpSpPr>
+        <p:cNvPr id="1" name=""/>
+        <p:cNvGrpSpPr/>
+        <p:nvPr/>
+      </p:nvGrpSpPr>
+      <p:grpSpPr>
+        <a:xfrm>
+          <a:off x="0" y="0"/>
+          <a:ext cx="0" cy="0"/>
+          <a:chOff x="0" y="0"/>
+          <a:chExt cx="0" cy="0"/>
+        </a:xfrm>
+      </p:grpSpPr>
+      <p:sp>
+        <p:nvSpPr>
+          <p:cNvPr id="2" name="Title 1">
+            <a:extLst>
+              <a:ext uri="{FF2B5EF4-FFF2-40B4-BE49-F238E27FC236}">
+                <a16:creationId xmlns:a16="http://schemas.microsoft.com/office/drawing/2014/main" id="{9FD1E87B-8C30-88A5-D7E6-8CAF02EF91BE}"/>
+              </a:ext>
+            </a:extLst>
+          </p:cNvPr>
+          <p:cNvSpPr>
+            <a:spLocks noGrp="1"/>
+          </p:cNvSpPr>
+          <p:nvPr>
+            <p:ph type="title"/>
+          </p:nvPr>
+        </p:nvSpPr>
+        <p:spPr/>
+        <p:txBody>
+          <a:bodyPr/>
+          <a:lstStyle/>
+          <a:p>
+            <a:r>
+              <a:rPr lang="en-US" dirty="0"/>
+              <a:t>We never discussed the W in DIKUW!</a:t>
+            </a:r>
+            <a:br>
+              <a:rPr lang="en-US" dirty="0"/>
+            </a:br>
+            <a:r>
+              <a:rPr lang="en-US" sz="2000" b="0" dirty="0"/>
+              <a:t>The accumulated wisdom of a community</a:t>
+            </a:r>
+          </a:p>
+        </p:txBody>
+      </p:sp>
+      <p:sp>
+        <p:nvSpPr>
+          <p:cNvPr id="3" name="Content Placeholder 2">
+            <a:extLst>
+              <a:ext uri="{FF2B5EF4-FFF2-40B4-BE49-F238E27FC236}">
+                <a16:creationId xmlns:a16="http://schemas.microsoft.com/office/drawing/2014/main" id="{A8572FF8-BC04-F06D-94C4-785057985DB6}"/>
+              </a:ext>
+            </a:extLst>
+          </p:cNvPr>
+          <p:cNvSpPr>
+            <a:spLocks noGrp="1"/>
+          </p:cNvSpPr>
+          <p:nvPr>
+            <p:ph idx="1"/>
+          </p:nvPr>
+        </p:nvSpPr>
+        <p:spPr/>
+        <p:txBody>
+          <a:bodyPr/>
+          <a:lstStyle/>
+          <a:p>
+            <a:pPr marL="0" indent="0">
+              <a:buNone/>
+            </a:pPr>
+            <a:r>
+              <a:rPr lang="en-US" dirty="0"/>
+              <a:t>In life and in labs we learn and repeat short phrases</a:t>
+            </a:r>
+          </a:p>
+          <a:p>
+            <a:r>
+              <a:rPr lang="en-US" b="1" dirty="0"/>
+              <a:t>The devil’s in the details</a:t>
+            </a:r>
+          </a:p>
+          <a:p>
+            <a:r>
+              <a:rPr lang="en-US" b="1" dirty="0"/>
+              <a:t>If it’s worth doing, it’s worth doing well</a:t>
+            </a:r>
+          </a:p>
+          <a:p>
+            <a:r>
+              <a:rPr lang="en-US" b="1" dirty="0"/>
+              <a:t>It’s better to be correct, than fast</a:t>
+            </a:r>
+          </a:p>
+          <a:p>
+            <a:r>
+              <a:rPr lang="en-US" dirty="0"/>
+              <a:t>Know your tools</a:t>
+            </a:r>
+          </a:p>
+          <a:p>
+            <a:r>
+              <a:rPr lang="en-US" dirty="0"/>
+              <a:t>Use the right tool for the job</a:t>
+            </a:r>
+          </a:p>
+          <a:p>
+            <a:r>
+              <a:rPr lang="en-US" dirty="0"/>
+              <a:t>Measure twice, cut once</a:t>
+            </a:r>
+          </a:p>
+          <a:p>
+            <a:r>
+              <a:rPr lang="en-US" dirty="0"/>
+              <a:t>Clean your workspace</a:t>
+            </a:r>
+          </a:p>
+        </p:txBody>
+      </p:sp>
+    </p:spTree>
+    <p:extLst>
+      <p:ext uri="{BB962C8B-B14F-4D97-AF65-F5344CB8AC3E}">
+        <p14:creationId xmlns:p14="http://schemas.microsoft.com/office/powerpoint/2010/main" val="2459349614"/>
+      </p:ext>
+    </p:extLst>
+  </p:cSld>
+  <p:clrMapOvr>
+    <a:masterClrMapping/>
+  </p:clrMapOvr>
+</p:sld>
+</file>
+
+<file path=ppt/slides/slide5.xml><?xml version="1.0" encoding="utf-8"?>
+<p:sld xmlns:a="http://schemas.openxmlformats.org/drawingml/2006/main" xmlns:r="http://schemas.openxmlformats.org/officeDocument/2006/relationships" xmlns:p="http://schemas.openxmlformats.org/presentationml/2006/main">
+  <p:cSld>
+    <p:spTree>
+      <p:nvGrpSpPr>
+        <p:cNvPr id="1" name=""/>
+        <p:cNvGrpSpPr/>
+        <p:nvPr/>
+      </p:nvGrpSpPr>
+      <p:grpSpPr>
+        <a:xfrm>
+          <a:off x="0" y="0"/>
+          <a:ext cx="0" cy="0"/>
+          <a:chOff x="0" y="0"/>
+          <a:chExt cx="0" cy="0"/>
+        </a:xfrm>
+      </p:grpSpPr>
+      <p:sp>
+        <p:nvSpPr>
+          <p:cNvPr id="2" name="Title 1">
+            <a:extLst>
+              <a:ext uri="{FF2B5EF4-FFF2-40B4-BE49-F238E27FC236}">
+                <a16:creationId xmlns:a16="http://schemas.microsoft.com/office/drawing/2014/main" id="{8D9B72DE-BA02-39B1-83E4-A1429EC50FD2}"/>
+              </a:ext>
+            </a:extLst>
+          </p:cNvPr>
+          <p:cNvSpPr>
+            <a:spLocks noGrp="1"/>
+          </p:cNvSpPr>
+          <p:nvPr>
+            <p:ph type="title"/>
+          </p:nvPr>
+        </p:nvSpPr>
+        <p:spPr/>
+        <p:txBody>
+          <a:bodyPr/>
+          <a:lstStyle/>
+          <a:p>
+            <a:r>
+              <a:rPr lang="en-US" dirty="0"/>
+              <a:t>Know your tools</a:t>
+            </a:r>
+          </a:p>
+        </p:txBody>
+      </p:sp>
+      <p:sp>
+        <p:nvSpPr>
+          <p:cNvPr id="3" name="Content Placeholder 2">
+            <a:extLst>
+              <a:ext uri="{FF2B5EF4-FFF2-40B4-BE49-F238E27FC236}">
+                <a16:creationId xmlns:a16="http://schemas.microsoft.com/office/drawing/2014/main" id="{57F58EF6-4610-3BD1-CB7F-1D05E8C0C4FA}"/>
+              </a:ext>
+            </a:extLst>
+          </p:cNvPr>
+          <p:cNvSpPr>
+            <a:spLocks noGrp="1"/>
+          </p:cNvSpPr>
+          <p:nvPr>
+            <p:ph idx="1"/>
+          </p:nvPr>
+        </p:nvSpPr>
+        <p:spPr>
+          <a:xfrm>
+            <a:off x="365761" y="1737360"/>
+            <a:ext cx="5145578" cy="4047778"/>
+          </a:xfrm>
+        </p:spPr>
+        <p:txBody>
+          <a:bodyPr/>
+          <a:lstStyle/>
+          <a:p>
+            <a:pPr marL="0" indent="0">
+              <a:buNone/>
+            </a:pPr>
+            <a:r>
+              <a:rPr lang="en-US" b="1" dirty="0"/>
+              <a:t>Experimental World</a:t>
+            </a:r>
+          </a:p>
+          <a:p>
+            <a:endParaRPr lang="en-US" dirty="0"/>
+          </a:p>
+        </p:txBody>
+      </p:sp>
+      <p:sp>
+        <p:nvSpPr>
+          <p:cNvPr id="4" name="Content Placeholder 2">
+            <a:extLst>
+              <a:ext uri="{FF2B5EF4-FFF2-40B4-BE49-F238E27FC236}">
+                <a16:creationId xmlns:a16="http://schemas.microsoft.com/office/drawing/2014/main" id="{85BCDC36-FA50-8834-5FC1-32611BCE6444}"/>
+              </a:ext>
+            </a:extLst>
+          </p:cNvPr>
+          <p:cNvSpPr txBox="1">
+            <a:spLocks/>
+          </p:cNvSpPr>
+          <p:nvPr/>
+        </p:nvSpPr>
+        <p:spPr bwMode="auto">
+          <a:xfrm>
+            <a:off x="6511623" y="1740130"/>
+            <a:ext cx="5145578" cy="4047778"/>
+          </a:xfrm>
+          <a:prstGeom prst="rect">
+            <a:avLst/>
+          </a:prstGeom>
+          <a:noFill/>
+          <a:ln w="9525">
+            <a:noFill/>
+            <a:miter lim="800000"/>
+            <a:headEnd/>
+            <a:tailEnd/>
+          </a:ln>
+        </p:spPr>
+        <p:txBody>
+          <a:bodyPr vert="horz" wrap="square" lIns="91440" tIns="45720" rIns="91440" bIns="45720" numCol="1" anchor="t" anchorCtr="0" compatLnSpc="1">
+            <a:prstTxWarp prst="textNoShape">
+              <a:avLst/>
+            </a:prstTxWarp>
+            <a:noAutofit/>
+          </a:bodyPr>
+          <a:lstStyle>
+            <a:lvl1pPr marL="230188" indent="-230188" algn="l" rtl="0" eaLnBrk="1" fontAlgn="base" hangingPunct="1">
+              <a:lnSpc>
+                <a:spcPct val="90000"/>
+              </a:lnSpc>
+              <a:spcBef>
+                <a:spcPts val="1400"/>
+              </a:spcBef>
+              <a:spcAft>
+                <a:spcPct val="0"/>
+              </a:spcAft>
+              <a:buClr>
+                <a:schemeClr val="tx1"/>
+              </a:buClr>
+              <a:buFont typeface="Arial" charset="0"/>
+              <a:buChar char="•"/>
+              <a:defRPr sz="2400" kern="1200">
+                <a:solidFill>
+                  <a:schemeClr val="tx1"/>
+                </a:solidFill>
+                <a:latin typeface="Arial" panose="020B0604020202020204" pitchFamily="34" charset="0"/>
+                <a:ea typeface="+mn-ea"/>
+                <a:cs typeface="Arial" panose="020B0604020202020204" pitchFamily="34" charset="0"/>
+              </a:defRPr>
+            </a:lvl1pPr>
+            <a:lvl2pPr marL="625475" indent="-279400" algn="l" rtl="0" eaLnBrk="1" fontAlgn="base" hangingPunct="1">
+              <a:lnSpc>
+                <a:spcPct val="90000"/>
+              </a:lnSpc>
+              <a:spcBef>
+                <a:spcPts val="800"/>
+              </a:spcBef>
+              <a:spcAft>
+                <a:spcPct val="0"/>
+              </a:spcAft>
+              <a:buClr>
+                <a:schemeClr val="tx1"/>
+              </a:buClr>
+              <a:buFont typeface="Arial" charset="0"/>
+              <a:buChar char="–"/>
+              <a:defRPr sz="2000" kern="1200">
+                <a:solidFill>
+                  <a:schemeClr val="tx1"/>
+                </a:solidFill>
+                <a:latin typeface="Arial" panose="020B0604020202020204" pitchFamily="34" charset="0"/>
+                <a:ea typeface="+mn-ea"/>
+                <a:cs typeface="Arial" panose="020B0604020202020204" pitchFamily="34" charset="0"/>
+              </a:defRPr>
+            </a:lvl2pPr>
+            <a:lvl3pPr marL="914400" indent="-230188" algn="l" rtl="0" eaLnBrk="1" fontAlgn="base" hangingPunct="1">
+              <a:lnSpc>
+                <a:spcPct val="90000"/>
+              </a:lnSpc>
+              <a:spcBef>
+                <a:spcPts val="800"/>
+              </a:spcBef>
+              <a:spcAft>
+                <a:spcPct val="0"/>
+              </a:spcAft>
+              <a:buClr>
+                <a:schemeClr val="tx1"/>
+              </a:buClr>
+              <a:buFont typeface="Arial" charset="0"/>
+              <a:buChar char="•"/>
+              <a:defRPr sz="1800" kern="1200">
+                <a:solidFill>
+                  <a:schemeClr val="tx1"/>
+                </a:solidFill>
+                <a:latin typeface="Arial" panose="020B0604020202020204" pitchFamily="34" charset="0"/>
+                <a:ea typeface="+mn-ea"/>
+                <a:cs typeface="Arial" panose="020B0604020202020204" pitchFamily="34" charset="0"/>
+              </a:defRPr>
+            </a:lvl3pPr>
+            <a:lvl4pPr marL="1144588" indent="-173038" algn="l" rtl="0" eaLnBrk="1" fontAlgn="base" hangingPunct="1">
+              <a:lnSpc>
+                <a:spcPct val="90000"/>
+              </a:lnSpc>
+              <a:spcBef>
+                <a:spcPts val="800"/>
+              </a:spcBef>
+              <a:spcAft>
+                <a:spcPct val="0"/>
+              </a:spcAft>
+              <a:buClr>
+                <a:schemeClr val="tx1"/>
+              </a:buClr>
+              <a:buFont typeface="Arial" charset="0"/>
+              <a:buChar char="–"/>
+              <a:defRPr sz="1600" kern="1200">
+                <a:solidFill>
+                  <a:schemeClr val="tx1"/>
+                </a:solidFill>
+                <a:latin typeface="Arial" panose="020B0604020202020204" pitchFamily="34" charset="0"/>
+                <a:ea typeface="+mn-ea"/>
+                <a:cs typeface="Arial" panose="020B0604020202020204" pitchFamily="34" charset="0"/>
+              </a:defRPr>
+            </a:lvl4pPr>
+            <a:lvl5pPr marL="1482725" indent="-222250" algn="l" rtl="0" eaLnBrk="1" fontAlgn="base" hangingPunct="1">
+              <a:lnSpc>
+                <a:spcPct val="90000"/>
+              </a:lnSpc>
+              <a:spcBef>
+                <a:spcPts val="600"/>
+              </a:spcBef>
+              <a:spcAft>
+                <a:spcPct val="0"/>
+              </a:spcAft>
+              <a:buClr>
+                <a:schemeClr val="tx1"/>
+              </a:buClr>
+              <a:buFont typeface="Arial" panose="020B0604020202020204" pitchFamily="34" charset="0"/>
+              <a:buChar char="•"/>
+              <a:defRPr sz="1600" kern="1200">
+                <a:solidFill>
+                  <a:schemeClr val="tx1"/>
+                </a:solidFill>
+                <a:latin typeface="Arial" panose="020B0604020202020204" pitchFamily="34" charset="0"/>
+                <a:ea typeface="+mn-ea"/>
+                <a:cs typeface="Arial" panose="020B0604020202020204" pitchFamily="34" charset="0"/>
+              </a:defRPr>
+            </a:lvl5pPr>
+            <a:lvl6pPr marL="2514600" indent="-228600" algn="l" defTabSz="914400" rtl="0" eaLnBrk="1" latinLnBrk="0" hangingPunct="1">
+              <a:spcBef>
+                <a:spcPct val="20000"/>
+              </a:spcBef>
+              <a:buFont typeface="Arial" pitchFamily="34" charset="0"/>
+              <a:buChar char="•"/>
+              <a:defRPr sz="2000" kern="1200">
+                <a:solidFill>
+                  <a:schemeClr val="tx1"/>
+                </a:solidFill>
+                <a:latin typeface="+mn-lt"/>
+                <a:ea typeface="+mn-ea"/>
+                <a:cs typeface="+mn-cs"/>
+              </a:defRPr>
+            </a:lvl6pPr>
+            <a:lvl7pPr marL="2971800" indent="-228600" algn="l" defTabSz="914400" rtl="0" eaLnBrk="1" latinLnBrk="0" hangingPunct="1">
+              <a:spcBef>
+                <a:spcPct val="20000"/>
+              </a:spcBef>
+              <a:buFont typeface="Arial" pitchFamily="34" charset="0"/>
+              <a:buChar char="•"/>
+              <a:defRPr sz="2000" kern="1200">
+                <a:solidFill>
+                  <a:schemeClr val="tx1"/>
+                </a:solidFill>
+                <a:latin typeface="+mn-lt"/>
+                <a:ea typeface="+mn-ea"/>
+                <a:cs typeface="+mn-cs"/>
+              </a:defRPr>
+            </a:lvl7pPr>
+            <a:lvl8pPr marL="3429000" indent="-228600" algn="l" defTabSz="914400" rtl="0" eaLnBrk="1" latinLnBrk="0" hangingPunct="1">
+              <a:spcBef>
+                <a:spcPct val="20000"/>
+              </a:spcBef>
+              <a:buFont typeface="Arial" pitchFamily="34" charset="0"/>
+              <a:buChar char="•"/>
+              <a:defRPr sz="2000" kern="1200">
+                <a:solidFill>
+                  <a:schemeClr val="tx1"/>
+                </a:solidFill>
+                <a:latin typeface="+mn-lt"/>
+                <a:ea typeface="+mn-ea"/>
+                <a:cs typeface="+mn-cs"/>
+              </a:defRPr>
+            </a:lvl8pPr>
+            <a:lvl9pPr marL="3886200" indent="-228600" algn="l" defTabSz="914400" rtl="0" eaLnBrk="1" latinLnBrk="0" hangingPunct="1">
+              <a:spcBef>
+                <a:spcPct val="20000"/>
+              </a:spcBef>
+              <a:buFont typeface="Arial" pitchFamily="34" charset="0"/>
+              <a:buChar char="•"/>
+              <a:defRPr sz="2000" kern="1200">
+                <a:solidFill>
+                  <a:schemeClr val="tx1"/>
+                </a:solidFill>
+                <a:latin typeface="+mn-lt"/>
+                <a:ea typeface="+mn-ea"/>
+                <a:cs typeface="+mn-cs"/>
+              </a:defRPr>
+            </a:lvl9pPr>
+          </a:lstStyle>
+          <a:p>
+            <a:pPr marL="0" indent="0">
+              <a:buFont typeface="Arial" charset="0"/>
+              <a:buNone/>
+            </a:pPr>
+            <a:r>
+              <a:rPr lang="en-US" b="1" dirty="0"/>
+              <a:t>Computational World</a:t>
+            </a:r>
+          </a:p>
+          <a:p>
+            <a:r>
+              <a:rPr lang="en-US" dirty="0"/>
+              <a:t>How much should you understand of library building? Is it OK to use </a:t>
+            </a:r>
+            <a:r>
+              <a:rPr lang="en-US" dirty="0" err="1"/>
+              <a:t>Spack</a:t>
+            </a:r>
+            <a:r>
+              <a:rPr lang="en-US" dirty="0"/>
+              <a:t> blindly?</a:t>
+            </a:r>
+          </a:p>
+          <a:p>
+            <a:r>
+              <a:rPr lang="en-US" dirty="0"/>
+              <a:t>For productivity languages, if you have a function with 10 optional variables, you should know what each does and set each one.</a:t>
+            </a:r>
+          </a:p>
+          <a:p>
+            <a:r>
+              <a:rPr lang="en-US" dirty="0"/>
+              <a:t>If you design a library, make sure that users can learn how to use your tool.</a:t>
+            </a:r>
+          </a:p>
+        </p:txBody>
+      </p:sp>
+    </p:spTree>
+    <p:extLst>
+      <p:ext uri="{BB962C8B-B14F-4D97-AF65-F5344CB8AC3E}">
+        <p14:creationId xmlns:p14="http://schemas.microsoft.com/office/powerpoint/2010/main" val="4245765019"/>
+      </p:ext>
+    </p:extLst>
+  </p:cSld>
+  <p:clrMapOvr>
+    <a:masterClrMapping/>
+  </p:clrMapOvr>
+</p:sld>
+</file>
+
+<file path=ppt/slides/slide6.xml><?xml version="1.0" encoding="utf-8"?>
+<p:sld xmlns:a="http://schemas.openxmlformats.org/drawingml/2006/main" xmlns:r="http://schemas.openxmlformats.org/officeDocument/2006/relationships" xmlns:p="http://schemas.openxmlformats.org/presentationml/2006/main">
+  <p:cSld>
+    <p:spTree>
+      <p:nvGrpSpPr>
+        <p:cNvPr id="1" name=""/>
+        <p:cNvGrpSpPr/>
+        <p:nvPr/>
+      </p:nvGrpSpPr>
+      <p:grpSpPr>
+        <a:xfrm>
+          <a:off x="0" y="0"/>
+          <a:ext cx="0" cy="0"/>
+          <a:chOff x="0" y="0"/>
+          <a:chExt cx="0" cy="0"/>
+        </a:xfrm>
+      </p:grpSpPr>
+      <p:sp>
+        <p:nvSpPr>
+          <p:cNvPr id="2" name="Title 1">
+            <a:extLst>
+              <a:ext uri="{FF2B5EF4-FFF2-40B4-BE49-F238E27FC236}">
+                <a16:creationId xmlns:a16="http://schemas.microsoft.com/office/drawing/2014/main" id="{C87F61D9-BB6B-6B85-F94B-BA9854A82DB6}"/>
+              </a:ext>
+            </a:extLst>
+          </p:cNvPr>
+          <p:cNvSpPr>
+            <a:spLocks noGrp="1"/>
+          </p:cNvSpPr>
+          <p:nvPr>
+            <p:ph type="title"/>
+          </p:nvPr>
+        </p:nvSpPr>
+        <p:spPr/>
+        <p:txBody>
+          <a:bodyPr/>
+          <a:lstStyle/>
+          <a:p>
+            <a:r>
+              <a:rPr lang="en-US" dirty="0"/>
+              <a:t>Know your tools: Example</a:t>
+            </a:r>
+          </a:p>
+        </p:txBody>
+      </p:sp>
+      <p:sp>
+        <p:nvSpPr>
+          <p:cNvPr id="3" name="Content Placeholder 2">
+            <a:extLst>
+              <a:ext uri="{FF2B5EF4-FFF2-40B4-BE49-F238E27FC236}">
+                <a16:creationId xmlns:a16="http://schemas.microsoft.com/office/drawing/2014/main" id="{697539F3-699D-1387-5F34-719A763151A1}"/>
+              </a:ext>
+            </a:extLst>
+          </p:cNvPr>
+          <p:cNvSpPr>
+            <a:spLocks noGrp="1"/>
+          </p:cNvSpPr>
+          <p:nvPr>
+            <p:ph idx="1"/>
+          </p:nvPr>
+        </p:nvSpPr>
+        <p:spPr/>
+        <p:txBody>
+          <a:bodyPr/>
+          <a:lstStyle/>
+          <a:p>
+            <a:r>
+              <a:rPr lang="en-US" dirty="0"/>
+              <a:t>Add in LDD output for the same module list but using python and anaconda.</a:t>
+            </a:r>
+          </a:p>
+          <a:p>
+            <a:r>
+              <a:rPr lang="en-US" dirty="0"/>
+              <a:t>Point out that the dependencies change</a:t>
+            </a:r>
+          </a:p>
+        </p:txBody>
+      </p:sp>
+    </p:spTree>
+    <p:extLst>
+      <p:ext uri="{BB962C8B-B14F-4D97-AF65-F5344CB8AC3E}">
+        <p14:creationId xmlns:p14="http://schemas.microsoft.com/office/powerpoint/2010/main" val="2503386237"/>
+      </p:ext>
+    </p:extLst>
+  </p:cSld>
+  <p:clrMapOvr>
+    <a:masterClrMapping/>
+  </p:clrMapOvr>
+</p:sld>
+</file>
+
+<file path=ppt/slides/slide7.xml><?xml version="1.0" encoding="utf-8"?>
+<p:sld xmlns:a="http://schemas.openxmlformats.org/drawingml/2006/main" xmlns:r="http://schemas.openxmlformats.org/officeDocument/2006/relationships" xmlns:p="http://schemas.openxmlformats.org/presentationml/2006/main">
+  <p:cSld>
+    <p:spTree>
+      <p:nvGrpSpPr>
+        <p:cNvPr id="1" name=""/>
+        <p:cNvGrpSpPr/>
+        <p:nvPr/>
+      </p:nvGrpSpPr>
+      <p:grpSpPr>
+        <a:xfrm>
+          <a:off x="0" y="0"/>
+          <a:ext cx="0" cy="0"/>
+          <a:chOff x="0" y="0"/>
+          <a:chExt cx="0" cy="0"/>
+        </a:xfrm>
+      </p:grpSpPr>
+      <p:sp>
+        <p:nvSpPr>
+          <p:cNvPr id="2" name="Title 1">
+            <a:extLst>
+              <a:ext uri="{FF2B5EF4-FFF2-40B4-BE49-F238E27FC236}">
+                <a16:creationId xmlns:a16="http://schemas.microsoft.com/office/drawing/2014/main" id="{8ABAE06C-9F3C-9217-C7B3-9FA0C260FA01}"/>
+              </a:ext>
+            </a:extLst>
+          </p:cNvPr>
+          <p:cNvSpPr>
+            <a:spLocks noGrp="1"/>
+          </p:cNvSpPr>
+          <p:nvPr>
+            <p:ph type="title"/>
+          </p:nvPr>
+        </p:nvSpPr>
+        <p:spPr/>
+        <p:txBody>
+          <a:bodyPr/>
+          <a:lstStyle/>
+          <a:p>
+            <a:r>
+              <a:rPr lang="en-US" dirty="0"/>
+              <a:t>Measure twice, cut once</a:t>
+            </a:r>
+          </a:p>
+        </p:txBody>
+      </p:sp>
+      <p:sp>
+        <p:nvSpPr>
+          <p:cNvPr id="4" name="Content Placeholder 2">
+            <a:extLst>
+              <a:ext uri="{FF2B5EF4-FFF2-40B4-BE49-F238E27FC236}">
+                <a16:creationId xmlns:a16="http://schemas.microsoft.com/office/drawing/2014/main" id="{2C6FC67E-CCBA-DE3F-AD5C-7D0D88344E66}"/>
+              </a:ext>
+            </a:extLst>
+          </p:cNvPr>
+          <p:cNvSpPr>
+            <a:spLocks noGrp="1"/>
+          </p:cNvSpPr>
+          <p:nvPr>
+            <p:ph idx="1"/>
+          </p:nvPr>
+        </p:nvSpPr>
+        <p:spPr>
+          <a:xfrm>
+            <a:off x="365761" y="1737360"/>
+            <a:ext cx="5145578" cy="4047778"/>
+          </a:xfrm>
+        </p:spPr>
+        <p:txBody>
+          <a:bodyPr/>
+          <a:lstStyle/>
+          <a:p>
+            <a:pPr marL="0" indent="0">
+              <a:buNone/>
+            </a:pPr>
+            <a:r>
+              <a:rPr lang="en-US" b="1" dirty="0"/>
+              <a:t>Experimental World</a:t>
+            </a:r>
+          </a:p>
+          <a:p>
+            <a:r>
+              <a:rPr lang="en-US" dirty="0"/>
+              <a:t>Some actions are not reversible</a:t>
+            </a:r>
+          </a:p>
+          <a:p>
+            <a:r>
+              <a:rPr lang="en-US" dirty="0"/>
+              <a:t>Don’t waste materials</a:t>
+            </a:r>
+          </a:p>
+          <a:p>
+            <a:r>
+              <a:rPr lang="en-US" dirty="0"/>
+              <a:t>Don’t waste time &amp; effort</a:t>
+            </a:r>
+          </a:p>
+          <a:p>
+            <a:endParaRPr lang="en-US" dirty="0"/>
+          </a:p>
+        </p:txBody>
+      </p:sp>
+      <p:sp>
+        <p:nvSpPr>
+          <p:cNvPr id="5" name="Content Placeholder 2">
+            <a:extLst>
+              <a:ext uri="{FF2B5EF4-FFF2-40B4-BE49-F238E27FC236}">
+                <a16:creationId xmlns:a16="http://schemas.microsoft.com/office/drawing/2014/main" id="{5D4B9335-3FCA-6503-DD7C-20B134A081E5}"/>
+              </a:ext>
+            </a:extLst>
+          </p:cNvPr>
+          <p:cNvSpPr txBox="1">
+            <a:spLocks/>
+          </p:cNvSpPr>
+          <p:nvPr/>
+        </p:nvSpPr>
+        <p:spPr bwMode="auto">
+          <a:xfrm>
+            <a:off x="6511623" y="1740130"/>
+            <a:ext cx="5145578" cy="4047778"/>
+          </a:xfrm>
+          <a:prstGeom prst="rect">
+            <a:avLst/>
+          </a:prstGeom>
+          <a:noFill/>
+          <a:ln w="9525">
+            <a:noFill/>
+            <a:miter lim="800000"/>
+            <a:headEnd/>
+            <a:tailEnd/>
+          </a:ln>
+        </p:spPr>
+        <p:txBody>
+          <a:bodyPr vert="horz" wrap="square" lIns="91440" tIns="45720" rIns="91440" bIns="45720" numCol="1" anchor="t" anchorCtr="0" compatLnSpc="1">
+            <a:prstTxWarp prst="textNoShape">
+              <a:avLst/>
+            </a:prstTxWarp>
+            <a:noAutofit/>
+          </a:bodyPr>
+          <a:lstStyle>
+            <a:lvl1pPr marL="230188" indent="-230188" algn="l" rtl="0" eaLnBrk="1" fontAlgn="base" hangingPunct="1">
+              <a:lnSpc>
+                <a:spcPct val="90000"/>
+              </a:lnSpc>
+              <a:spcBef>
+                <a:spcPts val="1400"/>
+              </a:spcBef>
+              <a:spcAft>
+                <a:spcPct val="0"/>
+              </a:spcAft>
+              <a:buClr>
+                <a:schemeClr val="tx1"/>
+              </a:buClr>
+              <a:buFont typeface="Arial" charset="0"/>
+              <a:buChar char="•"/>
+              <a:defRPr sz="2400" kern="1200">
+                <a:solidFill>
+                  <a:schemeClr val="tx1"/>
+                </a:solidFill>
+                <a:latin typeface="Arial" panose="020B0604020202020204" pitchFamily="34" charset="0"/>
+                <a:ea typeface="+mn-ea"/>
+                <a:cs typeface="Arial" panose="020B0604020202020204" pitchFamily="34" charset="0"/>
+              </a:defRPr>
+            </a:lvl1pPr>
+            <a:lvl2pPr marL="625475" indent="-279400" algn="l" rtl="0" eaLnBrk="1" fontAlgn="base" hangingPunct="1">
+              <a:lnSpc>
+                <a:spcPct val="90000"/>
+              </a:lnSpc>
+              <a:spcBef>
+                <a:spcPts val="800"/>
+              </a:spcBef>
+              <a:spcAft>
+                <a:spcPct val="0"/>
+              </a:spcAft>
+              <a:buClr>
+                <a:schemeClr val="tx1"/>
+              </a:buClr>
+              <a:buFont typeface="Arial" charset="0"/>
+              <a:buChar char="–"/>
+              <a:defRPr sz="2000" kern="1200">
+                <a:solidFill>
+                  <a:schemeClr val="tx1"/>
+                </a:solidFill>
+                <a:latin typeface="Arial" panose="020B0604020202020204" pitchFamily="34" charset="0"/>
+                <a:ea typeface="+mn-ea"/>
+                <a:cs typeface="Arial" panose="020B0604020202020204" pitchFamily="34" charset="0"/>
+              </a:defRPr>
+            </a:lvl2pPr>
+            <a:lvl3pPr marL="914400" indent="-230188" algn="l" rtl="0" eaLnBrk="1" fontAlgn="base" hangingPunct="1">
+              <a:lnSpc>
+                <a:spcPct val="90000"/>
+              </a:lnSpc>
+              <a:spcBef>
+                <a:spcPts val="800"/>
+              </a:spcBef>
+              <a:spcAft>
+                <a:spcPct val="0"/>
+              </a:spcAft>
+              <a:buClr>
+                <a:schemeClr val="tx1"/>
+              </a:buClr>
+              <a:buFont typeface="Arial" charset="0"/>
+              <a:buChar char="•"/>
+              <a:defRPr sz="1800" kern="1200">
+                <a:solidFill>
+                  <a:schemeClr val="tx1"/>
+                </a:solidFill>
+                <a:latin typeface="Arial" panose="020B0604020202020204" pitchFamily="34" charset="0"/>
+                <a:ea typeface="+mn-ea"/>
+                <a:cs typeface="Arial" panose="020B0604020202020204" pitchFamily="34" charset="0"/>
+              </a:defRPr>
+            </a:lvl3pPr>
+            <a:lvl4pPr marL="1144588" indent="-173038" algn="l" rtl="0" eaLnBrk="1" fontAlgn="base" hangingPunct="1">
+              <a:lnSpc>
+                <a:spcPct val="90000"/>
+              </a:lnSpc>
+              <a:spcBef>
+                <a:spcPts val="800"/>
+              </a:spcBef>
+              <a:spcAft>
+                <a:spcPct val="0"/>
+              </a:spcAft>
+              <a:buClr>
+                <a:schemeClr val="tx1"/>
+              </a:buClr>
+              <a:buFont typeface="Arial" charset="0"/>
+              <a:buChar char="–"/>
+              <a:defRPr sz="1600" kern="1200">
+                <a:solidFill>
+                  <a:schemeClr val="tx1"/>
+                </a:solidFill>
+                <a:latin typeface="Arial" panose="020B0604020202020204" pitchFamily="34" charset="0"/>
+                <a:ea typeface="+mn-ea"/>
+                <a:cs typeface="Arial" panose="020B0604020202020204" pitchFamily="34" charset="0"/>
+              </a:defRPr>
+            </a:lvl4pPr>
+            <a:lvl5pPr marL="1482725" indent="-222250" algn="l" rtl="0" eaLnBrk="1" fontAlgn="base" hangingPunct="1">
+              <a:lnSpc>
+                <a:spcPct val="90000"/>
+              </a:lnSpc>
+              <a:spcBef>
+                <a:spcPts val="600"/>
+              </a:spcBef>
+              <a:spcAft>
+                <a:spcPct val="0"/>
+              </a:spcAft>
+              <a:buClr>
+                <a:schemeClr val="tx1"/>
+              </a:buClr>
+              <a:buFont typeface="Arial" panose="020B0604020202020204" pitchFamily="34" charset="0"/>
+              <a:buChar char="•"/>
+              <a:defRPr sz="1600" kern="1200">
+                <a:solidFill>
+                  <a:schemeClr val="tx1"/>
+                </a:solidFill>
+                <a:latin typeface="Arial" panose="020B0604020202020204" pitchFamily="34" charset="0"/>
+                <a:ea typeface="+mn-ea"/>
+                <a:cs typeface="Arial" panose="020B0604020202020204" pitchFamily="34" charset="0"/>
+              </a:defRPr>
+            </a:lvl5pPr>
+            <a:lvl6pPr marL="2514600" indent="-228600" algn="l" defTabSz="914400" rtl="0" eaLnBrk="1" latinLnBrk="0" hangingPunct="1">
+              <a:spcBef>
+                <a:spcPct val="20000"/>
+              </a:spcBef>
+              <a:buFont typeface="Arial" pitchFamily="34" charset="0"/>
+              <a:buChar char="•"/>
+              <a:defRPr sz="2000" kern="1200">
+                <a:solidFill>
+                  <a:schemeClr val="tx1"/>
+                </a:solidFill>
+                <a:latin typeface="+mn-lt"/>
+                <a:ea typeface="+mn-ea"/>
+                <a:cs typeface="+mn-cs"/>
+              </a:defRPr>
+            </a:lvl6pPr>
+            <a:lvl7pPr marL="2971800" indent="-228600" algn="l" defTabSz="914400" rtl="0" eaLnBrk="1" latinLnBrk="0" hangingPunct="1">
+              <a:spcBef>
+                <a:spcPct val="20000"/>
+              </a:spcBef>
+              <a:buFont typeface="Arial" pitchFamily="34" charset="0"/>
+              <a:buChar char="•"/>
+              <a:defRPr sz="2000" kern="1200">
+                <a:solidFill>
+                  <a:schemeClr val="tx1"/>
+                </a:solidFill>
+                <a:latin typeface="+mn-lt"/>
+                <a:ea typeface="+mn-ea"/>
+                <a:cs typeface="+mn-cs"/>
+              </a:defRPr>
+            </a:lvl7pPr>
+            <a:lvl8pPr marL="3429000" indent="-228600" algn="l" defTabSz="914400" rtl="0" eaLnBrk="1" latinLnBrk="0" hangingPunct="1">
+              <a:spcBef>
+                <a:spcPct val="20000"/>
+              </a:spcBef>
+              <a:buFont typeface="Arial" pitchFamily="34" charset="0"/>
+              <a:buChar char="•"/>
+              <a:defRPr sz="2000" kern="1200">
+                <a:solidFill>
+                  <a:schemeClr val="tx1"/>
+                </a:solidFill>
+                <a:latin typeface="+mn-lt"/>
+                <a:ea typeface="+mn-ea"/>
+                <a:cs typeface="+mn-cs"/>
+              </a:defRPr>
+            </a:lvl8pPr>
+            <a:lvl9pPr marL="3886200" indent="-228600" algn="l" defTabSz="914400" rtl="0" eaLnBrk="1" latinLnBrk="0" hangingPunct="1">
+              <a:spcBef>
+                <a:spcPct val="20000"/>
+              </a:spcBef>
+              <a:buFont typeface="Arial" pitchFamily="34" charset="0"/>
+              <a:buChar char="•"/>
+              <a:defRPr sz="2000" kern="1200">
+                <a:solidFill>
+                  <a:schemeClr val="tx1"/>
+                </a:solidFill>
+                <a:latin typeface="+mn-lt"/>
+                <a:ea typeface="+mn-ea"/>
+                <a:cs typeface="+mn-cs"/>
+              </a:defRPr>
+            </a:lvl9pPr>
+          </a:lstStyle>
+          <a:p>
+            <a:pPr marL="0" indent="0">
+              <a:buFont typeface="Arial" charset="0"/>
+              <a:buNone/>
+            </a:pPr>
+            <a:r>
+              <a:rPr lang="en-US" b="1" dirty="0"/>
+              <a:t>Computational World</a:t>
+            </a:r>
+          </a:p>
+          <a:p>
+            <a:r>
+              <a:rPr lang="en-US" dirty="0"/>
+              <a:t>Do appropriate level of planning</a:t>
+            </a:r>
+          </a:p>
+          <a:p>
+            <a:r>
+              <a:rPr lang="en-US" dirty="0"/>
+              <a:t>Don’t waste energy</a:t>
+            </a:r>
+          </a:p>
+          <a:p>
+            <a:r>
+              <a:rPr lang="en-US" dirty="0"/>
+              <a:t>Don’t waste core hours</a:t>
+            </a:r>
+          </a:p>
+          <a:p>
+            <a:r>
+              <a:rPr lang="en-US" dirty="0"/>
+              <a:t>Don’t produce bad data</a:t>
+            </a:r>
+          </a:p>
+          <a:p>
+            <a:r>
+              <a:rPr lang="en-US" dirty="0"/>
+              <a:t>Long-term efficiency</a:t>
+            </a:r>
+          </a:p>
+          <a:p>
+            <a:r>
+              <a:rPr lang="en-US" dirty="0"/>
+              <a:t>Maximize scientific impact</a:t>
+            </a:r>
+          </a:p>
+        </p:txBody>
+      </p:sp>
+    </p:spTree>
+    <p:extLst>
+      <p:ext uri="{BB962C8B-B14F-4D97-AF65-F5344CB8AC3E}">
+        <p14:creationId xmlns:p14="http://schemas.microsoft.com/office/powerpoint/2010/main" val="553021276"/>
+      </p:ext>
+    </p:extLst>
+  </p:cSld>
+  <p:clrMapOvr>
+    <a:masterClrMapping/>
+  </p:clrMapOvr>
+</p:sld>
+</file>
+
+<file path=ppt/slides/slide8.xml><?xml version="1.0" encoding="utf-8"?>
+<p:sld xmlns:a="http://schemas.openxmlformats.org/drawingml/2006/main" xmlns:r="http://schemas.openxmlformats.org/officeDocument/2006/relationships" xmlns:p="http://schemas.openxmlformats.org/presentationml/2006/main">
+  <p:cSld>
+    <p:spTree>
+      <p:nvGrpSpPr>
+        <p:cNvPr id="1" name=""/>
+        <p:cNvGrpSpPr/>
+        <p:nvPr/>
+      </p:nvGrpSpPr>
+      <p:grpSpPr>
+        <a:xfrm>
+          <a:off x="0" y="0"/>
+          <a:ext cx="0" cy="0"/>
+          <a:chOff x="0" y="0"/>
+          <a:chExt cx="0" cy="0"/>
+        </a:xfrm>
+      </p:grpSpPr>
+      <p:sp>
+        <p:nvSpPr>
+          <p:cNvPr id="2" name="Title 1">
+            <a:extLst>
+              <a:ext uri="{FF2B5EF4-FFF2-40B4-BE49-F238E27FC236}">
+                <a16:creationId xmlns:a16="http://schemas.microsoft.com/office/drawing/2014/main" id="{8BA09715-D2C2-73F0-C930-3D45C44AF700}"/>
+              </a:ext>
+            </a:extLst>
+          </p:cNvPr>
+          <p:cNvSpPr>
+            <a:spLocks noGrp="1"/>
+          </p:cNvSpPr>
+          <p:nvPr>
+            <p:ph type="title"/>
+          </p:nvPr>
+        </p:nvSpPr>
+        <p:spPr/>
+        <p:txBody>
+          <a:bodyPr/>
+          <a:lstStyle/>
+          <a:p>
+            <a:r>
+              <a:rPr lang="en-US" dirty="0"/>
+              <a:t>Clean your workspace</a:t>
+            </a:r>
+          </a:p>
+        </p:txBody>
+      </p:sp>
+      <p:sp>
+        <p:nvSpPr>
+          <p:cNvPr id="4" name="Content Placeholder 2">
+            <a:extLst>
+              <a:ext uri="{FF2B5EF4-FFF2-40B4-BE49-F238E27FC236}">
+                <a16:creationId xmlns:a16="http://schemas.microsoft.com/office/drawing/2014/main" id="{64B59F6F-CFBD-AA50-42A5-DE34EBEFDF7E}"/>
+              </a:ext>
+            </a:extLst>
+          </p:cNvPr>
+          <p:cNvSpPr>
+            <a:spLocks noGrp="1"/>
+          </p:cNvSpPr>
+          <p:nvPr>
+            <p:ph idx="1"/>
+          </p:nvPr>
+        </p:nvSpPr>
+        <p:spPr>
+          <a:xfrm>
+            <a:off x="365761" y="1737360"/>
+            <a:ext cx="5145578" cy="4047778"/>
+          </a:xfrm>
+        </p:spPr>
+        <p:txBody>
+          <a:bodyPr/>
+          <a:lstStyle/>
+          <a:p>
+            <a:pPr marL="0" indent="0">
+              <a:buNone/>
+            </a:pPr>
+            <a:r>
+              <a:rPr lang="en-US" b="1" dirty="0"/>
+              <a:t>Experimental World</a:t>
+            </a:r>
+          </a:p>
+          <a:p>
+            <a:endParaRPr lang="en-US" dirty="0"/>
+          </a:p>
+        </p:txBody>
+      </p:sp>
+      <p:sp>
+        <p:nvSpPr>
+          <p:cNvPr id="5" name="Content Placeholder 2">
+            <a:extLst>
+              <a:ext uri="{FF2B5EF4-FFF2-40B4-BE49-F238E27FC236}">
+                <a16:creationId xmlns:a16="http://schemas.microsoft.com/office/drawing/2014/main" id="{1DE2A193-506E-1F4E-20F3-06F187CF7FE6}"/>
+              </a:ext>
+            </a:extLst>
+          </p:cNvPr>
+          <p:cNvSpPr txBox="1">
+            <a:spLocks/>
+          </p:cNvSpPr>
+          <p:nvPr/>
+        </p:nvSpPr>
+        <p:spPr bwMode="auto">
+          <a:xfrm>
+            <a:off x="6511623" y="1740130"/>
+            <a:ext cx="5145578" cy="4047778"/>
+          </a:xfrm>
+          <a:prstGeom prst="rect">
+            <a:avLst/>
+          </a:prstGeom>
+          <a:noFill/>
+          <a:ln w="9525">
+            <a:noFill/>
+            <a:miter lim="800000"/>
+            <a:headEnd/>
+            <a:tailEnd/>
+          </a:ln>
+        </p:spPr>
+        <p:txBody>
+          <a:bodyPr vert="horz" wrap="square" lIns="91440" tIns="45720" rIns="91440" bIns="45720" numCol="1" anchor="t" anchorCtr="0" compatLnSpc="1">
+            <a:prstTxWarp prst="textNoShape">
+              <a:avLst/>
+            </a:prstTxWarp>
+            <a:noAutofit/>
+          </a:bodyPr>
+          <a:lstStyle>
+            <a:lvl1pPr marL="230188" indent="-230188" algn="l" rtl="0" eaLnBrk="1" fontAlgn="base" hangingPunct="1">
+              <a:lnSpc>
+                <a:spcPct val="90000"/>
+              </a:lnSpc>
+              <a:spcBef>
+                <a:spcPts val="1400"/>
+              </a:spcBef>
+              <a:spcAft>
+                <a:spcPct val="0"/>
+              </a:spcAft>
+              <a:buClr>
+                <a:schemeClr val="tx1"/>
+              </a:buClr>
+              <a:buFont typeface="Arial" charset="0"/>
+              <a:buChar char="•"/>
+              <a:defRPr sz="2400" kern="1200">
+                <a:solidFill>
+                  <a:schemeClr val="tx1"/>
+                </a:solidFill>
+                <a:latin typeface="Arial" panose="020B0604020202020204" pitchFamily="34" charset="0"/>
+                <a:ea typeface="+mn-ea"/>
+                <a:cs typeface="Arial" panose="020B0604020202020204" pitchFamily="34" charset="0"/>
+              </a:defRPr>
+            </a:lvl1pPr>
+            <a:lvl2pPr marL="625475" indent="-279400" algn="l" rtl="0" eaLnBrk="1" fontAlgn="base" hangingPunct="1">
+              <a:lnSpc>
+                <a:spcPct val="90000"/>
+              </a:lnSpc>
+              <a:spcBef>
+                <a:spcPts val="800"/>
+              </a:spcBef>
+              <a:spcAft>
+                <a:spcPct val="0"/>
+              </a:spcAft>
+              <a:buClr>
+                <a:schemeClr val="tx1"/>
+              </a:buClr>
+              <a:buFont typeface="Arial" charset="0"/>
+              <a:buChar char="–"/>
+              <a:defRPr sz="2000" kern="1200">
+                <a:solidFill>
+                  <a:schemeClr val="tx1"/>
+                </a:solidFill>
+                <a:latin typeface="Arial" panose="020B0604020202020204" pitchFamily="34" charset="0"/>
+                <a:ea typeface="+mn-ea"/>
+                <a:cs typeface="Arial" panose="020B0604020202020204" pitchFamily="34" charset="0"/>
+              </a:defRPr>
+            </a:lvl2pPr>
+            <a:lvl3pPr marL="914400" indent="-230188" algn="l" rtl="0" eaLnBrk="1" fontAlgn="base" hangingPunct="1">
+              <a:lnSpc>
+                <a:spcPct val="90000"/>
+              </a:lnSpc>
+              <a:spcBef>
+                <a:spcPts val="800"/>
+              </a:spcBef>
+              <a:spcAft>
+                <a:spcPct val="0"/>
+              </a:spcAft>
+              <a:buClr>
+                <a:schemeClr val="tx1"/>
+              </a:buClr>
+              <a:buFont typeface="Arial" charset="0"/>
+              <a:buChar char="•"/>
+              <a:defRPr sz="1800" kern="1200">
+                <a:solidFill>
+                  <a:schemeClr val="tx1"/>
+                </a:solidFill>
+                <a:latin typeface="Arial" panose="020B0604020202020204" pitchFamily="34" charset="0"/>
+                <a:ea typeface="+mn-ea"/>
+                <a:cs typeface="Arial" panose="020B0604020202020204" pitchFamily="34" charset="0"/>
+              </a:defRPr>
+            </a:lvl3pPr>
+            <a:lvl4pPr marL="1144588" indent="-173038" algn="l" rtl="0" eaLnBrk="1" fontAlgn="base" hangingPunct="1">
+              <a:lnSpc>
+                <a:spcPct val="90000"/>
+              </a:lnSpc>
+              <a:spcBef>
+                <a:spcPts val="800"/>
+              </a:spcBef>
+              <a:spcAft>
+                <a:spcPct val="0"/>
+              </a:spcAft>
+              <a:buClr>
+                <a:schemeClr val="tx1"/>
+              </a:buClr>
+              <a:buFont typeface="Arial" charset="0"/>
+              <a:buChar char="–"/>
+              <a:defRPr sz="1600" kern="1200">
+                <a:solidFill>
+                  <a:schemeClr val="tx1"/>
+                </a:solidFill>
+                <a:latin typeface="Arial" panose="020B0604020202020204" pitchFamily="34" charset="0"/>
+                <a:ea typeface="+mn-ea"/>
+                <a:cs typeface="Arial" panose="020B0604020202020204" pitchFamily="34" charset="0"/>
+              </a:defRPr>
+            </a:lvl4pPr>
+            <a:lvl5pPr marL="1482725" indent="-222250" algn="l" rtl="0" eaLnBrk="1" fontAlgn="base" hangingPunct="1">
+              <a:lnSpc>
+                <a:spcPct val="90000"/>
+              </a:lnSpc>
+              <a:spcBef>
+                <a:spcPts val="600"/>
+              </a:spcBef>
+              <a:spcAft>
+                <a:spcPct val="0"/>
+              </a:spcAft>
+              <a:buClr>
+                <a:schemeClr val="tx1"/>
+              </a:buClr>
+              <a:buFont typeface="Arial" panose="020B0604020202020204" pitchFamily="34" charset="0"/>
+              <a:buChar char="•"/>
+              <a:defRPr sz="1600" kern="1200">
+                <a:solidFill>
+                  <a:schemeClr val="tx1"/>
+                </a:solidFill>
+                <a:latin typeface="Arial" panose="020B0604020202020204" pitchFamily="34" charset="0"/>
+                <a:ea typeface="+mn-ea"/>
+                <a:cs typeface="Arial" panose="020B0604020202020204" pitchFamily="34" charset="0"/>
+              </a:defRPr>
+            </a:lvl5pPr>
+            <a:lvl6pPr marL="2514600" indent="-228600" algn="l" defTabSz="914400" rtl="0" eaLnBrk="1" latinLnBrk="0" hangingPunct="1">
+              <a:spcBef>
+                <a:spcPct val="20000"/>
+              </a:spcBef>
+              <a:buFont typeface="Arial" pitchFamily="34" charset="0"/>
+              <a:buChar char="•"/>
+              <a:defRPr sz="2000" kern="1200">
+                <a:solidFill>
+                  <a:schemeClr val="tx1"/>
+                </a:solidFill>
+                <a:latin typeface="+mn-lt"/>
+                <a:ea typeface="+mn-ea"/>
+                <a:cs typeface="+mn-cs"/>
+              </a:defRPr>
+            </a:lvl6pPr>
+            <a:lvl7pPr marL="2971800" indent="-228600" algn="l" defTabSz="914400" rtl="0" eaLnBrk="1" latinLnBrk="0" hangingPunct="1">
+              <a:spcBef>
+                <a:spcPct val="20000"/>
+              </a:spcBef>
+              <a:buFont typeface="Arial" pitchFamily="34" charset="0"/>
+              <a:buChar char="•"/>
+              <a:defRPr sz="2000" kern="1200">
+                <a:solidFill>
+                  <a:schemeClr val="tx1"/>
+                </a:solidFill>
+                <a:latin typeface="+mn-lt"/>
+                <a:ea typeface="+mn-ea"/>
+                <a:cs typeface="+mn-cs"/>
+              </a:defRPr>
+            </a:lvl7pPr>
+            <a:lvl8pPr marL="3429000" indent="-228600" algn="l" defTabSz="914400" rtl="0" eaLnBrk="1" latinLnBrk="0" hangingPunct="1">
+              <a:spcBef>
+                <a:spcPct val="20000"/>
+              </a:spcBef>
+              <a:buFont typeface="Arial" pitchFamily="34" charset="0"/>
+              <a:buChar char="•"/>
+              <a:defRPr sz="2000" kern="1200">
+                <a:solidFill>
+                  <a:schemeClr val="tx1"/>
+                </a:solidFill>
+                <a:latin typeface="+mn-lt"/>
+                <a:ea typeface="+mn-ea"/>
+                <a:cs typeface="+mn-cs"/>
+              </a:defRPr>
+            </a:lvl8pPr>
+            <a:lvl9pPr marL="3886200" indent="-228600" algn="l" defTabSz="914400" rtl="0" eaLnBrk="1" latinLnBrk="0" hangingPunct="1">
+              <a:spcBef>
+                <a:spcPct val="20000"/>
+              </a:spcBef>
+              <a:buFont typeface="Arial" pitchFamily="34" charset="0"/>
+              <a:buChar char="•"/>
+              <a:defRPr sz="2000" kern="1200">
+                <a:solidFill>
+                  <a:schemeClr val="tx1"/>
+                </a:solidFill>
+                <a:latin typeface="+mn-lt"/>
+                <a:ea typeface="+mn-ea"/>
+                <a:cs typeface="+mn-cs"/>
+              </a:defRPr>
+            </a:lvl9pPr>
+          </a:lstStyle>
+          <a:p>
+            <a:pPr marL="0" indent="0">
+              <a:buFont typeface="Arial" charset="0"/>
+              <a:buNone/>
+            </a:pPr>
+            <a:r>
+              <a:rPr lang="en-US" b="1" dirty="0"/>
+              <a:t>Computational World</a:t>
+            </a:r>
+          </a:p>
+          <a:p>
+            <a:r>
+              <a:rPr lang="en-US" dirty="0"/>
+              <a:t>Write good commit messages</a:t>
+            </a:r>
+          </a:p>
+          <a:p>
+            <a:r>
+              <a:rPr lang="en-US" dirty="0"/>
+              <a:t>Maintain issues and PRs up-to-date</a:t>
+            </a:r>
+          </a:p>
+          <a:p>
+            <a:r>
+              <a:rPr lang="en-US" dirty="0"/>
+              <a:t>Don’t leave clones in undocumented intermediate state</a:t>
+            </a:r>
+          </a:p>
+          <a:p>
+            <a:r>
+              <a:rPr lang="en-US" dirty="0"/>
+              <a:t>Maintain documentation as you work</a:t>
+            </a:r>
+          </a:p>
+          <a:p>
+            <a:endParaRPr lang="en-US" b="1" dirty="0"/>
+          </a:p>
+        </p:txBody>
+      </p:sp>
+    </p:spTree>
+    <p:extLst>
+      <p:ext uri="{BB962C8B-B14F-4D97-AF65-F5344CB8AC3E}">
+        <p14:creationId xmlns:p14="http://schemas.microsoft.com/office/powerpoint/2010/main" val="426886108"/>
+      </p:ext>
+    </p:extLst>
+  </p:cSld>
+  <p:clrMapOvr>
+    <a:masterClrMapping/>
+  </p:clrMapOvr>
+</p:sld>
+</file>
+
+<file path=ppt/slides/slide9.xml><?xml version="1.0" encoding="utf-8"?>
+<p:sld xmlns:a="http://schemas.openxmlformats.org/drawingml/2006/main" xmlns:r="http://schemas.openxmlformats.org/officeDocument/2006/relationships" xmlns:p="http://schemas.openxmlformats.org/presentationml/2006/main">
+  <p:cSld>
+    <p:spTree>
+      <p:nvGrpSpPr>
+        <p:cNvPr id="1" name=""/>
+        <p:cNvGrpSpPr/>
+        <p:nvPr/>
+      </p:nvGrpSpPr>
+      <p:grpSpPr>
+        <a:xfrm>
+          <a:off x="0" y="0"/>
+          <a:ext cx="0" cy="0"/>
+          <a:chOff x="0" y="0"/>
+          <a:chExt cx="0" cy="0"/>
+        </a:xfrm>
+      </p:grpSpPr>
+      <p:sp>
+        <p:nvSpPr>
+          <p:cNvPr id="2" name="Title 1">
+            <a:extLst>
+              <a:ext uri="{FF2B5EF4-FFF2-40B4-BE49-F238E27FC236}">
+                <a16:creationId xmlns:a16="http://schemas.microsoft.com/office/drawing/2014/main" id="{E21090C7-16EB-89C7-DC5D-FCFF023B0BD0}"/>
+              </a:ext>
+            </a:extLst>
+          </p:cNvPr>
+          <p:cNvSpPr>
+            <a:spLocks noGrp="1"/>
+          </p:cNvSpPr>
+          <p:nvPr>
+            <p:ph type="title"/>
+          </p:nvPr>
+        </p:nvSpPr>
+        <p:spPr/>
+        <p:txBody>
+          <a:bodyPr/>
+          <a:lstStyle/>
+          <a:p>
+            <a:r>
+              <a:rPr lang="en-US" dirty="0"/>
+              <a:t>Experimental laboratory environment</a:t>
+            </a:r>
+          </a:p>
+        </p:txBody>
+      </p:sp>
+      <p:sp>
+        <p:nvSpPr>
+          <p:cNvPr id="3" name="Content Placeholder 2">
+            <a:extLst>
+              <a:ext uri="{FF2B5EF4-FFF2-40B4-BE49-F238E27FC236}">
+                <a16:creationId xmlns:a16="http://schemas.microsoft.com/office/drawing/2014/main" id="{A89CA5B2-D3EA-44A2-78F3-199F8270FCA2}"/>
+              </a:ext>
+            </a:extLst>
+          </p:cNvPr>
+          <p:cNvSpPr>
+            <a:spLocks noGrp="1"/>
+          </p:cNvSpPr>
+          <p:nvPr>
+            <p:ph idx="1"/>
+          </p:nvPr>
+        </p:nvSpPr>
+        <p:spPr>
+          <a:xfrm>
+            <a:off x="365760" y="1242831"/>
+            <a:ext cx="11369809" cy="4047778"/>
+          </a:xfrm>
+        </p:spPr>
+        <p:txBody>
+          <a:bodyPr/>
+          <a:lstStyle/>
+          <a:p>
+            <a:r>
+              <a:rPr lang="en-US" dirty="0"/>
+              <a:t>In an experimental lab,</a:t>
+            </a:r>
+          </a:p>
+          <a:p>
+            <a:pPr lvl="1"/>
+            <a:r>
+              <a:rPr lang="en-US" dirty="0"/>
+              <a:t>I want to have all my tools at hand, clean, and ready for use,</a:t>
+            </a:r>
+          </a:p>
+          <a:p>
+            <a:pPr lvl="1"/>
+            <a:r>
+              <a:rPr lang="en-US" dirty="0"/>
+              <a:t>I want to know how to use my tools,</a:t>
+            </a:r>
+          </a:p>
+          <a:p>
+            <a:pPr lvl="1"/>
+            <a:r>
+              <a:rPr lang="en-US" dirty="0"/>
+              <a:t>I want to have my instrument characterized and configured so that I know that I am collecting the correct data and so that I know how to use the data appropriately, </a:t>
+            </a:r>
+          </a:p>
+          <a:p>
+            <a:pPr lvl="1"/>
+            <a:r>
+              <a:rPr lang="en-US" dirty="0"/>
+              <a:t>If something is broken or underperforming, I want to know if I can use it and if so how it will affect my science, and</a:t>
+            </a:r>
+          </a:p>
+          <a:p>
+            <a:pPr lvl="1"/>
+            <a:r>
+              <a:rPr lang="en-US" dirty="0"/>
+              <a:t>I want to be able to take comprehensive lab notes quickly and easily.</a:t>
+            </a:r>
+          </a:p>
+          <a:p>
+            <a:pPr marL="346075" lvl="1" indent="0">
+              <a:buNone/>
+            </a:pPr>
+            <a:endParaRPr lang="en-US" dirty="0"/>
+          </a:p>
+          <a:p>
+            <a:pPr marL="0" indent="0" algn="ctr">
+              <a:buNone/>
+            </a:pPr>
+            <a:r>
+              <a:rPr lang="en-US" b="1" dirty="0"/>
+              <a:t>The Goal</a:t>
+            </a:r>
+          </a:p>
+          <a:p>
+            <a:pPr marL="0" indent="0" algn="ctr">
+              <a:buNone/>
+            </a:pPr>
+            <a:r>
+              <a:rPr lang="en-US" dirty="0"/>
+              <a:t>Concentrate on acquiring data, analyzing the data, drawing conclusions, designing next steps, and recording the work for reproducibility.</a:t>
+            </a:r>
+          </a:p>
+        </p:txBody>
+      </p:sp>
+    </p:spTree>
+    <p:extLst>
+      <p:ext uri="{BB962C8B-B14F-4D97-AF65-F5344CB8AC3E}">
+        <p14:creationId xmlns:p14="http://schemas.microsoft.com/office/powerpoint/2010/main" val="1385667442"/>
       </p:ext>
     </p:extLst>
   </p:cSld>
@@ -5448,6 +9335,21 @@
 </file>
 
 <file path=customXml/item1.xml><?xml version="1.0" encoding="utf-8"?>
+<?mso-contentType ?>
+<FormTemplates xmlns="http://schemas.microsoft.com/sharepoint/v3/contenttype/forms">
+  <Display>DocumentLibraryForm</Display>
+  <Edit>DocumentLibraryForm</Edit>
+  <New>DocumentLibraryForm</New>
+</FormTemplates>
+</file>
+
+<file path=customXml/item2.xml><?xml version="1.0" encoding="utf-8"?>
+<p:properties xmlns:p="http://schemas.microsoft.com/office/2006/metadata/properties" xmlns:xsi="http://www.w3.org/2001/XMLSchema-instance" xmlns:pc="http://schemas.microsoft.com/office/infopath/2007/PartnerControls">
+  <documentManagement/>
+</p:properties>
+</file>
+
+<file path=customXml/item3.xml><?xml version="1.0" encoding="utf-8"?>
 <ct:contentTypeSchema xmlns:ct="http://schemas.microsoft.com/office/2006/metadata/contentType" xmlns:ma="http://schemas.microsoft.com/office/2006/metadata/properties/metaAttributes" ct:_="" ma:_="" ma:contentTypeName="Document" ma:contentTypeID="0x010100565464437F680748A68B85EB6594EA7D" ma:contentTypeVersion="0" ma:contentTypeDescription="Create a new document." ma:contentTypeScope="" ma:versionID="fe3f4dd58d5914c51cfc6deaa8ad845c">
   <xsd:schema xmlns:xsd="http://www.w3.org/2001/XMLSchema" xmlns:p="http://schemas.microsoft.com/office/2006/metadata/properties" targetNamespace="http://schemas.microsoft.com/office/2006/metadata/properties" ma:root="true" ma:fieldsID="4aeb20c0e3442673af7ee10786458764">
     <xsd:element name="properties">
@@ -5496,32 +9398,10 @@
 </ct:contentTypeSchema>
 </file>
 
-<file path=customXml/item2.xml><?xml version="1.0" encoding="utf-8"?>
-<p:properties xmlns:p="http://schemas.microsoft.com/office/2006/metadata/properties" xmlns:xsi="http://www.w3.org/2001/XMLSchema-instance" xmlns:pc="http://schemas.microsoft.com/office/infopath/2007/PartnerControls">
-  <documentManagement/>
-</p:properties>
-</file>
-
-<file path=customXml/item3.xml><?xml version="1.0" encoding="utf-8"?>
-<?mso-contentType ?>
-<FormTemplates xmlns="http://schemas.microsoft.com/sharepoint/v3/contenttype/forms">
-  <Display>DocumentLibraryForm</Display>
-  <Edit>DocumentLibraryForm</Edit>
-  <New>DocumentLibraryForm</New>
-</FormTemplates>
-</file>
-
 <file path=customXml/itemProps1.xml><?xml version="1.0" encoding="utf-8"?>
-<ds:datastoreItem xmlns:ds="http://schemas.openxmlformats.org/officeDocument/2006/customXml" ds:itemID="{E8DB7DEB-074E-4EE8-9B6E-FD277323109C}">
+<ds:datastoreItem xmlns:ds="http://schemas.openxmlformats.org/officeDocument/2006/customXml" ds:itemID="{19E20559-B232-4371-8690-E3D8007EDB82}">
   <ds:schemaRefs>
-    <ds:schemaRef ds:uri="http://schemas.microsoft.com/office/2006/metadata/contentType"/>
-    <ds:schemaRef ds:uri="http://schemas.microsoft.com/office/2006/metadata/properties/metaAttributes"/>
-    <ds:schemaRef ds:uri="http://www.w3.org/2001/XMLSchema"/>
-    <ds:schemaRef ds:uri="http://schemas.microsoft.com/office/2006/metadata/properties"/>
-    <ds:schemaRef ds:uri="http://schemas.openxmlformats.org/package/2006/metadata/core-properties"/>
-    <ds:schemaRef ds:uri="http://purl.org/dc/elements/1.1/"/>
-    <ds:schemaRef ds:uri="http://purl.org/dc/terms/"/>
-    <ds:schemaRef ds:uri="http://schemas.microsoft.com/office/internal/2005/internalDocumentation"/>
+    <ds:schemaRef ds:uri="http://schemas.microsoft.com/sharepoint/v3/contenttype/forms"/>
   </ds:schemaRefs>
 </ds:datastoreItem>
 </file>
@@ -5542,9 +9422,16 @@
 </file>
 
 <file path=customXml/itemProps3.xml><?xml version="1.0" encoding="utf-8"?>
-<ds:datastoreItem xmlns:ds="http://schemas.openxmlformats.org/officeDocument/2006/customXml" ds:itemID="{19E20559-B232-4371-8690-E3D8007EDB82}">
+<ds:datastoreItem xmlns:ds="http://schemas.openxmlformats.org/officeDocument/2006/customXml" ds:itemID="{E8DB7DEB-074E-4EE8-9B6E-FD277323109C}">
   <ds:schemaRefs>
-    <ds:schemaRef ds:uri="http://schemas.microsoft.com/sharepoint/v3/contenttype/forms"/>
+    <ds:schemaRef ds:uri="http://schemas.microsoft.com/office/2006/metadata/contentType"/>
+    <ds:schemaRef ds:uri="http://schemas.microsoft.com/office/2006/metadata/properties/metaAttributes"/>
+    <ds:schemaRef ds:uri="http://www.w3.org/2001/XMLSchema"/>
+    <ds:schemaRef ds:uri="http://schemas.microsoft.com/office/2006/metadata/properties"/>
+    <ds:schemaRef ds:uri="http://schemas.openxmlformats.org/package/2006/metadata/core-properties"/>
+    <ds:schemaRef ds:uri="http://purl.org/dc/elements/1.1/"/>
+    <ds:schemaRef ds:uri="http://purl.org/dc/terms/"/>
+    <ds:schemaRef ds:uri="http://schemas.microsoft.com/office/internal/2005/internalDocumentation"/>
   </ds:schemaRefs>
 </ds:datastoreItem>
 </file>
</xml_diff>

<commit_message>
(Issue #132) Adding a bit of new content and enhanced notes.
</commit_message>
<xml_diff>
--- a/computational-expts.pptx
+++ b/computational-expts.pptx
@@ -273,7 +273,7 @@
           <a:p>
             <a:fld id="{0B842F42-2CE9-4E35-95C1-410DC08A50B1}" type="datetimeFigureOut">
               <a:rPr lang="en-US" smtClean="0"/>
-              <a:t>7/19/22</a:t>
+              <a:t>7/22/22</a:t>
             </a:fld>
             <a:endParaRPr lang="en-US"/>
           </a:p>
@@ -438,7 +438,7 @@
           <a:p>
             <a:fld id="{6F282904-F315-4730-8D91-37D99E141A6F}" type="datetimeFigureOut">
               <a:rPr lang="en-US" smtClean="0"/>
-              <a:t>7/19/22</a:t>
+              <a:t>7/22/22</a:t>
             </a:fld>
             <a:endParaRPr lang="en-US"/>
           </a:p>
@@ -751,6 +751,15 @@
           <a:p>
             <a:r>
               <a:rPr lang="en-US" dirty="0"/>
+              <a:t>Co-location of people from same discipline =&gt; easy knowledge communication =&gt; less need for documentation.  At the observatory we had a team A and a team B and much work was multidisciplinary.  Therefore, need for documentation was greater.</a:t>
+            </a:r>
+          </a:p>
+          <a:p>
+            <a:endParaRPr lang="en-US" dirty="0"/>
+          </a:p>
+          <a:p>
+            <a:r>
+              <a:rPr lang="en-US" dirty="0"/>
               <a:t>Examples are difficulties of lab notebooks and documentation.  We have many tools to help us, but difficulties can grow when  N tools scaled out.    Extra layers of automation can add more effort and decrease maintainability.</a:t>
             </a:r>
           </a:p>
@@ -847,7 +856,25 @@
           <a:p>
             <a:r>
               <a:rPr lang="en-US" dirty="0"/>
-              <a:t>Phrases in bold are immediately applicable.  Others will require some translation.</a:t>
+              <a:t>Code is usually not written once.  But, we understand that the point is that a programmer should not write the code for them, but rather for their future self and for the larger community.</a:t>
+            </a:r>
+          </a:p>
+          <a:p>
+            <a:endParaRPr lang="en-US" dirty="0"/>
+          </a:p>
+          <a:p>
+            <a:r>
+              <a:rPr lang="en-US" dirty="0"/>
+              <a:t>Ask if people have heard these SW wisdoms.  Are they aware of others?</a:t>
+            </a:r>
+          </a:p>
+          <a:p>
+            <a:endParaRPr lang="en-US" dirty="0"/>
+          </a:p>
+          <a:p>
+            <a:r>
+              <a:rPr lang="en-US" dirty="0"/>
+              <a:t>In the spirit of searching for commonalities rather than differences, I have tried to adapt the experimental wisdoms to the computational world.  In other words, try to squeeze as much utility as we can from the accumulated wisdom of a different community.  It might be that only someone with my experience is capable of doing this initially, but if people engage in meaningful conversations with other and with an open mind, they might be able to.</a:t>
             </a:r>
           </a:p>
         </p:txBody>
@@ -963,6 +990,15 @@
               <a:t>One example are libraries with optional variables with no explanation of what they do or guidance about how to set them.  I have heard of cases where they might refer to an article, but that article doesn’t help.</a:t>
             </a:r>
           </a:p>
+          <a:p>
+            <a:endParaRPr lang="en-US" dirty="0"/>
+          </a:p>
+          <a:p>
+            <a:r>
+              <a:rPr lang="en-US" dirty="0"/>
+              <a:t>If designing a library, shoot for making interface as mature as possible as quickly as possible so that users don’t have to keep updating their knowledge of how to use the tool or worse aren’t aware that they need to relearn how to use the tool.</a:t>
+            </a:r>
+          </a:p>
         </p:txBody>
       </p:sp>
       <p:sp>
@@ -1047,8 +1083,108 @@
           <a:p>
             <a:r>
               <a:rPr lang="en-US" dirty="0"/>
-              <a:t>Point out that we had to abstract out some of the wisdoms to understand how they relate to the computational science world.  If we abstract out more, these just say be disciplined and don’t be lazy.</a:t>
-            </a:r>
+              <a:t>Point out that we had to abstract out some of the wisdoms to understand how they relate to the computational science world.  If we abstract out more, these just say</a:t>
+            </a:r>
+          </a:p>
+          <a:p>
+            <a:pPr marL="171450" indent="-171450">
+              <a:buFont typeface="Arial" panose="020B0604020202020204" pitchFamily="34" charset="0"/>
+              <a:buChar char="•"/>
+            </a:pPr>
+            <a:r>
+              <a:rPr lang="en-US" dirty="0"/>
+              <a:t>be disciplined,</a:t>
+            </a:r>
+          </a:p>
+          <a:p>
+            <a:pPr marL="171450" indent="-171450">
+              <a:buFont typeface="Arial" panose="020B0604020202020204" pitchFamily="34" charset="0"/>
+              <a:buChar char="•"/>
+            </a:pPr>
+            <a:r>
+              <a:rPr lang="en-US" dirty="0"/>
+              <a:t>don’t be lazy,</a:t>
+            </a:r>
+          </a:p>
+          <a:p>
+            <a:pPr marL="171450" indent="-171450">
+              <a:buFont typeface="Arial" panose="020B0604020202020204" pitchFamily="34" charset="0"/>
+              <a:buChar char="•"/>
+            </a:pPr>
+            <a:r>
+              <a:rPr lang="en-US" dirty="0"/>
+              <a:t>don’t be self-centered.</a:t>
+            </a:r>
+          </a:p>
+          <a:p>
+            <a:pPr marL="171450" indent="-171450">
+              <a:buFont typeface="Arial" panose="020B0604020202020204" pitchFamily="34" charset="0"/>
+              <a:buChar char="•"/>
+            </a:pPr>
+            <a:endParaRPr lang="en-US" dirty="0"/>
+          </a:p>
+          <a:p>
+            <a:pPr marL="171450" indent="-171450">
+              <a:buFont typeface="Arial" panose="020B0604020202020204" pitchFamily="34" charset="0"/>
+              <a:buChar char="•"/>
+            </a:pPr>
+            <a:r>
+              <a:rPr lang="en-US" dirty="0"/>
+              <a:t>This fits with what I have seen written about knowledge.  The wiki page https://</a:t>
+            </a:r>
+            <a:r>
+              <a:rPr lang="en-US" dirty="0" err="1"/>
+              <a:t>en.wikipedia.org</a:t>
+            </a:r>
+            <a:r>
+              <a:rPr lang="en-US" dirty="0"/>
+              <a:t>/wiki/</a:t>
+            </a:r>
+            <a:r>
+              <a:rPr lang="en-US" dirty="0" err="1"/>
+              <a:t>DIKW_pyramid</a:t>
+            </a:r>
+            <a:r>
+              <a:rPr lang="en-US" dirty="0"/>
+              <a:t> says that wisdom “</a:t>
+            </a:r>
+            <a:r>
+              <a:rPr lang="en-US" sz="1200" b="0" i="0" u="none" strike="noStrike" kern="1200" dirty="0">
+                <a:solidFill>
+                  <a:schemeClr val="tx1"/>
+                </a:solidFill>
+                <a:effectLst/>
+                <a:latin typeface="+mn-lt"/>
+                <a:ea typeface="+mn-ea"/>
+                <a:cs typeface="+mn-cs"/>
+              </a:rPr>
+              <a:t>requires a sense of good and bad, right and wrong, ethical and unethical.”  These are all do “what is </a:t>
+            </a:r>
+            <a:r>
+              <a:rPr lang="en-US" sz="1200" b="0" i="0" u="none" strike="noStrike" kern="1200">
+                <a:solidFill>
+                  <a:schemeClr val="tx1"/>
+                </a:solidFill>
+                <a:effectLst/>
+                <a:latin typeface="+mn-lt"/>
+                <a:ea typeface="+mn-ea"/>
+                <a:cs typeface="+mn-cs"/>
+              </a:rPr>
+              <a:t>right and </a:t>
+            </a:r>
+            <a:r>
+              <a:rPr lang="en-US" sz="1200" b="0" i="0" u="none" strike="noStrike" kern="1200" dirty="0">
+                <a:solidFill>
+                  <a:schemeClr val="tx1"/>
+                </a:solidFill>
+                <a:effectLst/>
+                <a:latin typeface="+mn-lt"/>
+                <a:ea typeface="+mn-ea"/>
+                <a:cs typeface="+mn-cs"/>
+              </a:rPr>
+              <a:t>correct”</a:t>
+            </a:r>
+            <a:endParaRPr lang="en-US" dirty="0"/>
           </a:p>
         </p:txBody>
       </p:sp>
@@ -1172,6 +1308,15 @@
               <a:t>Use Carlo’s quote “in-flight airplane repair.”</a:t>
             </a:r>
           </a:p>
+          <a:p>
+            <a:endParaRPr lang="en-US" dirty="0"/>
+          </a:p>
+          <a:p>
+            <a:r>
+              <a:rPr lang="en-US" dirty="0"/>
+              <a:t>Also, if something is broken or underperforming, we need to communicate this to others explicitly and clearly.</a:t>
+            </a:r>
+          </a:p>
         </p:txBody>
       </p:sp>
       <p:sp>
@@ -1344,6 +1489,39 @@
             <a:r>
               <a:rPr lang="en-US" dirty="0"/>
               <a:t>I see this more and more as projects grow and tasks grow more complex.</a:t>
+            </a:r>
+          </a:p>
+          <a:p>
+            <a:endParaRPr lang="en-US" dirty="0"/>
+          </a:p>
+          <a:p>
+            <a:r>
+              <a:rPr lang="en-US" dirty="0"/>
+              <a:t>We are working on complex problems.  We cannot make complexity disappear, but we can try to transfer to areas where we are capable of managing the complexity well and with confidence.  If people believe that they have made the complexity disappear, then more likely than not, they do not appreciate that they have moved the complexity elsewhere.  An example to work up here is </a:t>
+            </a:r>
+            <a:r>
+              <a:rPr lang="en-US" dirty="0" err="1"/>
+              <a:t>Spack</a:t>
+            </a:r>
+            <a:r>
+              <a:rPr lang="en-US" dirty="0"/>
+              <a:t>.  We can move the complexity of constructing and managing SW stacks out to modules and </a:t>
+            </a:r>
+            <a:r>
+              <a:rPr lang="en-US" dirty="0" err="1"/>
+              <a:t>spack</a:t>
+            </a:r>
+            <a:r>
+              <a:rPr lang="en-US" dirty="0"/>
+              <a:t>.  Here we have transferred the complexity to a team of experts that we trust (i.e., the </a:t>
+            </a:r>
+            <a:r>
+              <a:rPr lang="en-US" dirty="0" err="1"/>
+              <a:t>spack</a:t>
+            </a:r>
+            <a:r>
+              <a:rPr lang="en-US" dirty="0"/>
+              <a:t> development team as well as platform management team that installs modules for us).  In this sense, the complexity still exists, but at the larger scope of the HPC community rather than at the level of a research team.</a:t>
             </a:r>
           </a:p>
         </p:txBody>
@@ -6299,7 +6477,7 @@
           <a:p>
             <a:r>
               <a:rPr lang="en-US" dirty="0"/>
-              <a:t>High-level road maps with motivation</a:t>
+              <a:t>High-level road maps with motivation and conclusions</a:t>
             </a:r>
           </a:p>
         </p:txBody>
@@ -7019,7 +7197,12 @@
             <p:ph idx="1"/>
           </p:nvPr>
         </p:nvSpPr>
-        <p:spPr/>
+        <p:spPr>
+          <a:xfrm>
+            <a:off x="365760" y="2430386"/>
+            <a:ext cx="4371859" cy="4047778"/>
+          </a:xfrm>
+        </p:spPr>
         <p:txBody>
           <a:bodyPr/>
           <a:lstStyle/>
@@ -7028,148 +7211,33 @@
               <a:buNone/>
             </a:pPr>
             <a:r>
-              <a:rPr lang="en-US" dirty="0"/>
-              <a:t>In life and in labs we learn and repeat short phrases</a:t>
-            </a:r>
-          </a:p>
-          <a:p>
-            <a:r>
-              <a:rPr lang="en-US" b="1" dirty="0"/>
+              <a:rPr lang="en-US" sz="2000" b="1" dirty="0"/>
+              <a:t>General</a:t>
+            </a:r>
+          </a:p>
+          <a:p>
+            <a:r>
+              <a:rPr lang="en-US" sz="1800" dirty="0"/>
               <a:t>The devil’s in the details</a:t>
             </a:r>
           </a:p>
           <a:p>
             <a:r>
-              <a:rPr lang="en-US" b="1" dirty="0"/>
+              <a:rPr lang="en-US" sz="1800" dirty="0"/>
               <a:t>If it’s worth doing, it’s worth doing well</a:t>
             </a:r>
           </a:p>
           <a:p>
             <a:r>
-              <a:rPr lang="en-US" b="1" dirty="0"/>
+              <a:rPr lang="en-US" sz="1800" dirty="0"/>
+              <a:t>Perfect is the enemy of good</a:t>
+            </a:r>
+          </a:p>
+          <a:p>
+            <a:r>
+              <a:rPr lang="en-US" sz="1800" dirty="0"/>
               <a:t>It’s better to be correct, than fast</a:t>
             </a:r>
-          </a:p>
-          <a:p>
-            <a:r>
-              <a:rPr lang="en-US" dirty="0"/>
-              <a:t>Know your tools</a:t>
-            </a:r>
-          </a:p>
-          <a:p>
-            <a:r>
-              <a:rPr lang="en-US" dirty="0"/>
-              <a:t>Use the right tool for the job</a:t>
-            </a:r>
-          </a:p>
-          <a:p>
-            <a:r>
-              <a:rPr lang="en-US" dirty="0"/>
-              <a:t>Measure twice, cut once</a:t>
-            </a:r>
-          </a:p>
-          <a:p>
-            <a:r>
-              <a:rPr lang="en-US" dirty="0"/>
-              <a:t>Clean your workspace</a:t>
-            </a:r>
-          </a:p>
-        </p:txBody>
-      </p:sp>
-    </p:spTree>
-    <p:extLst>
-      <p:ext uri="{BB962C8B-B14F-4D97-AF65-F5344CB8AC3E}">
-        <p14:creationId xmlns:p14="http://schemas.microsoft.com/office/powerpoint/2010/main" val="2459349614"/>
-      </p:ext>
-    </p:extLst>
-  </p:cSld>
-  <p:clrMapOvr>
-    <a:masterClrMapping/>
-  </p:clrMapOvr>
-</p:sld>
-</file>
-
-<file path=ppt/slides/slide5.xml><?xml version="1.0" encoding="utf-8"?>
-<p:sld xmlns:a="http://schemas.openxmlformats.org/drawingml/2006/main" xmlns:r="http://schemas.openxmlformats.org/officeDocument/2006/relationships" xmlns:p="http://schemas.openxmlformats.org/presentationml/2006/main">
-  <p:cSld>
-    <p:spTree>
-      <p:nvGrpSpPr>
-        <p:cNvPr id="1" name=""/>
-        <p:cNvGrpSpPr/>
-        <p:nvPr/>
-      </p:nvGrpSpPr>
-      <p:grpSpPr>
-        <a:xfrm>
-          <a:off x="0" y="0"/>
-          <a:ext cx="0" cy="0"/>
-          <a:chOff x="0" y="0"/>
-          <a:chExt cx="0" cy="0"/>
-        </a:xfrm>
-      </p:grpSpPr>
-      <p:sp>
-        <p:nvSpPr>
-          <p:cNvPr id="2" name="Title 1">
-            <a:extLst>
-              <a:ext uri="{FF2B5EF4-FFF2-40B4-BE49-F238E27FC236}">
-                <a16:creationId xmlns:a16="http://schemas.microsoft.com/office/drawing/2014/main" id="{8D9B72DE-BA02-39B1-83E4-A1429EC50FD2}"/>
-              </a:ext>
-            </a:extLst>
-          </p:cNvPr>
-          <p:cNvSpPr>
-            <a:spLocks noGrp="1"/>
-          </p:cNvSpPr>
-          <p:nvPr>
-            <p:ph type="title"/>
-          </p:nvPr>
-        </p:nvSpPr>
-        <p:spPr/>
-        <p:txBody>
-          <a:bodyPr/>
-          <a:lstStyle/>
-          <a:p>
-            <a:r>
-              <a:rPr lang="en-US" dirty="0"/>
-              <a:t>Know your tools</a:t>
-            </a:r>
-          </a:p>
-        </p:txBody>
-      </p:sp>
-      <p:sp>
-        <p:nvSpPr>
-          <p:cNvPr id="3" name="Content Placeholder 2">
-            <a:extLst>
-              <a:ext uri="{FF2B5EF4-FFF2-40B4-BE49-F238E27FC236}">
-                <a16:creationId xmlns:a16="http://schemas.microsoft.com/office/drawing/2014/main" id="{57F58EF6-4610-3BD1-CB7F-1D05E8C0C4FA}"/>
-              </a:ext>
-            </a:extLst>
-          </p:cNvPr>
-          <p:cNvSpPr>
-            <a:spLocks noGrp="1"/>
-          </p:cNvSpPr>
-          <p:nvPr>
-            <p:ph idx="1"/>
-          </p:nvPr>
-        </p:nvSpPr>
-        <p:spPr>
-          <a:xfrm>
-            <a:off x="365761" y="1737360"/>
-            <a:ext cx="5145578" cy="4047778"/>
-          </a:xfrm>
-        </p:spPr>
-        <p:txBody>
-          <a:bodyPr/>
-          <a:lstStyle/>
-          <a:p>
-            <a:pPr marL="0" indent="0">
-              <a:buNone/>
-            </a:pPr>
-            <a:r>
-              <a:rPr lang="en-US" b="1" dirty="0"/>
-              <a:t>Experimental World</a:t>
-            </a:r>
-          </a:p>
-          <a:p>
-            <a:endParaRPr lang="en-US" dirty="0"/>
           </a:p>
         </p:txBody>
       </p:sp>
@@ -7178,7 +7246,7 @@
           <p:cNvPr id="4" name="Content Placeholder 2">
             <a:extLst>
               <a:ext uri="{FF2B5EF4-FFF2-40B4-BE49-F238E27FC236}">
-                <a16:creationId xmlns:a16="http://schemas.microsoft.com/office/drawing/2014/main" id="{85BCDC36-FA50-8834-5FC1-32611BCE6444}"/>
+                <a16:creationId xmlns:a16="http://schemas.microsoft.com/office/drawing/2014/main" id="{FC9C731C-0606-62AA-90A8-360BB26D75B6}"/>
               </a:ext>
             </a:extLst>
           </p:cNvPr>
@@ -7189,8 +7257,8 @@
         </p:nvSpPr>
         <p:spPr bwMode="auto">
           <a:xfrm>
-            <a:off x="6511623" y="1740130"/>
-            <a:ext cx="5145578" cy="4047778"/>
+            <a:off x="7997107" y="2430386"/>
+            <a:ext cx="3994868" cy="4047778"/>
           </a:xfrm>
           <a:prstGeom prst="rect">
             <a:avLst/>
@@ -7394,255 +7462,79 @@
           </a:lstStyle>
           <a:p>
             <a:pPr marL="0" indent="0">
-              <a:buFont typeface="Arial" charset="0"/>
               <a:buNone/>
             </a:pPr>
             <a:r>
-              <a:rPr lang="en-US" b="1" dirty="0"/>
-              <a:t>Computational World</a:t>
-            </a:r>
-          </a:p>
-          <a:p>
-            <a:r>
-              <a:rPr lang="en-US" dirty="0"/>
-              <a:t>How much should you understand of library building? Is it OK to use </a:t>
-            </a:r>
-            <a:r>
-              <a:rPr lang="en-US" dirty="0" err="1"/>
-              <a:t>Spack</a:t>
-            </a:r>
-            <a:r>
-              <a:rPr lang="en-US" dirty="0"/>
-              <a:t> blindly?</a:t>
-            </a:r>
-          </a:p>
-          <a:p>
-            <a:r>
-              <a:rPr lang="en-US" dirty="0"/>
-              <a:t>For productivity languages, if you have a function with 10 optional variables, you should know what each does and set each one.</a:t>
-            </a:r>
-          </a:p>
-          <a:p>
-            <a:r>
-              <a:rPr lang="en-US" dirty="0"/>
-              <a:t>If you design a library, make sure that users can learn how to use your tool.</a:t>
-            </a:r>
-          </a:p>
-        </p:txBody>
-      </p:sp>
-    </p:spTree>
-    <p:extLst>
-      <p:ext uri="{BB962C8B-B14F-4D97-AF65-F5344CB8AC3E}">
-        <p14:creationId xmlns:p14="http://schemas.microsoft.com/office/powerpoint/2010/main" val="4245765019"/>
-      </p:ext>
-    </p:extLst>
-  </p:cSld>
-  <p:clrMapOvr>
-    <a:masterClrMapping/>
-  </p:clrMapOvr>
-</p:sld>
-</file>
-
-<file path=ppt/slides/slide6.xml><?xml version="1.0" encoding="utf-8"?>
-<p:sld xmlns:a="http://schemas.openxmlformats.org/drawingml/2006/main" xmlns:r="http://schemas.openxmlformats.org/officeDocument/2006/relationships" xmlns:p="http://schemas.openxmlformats.org/presentationml/2006/main">
-  <p:cSld>
-    <p:spTree>
-      <p:nvGrpSpPr>
-        <p:cNvPr id="1" name=""/>
-        <p:cNvGrpSpPr/>
-        <p:nvPr/>
-      </p:nvGrpSpPr>
-      <p:grpSpPr>
-        <a:xfrm>
-          <a:off x="0" y="0"/>
-          <a:ext cx="0" cy="0"/>
-          <a:chOff x="0" y="0"/>
-          <a:chExt cx="0" cy="0"/>
-        </a:xfrm>
-      </p:grpSpPr>
-      <p:sp>
-        <p:nvSpPr>
-          <p:cNvPr id="2" name="Title 1">
+              <a:rPr lang="en-US" sz="2000" b="1" dirty="0"/>
+              <a:t>Software</a:t>
+            </a:r>
+          </a:p>
+          <a:p>
+            <a:r>
+              <a:rPr lang="en-US" sz="1800" dirty="0"/>
+              <a:t>Code is meant to be written once and read many times</a:t>
+            </a:r>
+          </a:p>
+          <a:p>
+            <a:r>
+              <a:rPr lang="en-US" sz="1800" dirty="0"/>
+              <a:t>Premature optimization is the root of all evil – Donald Knuth</a:t>
+            </a:r>
+          </a:p>
+          <a:p>
+            <a:r>
+              <a:rPr lang="en-US" sz="1800" dirty="0"/>
+              <a:t>Beware of code smells</a:t>
+            </a:r>
+          </a:p>
+        </p:txBody>
+      </p:sp>
+      <p:sp>
+        <p:nvSpPr>
+          <p:cNvPr id="6" name="TextBox 5">
             <a:extLst>
               <a:ext uri="{FF2B5EF4-FFF2-40B4-BE49-F238E27FC236}">
-                <a16:creationId xmlns:a16="http://schemas.microsoft.com/office/drawing/2014/main" id="{C87F61D9-BB6B-6B85-F94B-BA9854A82DB6}"/>
+                <a16:creationId xmlns:a16="http://schemas.microsoft.com/office/drawing/2014/main" id="{BC38F905-5A95-A48D-5C18-0AE608BB3FC5}"/>
               </a:ext>
             </a:extLst>
           </p:cNvPr>
-          <p:cNvSpPr>
-            <a:spLocks noGrp="1"/>
-          </p:cNvSpPr>
-          <p:nvPr>
-            <p:ph type="title"/>
-          </p:nvPr>
-        </p:nvSpPr>
-        <p:spPr/>
-        <p:txBody>
-          <a:bodyPr/>
+          <p:cNvSpPr txBox="1"/>
+          <p:nvPr/>
+        </p:nvSpPr>
+        <p:spPr>
+          <a:xfrm>
+            <a:off x="2750436" y="1528434"/>
+            <a:ext cx="7310912" cy="517065"/>
+          </a:xfrm>
+          <a:prstGeom prst="rect">
+            <a:avLst/>
+          </a:prstGeom>
+          <a:noFill/>
+        </p:spPr>
+        <p:txBody>
+          <a:bodyPr wrap="none" lIns="118872" tIns="91440" rIns="118872" bIns="91440" rtlCol="0" anchor="ctr" anchorCtr="0">
+            <a:spAutoFit/>
+          </a:bodyPr>
           <a:lstStyle/>
           <a:p>
-            <a:r>
-              <a:rPr lang="en-US" dirty="0"/>
-              <a:t>Know your tools: Example</a:t>
-            </a:r>
-          </a:p>
-        </p:txBody>
-      </p:sp>
-      <p:sp>
-        <p:nvSpPr>
-          <p:cNvPr id="3" name="Content Placeholder 2">
+            <a:pPr>
+              <a:lnSpc>
+                <a:spcPct val="90000"/>
+              </a:lnSpc>
+            </a:pPr>
+            <a:r>
+              <a:rPr lang="en-US" sz="2400" dirty="0"/>
+              <a:t>In life and in labs we learn and repeat short phrases</a:t>
+            </a:r>
+          </a:p>
+        </p:txBody>
+      </p:sp>
+      <p:sp>
+        <p:nvSpPr>
+          <p:cNvPr id="7" name="Content Placeholder 2">
             <a:extLst>
               <a:ext uri="{FF2B5EF4-FFF2-40B4-BE49-F238E27FC236}">
-                <a16:creationId xmlns:a16="http://schemas.microsoft.com/office/drawing/2014/main" id="{697539F3-699D-1387-5F34-719A763151A1}"/>
-              </a:ext>
-            </a:extLst>
-          </p:cNvPr>
-          <p:cNvSpPr>
-            <a:spLocks noGrp="1"/>
-          </p:cNvSpPr>
-          <p:nvPr>
-            <p:ph idx="1"/>
-          </p:nvPr>
-        </p:nvSpPr>
-        <p:spPr/>
-        <p:txBody>
-          <a:bodyPr/>
-          <a:lstStyle/>
-          <a:p>
-            <a:r>
-              <a:rPr lang="en-US" dirty="0"/>
-              <a:t>Add in LDD output for the same module list but using python and anaconda.</a:t>
-            </a:r>
-          </a:p>
-          <a:p>
-            <a:r>
-              <a:rPr lang="en-US" dirty="0"/>
-              <a:t>Point out that the dependencies change</a:t>
-            </a:r>
-          </a:p>
-        </p:txBody>
-      </p:sp>
-    </p:spTree>
-    <p:extLst>
-      <p:ext uri="{BB962C8B-B14F-4D97-AF65-F5344CB8AC3E}">
-        <p14:creationId xmlns:p14="http://schemas.microsoft.com/office/powerpoint/2010/main" val="2503386237"/>
-      </p:ext>
-    </p:extLst>
-  </p:cSld>
-  <p:clrMapOvr>
-    <a:masterClrMapping/>
-  </p:clrMapOvr>
-</p:sld>
-</file>
-
-<file path=ppt/slides/slide7.xml><?xml version="1.0" encoding="utf-8"?>
-<p:sld xmlns:a="http://schemas.openxmlformats.org/drawingml/2006/main" xmlns:r="http://schemas.openxmlformats.org/officeDocument/2006/relationships" xmlns:p="http://schemas.openxmlformats.org/presentationml/2006/main">
-  <p:cSld>
-    <p:spTree>
-      <p:nvGrpSpPr>
-        <p:cNvPr id="1" name=""/>
-        <p:cNvGrpSpPr/>
-        <p:nvPr/>
-      </p:nvGrpSpPr>
-      <p:grpSpPr>
-        <a:xfrm>
-          <a:off x="0" y="0"/>
-          <a:ext cx="0" cy="0"/>
-          <a:chOff x="0" y="0"/>
-          <a:chExt cx="0" cy="0"/>
-        </a:xfrm>
-      </p:grpSpPr>
-      <p:sp>
-        <p:nvSpPr>
-          <p:cNvPr id="2" name="Title 1">
-            <a:extLst>
-              <a:ext uri="{FF2B5EF4-FFF2-40B4-BE49-F238E27FC236}">
-                <a16:creationId xmlns:a16="http://schemas.microsoft.com/office/drawing/2014/main" id="{8ABAE06C-9F3C-9217-C7B3-9FA0C260FA01}"/>
-              </a:ext>
-            </a:extLst>
-          </p:cNvPr>
-          <p:cNvSpPr>
-            <a:spLocks noGrp="1"/>
-          </p:cNvSpPr>
-          <p:nvPr>
-            <p:ph type="title"/>
-          </p:nvPr>
-        </p:nvSpPr>
-        <p:spPr/>
-        <p:txBody>
-          <a:bodyPr/>
-          <a:lstStyle/>
-          <a:p>
-            <a:r>
-              <a:rPr lang="en-US" dirty="0"/>
-              <a:t>Measure twice, cut once</a:t>
-            </a:r>
-          </a:p>
-        </p:txBody>
-      </p:sp>
-      <p:sp>
-        <p:nvSpPr>
-          <p:cNvPr id="4" name="Content Placeholder 2">
-            <a:extLst>
-              <a:ext uri="{FF2B5EF4-FFF2-40B4-BE49-F238E27FC236}">
-                <a16:creationId xmlns:a16="http://schemas.microsoft.com/office/drawing/2014/main" id="{2C6FC67E-CCBA-DE3F-AD5C-7D0D88344E66}"/>
-              </a:ext>
-            </a:extLst>
-          </p:cNvPr>
-          <p:cNvSpPr>
-            <a:spLocks noGrp="1"/>
-          </p:cNvSpPr>
-          <p:nvPr>
-            <p:ph idx="1"/>
-          </p:nvPr>
-        </p:nvSpPr>
-        <p:spPr>
-          <a:xfrm>
-            <a:off x="365761" y="1737360"/>
-            <a:ext cx="5145578" cy="4047778"/>
-          </a:xfrm>
-        </p:spPr>
-        <p:txBody>
-          <a:bodyPr/>
-          <a:lstStyle/>
-          <a:p>
-            <a:pPr marL="0" indent="0">
-              <a:buNone/>
-            </a:pPr>
-            <a:r>
-              <a:rPr lang="en-US" b="1" dirty="0"/>
-              <a:t>Experimental World</a:t>
-            </a:r>
-          </a:p>
-          <a:p>
-            <a:r>
-              <a:rPr lang="en-US" dirty="0"/>
-              <a:t>Some actions are not reversible</a:t>
-            </a:r>
-          </a:p>
-          <a:p>
-            <a:r>
-              <a:rPr lang="en-US" dirty="0"/>
-              <a:t>Don’t waste materials</a:t>
-            </a:r>
-          </a:p>
-          <a:p>
-            <a:r>
-              <a:rPr lang="en-US" dirty="0"/>
-              <a:t>Don’t waste time &amp; effort</a:t>
-            </a:r>
-          </a:p>
-          <a:p>
-            <a:endParaRPr lang="en-US" dirty="0"/>
-          </a:p>
-        </p:txBody>
-      </p:sp>
-      <p:sp>
-        <p:nvSpPr>
-          <p:cNvPr id="5" name="Content Placeholder 2">
-            <a:extLst>
-              <a:ext uri="{FF2B5EF4-FFF2-40B4-BE49-F238E27FC236}">
-                <a16:creationId xmlns:a16="http://schemas.microsoft.com/office/drawing/2014/main" id="{5D4B9335-3FCA-6503-DD7C-20B134A081E5}"/>
+                <a16:creationId xmlns:a16="http://schemas.microsoft.com/office/drawing/2014/main" id="{F9EFB727-D2D8-C6AE-756D-2A3FF6BEF817}"/>
               </a:ext>
             </a:extLst>
           </p:cNvPr>
@@ -7653,8 +7545,8 @@
         </p:nvSpPr>
         <p:spPr bwMode="auto">
           <a:xfrm>
-            <a:off x="6511623" y="1740130"/>
-            <a:ext cx="5145578" cy="4047778"/>
+            <a:off x="4776148" y="2430386"/>
+            <a:ext cx="3259488" cy="4047778"/>
           </a:xfrm>
           <a:prstGeom prst="rect">
             <a:avLst/>
@@ -7862,44 +7754,32 @@
               <a:buNone/>
             </a:pPr>
             <a:r>
-              <a:rPr lang="en-US" b="1" dirty="0"/>
-              <a:t>Computational World</a:t>
-            </a:r>
-          </a:p>
-          <a:p>
-            <a:r>
-              <a:rPr lang="en-US" dirty="0"/>
-              <a:t>Do appropriate level of planning</a:t>
-            </a:r>
-          </a:p>
-          <a:p>
-            <a:r>
-              <a:rPr lang="en-US" dirty="0"/>
-              <a:t>Don’t waste energy</a:t>
-            </a:r>
-          </a:p>
-          <a:p>
-            <a:r>
-              <a:rPr lang="en-US" dirty="0"/>
-              <a:t>Don’t waste core hours</a:t>
-            </a:r>
-          </a:p>
-          <a:p>
-            <a:r>
-              <a:rPr lang="en-US" dirty="0"/>
-              <a:t>Don’t produce bad data</a:t>
-            </a:r>
-          </a:p>
-          <a:p>
-            <a:r>
-              <a:rPr lang="en-US" dirty="0"/>
-              <a:t>Long-term efficiency</a:t>
-            </a:r>
-          </a:p>
-          <a:p>
-            <a:r>
-              <a:rPr lang="en-US" dirty="0"/>
-              <a:t>Maximize scientific impact</a:t>
+              <a:rPr lang="en-US" sz="2000" b="1" dirty="0"/>
+              <a:t>Experimental</a:t>
+            </a:r>
+          </a:p>
+          <a:p>
+            <a:r>
+              <a:rPr lang="en-US" sz="1800" dirty="0"/>
+              <a:t>Know your tools</a:t>
+            </a:r>
+          </a:p>
+          <a:p>
+            <a:r>
+              <a:rPr lang="en-US" sz="1800" dirty="0"/>
+              <a:t>Use the right tool for the job</a:t>
+            </a:r>
+          </a:p>
+          <a:p>
+            <a:r>
+              <a:rPr lang="en-US" sz="1800" dirty="0"/>
+              <a:t>Measure twice, cut once</a:t>
+            </a:r>
+          </a:p>
+          <a:p>
+            <a:r>
+              <a:rPr lang="en-US" sz="1800" dirty="0"/>
+              <a:t>Clean your workspace</a:t>
             </a:r>
           </a:p>
         </p:txBody>
@@ -7907,7 +7787,7 @@
     </p:spTree>
     <p:extLst>
       <p:ext uri="{BB962C8B-B14F-4D97-AF65-F5344CB8AC3E}">
-        <p14:creationId xmlns:p14="http://schemas.microsoft.com/office/powerpoint/2010/main" val="553021276"/>
+        <p14:creationId xmlns:p14="http://schemas.microsoft.com/office/powerpoint/2010/main" val="2459349614"/>
       </p:ext>
     </p:extLst>
   </p:cSld>
@@ -7917,7 +7797,7 @@
 </p:sld>
 </file>
 
-<file path=ppt/slides/slide8.xml><?xml version="1.0" encoding="utf-8"?>
+<file path=ppt/slides/slide5.xml><?xml version="1.0" encoding="utf-8"?>
 <p:sld xmlns:a="http://schemas.openxmlformats.org/drawingml/2006/main" xmlns:r="http://schemas.openxmlformats.org/officeDocument/2006/relationships" xmlns:p="http://schemas.openxmlformats.org/presentationml/2006/main">
   <p:cSld>
     <p:spTree>
@@ -7939,7 +7819,7 @@
           <p:cNvPr id="2" name="Title 1">
             <a:extLst>
               <a:ext uri="{FF2B5EF4-FFF2-40B4-BE49-F238E27FC236}">
-                <a16:creationId xmlns:a16="http://schemas.microsoft.com/office/drawing/2014/main" id="{8BA09715-D2C2-73F0-C930-3D45C44AF700}"/>
+                <a16:creationId xmlns:a16="http://schemas.microsoft.com/office/drawing/2014/main" id="{8D9B72DE-BA02-39B1-83E4-A1429EC50FD2}"/>
               </a:ext>
             </a:extLst>
           </p:cNvPr>
@@ -7957,17 +7837,17 @@
           <a:p>
             <a:r>
               <a:rPr lang="en-US" dirty="0"/>
-              <a:t>Clean your workspace</a:t>
-            </a:r>
-          </a:p>
-        </p:txBody>
-      </p:sp>
-      <p:sp>
-        <p:nvSpPr>
-          <p:cNvPr id="4" name="Content Placeholder 2">
+              <a:t>Know your tools</a:t>
+            </a:r>
+          </a:p>
+        </p:txBody>
+      </p:sp>
+      <p:sp>
+        <p:nvSpPr>
+          <p:cNvPr id="3" name="Content Placeholder 2">
             <a:extLst>
               <a:ext uri="{FF2B5EF4-FFF2-40B4-BE49-F238E27FC236}">
-                <a16:creationId xmlns:a16="http://schemas.microsoft.com/office/drawing/2014/main" id="{64B59F6F-CFBD-AA50-42A5-DE34EBEFDF7E}"/>
+                <a16:creationId xmlns:a16="http://schemas.microsoft.com/office/drawing/2014/main" id="{57F58EF6-4610-3BD1-CB7F-1D05E8C0C4FA}"/>
               </a:ext>
             </a:extLst>
           </p:cNvPr>
@@ -8003,10 +7883,10 @@
       </p:sp>
       <p:sp>
         <p:nvSpPr>
-          <p:cNvPr id="5" name="Content Placeholder 2">
+          <p:cNvPr id="4" name="Content Placeholder 2">
             <a:extLst>
               <a:ext uri="{FF2B5EF4-FFF2-40B4-BE49-F238E27FC236}">
-                <a16:creationId xmlns:a16="http://schemas.microsoft.com/office/drawing/2014/main" id="{1DE2A193-506E-1F4E-20F3-06F187CF7FE6}"/>
+                <a16:creationId xmlns:a16="http://schemas.microsoft.com/office/drawing/2014/main" id="{85BCDC36-FA50-8834-5FC1-32611BCE6444}"/>
               </a:ext>
             </a:extLst>
           </p:cNvPr>
@@ -8233,6 +8113,834 @@
           <a:p>
             <a:r>
               <a:rPr lang="en-US" dirty="0"/>
+              <a:t>How much should you understand of library building? Is it OK to use </a:t>
+            </a:r>
+            <a:r>
+              <a:rPr lang="en-US" dirty="0" err="1"/>
+              <a:t>Spack</a:t>
+            </a:r>
+            <a:r>
+              <a:rPr lang="en-US" dirty="0"/>
+              <a:t> blindly?</a:t>
+            </a:r>
+          </a:p>
+          <a:p>
+            <a:r>
+              <a:rPr lang="en-US" dirty="0"/>
+              <a:t>For productivity languages, if you have a function with 10 optional variables, you should know what each does and set each one.</a:t>
+            </a:r>
+          </a:p>
+          <a:p>
+            <a:r>
+              <a:rPr lang="en-US" dirty="0"/>
+              <a:t>If you design a library, make sure that users can learn how to use your tool.</a:t>
+            </a:r>
+          </a:p>
+        </p:txBody>
+      </p:sp>
+    </p:spTree>
+    <p:extLst>
+      <p:ext uri="{BB962C8B-B14F-4D97-AF65-F5344CB8AC3E}">
+        <p14:creationId xmlns:p14="http://schemas.microsoft.com/office/powerpoint/2010/main" val="4245765019"/>
+      </p:ext>
+    </p:extLst>
+  </p:cSld>
+  <p:clrMapOvr>
+    <a:masterClrMapping/>
+  </p:clrMapOvr>
+</p:sld>
+</file>
+
+<file path=ppt/slides/slide6.xml><?xml version="1.0" encoding="utf-8"?>
+<p:sld xmlns:a="http://schemas.openxmlformats.org/drawingml/2006/main" xmlns:r="http://schemas.openxmlformats.org/officeDocument/2006/relationships" xmlns:p="http://schemas.openxmlformats.org/presentationml/2006/main">
+  <p:cSld>
+    <p:spTree>
+      <p:nvGrpSpPr>
+        <p:cNvPr id="1" name=""/>
+        <p:cNvGrpSpPr/>
+        <p:nvPr/>
+      </p:nvGrpSpPr>
+      <p:grpSpPr>
+        <a:xfrm>
+          <a:off x="0" y="0"/>
+          <a:ext cx="0" cy="0"/>
+          <a:chOff x="0" y="0"/>
+          <a:chExt cx="0" cy="0"/>
+        </a:xfrm>
+      </p:grpSpPr>
+      <p:sp>
+        <p:nvSpPr>
+          <p:cNvPr id="2" name="Title 1">
+            <a:extLst>
+              <a:ext uri="{FF2B5EF4-FFF2-40B4-BE49-F238E27FC236}">
+                <a16:creationId xmlns:a16="http://schemas.microsoft.com/office/drawing/2014/main" id="{C87F61D9-BB6B-6B85-F94B-BA9854A82DB6}"/>
+              </a:ext>
+            </a:extLst>
+          </p:cNvPr>
+          <p:cNvSpPr>
+            <a:spLocks noGrp="1"/>
+          </p:cNvSpPr>
+          <p:nvPr>
+            <p:ph type="title"/>
+          </p:nvPr>
+        </p:nvSpPr>
+        <p:spPr/>
+        <p:txBody>
+          <a:bodyPr/>
+          <a:lstStyle/>
+          <a:p>
+            <a:r>
+              <a:rPr lang="en-US" dirty="0"/>
+              <a:t>Know your tools: Example</a:t>
+            </a:r>
+          </a:p>
+        </p:txBody>
+      </p:sp>
+      <p:sp>
+        <p:nvSpPr>
+          <p:cNvPr id="3" name="Content Placeholder 2">
+            <a:extLst>
+              <a:ext uri="{FF2B5EF4-FFF2-40B4-BE49-F238E27FC236}">
+                <a16:creationId xmlns:a16="http://schemas.microsoft.com/office/drawing/2014/main" id="{697539F3-699D-1387-5F34-719A763151A1}"/>
+              </a:ext>
+            </a:extLst>
+          </p:cNvPr>
+          <p:cNvSpPr>
+            <a:spLocks noGrp="1"/>
+          </p:cNvSpPr>
+          <p:nvPr>
+            <p:ph idx="1"/>
+          </p:nvPr>
+        </p:nvSpPr>
+        <p:spPr/>
+        <p:txBody>
+          <a:bodyPr/>
+          <a:lstStyle/>
+          <a:p>
+            <a:r>
+              <a:rPr lang="en-US" dirty="0"/>
+              <a:t>Add in LDD output for the same module list but using python and anaconda.</a:t>
+            </a:r>
+          </a:p>
+          <a:p>
+            <a:r>
+              <a:rPr lang="en-US" dirty="0"/>
+              <a:t>Point out that the dependencies change</a:t>
+            </a:r>
+          </a:p>
+        </p:txBody>
+      </p:sp>
+    </p:spTree>
+    <p:extLst>
+      <p:ext uri="{BB962C8B-B14F-4D97-AF65-F5344CB8AC3E}">
+        <p14:creationId xmlns:p14="http://schemas.microsoft.com/office/powerpoint/2010/main" val="2503386237"/>
+      </p:ext>
+    </p:extLst>
+  </p:cSld>
+  <p:clrMapOvr>
+    <a:masterClrMapping/>
+  </p:clrMapOvr>
+</p:sld>
+</file>
+
+<file path=ppt/slides/slide7.xml><?xml version="1.0" encoding="utf-8"?>
+<p:sld xmlns:a="http://schemas.openxmlformats.org/drawingml/2006/main" xmlns:r="http://schemas.openxmlformats.org/officeDocument/2006/relationships" xmlns:p="http://schemas.openxmlformats.org/presentationml/2006/main">
+  <p:cSld>
+    <p:spTree>
+      <p:nvGrpSpPr>
+        <p:cNvPr id="1" name=""/>
+        <p:cNvGrpSpPr/>
+        <p:nvPr/>
+      </p:nvGrpSpPr>
+      <p:grpSpPr>
+        <a:xfrm>
+          <a:off x="0" y="0"/>
+          <a:ext cx="0" cy="0"/>
+          <a:chOff x="0" y="0"/>
+          <a:chExt cx="0" cy="0"/>
+        </a:xfrm>
+      </p:grpSpPr>
+      <p:sp>
+        <p:nvSpPr>
+          <p:cNvPr id="2" name="Title 1">
+            <a:extLst>
+              <a:ext uri="{FF2B5EF4-FFF2-40B4-BE49-F238E27FC236}">
+                <a16:creationId xmlns:a16="http://schemas.microsoft.com/office/drawing/2014/main" id="{8ABAE06C-9F3C-9217-C7B3-9FA0C260FA01}"/>
+              </a:ext>
+            </a:extLst>
+          </p:cNvPr>
+          <p:cNvSpPr>
+            <a:spLocks noGrp="1"/>
+          </p:cNvSpPr>
+          <p:nvPr>
+            <p:ph type="title"/>
+          </p:nvPr>
+        </p:nvSpPr>
+        <p:spPr/>
+        <p:txBody>
+          <a:bodyPr/>
+          <a:lstStyle/>
+          <a:p>
+            <a:r>
+              <a:rPr lang="en-US" dirty="0"/>
+              <a:t>Measure twice, cut once</a:t>
+            </a:r>
+          </a:p>
+        </p:txBody>
+      </p:sp>
+      <p:sp>
+        <p:nvSpPr>
+          <p:cNvPr id="4" name="Content Placeholder 2">
+            <a:extLst>
+              <a:ext uri="{FF2B5EF4-FFF2-40B4-BE49-F238E27FC236}">
+                <a16:creationId xmlns:a16="http://schemas.microsoft.com/office/drawing/2014/main" id="{2C6FC67E-CCBA-DE3F-AD5C-7D0D88344E66}"/>
+              </a:ext>
+            </a:extLst>
+          </p:cNvPr>
+          <p:cNvSpPr>
+            <a:spLocks noGrp="1"/>
+          </p:cNvSpPr>
+          <p:nvPr>
+            <p:ph idx="1"/>
+          </p:nvPr>
+        </p:nvSpPr>
+        <p:spPr>
+          <a:xfrm>
+            <a:off x="365761" y="1737360"/>
+            <a:ext cx="5145578" cy="4047778"/>
+          </a:xfrm>
+        </p:spPr>
+        <p:txBody>
+          <a:bodyPr/>
+          <a:lstStyle/>
+          <a:p>
+            <a:pPr marL="0" indent="0">
+              <a:buNone/>
+            </a:pPr>
+            <a:r>
+              <a:rPr lang="en-US" b="1" dirty="0"/>
+              <a:t>Experimental World</a:t>
+            </a:r>
+          </a:p>
+          <a:p>
+            <a:r>
+              <a:rPr lang="en-US" dirty="0"/>
+              <a:t>Some actions are not reversible</a:t>
+            </a:r>
+          </a:p>
+          <a:p>
+            <a:r>
+              <a:rPr lang="en-US" dirty="0"/>
+              <a:t>Don’t waste materials</a:t>
+            </a:r>
+          </a:p>
+          <a:p>
+            <a:r>
+              <a:rPr lang="en-US" dirty="0"/>
+              <a:t>Don’t waste time &amp; effort</a:t>
+            </a:r>
+          </a:p>
+          <a:p>
+            <a:endParaRPr lang="en-US" dirty="0"/>
+          </a:p>
+        </p:txBody>
+      </p:sp>
+      <p:sp>
+        <p:nvSpPr>
+          <p:cNvPr id="5" name="Content Placeholder 2">
+            <a:extLst>
+              <a:ext uri="{FF2B5EF4-FFF2-40B4-BE49-F238E27FC236}">
+                <a16:creationId xmlns:a16="http://schemas.microsoft.com/office/drawing/2014/main" id="{5D4B9335-3FCA-6503-DD7C-20B134A081E5}"/>
+              </a:ext>
+            </a:extLst>
+          </p:cNvPr>
+          <p:cNvSpPr txBox="1">
+            <a:spLocks/>
+          </p:cNvSpPr>
+          <p:nvPr/>
+        </p:nvSpPr>
+        <p:spPr bwMode="auto">
+          <a:xfrm>
+            <a:off x="6511623" y="1740130"/>
+            <a:ext cx="5145578" cy="4047778"/>
+          </a:xfrm>
+          <a:prstGeom prst="rect">
+            <a:avLst/>
+          </a:prstGeom>
+          <a:noFill/>
+          <a:ln w="9525">
+            <a:noFill/>
+            <a:miter lim="800000"/>
+            <a:headEnd/>
+            <a:tailEnd/>
+          </a:ln>
+        </p:spPr>
+        <p:txBody>
+          <a:bodyPr vert="horz" wrap="square" lIns="91440" tIns="45720" rIns="91440" bIns="45720" numCol="1" anchor="t" anchorCtr="0" compatLnSpc="1">
+            <a:prstTxWarp prst="textNoShape">
+              <a:avLst/>
+            </a:prstTxWarp>
+            <a:noAutofit/>
+          </a:bodyPr>
+          <a:lstStyle>
+            <a:lvl1pPr marL="230188" indent="-230188" algn="l" rtl="0" eaLnBrk="1" fontAlgn="base" hangingPunct="1">
+              <a:lnSpc>
+                <a:spcPct val="90000"/>
+              </a:lnSpc>
+              <a:spcBef>
+                <a:spcPts val="1400"/>
+              </a:spcBef>
+              <a:spcAft>
+                <a:spcPct val="0"/>
+              </a:spcAft>
+              <a:buClr>
+                <a:schemeClr val="tx1"/>
+              </a:buClr>
+              <a:buFont typeface="Arial" charset="0"/>
+              <a:buChar char="•"/>
+              <a:defRPr sz="2400" kern="1200">
+                <a:solidFill>
+                  <a:schemeClr val="tx1"/>
+                </a:solidFill>
+                <a:latin typeface="Arial" panose="020B0604020202020204" pitchFamily="34" charset="0"/>
+                <a:ea typeface="+mn-ea"/>
+                <a:cs typeface="Arial" panose="020B0604020202020204" pitchFamily="34" charset="0"/>
+              </a:defRPr>
+            </a:lvl1pPr>
+            <a:lvl2pPr marL="625475" indent="-279400" algn="l" rtl="0" eaLnBrk="1" fontAlgn="base" hangingPunct="1">
+              <a:lnSpc>
+                <a:spcPct val="90000"/>
+              </a:lnSpc>
+              <a:spcBef>
+                <a:spcPts val="800"/>
+              </a:spcBef>
+              <a:spcAft>
+                <a:spcPct val="0"/>
+              </a:spcAft>
+              <a:buClr>
+                <a:schemeClr val="tx1"/>
+              </a:buClr>
+              <a:buFont typeface="Arial" charset="0"/>
+              <a:buChar char="–"/>
+              <a:defRPr sz="2000" kern="1200">
+                <a:solidFill>
+                  <a:schemeClr val="tx1"/>
+                </a:solidFill>
+                <a:latin typeface="Arial" panose="020B0604020202020204" pitchFamily="34" charset="0"/>
+                <a:ea typeface="+mn-ea"/>
+                <a:cs typeface="Arial" panose="020B0604020202020204" pitchFamily="34" charset="0"/>
+              </a:defRPr>
+            </a:lvl2pPr>
+            <a:lvl3pPr marL="914400" indent="-230188" algn="l" rtl="0" eaLnBrk="1" fontAlgn="base" hangingPunct="1">
+              <a:lnSpc>
+                <a:spcPct val="90000"/>
+              </a:lnSpc>
+              <a:spcBef>
+                <a:spcPts val="800"/>
+              </a:spcBef>
+              <a:spcAft>
+                <a:spcPct val="0"/>
+              </a:spcAft>
+              <a:buClr>
+                <a:schemeClr val="tx1"/>
+              </a:buClr>
+              <a:buFont typeface="Arial" charset="0"/>
+              <a:buChar char="•"/>
+              <a:defRPr sz="1800" kern="1200">
+                <a:solidFill>
+                  <a:schemeClr val="tx1"/>
+                </a:solidFill>
+                <a:latin typeface="Arial" panose="020B0604020202020204" pitchFamily="34" charset="0"/>
+                <a:ea typeface="+mn-ea"/>
+                <a:cs typeface="Arial" panose="020B0604020202020204" pitchFamily="34" charset="0"/>
+              </a:defRPr>
+            </a:lvl3pPr>
+            <a:lvl4pPr marL="1144588" indent="-173038" algn="l" rtl="0" eaLnBrk="1" fontAlgn="base" hangingPunct="1">
+              <a:lnSpc>
+                <a:spcPct val="90000"/>
+              </a:lnSpc>
+              <a:spcBef>
+                <a:spcPts val="800"/>
+              </a:spcBef>
+              <a:spcAft>
+                <a:spcPct val="0"/>
+              </a:spcAft>
+              <a:buClr>
+                <a:schemeClr val="tx1"/>
+              </a:buClr>
+              <a:buFont typeface="Arial" charset="0"/>
+              <a:buChar char="–"/>
+              <a:defRPr sz="1600" kern="1200">
+                <a:solidFill>
+                  <a:schemeClr val="tx1"/>
+                </a:solidFill>
+                <a:latin typeface="Arial" panose="020B0604020202020204" pitchFamily="34" charset="0"/>
+                <a:ea typeface="+mn-ea"/>
+                <a:cs typeface="Arial" panose="020B0604020202020204" pitchFamily="34" charset="0"/>
+              </a:defRPr>
+            </a:lvl4pPr>
+            <a:lvl5pPr marL="1482725" indent="-222250" algn="l" rtl="0" eaLnBrk="1" fontAlgn="base" hangingPunct="1">
+              <a:lnSpc>
+                <a:spcPct val="90000"/>
+              </a:lnSpc>
+              <a:spcBef>
+                <a:spcPts val="600"/>
+              </a:spcBef>
+              <a:spcAft>
+                <a:spcPct val="0"/>
+              </a:spcAft>
+              <a:buClr>
+                <a:schemeClr val="tx1"/>
+              </a:buClr>
+              <a:buFont typeface="Arial" panose="020B0604020202020204" pitchFamily="34" charset="0"/>
+              <a:buChar char="•"/>
+              <a:defRPr sz="1600" kern="1200">
+                <a:solidFill>
+                  <a:schemeClr val="tx1"/>
+                </a:solidFill>
+                <a:latin typeface="Arial" panose="020B0604020202020204" pitchFamily="34" charset="0"/>
+                <a:ea typeface="+mn-ea"/>
+                <a:cs typeface="Arial" panose="020B0604020202020204" pitchFamily="34" charset="0"/>
+              </a:defRPr>
+            </a:lvl5pPr>
+            <a:lvl6pPr marL="2514600" indent="-228600" algn="l" defTabSz="914400" rtl="0" eaLnBrk="1" latinLnBrk="0" hangingPunct="1">
+              <a:spcBef>
+                <a:spcPct val="20000"/>
+              </a:spcBef>
+              <a:buFont typeface="Arial" pitchFamily="34" charset="0"/>
+              <a:buChar char="•"/>
+              <a:defRPr sz="2000" kern="1200">
+                <a:solidFill>
+                  <a:schemeClr val="tx1"/>
+                </a:solidFill>
+                <a:latin typeface="+mn-lt"/>
+                <a:ea typeface="+mn-ea"/>
+                <a:cs typeface="+mn-cs"/>
+              </a:defRPr>
+            </a:lvl6pPr>
+            <a:lvl7pPr marL="2971800" indent="-228600" algn="l" defTabSz="914400" rtl="0" eaLnBrk="1" latinLnBrk="0" hangingPunct="1">
+              <a:spcBef>
+                <a:spcPct val="20000"/>
+              </a:spcBef>
+              <a:buFont typeface="Arial" pitchFamily="34" charset="0"/>
+              <a:buChar char="•"/>
+              <a:defRPr sz="2000" kern="1200">
+                <a:solidFill>
+                  <a:schemeClr val="tx1"/>
+                </a:solidFill>
+                <a:latin typeface="+mn-lt"/>
+                <a:ea typeface="+mn-ea"/>
+                <a:cs typeface="+mn-cs"/>
+              </a:defRPr>
+            </a:lvl7pPr>
+            <a:lvl8pPr marL="3429000" indent="-228600" algn="l" defTabSz="914400" rtl="0" eaLnBrk="1" latinLnBrk="0" hangingPunct="1">
+              <a:spcBef>
+                <a:spcPct val="20000"/>
+              </a:spcBef>
+              <a:buFont typeface="Arial" pitchFamily="34" charset="0"/>
+              <a:buChar char="•"/>
+              <a:defRPr sz="2000" kern="1200">
+                <a:solidFill>
+                  <a:schemeClr val="tx1"/>
+                </a:solidFill>
+                <a:latin typeface="+mn-lt"/>
+                <a:ea typeface="+mn-ea"/>
+                <a:cs typeface="+mn-cs"/>
+              </a:defRPr>
+            </a:lvl8pPr>
+            <a:lvl9pPr marL="3886200" indent="-228600" algn="l" defTabSz="914400" rtl="0" eaLnBrk="1" latinLnBrk="0" hangingPunct="1">
+              <a:spcBef>
+                <a:spcPct val="20000"/>
+              </a:spcBef>
+              <a:buFont typeface="Arial" pitchFamily="34" charset="0"/>
+              <a:buChar char="•"/>
+              <a:defRPr sz="2000" kern="1200">
+                <a:solidFill>
+                  <a:schemeClr val="tx1"/>
+                </a:solidFill>
+                <a:latin typeface="+mn-lt"/>
+                <a:ea typeface="+mn-ea"/>
+                <a:cs typeface="+mn-cs"/>
+              </a:defRPr>
+            </a:lvl9pPr>
+          </a:lstStyle>
+          <a:p>
+            <a:pPr marL="0" indent="0">
+              <a:buFont typeface="Arial" charset="0"/>
+              <a:buNone/>
+            </a:pPr>
+            <a:r>
+              <a:rPr lang="en-US" b="1" dirty="0"/>
+              <a:t>Computational World</a:t>
+            </a:r>
+          </a:p>
+          <a:p>
+            <a:r>
+              <a:rPr lang="en-US" dirty="0"/>
+              <a:t>Do appropriate level of planning</a:t>
+            </a:r>
+          </a:p>
+          <a:p>
+            <a:r>
+              <a:rPr lang="en-US" dirty="0"/>
+              <a:t>Don’t waste energy</a:t>
+            </a:r>
+          </a:p>
+          <a:p>
+            <a:r>
+              <a:rPr lang="en-US" dirty="0"/>
+              <a:t>Don’t waste core hours</a:t>
+            </a:r>
+          </a:p>
+          <a:p>
+            <a:r>
+              <a:rPr lang="en-US" dirty="0"/>
+              <a:t>Don’t produce bad data</a:t>
+            </a:r>
+          </a:p>
+          <a:p>
+            <a:r>
+              <a:rPr lang="en-US" dirty="0"/>
+              <a:t>Long-term efficiency</a:t>
+            </a:r>
+          </a:p>
+          <a:p>
+            <a:r>
+              <a:rPr lang="en-US" dirty="0"/>
+              <a:t>Maximize scientific impact</a:t>
+            </a:r>
+          </a:p>
+        </p:txBody>
+      </p:sp>
+    </p:spTree>
+    <p:extLst>
+      <p:ext uri="{BB962C8B-B14F-4D97-AF65-F5344CB8AC3E}">
+        <p14:creationId xmlns:p14="http://schemas.microsoft.com/office/powerpoint/2010/main" val="553021276"/>
+      </p:ext>
+    </p:extLst>
+  </p:cSld>
+  <p:clrMapOvr>
+    <a:masterClrMapping/>
+  </p:clrMapOvr>
+</p:sld>
+</file>
+
+<file path=ppt/slides/slide8.xml><?xml version="1.0" encoding="utf-8"?>
+<p:sld xmlns:a="http://schemas.openxmlformats.org/drawingml/2006/main" xmlns:r="http://schemas.openxmlformats.org/officeDocument/2006/relationships" xmlns:p="http://schemas.openxmlformats.org/presentationml/2006/main">
+  <p:cSld>
+    <p:spTree>
+      <p:nvGrpSpPr>
+        <p:cNvPr id="1" name=""/>
+        <p:cNvGrpSpPr/>
+        <p:nvPr/>
+      </p:nvGrpSpPr>
+      <p:grpSpPr>
+        <a:xfrm>
+          <a:off x="0" y="0"/>
+          <a:ext cx="0" cy="0"/>
+          <a:chOff x="0" y="0"/>
+          <a:chExt cx="0" cy="0"/>
+        </a:xfrm>
+      </p:grpSpPr>
+      <p:sp>
+        <p:nvSpPr>
+          <p:cNvPr id="2" name="Title 1">
+            <a:extLst>
+              <a:ext uri="{FF2B5EF4-FFF2-40B4-BE49-F238E27FC236}">
+                <a16:creationId xmlns:a16="http://schemas.microsoft.com/office/drawing/2014/main" id="{8BA09715-D2C2-73F0-C930-3D45C44AF700}"/>
+              </a:ext>
+            </a:extLst>
+          </p:cNvPr>
+          <p:cNvSpPr>
+            <a:spLocks noGrp="1"/>
+          </p:cNvSpPr>
+          <p:nvPr>
+            <p:ph type="title"/>
+          </p:nvPr>
+        </p:nvSpPr>
+        <p:spPr/>
+        <p:txBody>
+          <a:bodyPr/>
+          <a:lstStyle/>
+          <a:p>
+            <a:r>
+              <a:rPr lang="en-US" dirty="0"/>
+              <a:t>Clean your workspace</a:t>
+            </a:r>
+          </a:p>
+        </p:txBody>
+      </p:sp>
+      <p:sp>
+        <p:nvSpPr>
+          <p:cNvPr id="4" name="Content Placeholder 2">
+            <a:extLst>
+              <a:ext uri="{FF2B5EF4-FFF2-40B4-BE49-F238E27FC236}">
+                <a16:creationId xmlns:a16="http://schemas.microsoft.com/office/drawing/2014/main" id="{64B59F6F-CFBD-AA50-42A5-DE34EBEFDF7E}"/>
+              </a:ext>
+            </a:extLst>
+          </p:cNvPr>
+          <p:cNvSpPr>
+            <a:spLocks noGrp="1"/>
+          </p:cNvSpPr>
+          <p:nvPr>
+            <p:ph idx="1"/>
+          </p:nvPr>
+        </p:nvSpPr>
+        <p:spPr>
+          <a:xfrm>
+            <a:off x="365761" y="1737360"/>
+            <a:ext cx="5145578" cy="4047778"/>
+          </a:xfrm>
+        </p:spPr>
+        <p:txBody>
+          <a:bodyPr/>
+          <a:lstStyle/>
+          <a:p>
+            <a:pPr marL="0" indent="0">
+              <a:buNone/>
+            </a:pPr>
+            <a:r>
+              <a:rPr lang="en-US" b="1" dirty="0"/>
+              <a:t>Experimental World</a:t>
+            </a:r>
+          </a:p>
+          <a:p>
+            <a:endParaRPr lang="en-US" dirty="0"/>
+          </a:p>
+        </p:txBody>
+      </p:sp>
+      <p:sp>
+        <p:nvSpPr>
+          <p:cNvPr id="5" name="Content Placeholder 2">
+            <a:extLst>
+              <a:ext uri="{FF2B5EF4-FFF2-40B4-BE49-F238E27FC236}">
+                <a16:creationId xmlns:a16="http://schemas.microsoft.com/office/drawing/2014/main" id="{1DE2A193-506E-1F4E-20F3-06F187CF7FE6}"/>
+              </a:ext>
+            </a:extLst>
+          </p:cNvPr>
+          <p:cNvSpPr txBox="1">
+            <a:spLocks/>
+          </p:cNvSpPr>
+          <p:nvPr/>
+        </p:nvSpPr>
+        <p:spPr bwMode="auto">
+          <a:xfrm>
+            <a:off x="6511623" y="1740130"/>
+            <a:ext cx="5145578" cy="4047778"/>
+          </a:xfrm>
+          <a:prstGeom prst="rect">
+            <a:avLst/>
+          </a:prstGeom>
+          <a:noFill/>
+          <a:ln w="9525">
+            <a:noFill/>
+            <a:miter lim="800000"/>
+            <a:headEnd/>
+            <a:tailEnd/>
+          </a:ln>
+        </p:spPr>
+        <p:txBody>
+          <a:bodyPr vert="horz" wrap="square" lIns="91440" tIns="45720" rIns="91440" bIns="45720" numCol="1" anchor="t" anchorCtr="0" compatLnSpc="1">
+            <a:prstTxWarp prst="textNoShape">
+              <a:avLst/>
+            </a:prstTxWarp>
+            <a:noAutofit/>
+          </a:bodyPr>
+          <a:lstStyle>
+            <a:lvl1pPr marL="230188" indent="-230188" algn="l" rtl="0" eaLnBrk="1" fontAlgn="base" hangingPunct="1">
+              <a:lnSpc>
+                <a:spcPct val="90000"/>
+              </a:lnSpc>
+              <a:spcBef>
+                <a:spcPts val="1400"/>
+              </a:spcBef>
+              <a:spcAft>
+                <a:spcPct val="0"/>
+              </a:spcAft>
+              <a:buClr>
+                <a:schemeClr val="tx1"/>
+              </a:buClr>
+              <a:buFont typeface="Arial" charset="0"/>
+              <a:buChar char="•"/>
+              <a:defRPr sz="2400" kern="1200">
+                <a:solidFill>
+                  <a:schemeClr val="tx1"/>
+                </a:solidFill>
+                <a:latin typeface="Arial" panose="020B0604020202020204" pitchFamily="34" charset="0"/>
+                <a:ea typeface="+mn-ea"/>
+                <a:cs typeface="Arial" panose="020B0604020202020204" pitchFamily="34" charset="0"/>
+              </a:defRPr>
+            </a:lvl1pPr>
+            <a:lvl2pPr marL="625475" indent="-279400" algn="l" rtl="0" eaLnBrk="1" fontAlgn="base" hangingPunct="1">
+              <a:lnSpc>
+                <a:spcPct val="90000"/>
+              </a:lnSpc>
+              <a:spcBef>
+                <a:spcPts val="800"/>
+              </a:spcBef>
+              <a:spcAft>
+                <a:spcPct val="0"/>
+              </a:spcAft>
+              <a:buClr>
+                <a:schemeClr val="tx1"/>
+              </a:buClr>
+              <a:buFont typeface="Arial" charset="0"/>
+              <a:buChar char="–"/>
+              <a:defRPr sz="2000" kern="1200">
+                <a:solidFill>
+                  <a:schemeClr val="tx1"/>
+                </a:solidFill>
+                <a:latin typeface="Arial" panose="020B0604020202020204" pitchFamily="34" charset="0"/>
+                <a:ea typeface="+mn-ea"/>
+                <a:cs typeface="Arial" panose="020B0604020202020204" pitchFamily="34" charset="0"/>
+              </a:defRPr>
+            </a:lvl2pPr>
+            <a:lvl3pPr marL="914400" indent="-230188" algn="l" rtl="0" eaLnBrk="1" fontAlgn="base" hangingPunct="1">
+              <a:lnSpc>
+                <a:spcPct val="90000"/>
+              </a:lnSpc>
+              <a:spcBef>
+                <a:spcPts val="800"/>
+              </a:spcBef>
+              <a:spcAft>
+                <a:spcPct val="0"/>
+              </a:spcAft>
+              <a:buClr>
+                <a:schemeClr val="tx1"/>
+              </a:buClr>
+              <a:buFont typeface="Arial" charset="0"/>
+              <a:buChar char="•"/>
+              <a:defRPr sz="1800" kern="1200">
+                <a:solidFill>
+                  <a:schemeClr val="tx1"/>
+                </a:solidFill>
+                <a:latin typeface="Arial" panose="020B0604020202020204" pitchFamily="34" charset="0"/>
+                <a:ea typeface="+mn-ea"/>
+                <a:cs typeface="Arial" panose="020B0604020202020204" pitchFamily="34" charset="0"/>
+              </a:defRPr>
+            </a:lvl3pPr>
+            <a:lvl4pPr marL="1144588" indent="-173038" algn="l" rtl="0" eaLnBrk="1" fontAlgn="base" hangingPunct="1">
+              <a:lnSpc>
+                <a:spcPct val="90000"/>
+              </a:lnSpc>
+              <a:spcBef>
+                <a:spcPts val="800"/>
+              </a:spcBef>
+              <a:spcAft>
+                <a:spcPct val="0"/>
+              </a:spcAft>
+              <a:buClr>
+                <a:schemeClr val="tx1"/>
+              </a:buClr>
+              <a:buFont typeface="Arial" charset="0"/>
+              <a:buChar char="–"/>
+              <a:defRPr sz="1600" kern="1200">
+                <a:solidFill>
+                  <a:schemeClr val="tx1"/>
+                </a:solidFill>
+                <a:latin typeface="Arial" panose="020B0604020202020204" pitchFamily="34" charset="0"/>
+                <a:ea typeface="+mn-ea"/>
+                <a:cs typeface="Arial" panose="020B0604020202020204" pitchFamily="34" charset="0"/>
+              </a:defRPr>
+            </a:lvl4pPr>
+            <a:lvl5pPr marL="1482725" indent="-222250" algn="l" rtl="0" eaLnBrk="1" fontAlgn="base" hangingPunct="1">
+              <a:lnSpc>
+                <a:spcPct val="90000"/>
+              </a:lnSpc>
+              <a:spcBef>
+                <a:spcPts val="600"/>
+              </a:spcBef>
+              <a:spcAft>
+                <a:spcPct val="0"/>
+              </a:spcAft>
+              <a:buClr>
+                <a:schemeClr val="tx1"/>
+              </a:buClr>
+              <a:buFont typeface="Arial" panose="020B0604020202020204" pitchFamily="34" charset="0"/>
+              <a:buChar char="•"/>
+              <a:defRPr sz="1600" kern="1200">
+                <a:solidFill>
+                  <a:schemeClr val="tx1"/>
+                </a:solidFill>
+                <a:latin typeface="Arial" panose="020B0604020202020204" pitchFamily="34" charset="0"/>
+                <a:ea typeface="+mn-ea"/>
+                <a:cs typeface="Arial" panose="020B0604020202020204" pitchFamily="34" charset="0"/>
+              </a:defRPr>
+            </a:lvl5pPr>
+            <a:lvl6pPr marL="2514600" indent="-228600" algn="l" defTabSz="914400" rtl="0" eaLnBrk="1" latinLnBrk="0" hangingPunct="1">
+              <a:spcBef>
+                <a:spcPct val="20000"/>
+              </a:spcBef>
+              <a:buFont typeface="Arial" pitchFamily="34" charset="0"/>
+              <a:buChar char="•"/>
+              <a:defRPr sz="2000" kern="1200">
+                <a:solidFill>
+                  <a:schemeClr val="tx1"/>
+                </a:solidFill>
+                <a:latin typeface="+mn-lt"/>
+                <a:ea typeface="+mn-ea"/>
+                <a:cs typeface="+mn-cs"/>
+              </a:defRPr>
+            </a:lvl6pPr>
+            <a:lvl7pPr marL="2971800" indent="-228600" algn="l" defTabSz="914400" rtl="0" eaLnBrk="1" latinLnBrk="0" hangingPunct="1">
+              <a:spcBef>
+                <a:spcPct val="20000"/>
+              </a:spcBef>
+              <a:buFont typeface="Arial" pitchFamily="34" charset="0"/>
+              <a:buChar char="•"/>
+              <a:defRPr sz="2000" kern="1200">
+                <a:solidFill>
+                  <a:schemeClr val="tx1"/>
+                </a:solidFill>
+                <a:latin typeface="+mn-lt"/>
+                <a:ea typeface="+mn-ea"/>
+                <a:cs typeface="+mn-cs"/>
+              </a:defRPr>
+            </a:lvl7pPr>
+            <a:lvl8pPr marL="3429000" indent="-228600" algn="l" defTabSz="914400" rtl="0" eaLnBrk="1" latinLnBrk="0" hangingPunct="1">
+              <a:spcBef>
+                <a:spcPct val="20000"/>
+              </a:spcBef>
+              <a:buFont typeface="Arial" pitchFamily="34" charset="0"/>
+              <a:buChar char="•"/>
+              <a:defRPr sz="2000" kern="1200">
+                <a:solidFill>
+                  <a:schemeClr val="tx1"/>
+                </a:solidFill>
+                <a:latin typeface="+mn-lt"/>
+                <a:ea typeface="+mn-ea"/>
+                <a:cs typeface="+mn-cs"/>
+              </a:defRPr>
+            </a:lvl8pPr>
+            <a:lvl9pPr marL="3886200" indent="-228600" algn="l" defTabSz="914400" rtl="0" eaLnBrk="1" latinLnBrk="0" hangingPunct="1">
+              <a:spcBef>
+                <a:spcPct val="20000"/>
+              </a:spcBef>
+              <a:buFont typeface="Arial" pitchFamily="34" charset="0"/>
+              <a:buChar char="•"/>
+              <a:defRPr sz="2000" kern="1200">
+                <a:solidFill>
+                  <a:schemeClr val="tx1"/>
+                </a:solidFill>
+                <a:latin typeface="+mn-lt"/>
+                <a:ea typeface="+mn-ea"/>
+                <a:cs typeface="+mn-cs"/>
+              </a:defRPr>
+            </a:lvl9pPr>
+          </a:lstStyle>
+          <a:p>
+            <a:pPr marL="0" indent="0">
+              <a:buFont typeface="Arial" charset="0"/>
+              <a:buNone/>
+            </a:pPr>
+            <a:r>
+              <a:rPr lang="en-US" b="1" dirty="0"/>
+              <a:t>Computational World</a:t>
+            </a:r>
+          </a:p>
+          <a:p>
+            <a:r>
+              <a:rPr lang="en-US" dirty="0"/>
               <a:t>Write good commit messages</a:t>
             </a:r>
           </a:p>
@@ -8380,7 +9088,7 @@
             <a:pPr lvl="1"/>
             <a:r>
               <a:rPr lang="en-US" dirty="0"/>
-              <a:t>I want to be able to take comprehensive lab notes quickly and easily.</a:t>
+              <a:t>I want to take comprehensive lab notes quickly and easily.</a:t>
             </a:r>
           </a:p>
           <a:p>
@@ -9335,18 +10043,18 @@
 </file>
 
 <file path=customXml/item1.xml><?xml version="1.0" encoding="utf-8"?>
+<p:properties xmlns:p="http://schemas.microsoft.com/office/2006/metadata/properties" xmlns:xsi="http://www.w3.org/2001/XMLSchema-instance" xmlns:pc="http://schemas.microsoft.com/office/infopath/2007/PartnerControls">
+  <documentManagement/>
+</p:properties>
+</file>
+
+<file path=customXml/item2.xml><?xml version="1.0" encoding="utf-8"?>
 <?mso-contentType ?>
 <FormTemplates xmlns="http://schemas.microsoft.com/sharepoint/v3/contenttype/forms">
   <Display>DocumentLibraryForm</Display>
   <Edit>DocumentLibraryForm</Edit>
   <New>DocumentLibraryForm</New>
 </FormTemplates>
-</file>
-
-<file path=customXml/item2.xml><?xml version="1.0" encoding="utf-8"?>
-<p:properties xmlns:p="http://schemas.microsoft.com/office/2006/metadata/properties" xmlns:xsi="http://www.w3.org/2001/XMLSchema-instance" xmlns:pc="http://schemas.microsoft.com/office/infopath/2007/PartnerControls">
-  <documentManagement/>
-</p:properties>
 </file>
 
 <file path=customXml/item3.xml><?xml version="1.0" encoding="utf-8"?>
@@ -9399,14 +10107,6 @@
 </file>
 
 <file path=customXml/itemProps1.xml><?xml version="1.0" encoding="utf-8"?>
-<ds:datastoreItem xmlns:ds="http://schemas.openxmlformats.org/officeDocument/2006/customXml" ds:itemID="{19E20559-B232-4371-8690-E3D8007EDB82}">
-  <ds:schemaRefs>
-    <ds:schemaRef ds:uri="http://schemas.microsoft.com/sharepoint/v3/contenttype/forms"/>
-  </ds:schemaRefs>
-</ds:datastoreItem>
-</file>
-
-<file path=customXml/itemProps2.xml><?xml version="1.0" encoding="utf-8"?>
 <ds:datastoreItem xmlns:ds="http://schemas.openxmlformats.org/officeDocument/2006/customXml" ds:itemID="{A50EC660-24D0-43A0-AE5E-E274115E726B}">
   <ds:schemaRefs>
     <ds:schemaRef ds:uri="http://purl.org/dc/elements/1.1/"/>
@@ -9417,6 +10117,14 @@
     <ds:schemaRef ds:uri="http://www.w3.org/XML/1998/namespace"/>
     <ds:schemaRef ds:uri="http://purl.org/dc/dcmitype/"/>
     <ds:schemaRef ds:uri="http://schemas.microsoft.com/office/infopath/2007/PartnerControls"/>
+  </ds:schemaRefs>
+</ds:datastoreItem>
+</file>
+
+<file path=customXml/itemProps2.xml><?xml version="1.0" encoding="utf-8"?>
+<ds:datastoreItem xmlns:ds="http://schemas.openxmlformats.org/officeDocument/2006/customXml" ds:itemID="{19E20559-B232-4371-8690-E3D8007EDB82}">
+  <ds:schemaRefs>
+    <ds:schemaRef ds:uri="http://schemas.microsoft.com/sharepoint/v3/contenttype/forms"/>
   </ds:schemaRefs>
 </ds:datastoreItem>
 </file>

</xml_diff>

<commit_message>
added slides for computational experiments
</commit_message>
<xml_diff>
--- a/computational-expts.pptx
+++ b/computational-expts.pptx
@@ -5,10 +5,10 @@
     <p:sldMasterId id="2147483935" r:id="rId4"/>
   </p:sldMasterIdLst>
   <p:notesMasterIdLst>
-    <p:notesMasterId r:id="rId25"/>
+    <p:notesMasterId r:id="rId36"/>
   </p:notesMasterIdLst>
   <p:handoutMasterIdLst>
-    <p:handoutMasterId r:id="rId26"/>
+    <p:handoutMasterId r:id="rId37"/>
   </p:handoutMasterIdLst>
   <p:sldIdLst>
     <p:sldId id="256" r:id="rId5"/>
@@ -31,6 +31,17 @@
     <p:sldId id="335" r:id="rId22"/>
     <p:sldId id="338" r:id="rId23"/>
     <p:sldId id="339" r:id="rId24"/>
+    <p:sldId id="343" r:id="rId25"/>
+    <p:sldId id="344" r:id="rId26"/>
+    <p:sldId id="345" r:id="rId27"/>
+    <p:sldId id="346" r:id="rId28"/>
+    <p:sldId id="347" r:id="rId29"/>
+    <p:sldId id="348" r:id="rId30"/>
+    <p:sldId id="349" r:id="rId31"/>
+    <p:sldId id="350" r:id="rId32"/>
+    <p:sldId id="351" r:id="rId33"/>
+    <p:sldId id="352" r:id="rId34"/>
+    <p:sldId id="353" r:id="rId35"/>
   </p:sldIdLst>
   <p:sldSz cx="12188825" cy="6858000"/>
   <p:notesSz cx="7010400" cy="9296400"/>
@@ -274,7 +285,7 @@
           <a:p>
             <a:fld id="{0B842F42-2CE9-4E35-95C1-410DC08A50B1}" type="datetimeFigureOut">
               <a:rPr lang="en-US" smtClean="0"/>
-              <a:t>7/25/22</a:t>
+              <a:t>7/29/22</a:t>
             </a:fld>
             <a:endParaRPr lang="en-US"/>
           </a:p>
@@ -439,7 +450,7 @@
           <a:p>
             <a:fld id="{6F282904-F315-4730-8D91-37D99E141A6F}" type="datetimeFigureOut">
               <a:rPr lang="en-US" smtClean="0"/>
-              <a:t>7/25/22</a:t>
+              <a:t>7/29/22</a:t>
             </a:fld>
             <a:endParaRPr lang="en-US"/>
           </a:p>
@@ -5905,7 +5916,7 @@
         <p:spPr>
           <a:xfrm>
             <a:off x="3176924" y="2085870"/>
-            <a:ext cx="6341801" cy="936667"/>
+            <a:ext cx="5910849" cy="936667"/>
           </a:xfrm>
         </p:spPr>
         <p:txBody>
@@ -5913,12 +5924,8 @@
           <a:lstStyle/>
           <a:p>
             <a:r>
-              <a:rPr lang="en-US" dirty="0" err="1"/>
-              <a:t>Anshu</a:t>
-            </a:r>
-            <a:r>
-              <a:rPr lang="en-US" dirty="0"/>
-              <a:t> Dubey</a:t>
+              <a:rPr lang="en-US" dirty="0"/>
+              <a:t>Jared O’Neal</a:t>
             </a:r>
             <a:r>
               <a:rPr lang="en-US" u="none" dirty="0"/>
@@ -5926,23 +5933,31 @@
             </a:r>
             <a:r>
               <a:rPr lang="en-US" sz="2000" u="none" dirty="0"/>
+              <a:t>(he/him) &amp;</a:t>
+            </a:r>
+            <a:r>
+              <a:rPr lang="en-US" sz="2000" dirty="0"/>
+              <a:t> </a:t>
+            </a:r>
+            <a:r>
+              <a:rPr lang="en-US" sz="2000" dirty="0" err="1"/>
+              <a:t>Anshu</a:t>
+            </a:r>
+            <a:r>
+              <a:rPr lang="en-US" sz="2000" dirty="0"/>
+              <a:t> Dubey</a:t>
+            </a:r>
+            <a:r>
+              <a:rPr lang="en-US" sz="2000" u="none" dirty="0"/>
+              <a:t> </a:t>
+            </a:r>
+            <a:r>
+              <a:rPr lang="en-US" sz="1800" u="none" dirty="0"/>
               <a:t>(she/her)</a:t>
             </a:r>
             <a:r>
-              <a:rPr lang="en-US" u="none" dirty="0"/>
-              <a:t> &amp; </a:t>
-            </a:r>
-            <a:r>
-              <a:rPr lang="en-US" dirty="0"/>
-              <a:t>Jared O’Neal</a:t>
-            </a:r>
-            <a:r>
-              <a:rPr lang="en-US" u="none" dirty="0"/>
+              <a:rPr lang="en-US" sz="2000" u="none" dirty="0"/>
               <a:t> </a:t>
-            </a:r>
-            <a:r>
-              <a:rPr lang="en-US" sz="2000" u="none" dirty="0"/>
-              <a:t>(he/him)</a:t>
             </a:r>
           </a:p>
           <a:p>
@@ -6048,7 +6063,7 @@
           <a:p>
             <a:r>
               <a:rPr lang="en-US" dirty="0"/>
-              <a:t>Contributors: </a:t>
+              <a:t>Contributors: Jared O’Neal (ANL), </a:t>
             </a:r>
             <a:r>
               <a:rPr lang="en-US" dirty="0" err="1"/>
@@ -6056,7 +6071,7 @@
             </a:r>
             <a:r>
               <a:rPr lang="en-US" dirty="0"/>
-              <a:t> Dubey (ANL), Jared O’Neal (ANL)</a:t>
+              <a:t> Dubey (ANL)</a:t>
             </a:r>
           </a:p>
         </p:txBody>
@@ -8129,34 +8144,6 @@
       </p:grpSpPr>
       <p:sp>
         <p:nvSpPr>
-          <p:cNvPr id="2" name="Title 1">
-            <a:extLst>
-              <a:ext uri="{FF2B5EF4-FFF2-40B4-BE49-F238E27FC236}">
-                <a16:creationId xmlns:a16="http://schemas.microsoft.com/office/drawing/2014/main" id="{10BDA77C-F871-ADA0-6CA2-68C92B681AB0}"/>
-              </a:ext>
-            </a:extLst>
-          </p:cNvPr>
-          <p:cNvSpPr>
-            <a:spLocks noGrp="1"/>
-          </p:cNvSpPr>
-          <p:nvPr>
-            <p:ph type="title"/>
-          </p:nvPr>
-        </p:nvSpPr>
-        <p:spPr/>
-        <p:txBody>
-          <a:bodyPr/>
-          <a:lstStyle/>
-          <a:p>
-            <a:r>
-              <a:rPr lang="en-US" dirty="0"/>
-              <a:t>ANSHU STARTS HERE!</a:t>
-            </a:r>
-          </a:p>
-        </p:txBody>
-      </p:sp>
-      <p:sp>
-        <p:nvSpPr>
           <p:cNvPr id="3" name="Content Placeholder 2">
             <a:extLst>
               <a:ext uri="{FF2B5EF4-FFF2-40B4-BE49-F238E27FC236}">
@@ -8171,12 +8158,121 @@
             <p:ph idx="1"/>
           </p:nvPr>
         </p:nvSpPr>
-        <p:spPr/>
+        <p:spPr>
+          <a:xfrm>
+            <a:off x="409507" y="1199477"/>
+            <a:ext cx="11369809" cy="4047778"/>
+          </a:xfrm>
+        </p:spPr>
         <p:txBody>
           <a:bodyPr/>
           <a:lstStyle/>
           <a:p>
-            <a:endParaRPr lang="en-US"/>
+            <a:pPr marL="0" indent="0">
+              <a:buNone/>
+            </a:pPr>
+            <a:r>
+              <a:rPr lang="en-US" dirty="0"/>
+              <a:t>So far we have talked about setting up the infrastructure that is needed to collect and analyze results.</a:t>
+            </a:r>
+          </a:p>
+          <a:p>
+            <a:pPr marL="0" indent="0">
+              <a:buNone/>
+            </a:pPr>
+            <a:endParaRPr lang="en-US" dirty="0"/>
+          </a:p>
+          <a:p>
+            <a:pPr marL="0" indent="0">
+              <a:buNone/>
+            </a:pPr>
+            <a:r>
+              <a:rPr lang="en-US" dirty="0"/>
+              <a:t>We still haven’t talked about how to plan running the study/experiments</a:t>
+            </a:r>
+          </a:p>
+          <a:p>
+            <a:pPr marL="0" indent="0">
+              <a:buNone/>
+            </a:pPr>
+            <a:endParaRPr lang="en-US" dirty="0"/>
+          </a:p>
+          <a:p>
+            <a:pPr marL="0" indent="0">
+              <a:buNone/>
+            </a:pPr>
+            <a:r>
+              <a:rPr lang="en-US" dirty="0"/>
+              <a:t>This section talks about preparing for a successful simulation campaign</a:t>
+            </a:r>
+          </a:p>
+          <a:p>
+            <a:pPr marL="0" indent="0" algn="ctr">
+              <a:buNone/>
+            </a:pPr>
+            <a:r>
+              <a:rPr lang="en-US" dirty="0"/>
+              <a:t> </a:t>
+            </a:r>
+          </a:p>
+        </p:txBody>
+      </p:sp>
+      <p:sp>
+        <p:nvSpPr>
+          <p:cNvPr id="4" name="Rounded Rectangle 3">
+            <a:extLst>
+              <a:ext uri="{FF2B5EF4-FFF2-40B4-BE49-F238E27FC236}">
+                <a16:creationId xmlns:a16="http://schemas.microsoft.com/office/drawing/2014/main" id="{A05CF8D7-AE7E-0ECA-F80F-38A8FBCC26B6}"/>
+              </a:ext>
+            </a:extLst>
+          </p:cNvPr>
+          <p:cNvSpPr/>
+          <p:nvPr/>
+        </p:nvSpPr>
+        <p:spPr>
+          <a:xfrm>
+            <a:off x="1896034" y="4249269"/>
+            <a:ext cx="7826189" cy="1600201"/>
+          </a:xfrm>
+          <a:prstGeom prst="roundRect">
+            <a:avLst/>
+          </a:prstGeom>
+          <a:solidFill>
+            <a:schemeClr val="accent3"/>
+          </a:solidFill>
+          <a:ln>
+            <a:noFill/>
+          </a:ln>
+          <a:effectLst>
+            <a:outerShdw blurRad="44450" dist="27940" dir="5400000" algn="ctr">
+              <a:srgbClr val="000000">
+                <a:alpha val="32000"/>
+              </a:srgbClr>
+            </a:outerShdw>
+          </a:effectLst>
+        </p:spPr>
+        <p:txBody>
+          <a:bodyPr rot="0" spcFirstLastPara="0" vertOverflow="overflow" horzOverflow="overflow" vert="horz" wrap="square" lIns="121851" tIns="60925" rIns="121851" bIns="60925" numCol="1" spcCol="0" rtlCol="0" fromWordArt="0" anchor="ctr" anchorCtr="0" forceAA="0" compatLnSpc="1">
+            <a:prstTxWarp prst="textNoShape">
+              <a:avLst/>
+            </a:prstTxWarp>
+            <a:noAutofit/>
+          </a:bodyPr>
+          <a:lstStyle/>
+          <a:p>
+            <a:pPr algn="ctr">
+              <a:lnSpc>
+                <a:spcPct val="90000"/>
+              </a:lnSpc>
+            </a:pPr>
+            <a:r>
+              <a:rPr lang="en-US" sz="2000" dirty="0">
+                <a:solidFill>
+                  <a:schemeClr val="bg1"/>
+                </a:solidFill>
+              </a:rPr>
+              <a:t>Running simulations at large scales for science discovery is more of a craft and less of science. More than any other aspect of computational science it relies on experience and acquired wisdom that helps one develop a nose for fruitful possibilities.</a:t>
+            </a:r>
           </a:p>
         </p:txBody>
       </p:sp>
@@ -8184,6 +8280,1636 @@
     <p:extLst>
       <p:ext uri="{BB962C8B-B14F-4D97-AF65-F5344CB8AC3E}">
         <p14:creationId xmlns:p14="http://schemas.microsoft.com/office/powerpoint/2010/main" val="732654816"/>
+      </p:ext>
+    </p:extLst>
+  </p:cSld>
+  <p:clrMapOvr>
+    <a:masterClrMapping/>
+  </p:clrMapOvr>
+</p:sld>
+</file>
+
+<file path=ppt/slides/slide21.xml><?xml version="1.0" encoding="utf-8"?>
+<p:sld xmlns:a="http://schemas.openxmlformats.org/drawingml/2006/main" xmlns:r="http://schemas.openxmlformats.org/officeDocument/2006/relationships" xmlns:p="http://schemas.openxmlformats.org/presentationml/2006/main">
+  <p:cSld>
+    <p:spTree>
+      <p:nvGrpSpPr>
+        <p:cNvPr id="1" name=""/>
+        <p:cNvGrpSpPr/>
+        <p:nvPr/>
+      </p:nvGrpSpPr>
+      <p:grpSpPr>
+        <a:xfrm>
+          <a:off x="0" y="0"/>
+          <a:ext cx="0" cy="0"/>
+          <a:chOff x="0" y="0"/>
+          <a:chExt cx="0" cy="0"/>
+        </a:xfrm>
+      </p:grpSpPr>
+      <p:sp>
+        <p:nvSpPr>
+          <p:cNvPr id="2" name="Title 1">
+            <a:extLst>
+              <a:ext uri="{FF2B5EF4-FFF2-40B4-BE49-F238E27FC236}">
+                <a16:creationId xmlns:a16="http://schemas.microsoft.com/office/drawing/2014/main" id="{C2376954-3703-3D5F-1556-493251ADA7D6}"/>
+              </a:ext>
+            </a:extLst>
+          </p:cNvPr>
+          <p:cNvSpPr>
+            <a:spLocks noGrp="1"/>
+          </p:cNvSpPr>
+          <p:nvPr>
+            <p:ph type="title"/>
+          </p:nvPr>
+        </p:nvSpPr>
+        <p:spPr/>
+        <p:txBody>
+          <a:bodyPr/>
+          <a:lstStyle/>
+          <a:p>
+            <a:r>
+              <a:rPr lang="en-US" dirty="0"/>
+              <a:t>Why do you need to plan?</a:t>
+            </a:r>
+          </a:p>
+        </p:txBody>
+      </p:sp>
+      <p:sp>
+        <p:nvSpPr>
+          <p:cNvPr id="3" name="Content Placeholder 2">
+            <a:extLst>
+              <a:ext uri="{FF2B5EF4-FFF2-40B4-BE49-F238E27FC236}">
+                <a16:creationId xmlns:a16="http://schemas.microsoft.com/office/drawing/2014/main" id="{4F3D57F9-5D12-25C5-A6B4-27E9D7E906C9}"/>
+              </a:ext>
+            </a:extLst>
+          </p:cNvPr>
+          <p:cNvSpPr>
+            <a:spLocks noGrp="1"/>
+          </p:cNvSpPr>
+          <p:nvPr>
+            <p:ph idx="1"/>
+          </p:nvPr>
+        </p:nvSpPr>
+        <p:spPr>
+          <a:xfrm>
+            <a:off x="365761" y="1325879"/>
+            <a:ext cx="9006840" cy="4402567"/>
+          </a:xfrm>
+        </p:spPr>
+        <p:txBody>
+          <a:bodyPr/>
+          <a:lstStyle/>
+          <a:p>
+            <a:r>
+              <a:rPr lang="en-US" dirty="0"/>
+              <a:t>Machines are expensive and rare resources</a:t>
+            </a:r>
+          </a:p>
+          <a:p>
+            <a:pPr lvl="1"/>
+            <a:r>
+              <a:rPr lang="en-US" dirty="0"/>
+              <a:t>Operating them is also very expensive</a:t>
+            </a:r>
+          </a:p>
+          <a:p>
+            <a:pPr lvl="2"/>
+            <a:r>
+              <a:rPr lang="en-US" dirty="0">
+                <a:solidFill>
+                  <a:srgbClr val="C00000"/>
+                </a:solidFill>
+              </a:rPr>
+              <a:t>If you made a mistake in your input parameters and got garbage results on a large scale run, you just wasted hundreds of thousands of dollars </a:t>
+            </a:r>
+          </a:p>
+          <a:p>
+            <a:pPr lvl="1"/>
+            <a:r>
+              <a:rPr lang="en-US" dirty="0"/>
+              <a:t>Many people are competing for these resources</a:t>
+            </a:r>
+          </a:p>
+          <a:p>
+            <a:pPr lvl="2"/>
+            <a:r>
+              <a:rPr lang="en-US" dirty="0">
+                <a:solidFill>
+                  <a:srgbClr val="C00000"/>
+                </a:solidFill>
+              </a:rPr>
+              <a:t>Your wasted run is likely to be either your or someone else’s opportunity lost</a:t>
+            </a:r>
+          </a:p>
+          <a:p>
+            <a:pPr lvl="1"/>
+            <a:r>
+              <a:rPr lang="en-US" dirty="0"/>
+              <a:t>You are likely charting new scientific territory</a:t>
+            </a:r>
+          </a:p>
+          <a:p>
+            <a:pPr lvl="2"/>
+            <a:r>
+              <a:rPr lang="en-US" dirty="0">
+                <a:solidFill>
+                  <a:srgbClr val="C00000"/>
+                </a:solidFill>
+              </a:rPr>
+              <a:t>Some aspect of using your code may not have been important before, but may become critical in the new study</a:t>
+            </a:r>
+          </a:p>
+          <a:p>
+            <a:pPr lvl="2"/>
+            <a:r>
+              <a:rPr lang="en-US" dirty="0">
+                <a:solidFill>
+                  <a:srgbClr val="C00000"/>
+                </a:solidFill>
+              </a:rPr>
+              <a:t>Some solver may run up against the limits of its validity</a:t>
+            </a:r>
+          </a:p>
+          <a:p>
+            <a:pPr lvl="2"/>
+            <a:r>
+              <a:rPr lang="en-US" dirty="0">
+                <a:solidFill>
+                  <a:srgbClr val="C00000"/>
+                </a:solidFill>
+              </a:rPr>
+              <a:t>Inflight correction may be needed to parameters to continue with the study</a:t>
+            </a:r>
+          </a:p>
+          <a:p>
+            <a:r>
+              <a:rPr lang="en-US" dirty="0"/>
+              <a:t>Aim for no surprises, but be prepared for them</a:t>
+            </a:r>
+          </a:p>
+        </p:txBody>
+      </p:sp>
+      <p:sp>
+        <p:nvSpPr>
+          <p:cNvPr id="5" name="Rectangle 4">
+            <a:extLst>
+              <a:ext uri="{FF2B5EF4-FFF2-40B4-BE49-F238E27FC236}">
+                <a16:creationId xmlns:a16="http://schemas.microsoft.com/office/drawing/2014/main" id="{6BAADB36-155B-3C6B-571D-C37BA88F887D}"/>
+              </a:ext>
+            </a:extLst>
+          </p:cNvPr>
+          <p:cNvSpPr/>
+          <p:nvPr/>
+        </p:nvSpPr>
+        <p:spPr>
+          <a:xfrm>
+            <a:off x="914400" y="2070847"/>
+            <a:ext cx="8458201" cy="699247"/>
+          </a:xfrm>
+          <a:prstGeom prst="rect">
+            <a:avLst/>
+          </a:prstGeom>
+          <a:solidFill>
+            <a:schemeClr val="bg1"/>
+          </a:solidFill>
+          <a:ln>
+            <a:noFill/>
+          </a:ln>
+          <a:effectLst>
+            <a:outerShdw sx="1000" sy="1000" algn="ctr">
+              <a:srgbClr val="000000"/>
+            </a:outerShdw>
+          </a:effectLst>
+        </p:spPr>
+        <p:txBody>
+          <a:bodyPr rot="0" spcFirstLastPara="0" vertOverflow="overflow" horzOverflow="overflow" vert="horz" wrap="square" lIns="121851" tIns="60925" rIns="121851" bIns="60925" numCol="1" spcCol="0" rtlCol="0" fromWordArt="0" anchor="ctr" anchorCtr="0" forceAA="0" compatLnSpc="1">
+            <a:prstTxWarp prst="textNoShape">
+              <a:avLst/>
+            </a:prstTxWarp>
+            <a:noAutofit/>
+          </a:bodyPr>
+          <a:lstStyle/>
+          <a:p>
+            <a:pPr algn="ctr">
+              <a:lnSpc>
+                <a:spcPct val="90000"/>
+              </a:lnSpc>
+            </a:pPr>
+            <a:endParaRPr lang="en-US" sz="2000" dirty="0">
+              <a:solidFill>
+                <a:schemeClr val="bg1"/>
+              </a:solidFill>
+            </a:endParaRPr>
+          </a:p>
+        </p:txBody>
+      </p:sp>
+      <p:sp>
+        <p:nvSpPr>
+          <p:cNvPr id="6" name="Rectangle 5">
+            <a:extLst>
+              <a:ext uri="{FF2B5EF4-FFF2-40B4-BE49-F238E27FC236}">
+                <a16:creationId xmlns:a16="http://schemas.microsoft.com/office/drawing/2014/main" id="{5C3A25D7-7A00-664A-9949-1C0509FCC0AF}"/>
+              </a:ext>
+            </a:extLst>
+          </p:cNvPr>
+          <p:cNvSpPr/>
+          <p:nvPr/>
+        </p:nvSpPr>
+        <p:spPr>
+          <a:xfrm>
+            <a:off x="1093694" y="3079376"/>
+            <a:ext cx="8458201" cy="435685"/>
+          </a:xfrm>
+          <a:prstGeom prst="rect">
+            <a:avLst/>
+          </a:prstGeom>
+          <a:solidFill>
+            <a:schemeClr val="bg1"/>
+          </a:solidFill>
+          <a:ln>
+            <a:noFill/>
+          </a:ln>
+          <a:effectLst>
+            <a:outerShdw sx="1000" sy="1000" algn="ctr">
+              <a:srgbClr val="000000"/>
+            </a:outerShdw>
+          </a:effectLst>
+        </p:spPr>
+        <p:txBody>
+          <a:bodyPr rot="0" spcFirstLastPara="0" vertOverflow="overflow" horzOverflow="overflow" vert="horz" wrap="square" lIns="121851" tIns="60925" rIns="121851" bIns="60925" numCol="1" spcCol="0" rtlCol="0" fromWordArt="0" anchor="ctr" anchorCtr="0" forceAA="0" compatLnSpc="1">
+            <a:prstTxWarp prst="textNoShape">
+              <a:avLst/>
+            </a:prstTxWarp>
+            <a:noAutofit/>
+          </a:bodyPr>
+          <a:lstStyle/>
+          <a:p>
+            <a:pPr algn="ctr">
+              <a:lnSpc>
+                <a:spcPct val="90000"/>
+              </a:lnSpc>
+            </a:pPr>
+            <a:endParaRPr lang="en-US" sz="2000" dirty="0">
+              <a:solidFill>
+                <a:schemeClr val="bg1"/>
+              </a:solidFill>
+            </a:endParaRPr>
+          </a:p>
+        </p:txBody>
+      </p:sp>
+      <p:sp>
+        <p:nvSpPr>
+          <p:cNvPr id="7" name="Rectangle 6">
+            <a:extLst>
+              <a:ext uri="{FF2B5EF4-FFF2-40B4-BE49-F238E27FC236}">
+                <a16:creationId xmlns:a16="http://schemas.microsoft.com/office/drawing/2014/main" id="{5AD47328-D3FB-DAC1-8695-238EED7A2C6F}"/>
+              </a:ext>
+            </a:extLst>
+          </p:cNvPr>
+          <p:cNvSpPr/>
+          <p:nvPr/>
+        </p:nvSpPr>
+        <p:spPr>
+          <a:xfrm>
+            <a:off x="1093694" y="3824343"/>
+            <a:ext cx="8278908" cy="1272092"/>
+          </a:xfrm>
+          <a:prstGeom prst="rect">
+            <a:avLst/>
+          </a:prstGeom>
+          <a:solidFill>
+            <a:schemeClr val="bg1"/>
+          </a:solidFill>
+          <a:ln>
+            <a:noFill/>
+          </a:ln>
+          <a:effectLst>
+            <a:outerShdw sx="1000" sy="1000" algn="ctr">
+              <a:srgbClr val="000000"/>
+            </a:outerShdw>
+          </a:effectLst>
+        </p:spPr>
+        <p:txBody>
+          <a:bodyPr rot="0" spcFirstLastPara="0" vertOverflow="overflow" horzOverflow="overflow" vert="horz" wrap="square" lIns="121851" tIns="60925" rIns="121851" bIns="60925" numCol="1" spcCol="0" rtlCol="0" fromWordArt="0" anchor="ctr" anchorCtr="0" forceAA="0" compatLnSpc="1">
+            <a:prstTxWarp prst="textNoShape">
+              <a:avLst/>
+            </a:prstTxWarp>
+            <a:noAutofit/>
+          </a:bodyPr>
+          <a:lstStyle/>
+          <a:p>
+            <a:pPr algn="ctr">
+              <a:lnSpc>
+                <a:spcPct val="90000"/>
+              </a:lnSpc>
+            </a:pPr>
+            <a:endParaRPr lang="en-US" sz="2000" dirty="0">
+              <a:solidFill>
+                <a:schemeClr val="bg1"/>
+              </a:solidFill>
+            </a:endParaRPr>
+          </a:p>
+        </p:txBody>
+      </p:sp>
+    </p:spTree>
+    <p:extLst>
+      <p:ext uri="{BB962C8B-B14F-4D97-AF65-F5344CB8AC3E}">
+        <p14:creationId xmlns:p14="http://schemas.microsoft.com/office/powerpoint/2010/main" val="32320673"/>
+      </p:ext>
+    </p:extLst>
+  </p:cSld>
+  <p:clrMapOvr>
+    <a:masterClrMapping/>
+  </p:clrMapOvr>
+</p:sld>
+</file>
+
+<file path=ppt/slides/slide22.xml><?xml version="1.0" encoding="utf-8"?>
+<p:sld xmlns:a="http://schemas.openxmlformats.org/drawingml/2006/main" xmlns:r="http://schemas.openxmlformats.org/officeDocument/2006/relationships" xmlns:p="http://schemas.openxmlformats.org/presentationml/2006/main">
+  <p:cSld>
+    <p:spTree>
+      <p:nvGrpSpPr>
+        <p:cNvPr id="1" name=""/>
+        <p:cNvGrpSpPr/>
+        <p:nvPr/>
+      </p:nvGrpSpPr>
+      <p:grpSpPr>
+        <a:xfrm>
+          <a:off x="0" y="0"/>
+          <a:ext cx="0" cy="0"/>
+          <a:chOff x="0" y="0"/>
+          <a:chExt cx="0" cy="0"/>
+        </a:xfrm>
+      </p:grpSpPr>
+      <p:sp>
+        <p:nvSpPr>
+          <p:cNvPr id="2" name="Title 1">
+            <a:extLst>
+              <a:ext uri="{FF2B5EF4-FFF2-40B4-BE49-F238E27FC236}">
+                <a16:creationId xmlns:a16="http://schemas.microsoft.com/office/drawing/2014/main" id="{C2376954-3703-3D5F-1556-493251ADA7D6}"/>
+              </a:ext>
+            </a:extLst>
+          </p:cNvPr>
+          <p:cNvSpPr>
+            <a:spLocks noGrp="1"/>
+          </p:cNvSpPr>
+          <p:nvPr>
+            <p:ph type="title"/>
+          </p:nvPr>
+        </p:nvSpPr>
+        <p:spPr/>
+        <p:txBody>
+          <a:bodyPr/>
+          <a:lstStyle/>
+          <a:p>
+            <a:r>
+              <a:rPr lang="en-US" dirty="0"/>
+              <a:t>Why do you need to plan?</a:t>
+            </a:r>
+          </a:p>
+        </p:txBody>
+      </p:sp>
+      <p:sp>
+        <p:nvSpPr>
+          <p:cNvPr id="3" name="Content Placeholder 2">
+            <a:extLst>
+              <a:ext uri="{FF2B5EF4-FFF2-40B4-BE49-F238E27FC236}">
+                <a16:creationId xmlns:a16="http://schemas.microsoft.com/office/drawing/2014/main" id="{4F3D57F9-5D12-25C5-A6B4-27E9D7E906C9}"/>
+              </a:ext>
+            </a:extLst>
+          </p:cNvPr>
+          <p:cNvSpPr>
+            <a:spLocks noGrp="1"/>
+          </p:cNvSpPr>
+          <p:nvPr>
+            <p:ph idx="1"/>
+          </p:nvPr>
+        </p:nvSpPr>
+        <p:spPr>
+          <a:xfrm>
+            <a:off x="365761" y="1325879"/>
+            <a:ext cx="9006840" cy="4402567"/>
+          </a:xfrm>
+        </p:spPr>
+        <p:txBody>
+          <a:bodyPr/>
+          <a:lstStyle/>
+          <a:p>
+            <a:r>
+              <a:rPr lang="en-US" dirty="0"/>
+              <a:t>Machines are expensive and rare resources</a:t>
+            </a:r>
+          </a:p>
+          <a:p>
+            <a:pPr lvl="1"/>
+            <a:r>
+              <a:rPr lang="en-US" dirty="0"/>
+              <a:t>Operating them is also very expensive</a:t>
+            </a:r>
+          </a:p>
+          <a:p>
+            <a:pPr lvl="2"/>
+            <a:r>
+              <a:rPr lang="en-US" dirty="0">
+                <a:solidFill>
+                  <a:srgbClr val="C00000"/>
+                </a:solidFill>
+              </a:rPr>
+              <a:t>If you made a mistake in your input parameters and got garbage results on a large scale run, you just wasted hundreds of thousands of dollars </a:t>
+            </a:r>
+          </a:p>
+          <a:p>
+            <a:pPr lvl="1"/>
+            <a:r>
+              <a:rPr lang="en-US" dirty="0"/>
+              <a:t>Many people are competing for these resources</a:t>
+            </a:r>
+          </a:p>
+          <a:p>
+            <a:pPr lvl="2"/>
+            <a:r>
+              <a:rPr lang="en-US" dirty="0">
+                <a:solidFill>
+                  <a:srgbClr val="C00000"/>
+                </a:solidFill>
+              </a:rPr>
+              <a:t>Your wasted run is likely to be either your or someone else’s opportunity lost</a:t>
+            </a:r>
+          </a:p>
+          <a:p>
+            <a:pPr lvl="1"/>
+            <a:r>
+              <a:rPr lang="en-US" dirty="0"/>
+              <a:t>You are likely charting new scientific territory</a:t>
+            </a:r>
+          </a:p>
+          <a:p>
+            <a:pPr lvl="2"/>
+            <a:r>
+              <a:rPr lang="en-US" dirty="0">
+                <a:solidFill>
+                  <a:srgbClr val="C00000"/>
+                </a:solidFill>
+              </a:rPr>
+              <a:t>Some aspect of using your code may not have been important before, but may become critical in the new study</a:t>
+            </a:r>
+          </a:p>
+          <a:p>
+            <a:pPr lvl="2"/>
+            <a:r>
+              <a:rPr lang="en-US" dirty="0">
+                <a:solidFill>
+                  <a:srgbClr val="C00000"/>
+                </a:solidFill>
+              </a:rPr>
+              <a:t>Some solver may run up against the limits of its validity</a:t>
+            </a:r>
+          </a:p>
+          <a:p>
+            <a:pPr lvl="2"/>
+            <a:r>
+              <a:rPr lang="en-US" dirty="0">
+                <a:solidFill>
+                  <a:srgbClr val="C00000"/>
+                </a:solidFill>
+              </a:rPr>
+              <a:t>Inflight correction may be needed to parameters to continue with the study</a:t>
+            </a:r>
+          </a:p>
+          <a:p>
+            <a:r>
+              <a:rPr lang="en-US" dirty="0"/>
+              <a:t>Aim for no surprises, but be prepared for them</a:t>
+            </a:r>
+          </a:p>
+        </p:txBody>
+      </p:sp>
+    </p:spTree>
+    <p:extLst>
+      <p:ext uri="{BB962C8B-B14F-4D97-AF65-F5344CB8AC3E}">
+        <p14:creationId xmlns:p14="http://schemas.microsoft.com/office/powerpoint/2010/main" val="135586253"/>
+      </p:ext>
+    </p:extLst>
+  </p:cSld>
+  <p:clrMapOvr>
+    <a:masterClrMapping/>
+  </p:clrMapOvr>
+</p:sld>
+</file>
+
+<file path=ppt/slides/slide23.xml><?xml version="1.0" encoding="utf-8"?>
+<p:sld xmlns:a="http://schemas.openxmlformats.org/drawingml/2006/main" xmlns:r="http://schemas.openxmlformats.org/officeDocument/2006/relationships" xmlns:p="http://schemas.openxmlformats.org/presentationml/2006/main">
+  <p:cSld>
+    <p:spTree>
+      <p:nvGrpSpPr>
+        <p:cNvPr id="1" name=""/>
+        <p:cNvGrpSpPr/>
+        <p:nvPr/>
+      </p:nvGrpSpPr>
+      <p:grpSpPr>
+        <a:xfrm>
+          <a:off x="0" y="0"/>
+          <a:ext cx="0" cy="0"/>
+          <a:chOff x="0" y="0"/>
+          <a:chExt cx="0" cy="0"/>
+        </a:xfrm>
+      </p:grpSpPr>
+      <p:sp>
+        <p:nvSpPr>
+          <p:cNvPr id="2" name="Title 1">
+            <a:extLst>
+              <a:ext uri="{FF2B5EF4-FFF2-40B4-BE49-F238E27FC236}">
+                <a16:creationId xmlns:a16="http://schemas.microsoft.com/office/drawing/2014/main" id="{C2376954-3703-3D5F-1556-493251ADA7D6}"/>
+              </a:ext>
+            </a:extLst>
+          </p:cNvPr>
+          <p:cNvSpPr>
+            <a:spLocks noGrp="1"/>
+          </p:cNvSpPr>
+          <p:nvPr>
+            <p:ph type="title"/>
+          </p:nvPr>
+        </p:nvSpPr>
+        <p:spPr/>
+        <p:txBody>
+          <a:bodyPr/>
+          <a:lstStyle/>
+          <a:p>
+            <a:r>
+              <a:rPr lang="en-US" dirty="0"/>
+              <a:t>Why do you need to plan?</a:t>
+            </a:r>
+          </a:p>
+        </p:txBody>
+      </p:sp>
+      <p:sp>
+        <p:nvSpPr>
+          <p:cNvPr id="3" name="Content Placeholder 2">
+            <a:extLst>
+              <a:ext uri="{FF2B5EF4-FFF2-40B4-BE49-F238E27FC236}">
+                <a16:creationId xmlns:a16="http://schemas.microsoft.com/office/drawing/2014/main" id="{4F3D57F9-5D12-25C5-A6B4-27E9D7E906C9}"/>
+              </a:ext>
+            </a:extLst>
+          </p:cNvPr>
+          <p:cNvSpPr>
+            <a:spLocks noGrp="1"/>
+          </p:cNvSpPr>
+          <p:nvPr>
+            <p:ph idx="1"/>
+          </p:nvPr>
+        </p:nvSpPr>
+        <p:spPr>
+          <a:xfrm>
+            <a:off x="365761" y="1325879"/>
+            <a:ext cx="9006840" cy="4402567"/>
+          </a:xfrm>
+        </p:spPr>
+        <p:txBody>
+          <a:bodyPr/>
+          <a:lstStyle/>
+          <a:p>
+            <a:r>
+              <a:rPr lang="en-US" dirty="0"/>
+              <a:t>Machines are expensive and rare resources</a:t>
+            </a:r>
+          </a:p>
+          <a:p>
+            <a:pPr lvl="1"/>
+            <a:r>
+              <a:rPr lang="en-US" dirty="0"/>
+              <a:t>Operating them is also very expensive</a:t>
+            </a:r>
+          </a:p>
+          <a:p>
+            <a:pPr lvl="2"/>
+            <a:r>
+              <a:rPr lang="en-US" dirty="0">
+                <a:solidFill>
+                  <a:srgbClr val="C00000"/>
+                </a:solidFill>
+              </a:rPr>
+              <a:t>If you made a mistake in your input parameters and got garbage results on a large scale run, you just wasted hundreds of thousands of dollars </a:t>
+            </a:r>
+          </a:p>
+          <a:p>
+            <a:pPr lvl="1"/>
+            <a:r>
+              <a:rPr lang="en-US" dirty="0"/>
+              <a:t>Many people are competing for these resources</a:t>
+            </a:r>
+          </a:p>
+          <a:p>
+            <a:pPr lvl="2"/>
+            <a:r>
+              <a:rPr lang="en-US" dirty="0">
+                <a:solidFill>
+                  <a:srgbClr val="C00000"/>
+                </a:solidFill>
+              </a:rPr>
+              <a:t>Your wasted run is likely to be either your or someone else’s opportunity lost</a:t>
+            </a:r>
+          </a:p>
+          <a:p>
+            <a:pPr lvl="1"/>
+            <a:r>
+              <a:rPr lang="en-US" dirty="0"/>
+              <a:t>You are likely charting new scientific territory</a:t>
+            </a:r>
+          </a:p>
+          <a:p>
+            <a:pPr lvl="2"/>
+            <a:r>
+              <a:rPr lang="en-US" dirty="0">
+                <a:solidFill>
+                  <a:srgbClr val="C00000"/>
+                </a:solidFill>
+              </a:rPr>
+              <a:t>Some aspect of using your code may not have been important before, but may become critical in the new study</a:t>
+            </a:r>
+          </a:p>
+          <a:p>
+            <a:pPr lvl="2"/>
+            <a:r>
+              <a:rPr lang="en-US" dirty="0">
+                <a:solidFill>
+                  <a:srgbClr val="C00000"/>
+                </a:solidFill>
+              </a:rPr>
+              <a:t>Some solver may run up against the limits of its validity</a:t>
+            </a:r>
+          </a:p>
+          <a:p>
+            <a:pPr lvl="2"/>
+            <a:r>
+              <a:rPr lang="en-US" dirty="0">
+                <a:solidFill>
+                  <a:srgbClr val="C00000"/>
+                </a:solidFill>
+              </a:rPr>
+              <a:t>Inflight correction may be needed to parameters to continue with the study</a:t>
+            </a:r>
+          </a:p>
+          <a:p>
+            <a:r>
+              <a:rPr lang="en-US" dirty="0"/>
+              <a:t>Aim for no surprises, but be prepared for them</a:t>
+            </a:r>
+          </a:p>
+        </p:txBody>
+      </p:sp>
+      <p:sp>
+        <p:nvSpPr>
+          <p:cNvPr id="4" name="Rectangle 3">
+            <a:extLst>
+              <a:ext uri="{FF2B5EF4-FFF2-40B4-BE49-F238E27FC236}">
+                <a16:creationId xmlns:a16="http://schemas.microsoft.com/office/drawing/2014/main" id="{F25F886C-EB2B-9191-6F30-62179A7DF7F1}"/>
+              </a:ext>
+            </a:extLst>
+          </p:cNvPr>
+          <p:cNvSpPr/>
+          <p:nvPr/>
+        </p:nvSpPr>
+        <p:spPr>
+          <a:xfrm>
+            <a:off x="9695329" y="1325880"/>
+            <a:ext cx="1869142" cy="4416014"/>
+          </a:xfrm>
+          <a:prstGeom prst="rect">
+            <a:avLst/>
+          </a:prstGeom>
+          <a:solidFill>
+            <a:schemeClr val="accent4">
+              <a:lumMod val="75000"/>
+            </a:schemeClr>
+          </a:solidFill>
+          <a:ln>
+            <a:noFill/>
+          </a:ln>
+          <a:effectLst>
+            <a:outerShdw blurRad="44450" dist="27940" dir="5400000" algn="ctr">
+              <a:srgbClr val="000000">
+                <a:alpha val="32000"/>
+              </a:srgbClr>
+            </a:outerShdw>
+          </a:effectLst>
+        </p:spPr>
+        <p:txBody>
+          <a:bodyPr rot="0" spcFirstLastPara="0" vertOverflow="overflow" horzOverflow="overflow" vert="horz" wrap="square" lIns="121851" tIns="60925" rIns="121851" bIns="60925" numCol="1" spcCol="0" rtlCol="0" fromWordArt="0" anchor="ctr" anchorCtr="0" forceAA="0" compatLnSpc="1">
+            <a:prstTxWarp prst="textNoShape">
+              <a:avLst/>
+            </a:prstTxWarp>
+            <a:noAutofit/>
+          </a:bodyPr>
+          <a:lstStyle/>
+          <a:p>
+            <a:pPr algn="ctr">
+              <a:lnSpc>
+                <a:spcPct val="90000"/>
+              </a:lnSpc>
+            </a:pPr>
+            <a:r>
+              <a:rPr lang="en-US" sz="2000" dirty="0">
+                <a:solidFill>
+                  <a:schemeClr val="bg1"/>
+                </a:solidFill>
+              </a:rPr>
+              <a:t>In the 2005 simulation mentioned earlier, out of 5 teams, ours was the only team that had success in getting good science outcome </a:t>
+            </a:r>
+          </a:p>
+          <a:p>
+            <a:pPr algn="ctr">
+              <a:lnSpc>
+                <a:spcPct val="90000"/>
+              </a:lnSpc>
+            </a:pPr>
+            <a:endParaRPr lang="en-US" sz="2000" dirty="0">
+              <a:solidFill>
+                <a:schemeClr val="bg1"/>
+              </a:solidFill>
+            </a:endParaRPr>
+          </a:p>
+          <a:p>
+            <a:pPr algn="ctr">
+              <a:lnSpc>
+                <a:spcPct val="90000"/>
+              </a:lnSpc>
+            </a:pPr>
+            <a:endParaRPr lang="en-US" sz="2000" dirty="0">
+              <a:solidFill>
+                <a:schemeClr val="bg1"/>
+              </a:solidFill>
+            </a:endParaRPr>
+          </a:p>
+        </p:txBody>
+      </p:sp>
+    </p:spTree>
+    <p:extLst>
+      <p:ext uri="{BB962C8B-B14F-4D97-AF65-F5344CB8AC3E}">
+        <p14:creationId xmlns:p14="http://schemas.microsoft.com/office/powerpoint/2010/main" val="2324504081"/>
+      </p:ext>
+    </p:extLst>
+  </p:cSld>
+  <p:clrMapOvr>
+    <a:masterClrMapping/>
+  </p:clrMapOvr>
+</p:sld>
+</file>
+
+<file path=ppt/slides/slide24.xml><?xml version="1.0" encoding="utf-8"?>
+<p:sld xmlns:a="http://schemas.openxmlformats.org/drawingml/2006/main" xmlns:r="http://schemas.openxmlformats.org/officeDocument/2006/relationships" xmlns:p="http://schemas.openxmlformats.org/presentationml/2006/main">
+  <p:cSld>
+    <p:spTree>
+      <p:nvGrpSpPr>
+        <p:cNvPr id="1" name=""/>
+        <p:cNvGrpSpPr/>
+        <p:nvPr/>
+      </p:nvGrpSpPr>
+      <p:grpSpPr>
+        <a:xfrm>
+          <a:off x="0" y="0"/>
+          <a:ext cx="0" cy="0"/>
+          <a:chOff x="0" y="0"/>
+          <a:chExt cx="0" cy="0"/>
+        </a:xfrm>
+      </p:grpSpPr>
+      <p:sp>
+        <p:nvSpPr>
+          <p:cNvPr id="2" name="Title 1">
+            <a:extLst>
+              <a:ext uri="{FF2B5EF4-FFF2-40B4-BE49-F238E27FC236}">
+                <a16:creationId xmlns:a16="http://schemas.microsoft.com/office/drawing/2014/main" id="{A5235A0F-203F-5BF7-7718-068E3B49D01A}"/>
+              </a:ext>
+            </a:extLst>
+          </p:cNvPr>
+          <p:cNvSpPr>
+            <a:spLocks noGrp="1"/>
+          </p:cNvSpPr>
+          <p:nvPr>
+            <p:ph type="title"/>
+          </p:nvPr>
+        </p:nvSpPr>
+        <p:spPr/>
+        <p:txBody>
+          <a:bodyPr/>
+          <a:lstStyle/>
+          <a:p>
+            <a:r>
+              <a:rPr lang="en-US" dirty="0"/>
+              <a:t>How do you plan</a:t>
+            </a:r>
+          </a:p>
+        </p:txBody>
+      </p:sp>
+      <p:sp>
+        <p:nvSpPr>
+          <p:cNvPr id="3" name="Content Placeholder 2">
+            <a:extLst>
+              <a:ext uri="{FF2B5EF4-FFF2-40B4-BE49-F238E27FC236}">
+                <a16:creationId xmlns:a16="http://schemas.microsoft.com/office/drawing/2014/main" id="{B8E8927D-BD4A-178A-E7C6-FB6DB5E104CB}"/>
+              </a:ext>
+            </a:extLst>
+          </p:cNvPr>
+          <p:cNvSpPr>
+            <a:spLocks noGrp="1"/>
+          </p:cNvSpPr>
+          <p:nvPr>
+            <p:ph idx="1"/>
+          </p:nvPr>
+        </p:nvSpPr>
+        <p:spPr>
+          <a:xfrm>
+            <a:off x="527125" y="1729291"/>
+            <a:ext cx="11369809" cy="4717229"/>
+          </a:xfrm>
+        </p:spPr>
+        <p:txBody>
+          <a:bodyPr/>
+          <a:lstStyle/>
+          <a:p>
+            <a:r>
+              <a:rPr lang="en-US" dirty="0"/>
+              <a:t>Focused verification of the target simulation on the target platform</a:t>
+            </a:r>
+          </a:p>
+          <a:p>
+            <a:pPr lvl="1"/>
+            <a:r>
+              <a:rPr lang="en-US" dirty="0"/>
+              <a:t>Over and above regular testing </a:t>
+            </a:r>
+          </a:p>
+          <a:p>
+            <a:pPr lvl="1"/>
+            <a:r>
+              <a:rPr lang="en-US" dirty="0"/>
+              <a:t>Emphasis on understanding solver validity regime</a:t>
+            </a:r>
+          </a:p>
+          <a:p>
+            <a:pPr lvl="1"/>
+            <a:endParaRPr lang="en-US" dirty="0"/>
+          </a:p>
+          <a:p>
+            <a:r>
+              <a:rPr lang="en-US" dirty="0"/>
+              <a:t>Pathfinder runs to get a good estimate of needed resources</a:t>
+            </a:r>
+          </a:p>
+          <a:p>
+            <a:pPr lvl="1"/>
+            <a:r>
+              <a:rPr lang="en-US" dirty="0"/>
+              <a:t>Cost benefit analysis of fidelity Vs reaching science goals in allocated resources</a:t>
+            </a:r>
+          </a:p>
+        </p:txBody>
+      </p:sp>
+    </p:spTree>
+    <p:extLst>
+      <p:ext uri="{BB962C8B-B14F-4D97-AF65-F5344CB8AC3E}">
+        <p14:creationId xmlns:p14="http://schemas.microsoft.com/office/powerpoint/2010/main" val="3416025368"/>
+      </p:ext>
+    </p:extLst>
+  </p:cSld>
+  <p:clrMapOvr>
+    <a:masterClrMapping/>
+  </p:clrMapOvr>
+</p:sld>
+</file>
+
+<file path=ppt/slides/slide25.xml><?xml version="1.0" encoding="utf-8"?>
+<p:sld xmlns:a="http://schemas.openxmlformats.org/drawingml/2006/main" xmlns:r="http://schemas.openxmlformats.org/officeDocument/2006/relationships" xmlns:p="http://schemas.openxmlformats.org/presentationml/2006/main">
+  <p:cSld>
+    <p:spTree>
+      <p:nvGrpSpPr>
+        <p:cNvPr id="1" name=""/>
+        <p:cNvGrpSpPr/>
+        <p:nvPr/>
+      </p:nvGrpSpPr>
+      <p:grpSpPr>
+        <a:xfrm>
+          <a:off x="0" y="0"/>
+          <a:ext cx="0" cy="0"/>
+          <a:chOff x="0" y="0"/>
+          <a:chExt cx="0" cy="0"/>
+        </a:xfrm>
+      </p:grpSpPr>
+      <p:sp>
+        <p:nvSpPr>
+          <p:cNvPr id="2" name="Title 1">
+            <a:extLst>
+              <a:ext uri="{FF2B5EF4-FFF2-40B4-BE49-F238E27FC236}">
+                <a16:creationId xmlns:a16="http://schemas.microsoft.com/office/drawing/2014/main" id="{A5235A0F-203F-5BF7-7718-068E3B49D01A}"/>
+              </a:ext>
+            </a:extLst>
+          </p:cNvPr>
+          <p:cNvSpPr>
+            <a:spLocks noGrp="1"/>
+          </p:cNvSpPr>
+          <p:nvPr>
+            <p:ph type="title"/>
+          </p:nvPr>
+        </p:nvSpPr>
+        <p:spPr/>
+        <p:txBody>
+          <a:bodyPr/>
+          <a:lstStyle/>
+          <a:p>
+            <a:r>
+              <a:rPr lang="en-US" dirty="0"/>
+              <a:t>How do you plan</a:t>
+            </a:r>
+          </a:p>
+        </p:txBody>
+      </p:sp>
+      <p:sp>
+        <p:nvSpPr>
+          <p:cNvPr id="3" name="Content Placeholder 2">
+            <a:extLst>
+              <a:ext uri="{FF2B5EF4-FFF2-40B4-BE49-F238E27FC236}">
+                <a16:creationId xmlns:a16="http://schemas.microsoft.com/office/drawing/2014/main" id="{B8E8927D-BD4A-178A-E7C6-FB6DB5E104CB}"/>
+              </a:ext>
+            </a:extLst>
+          </p:cNvPr>
+          <p:cNvSpPr>
+            <a:spLocks noGrp="1"/>
+          </p:cNvSpPr>
+          <p:nvPr>
+            <p:ph idx="1"/>
+          </p:nvPr>
+        </p:nvSpPr>
+        <p:spPr>
+          <a:xfrm>
+            <a:off x="365760" y="1159135"/>
+            <a:ext cx="11369809" cy="4717229"/>
+          </a:xfrm>
+        </p:spPr>
+        <p:txBody>
+          <a:bodyPr/>
+          <a:lstStyle/>
+          <a:p>
+            <a:r>
+              <a:rPr lang="en-US" dirty="0"/>
+              <a:t>Develop helpful diagnostics</a:t>
+            </a:r>
+          </a:p>
+          <a:p>
+            <a:pPr lvl="1"/>
+            <a:r>
+              <a:rPr lang="en-US" dirty="0"/>
+              <a:t>Low overhead ways of confirming the health of the run</a:t>
+            </a:r>
+          </a:p>
+          <a:p>
+            <a:pPr lvl="2"/>
+            <a:r>
+              <a:rPr lang="en-US" dirty="0"/>
+              <a:t>Are conserved quantities conserved?</a:t>
+            </a:r>
+          </a:p>
+          <a:p>
+            <a:pPr lvl="2"/>
+            <a:r>
+              <a:rPr lang="en-US" dirty="0"/>
+              <a:t>Has any quantity become unphysical?</a:t>
+            </a:r>
+          </a:p>
+          <a:p>
+            <a:pPr lvl="2"/>
+            <a:endParaRPr lang="en-US" dirty="0"/>
+          </a:p>
+          <a:p>
+            <a:r>
+              <a:rPr lang="en-US" dirty="0"/>
+              <a:t>Develop hierarchy of analysis</a:t>
+            </a:r>
+          </a:p>
+          <a:p>
+            <a:pPr lvl="1"/>
+            <a:r>
+              <a:rPr lang="en-US" dirty="0"/>
+              <a:t>Full analysis of runs is not feasible in flight</a:t>
+            </a:r>
+          </a:p>
+          <a:p>
+            <a:pPr lvl="1"/>
+            <a:r>
+              <a:rPr lang="en-US" dirty="0"/>
+              <a:t>Intermediate level runs can give further insight into health of the simulation</a:t>
+            </a:r>
+          </a:p>
+        </p:txBody>
+      </p:sp>
+    </p:spTree>
+    <p:extLst>
+      <p:ext uri="{BB962C8B-B14F-4D97-AF65-F5344CB8AC3E}">
+        <p14:creationId xmlns:p14="http://schemas.microsoft.com/office/powerpoint/2010/main" val="3873864617"/>
+      </p:ext>
+    </p:extLst>
+  </p:cSld>
+  <p:clrMapOvr>
+    <a:masterClrMapping/>
+  </p:clrMapOvr>
+</p:sld>
+</file>
+
+<file path=ppt/slides/slide26.xml><?xml version="1.0" encoding="utf-8"?>
+<p:sld xmlns:a="http://schemas.openxmlformats.org/drawingml/2006/main" xmlns:r="http://schemas.openxmlformats.org/officeDocument/2006/relationships" xmlns:p="http://schemas.openxmlformats.org/presentationml/2006/main">
+  <p:cSld>
+    <p:spTree>
+      <p:nvGrpSpPr>
+        <p:cNvPr id="1" name=""/>
+        <p:cNvGrpSpPr/>
+        <p:nvPr/>
+      </p:nvGrpSpPr>
+      <p:grpSpPr>
+        <a:xfrm>
+          <a:off x="0" y="0"/>
+          <a:ext cx="0" cy="0"/>
+          <a:chOff x="0" y="0"/>
+          <a:chExt cx="0" cy="0"/>
+        </a:xfrm>
+      </p:grpSpPr>
+      <p:sp>
+        <p:nvSpPr>
+          <p:cNvPr id="2" name="Title 1">
+            <a:extLst>
+              <a:ext uri="{FF2B5EF4-FFF2-40B4-BE49-F238E27FC236}">
+                <a16:creationId xmlns:a16="http://schemas.microsoft.com/office/drawing/2014/main" id="{532AD9BB-395B-66A5-5D5E-B94329EF58ED}"/>
+              </a:ext>
+            </a:extLst>
+          </p:cNvPr>
+          <p:cNvSpPr>
+            <a:spLocks noGrp="1"/>
+          </p:cNvSpPr>
+          <p:nvPr>
+            <p:ph type="title"/>
+          </p:nvPr>
+        </p:nvSpPr>
+        <p:spPr/>
+        <p:txBody>
+          <a:bodyPr/>
+          <a:lstStyle/>
+          <a:p>
+            <a:r>
+              <a:rPr lang="en-US" dirty="0"/>
+              <a:t>Story of one simulation campaign</a:t>
+            </a:r>
+          </a:p>
+        </p:txBody>
+      </p:sp>
+      <p:sp>
+        <p:nvSpPr>
+          <p:cNvPr id="3" name="Content Placeholder 2">
+            <a:extLst>
+              <a:ext uri="{FF2B5EF4-FFF2-40B4-BE49-F238E27FC236}">
+                <a16:creationId xmlns:a16="http://schemas.microsoft.com/office/drawing/2014/main" id="{13C86A4D-96BB-6C1B-67D4-D498DE9DAFF2}"/>
+              </a:ext>
+            </a:extLst>
+          </p:cNvPr>
+          <p:cNvSpPr>
+            <a:spLocks noGrp="1"/>
+          </p:cNvSpPr>
+          <p:nvPr>
+            <p:ph idx="1"/>
+          </p:nvPr>
+        </p:nvSpPr>
+        <p:spPr>
+          <a:xfrm>
+            <a:off x="409507" y="1405111"/>
+            <a:ext cx="11369809" cy="4047778"/>
+          </a:xfrm>
+        </p:spPr>
+        <p:txBody>
+          <a:bodyPr/>
+          <a:lstStyle/>
+          <a:p>
+            <a:r>
+              <a:rPr lang="en-US" dirty="0"/>
+              <a:t>Theory of Type </a:t>
+            </a:r>
+            <a:r>
+              <a:rPr lang="en-US" dirty="0" err="1"/>
+              <a:t>Ia</a:t>
+            </a:r>
+            <a:r>
+              <a:rPr lang="en-US" dirty="0"/>
+              <a:t> supernova explosion – 2006/2007</a:t>
+            </a:r>
+          </a:p>
+          <a:p>
+            <a:pPr lvl="1"/>
+            <a:r>
+              <a:rPr lang="en-US" dirty="0"/>
+              <a:t>Evidence from observations: </a:t>
+            </a:r>
+          </a:p>
+          <a:p>
+            <a:pPr lvl="2"/>
+            <a:r>
+              <a:rPr lang="en-US" dirty="0"/>
+              <a:t>Light curve powered by Ni56 decay</a:t>
+            </a:r>
+          </a:p>
+          <a:p>
+            <a:pPr lvl="2"/>
+            <a:r>
+              <a:rPr lang="en-US" dirty="0"/>
+              <a:t>Evidence of medium weight elements, but in much smaller quantities</a:t>
+            </a:r>
+          </a:p>
+          <a:p>
+            <a:pPr lvl="1"/>
+            <a:r>
+              <a:rPr lang="en-US" dirty="0"/>
+              <a:t>Implied transition from deflagration to detonation</a:t>
+            </a:r>
+          </a:p>
+          <a:p>
+            <a:r>
+              <a:rPr lang="en-US" dirty="0"/>
+              <a:t>A 2D exploratory run had given a tantalizing answer to how?</a:t>
+            </a:r>
+          </a:p>
+          <a:p>
+            <a:pPr lvl="1"/>
+            <a:r>
+              <a:rPr lang="en-US" dirty="0"/>
+              <a:t>To confirm a full 3D run was needed at good enough resolution</a:t>
+            </a:r>
+          </a:p>
+          <a:p>
+            <a:pPr lvl="1"/>
+            <a:r>
+              <a:rPr lang="en-US" dirty="0"/>
+              <a:t>It would be the largest run of its kind at the time – totally uncharted territory</a:t>
+            </a:r>
+          </a:p>
+          <a:p>
+            <a:pPr lvl="1"/>
+            <a:r>
+              <a:rPr lang="en-US" dirty="0"/>
+              <a:t>Until then 3D runs had been octants relying on symmetry</a:t>
+            </a:r>
+          </a:p>
+          <a:p>
+            <a:pPr lvl="2"/>
+            <a:r>
+              <a:rPr lang="en-US" dirty="0"/>
+              <a:t>The 2D run had shown that symmetry had to be avoided</a:t>
+            </a:r>
+          </a:p>
+        </p:txBody>
+      </p:sp>
+    </p:spTree>
+    <p:extLst>
+      <p:ext uri="{BB962C8B-B14F-4D97-AF65-F5344CB8AC3E}">
+        <p14:creationId xmlns:p14="http://schemas.microsoft.com/office/powerpoint/2010/main" val="936705717"/>
+      </p:ext>
+    </p:extLst>
+  </p:cSld>
+  <p:clrMapOvr>
+    <a:masterClrMapping/>
+  </p:clrMapOvr>
+</p:sld>
+</file>
+
+<file path=ppt/slides/slide27.xml><?xml version="1.0" encoding="utf-8"?>
+<p:sld xmlns:a="http://schemas.openxmlformats.org/drawingml/2006/main" xmlns:r="http://schemas.openxmlformats.org/officeDocument/2006/relationships" xmlns:p="http://schemas.openxmlformats.org/presentationml/2006/main">
+  <p:cSld>
+    <p:spTree>
+      <p:nvGrpSpPr>
+        <p:cNvPr id="1" name=""/>
+        <p:cNvGrpSpPr/>
+        <p:nvPr/>
+      </p:nvGrpSpPr>
+      <p:grpSpPr>
+        <a:xfrm>
+          <a:off x="0" y="0"/>
+          <a:ext cx="0" cy="0"/>
+          <a:chOff x="0" y="0"/>
+          <a:chExt cx="0" cy="0"/>
+        </a:xfrm>
+      </p:grpSpPr>
+      <p:sp>
+        <p:nvSpPr>
+          <p:cNvPr id="2" name="Title 1">
+            <a:extLst>
+              <a:ext uri="{FF2B5EF4-FFF2-40B4-BE49-F238E27FC236}">
+                <a16:creationId xmlns:a16="http://schemas.microsoft.com/office/drawing/2014/main" id="{3DAE27AA-E90C-9E73-9F78-A1907E2A009C}"/>
+              </a:ext>
+            </a:extLst>
+          </p:cNvPr>
+          <p:cNvSpPr>
+            <a:spLocks noGrp="1"/>
+          </p:cNvSpPr>
+          <p:nvPr>
+            <p:ph type="title"/>
+          </p:nvPr>
+        </p:nvSpPr>
+        <p:spPr/>
+        <p:txBody>
+          <a:bodyPr/>
+          <a:lstStyle/>
+          <a:p>
+            <a:r>
+              <a:rPr lang="en-US" dirty="0"/>
+              <a:t>Preparation Steps</a:t>
+            </a:r>
+          </a:p>
+        </p:txBody>
+      </p:sp>
+      <p:sp>
+        <p:nvSpPr>
+          <p:cNvPr id="3" name="Content Placeholder 2">
+            <a:extLst>
+              <a:ext uri="{FF2B5EF4-FFF2-40B4-BE49-F238E27FC236}">
+                <a16:creationId xmlns:a16="http://schemas.microsoft.com/office/drawing/2014/main" id="{47F33A05-64E3-D838-EAB7-99CE5B676A05}"/>
+              </a:ext>
+            </a:extLst>
+          </p:cNvPr>
+          <p:cNvSpPr>
+            <a:spLocks noGrp="1"/>
+          </p:cNvSpPr>
+          <p:nvPr>
+            <p:ph idx="1"/>
+          </p:nvPr>
+        </p:nvSpPr>
+        <p:spPr/>
+        <p:txBody>
+          <a:bodyPr/>
+          <a:lstStyle/>
+          <a:p>
+            <a:r>
+              <a:rPr lang="en-US" dirty="0"/>
+              <a:t>Step 1 – develop a test that represents the most complex physics interactions</a:t>
+            </a:r>
+          </a:p>
+          <a:p>
+            <a:r>
+              <a:rPr lang="en-US" dirty="0"/>
+              <a:t>Challenges:</a:t>
+            </a:r>
+          </a:p>
+          <a:p>
+            <a:pPr lvl="1"/>
+            <a:r>
+              <a:rPr lang="en-US" dirty="0"/>
+              <a:t>Features take a long time to develop</a:t>
+            </a:r>
+          </a:p>
+          <a:p>
+            <a:pPr lvl="1"/>
+            <a:r>
+              <a:rPr lang="en-US" dirty="0"/>
+              <a:t>Want to ensure that at least one refinement step occurs during the test</a:t>
+            </a:r>
+          </a:p>
+          <a:p>
+            <a:pPr lvl="1"/>
+            <a:r>
+              <a:rPr lang="en-US" dirty="0"/>
+              <a:t>IO too slow to restart from a large checkpoint at late stage of the run</a:t>
+            </a:r>
+          </a:p>
+          <a:p>
+            <a:pPr lvl="2"/>
+            <a:r>
+              <a:rPr lang="en-US" dirty="0"/>
+              <a:t>Also test would need a large chunk of the machine</a:t>
+            </a:r>
+          </a:p>
+          <a:p>
+            <a:r>
+              <a:rPr lang="en-US" dirty="0"/>
+              <a:t>Use physics understanding to create initial conditions that would quickly develop comparable complexity</a:t>
+            </a:r>
+          </a:p>
+          <a:p>
+            <a:pPr lvl="1"/>
+            <a:endParaRPr lang="en-US" dirty="0"/>
+          </a:p>
+        </p:txBody>
+      </p:sp>
+    </p:spTree>
+    <p:extLst>
+      <p:ext uri="{BB962C8B-B14F-4D97-AF65-F5344CB8AC3E}">
+        <p14:creationId xmlns:p14="http://schemas.microsoft.com/office/powerpoint/2010/main" val="1970226240"/>
+      </p:ext>
+    </p:extLst>
+  </p:cSld>
+  <p:clrMapOvr>
+    <a:masterClrMapping/>
+  </p:clrMapOvr>
+</p:sld>
+</file>
+
+<file path=ppt/slides/slide28.xml><?xml version="1.0" encoding="utf-8"?>
+<p:sld xmlns:a="http://schemas.openxmlformats.org/drawingml/2006/main" xmlns:r="http://schemas.openxmlformats.org/officeDocument/2006/relationships" xmlns:p="http://schemas.openxmlformats.org/presentationml/2006/main">
+  <p:cSld>
+    <p:spTree>
+      <p:nvGrpSpPr>
+        <p:cNvPr id="1" name=""/>
+        <p:cNvGrpSpPr/>
+        <p:nvPr/>
+      </p:nvGrpSpPr>
+      <p:grpSpPr>
+        <a:xfrm>
+          <a:off x="0" y="0"/>
+          <a:ext cx="0" cy="0"/>
+          <a:chOff x="0" y="0"/>
+          <a:chExt cx="0" cy="0"/>
+        </a:xfrm>
+      </p:grpSpPr>
+      <p:sp>
+        <p:nvSpPr>
+          <p:cNvPr id="2" name="Title 1">
+            <a:extLst>
+              <a:ext uri="{FF2B5EF4-FFF2-40B4-BE49-F238E27FC236}">
+                <a16:creationId xmlns:a16="http://schemas.microsoft.com/office/drawing/2014/main" id="{3DAE27AA-E90C-9E73-9F78-A1907E2A009C}"/>
+              </a:ext>
+            </a:extLst>
+          </p:cNvPr>
+          <p:cNvSpPr>
+            <a:spLocks noGrp="1"/>
+          </p:cNvSpPr>
+          <p:nvPr>
+            <p:ph type="title"/>
+          </p:nvPr>
+        </p:nvSpPr>
+        <p:spPr/>
+        <p:txBody>
+          <a:bodyPr/>
+          <a:lstStyle/>
+          <a:p>
+            <a:r>
+              <a:rPr lang="en-US" dirty="0"/>
+              <a:t>Preparation Steps</a:t>
+            </a:r>
+          </a:p>
+        </p:txBody>
+      </p:sp>
+      <p:sp>
+        <p:nvSpPr>
+          <p:cNvPr id="3" name="Content Placeholder 2">
+            <a:extLst>
+              <a:ext uri="{FF2B5EF4-FFF2-40B4-BE49-F238E27FC236}">
+                <a16:creationId xmlns:a16="http://schemas.microsoft.com/office/drawing/2014/main" id="{47F33A05-64E3-D838-EAB7-99CE5B676A05}"/>
+              </a:ext>
+            </a:extLst>
+          </p:cNvPr>
+          <p:cNvSpPr>
+            <a:spLocks noGrp="1"/>
+          </p:cNvSpPr>
+          <p:nvPr>
+            <p:ph idx="1"/>
+          </p:nvPr>
+        </p:nvSpPr>
+        <p:spPr/>
+        <p:txBody>
+          <a:bodyPr/>
+          <a:lstStyle/>
+          <a:p>
+            <a:r>
+              <a:rPr lang="en-US" dirty="0"/>
+              <a:t>Step 2 – Use the new test to characterize the performance behavior of the target platform</a:t>
+            </a:r>
+          </a:p>
+          <a:p>
+            <a:r>
+              <a:rPr lang="en-US" dirty="0"/>
+              <a:t>Motivation:</a:t>
+            </a:r>
+          </a:p>
+          <a:p>
+            <a:pPr lvl="1"/>
+            <a:r>
+              <a:rPr lang="en-US" dirty="0"/>
+              <a:t>Standard performance studies could not give crucial information</a:t>
+            </a:r>
+          </a:p>
+          <a:p>
+            <a:pPr lvl="1"/>
+            <a:r>
+              <a:rPr lang="en-US" dirty="0"/>
+              <a:t>AMR refinement patterns make each application different</a:t>
+            </a:r>
+          </a:p>
+          <a:p>
+            <a:pPr lvl="1"/>
+            <a:r>
+              <a:rPr lang="en-US" dirty="0"/>
+              <a:t>Interoperability and trade-off opportunities needed to explored in a closely resembling simulation behavior</a:t>
+            </a:r>
+          </a:p>
+          <a:p>
+            <a:r>
+              <a:rPr lang="en-US" dirty="0"/>
+              <a:t>Full fidelity 2D runs, and a set of runs of the new test provided enough information to extrapolate and estimate needed CPU hours </a:t>
+            </a:r>
+          </a:p>
+          <a:p>
+            <a:pPr lvl="1"/>
+            <a:endParaRPr lang="en-US" dirty="0"/>
+          </a:p>
+        </p:txBody>
+      </p:sp>
+    </p:spTree>
+    <p:extLst>
+      <p:ext uri="{BB962C8B-B14F-4D97-AF65-F5344CB8AC3E}">
+        <p14:creationId xmlns:p14="http://schemas.microsoft.com/office/powerpoint/2010/main" val="1965150740"/>
+      </p:ext>
+    </p:extLst>
+  </p:cSld>
+  <p:clrMapOvr>
+    <a:masterClrMapping/>
+  </p:clrMapOvr>
+</p:sld>
+</file>
+
+<file path=ppt/slides/slide29.xml><?xml version="1.0" encoding="utf-8"?>
+<p:sld xmlns:a="http://schemas.openxmlformats.org/drawingml/2006/main" xmlns:r="http://schemas.openxmlformats.org/officeDocument/2006/relationships" xmlns:p="http://schemas.openxmlformats.org/presentationml/2006/main">
+  <p:cSld>
+    <p:spTree>
+      <p:nvGrpSpPr>
+        <p:cNvPr id="1" name=""/>
+        <p:cNvGrpSpPr/>
+        <p:nvPr/>
+      </p:nvGrpSpPr>
+      <p:grpSpPr>
+        <a:xfrm>
+          <a:off x="0" y="0"/>
+          <a:ext cx="0" cy="0"/>
+          <a:chOff x="0" y="0"/>
+          <a:chExt cx="0" cy="0"/>
+        </a:xfrm>
+      </p:grpSpPr>
+      <p:sp>
+        <p:nvSpPr>
+          <p:cNvPr id="2" name="Title 1">
+            <a:extLst>
+              <a:ext uri="{FF2B5EF4-FFF2-40B4-BE49-F238E27FC236}">
+                <a16:creationId xmlns:a16="http://schemas.microsoft.com/office/drawing/2014/main" id="{3DAE27AA-E90C-9E73-9F78-A1907E2A009C}"/>
+              </a:ext>
+            </a:extLst>
+          </p:cNvPr>
+          <p:cNvSpPr>
+            <a:spLocks noGrp="1"/>
+          </p:cNvSpPr>
+          <p:nvPr>
+            <p:ph type="title"/>
+          </p:nvPr>
+        </p:nvSpPr>
+        <p:spPr/>
+        <p:txBody>
+          <a:bodyPr/>
+          <a:lstStyle/>
+          <a:p>
+            <a:r>
+              <a:rPr lang="en-US" dirty="0"/>
+              <a:t>Preparation Steps</a:t>
+            </a:r>
+          </a:p>
+        </p:txBody>
+      </p:sp>
+      <p:sp>
+        <p:nvSpPr>
+          <p:cNvPr id="3" name="Content Placeholder 2">
+            <a:extLst>
+              <a:ext uri="{FF2B5EF4-FFF2-40B4-BE49-F238E27FC236}">
+                <a16:creationId xmlns:a16="http://schemas.microsoft.com/office/drawing/2014/main" id="{47F33A05-64E3-D838-EAB7-99CE5B676A05}"/>
+              </a:ext>
+            </a:extLst>
+          </p:cNvPr>
+          <p:cNvSpPr>
+            <a:spLocks noGrp="1"/>
+          </p:cNvSpPr>
+          <p:nvPr>
+            <p:ph idx="1"/>
+          </p:nvPr>
+        </p:nvSpPr>
+        <p:spPr>
+          <a:xfrm>
+            <a:off x="365760" y="1737360"/>
+            <a:ext cx="11212158" cy="4047778"/>
+          </a:xfrm>
+        </p:spPr>
+        <p:txBody>
+          <a:bodyPr/>
+          <a:lstStyle/>
+          <a:p>
+            <a:r>
+              <a:rPr lang="en-US" dirty="0"/>
+              <a:t>Step 3 – Look for trade-offs and optimization opportunities</a:t>
+            </a:r>
+          </a:p>
+          <a:p>
+            <a:r>
+              <a:rPr lang="en-US" dirty="0"/>
+              <a:t>Motivation:</a:t>
+            </a:r>
+          </a:p>
+          <a:p>
+            <a:pPr lvl="1"/>
+            <a:r>
+              <a:rPr lang="en-US" dirty="0"/>
+              <a:t>Initial CPU estimates too high to complete the runs within allocations</a:t>
+            </a:r>
+          </a:p>
+          <a:p>
+            <a:pPr lvl="1"/>
+            <a:r>
+              <a:rPr lang="en-US" dirty="0"/>
+              <a:t>Exploration of any parameter space needs to minimize individual run times</a:t>
+            </a:r>
+          </a:p>
+          <a:p>
+            <a:r>
+              <a:rPr lang="en-US" dirty="0"/>
+              <a:t>Many opportunities were found, documented in reference below. Some examples:</a:t>
+            </a:r>
+          </a:p>
+          <a:p>
+            <a:pPr lvl="1"/>
+            <a:r>
+              <a:rPr lang="en-US" dirty="0"/>
+              <a:t>Tilt the star along the direction of rising bubble to get symmetry in gravity computation</a:t>
+            </a:r>
+          </a:p>
+          <a:p>
+            <a:pPr lvl="1"/>
+            <a:r>
+              <a:rPr lang="en-US" dirty="0"/>
+              <a:t>Remove subsampling in gravity </a:t>
+            </a:r>
+          </a:p>
+          <a:p>
+            <a:pPr lvl="1"/>
+            <a:r>
+              <a:rPr lang="en-US" dirty="0"/>
+              <a:t>Offload nuclear burning to post-processing</a:t>
+            </a:r>
+          </a:p>
+          <a:p>
+            <a:pPr marL="0" indent="0">
+              <a:buNone/>
+            </a:pPr>
+            <a:r>
+              <a:rPr lang="en-US" dirty="0"/>
+              <a:t>    </a:t>
+            </a:r>
+            <a:endParaRPr lang="en-US" sz="1800" dirty="0"/>
+          </a:p>
+        </p:txBody>
+      </p:sp>
+      <p:sp>
+        <p:nvSpPr>
+          <p:cNvPr id="4" name="TextBox 3">
+            <a:extLst>
+              <a:ext uri="{FF2B5EF4-FFF2-40B4-BE49-F238E27FC236}">
+                <a16:creationId xmlns:a16="http://schemas.microsoft.com/office/drawing/2014/main" id="{D7C1379D-FEB9-988E-EB01-3C17171B996C}"/>
+              </a:ext>
+            </a:extLst>
+          </p:cNvPr>
+          <p:cNvSpPr txBox="1"/>
+          <p:nvPr/>
+        </p:nvSpPr>
+        <p:spPr>
+          <a:xfrm>
+            <a:off x="189603" y="5854986"/>
+            <a:ext cx="7636585" cy="683264"/>
+          </a:xfrm>
+          <a:prstGeom prst="rect">
+            <a:avLst/>
+          </a:prstGeom>
+          <a:noFill/>
+        </p:spPr>
+        <p:txBody>
+          <a:bodyPr wrap="square" lIns="118872" tIns="91440" rIns="118872" bIns="91440" rtlCol="0" anchor="ctr" anchorCtr="0">
+            <a:normAutofit fontScale="85000" lnSpcReduction="20000"/>
+          </a:bodyPr>
+          <a:lstStyle/>
+          <a:p>
+            <a:pPr>
+              <a:lnSpc>
+                <a:spcPct val="90000"/>
+              </a:lnSpc>
+            </a:pPr>
+            <a:r>
+              <a:rPr lang="en-US" dirty="0">
+                <a:solidFill>
+                  <a:srgbClr val="C00000"/>
+                </a:solidFill>
+              </a:rPr>
+              <a:t>Dubey A, Calder AC, Daley C, et al. Pragmatic optimizations for better scientific utilization of large supercomputers. The International Journal of High Performance Computing Applications. 2013;27(3):360-373. doi:10.1177/1094342012464404</a:t>
+            </a:r>
+          </a:p>
+        </p:txBody>
+      </p:sp>
+    </p:spTree>
+    <p:extLst>
+      <p:ext uri="{BB962C8B-B14F-4D97-AF65-F5344CB8AC3E}">
+        <p14:creationId xmlns:p14="http://schemas.microsoft.com/office/powerpoint/2010/main" val="3984054953"/>
       </p:ext>
     </p:extLst>
   </p:cSld>
@@ -8327,6 +10053,237 @@
     <p:extLst>
       <p:ext uri="{BB962C8B-B14F-4D97-AF65-F5344CB8AC3E}">
         <p14:creationId xmlns:p14="http://schemas.microsoft.com/office/powerpoint/2010/main" val="65008830"/>
+      </p:ext>
+    </p:extLst>
+  </p:cSld>
+  <p:clrMapOvr>
+    <a:masterClrMapping/>
+  </p:clrMapOvr>
+</p:sld>
+</file>
+
+<file path=ppt/slides/slide30.xml><?xml version="1.0" encoding="utf-8"?>
+<p:sld xmlns:a="http://schemas.openxmlformats.org/drawingml/2006/main" xmlns:r="http://schemas.openxmlformats.org/officeDocument/2006/relationships" xmlns:p="http://schemas.openxmlformats.org/presentationml/2006/main">
+  <p:cSld>
+    <p:spTree>
+      <p:nvGrpSpPr>
+        <p:cNvPr id="1" name=""/>
+        <p:cNvGrpSpPr/>
+        <p:nvPr/>
+      </p:nvGrpSpPr>
+      <p:grpSpPr>
+        <a:xfrm>
+          <a:off x="0" y="0"/>
+          <a:ext cx="0" cy="0"/>
+          <a:chOff x="0" y="0"/>
+          <a:chExt cx="0" cy="0"/>
+        </a:xfrm>
+      </p:grpSpPr>
+      <p:sp>
+        <p:nvSpPr>
+          <p:cNvPr id="2" name="Title 1">
+            <a:extLst>
+              <a:ext uri="{FF2B5EF4-FFF2-40B4-BE49-F238E27FC236}">
+                <a16:creationId xmlns:a16="http://schemas.microsoft.com/office/drawing/2014/main" id="{3DAE27AA-E90C-9E73-9F78-A1907E2A009C}"/>
+              </a:ext>
+            </a:extLst>
+          </p:cNvPr>
+          <p:cNvSpPr>
+            <a:spLocks noGrp="1"/>
+          </p:cNvSpPr>
+          <p:nvPr>
+            <p:ph type="title"/>
+          </p:nvPr>
+        </p:nvSpPr>
+        <p:spPr/>
+        <p:txBody>
+          <a:bodyPr/>
+          <a:lstStyle/>
+          <a:p>
+            <a:r>
+              <a:rPr lang="en-US" dirty="0"/>
+              <a:t>Preparation Steps</a:t>
+            </a:r>
+          </a:p>
+        </p:txBody>
+      </p:sp>
+      <p:sp>
+        <p:nvSpPr>
+          <p:cNvPr id="3" name="Content Placeholder 2">
+            <a:extLst>
+              <a:ext uri="{FF2B5EF4-FFF2-40B4-BE49-F238E27FC236}">
+                <a16:creationId xmlns:a16="http://schemas.microsoft.com/office/drawing/2014/main" id="{47F33A05-64E3-D838-EAB7-99CE5B676A05}"/>
+              </a:ext>
+            </a:extLst>
+          </p:cNvPr>
+          <p:cNvSpPr>
+            <a:spLocks noGrp="1"/>
+          </p:cNvSpPr>
+          <p:nvPr>
+            <p:ph idx="1"/>
+          </p:nvPr>
+        </p:nvSpPr>
+        <p:spPr>
+          <a:xfrm>
+            <a:off x="271631" y="1405111"/>
+            <a:ext cx="11212158" cy="4047778"/>
+          </a:xfrm>
+        </p:spPr>
+        <p:txBody>
+          <a:bodyPr/>
+          <a:lstStyle/>
+          <a:p>
+            <a:r>
+              <a:rPr lang="en-US" dirty="0"/>
+              <a:t>Step 4 – Prepare diagnostics and quick analysis mechanism</a:t>
+            </a:r>
+          </a:p>
+          <a:p>
+            <a:r>
+              <a:rPr lang="en-US" dirty="0"/>
+              <a:t>Examples-- diagnostics</a:t>
+            </a:r>
+          </a:p>
+          <a:p>
+            <a:pPr lvl="1"/>
+            <a:r>
+              <a:rPr lang="en-US" dirty="0"/>
+              <a:t>Conservation of mass, momentum energy</a:t>
+            </a:r>
+          </a:p>
+          <a:p>
+            <a:pPr lvl="1"/>
+            <a:r>
+              <a:rPr lang="en-US" dirty="0"/>
+              <a:t>Changes in dt recorded in the logfiles</a:t>
+            </a:r>
+          </a:p>
+          <a:p>
+            <a:pPr lvl="1"/>
+            <a:r>
+              <a:rPr lang="en-US" dirty="0"/>
+              <a:t>Spikes in variable values</a:t>
+            </a:r>
+          </a:p>
+          <a:p>
+            <a:r>
+              <a:rPr lang="en-US" dirty="0"/>
+              <a:t>Examples – quick analysis</a:t>
+            </a:r>
+          </a:p>
+          <a:p>
+            <a:pPr lvl="1"/>
+            <a:r>
+              <a:rPr lang="en-US" dirty="0"/>
+              <a:t>Quick visualization of random 2D slices</a:t>
+            </a:r>
+          </a:p>
+          <a:p>
+            <a:pPr lvl="1"/>
+            <a:r>
+              <a:rPr lang="en-US" sz="1800" dirty="0"/>
+              <a:t>Inspection of critical quantities in 1D</a:t>
+            </a:r>
+          </a:p>
+          <a:p>
+            <a:pPr marL="346075" lvl="1" indent="0">
+              <a:buNone/>
+            </a:pPr>
+            <a:endParaRPr lang="en-US" sz="1800" dirty="0"/>
+          </a:p>
+        </p:txBody>
+      </p:sp>
+    </p:spTree>
+    <p:extLst>
+      <p:ext uri="{BB962C8B-B14F-4D97-AF65-F5344CB8AC3E}">
+        <p14:creationId xmlns:p14="http://schemas.microsoft.com/office/powerpoint/2010/main" val="2623341437"/>
+      </p:ext>
+    </p:extLst>
+  </p:cSld>
+  <p:clrMapOvr>
+    <a:masterClrMapping/>
+  </p:clrMapOvr>
+</p:sld>
+</file>
+
+<file path=ppt/slides/slide31.xml><?xml version="1.0" encoding="utf-8"?>
+<p:sld xmlns:a="http://schemas.openxmlformats.org/drawingml/2006/main" xmlns:r="http://schemas.openxmlformats.org/officeDocument/2006/relationships" xmlns:p="http://schemas.openxmlformats.org/presentationml/2006/main">
+  <p:cSld>
+    <p:spTree>
+      <p:nvGrpSpPr>
+        <p:cNvPr id="1" name=""/>
+        <p:cNvGrpSpPr/>
+        <p:nvPr/>
+      </p:nvGrpSpPr>
+      <p:grpSpPr>
+        <a:xfrm>
+          <a:off x="0" y="0"/>
+          <a:ext cx="0" cy="0"/>
+          <a:chOff x="0" y="0"/>
+          <a:chExt cx="0" cy="0"/>
+        </a:xfrm>
+      </p:grpSpPr>
+      <p:sp>
+        <p:nvSpPr>
+          <p:cNvPr id="2" name="Title 1">
+            <a:extLst>
+              <a:ext uri="{FF2B5EF4-FFF2-40B4-BE49-F238E27FC236}">
+                <a16:creationId xmlns:a16="http://schemas.microsoft.com/office/drawing/2014/main" id="{05DA5443-06A3-D891-A1ED-0775C4969FCF}"/>
+              </a:ext>
+            </a:extLst>
+          </p:cNvPr>
+          <p:cNvSpPr>
+            <a:spLocks noGrp="1"/>
+          </p:cNvSpPr>
+          <p:nvPr>
+            <p:ph type="title"/>
+          </p:nvPr>
+        </p:nvSpPr>
+        <p:spPr/>
+        <p:txBody>
+          <a:bodyPr/>
+          <a:lstStyle/>
+          <a:p>
+            <a:r>
+              <a:rPr lang="en-US" dirty="0"/>
+              <a:t>Summary, Takeaway </a:t>
+            </a:r>
+            <a:r>
+              <a:rPr lang="en-US"/>
+              <a:t>and Resources</a:t>
+            </a:r>
+          </a:p>
+        </p:txBody>
+      </p:sp>
+      <p:sp>
+        <p:nvSpPr>
+          <p:cNvPr id="3" name="Content Placeholder 2">
+            <a:extLst>
+              <a:ext uri="{FF2B5EF4-FFF2-40B4-BE49-F238E27FC236}">
+                <a16:creationId xmlns:a16="http://schemas.microsoft.com/office/drawing/2014/main" id="{CD6C7F32-4FC0-4D35-E8CC-D5A39F47C9BD}"/>
+              </a:ext>
+            </a:extLst>
+          </p:cNvPr>
+          <p:cNvSpPr>
+            <a:spLocks noGrp="1"/>
+          </p:cNvSpPr>
+          <p:nvPr>
+            <p:ph idx="1"/>
+          </p:nvPr>
+        </p:nvSpPr>
+        <p:spPr/>
+        <p:txBody>
+          <a:bodyPr/>
+          <a:lstStyle/>
+          <a:p>
+            <a:endParaRPr lang="en-US"/>
+          </a:p>
+        </p:txBody>
+      </p:sp>
+    </p:spTree>
+    <p:extLst>
+      <p:ext uri="{BB962C8B-B14F-4D97-AF65-F5344CB8AC3E}">
+        <p14:creationId xmlns:p14="http://schemas.microsoft.com/office/powerpoint/2010/main" val="2035090352"/>
       </p:ext>
     </p:extLst>
   </p:cSld>
@@ -10491,7 +12448,7 @@
             </a:br>
             <a:r>
               <a:rPr lang="en-US" sz="2000" b="0" dirty="0"/>
-              <a:t>Last 15 minutes of workday if for cleaning</a:t>
+              <a:t>Last 15 minutes of workday is for cleaning</a:t>
             </a:r>
           </a:p>
         </p:txBody>
@@ -11929,21 +13886,6 @@
 </file>
 
 <file path=customXml/item1.xml><?xml version="1.0" encoding="utf-8"?>
-<?mso-contentType ?>
-<FormTemplates xmlns="http://schemas.microsoft.com/sharepoint/v3/contenttype/forms">
-  <Display>DocumentLibraryForm</Display>
-  <Edit>DocumentLibraryForm</Edit>
-  <New>DocumentLibraryForm</New>
-</FormTemplates>
-</file>
-
-<file path=customXml/item2.xml><?xml version="1.0" encoding="utf-8"?>
-<p:properties xmlns:p="http://schemas.microsoft.com/office/2006/metadata/properties" xmlns:xsi="http://www.w3.org/2001/XMLSchema-instance" xmlns:pc="http://schemas.microsoft.com/office/infopath/2007/PartnerControls">
-  <documentManagement/>
-</p:properties>
-</file>
-
-<file path=customXml/item3.xml><?xml version="1.0" encoding="utf-8"?>
 <ct:contentTypeSchema xmlns:ct="http://schemas.microsoft.com/office/2006/metadata/contentType" xmlns:ma="http://schemas.microsoft.com/office/2006/metadata/properties/metaAttributes" ct:_="" ma:_="" ma:contentTypeName="Document" ma:contentTypeID="0x010100565464437F680748A68B85EB6594EA7D" ma:contentTypeVersion="0" ma:contentTypeDescription="Create a new document." ma:contentTypeScope="" ma:versionID="fe3f4dd58d5914c51cfc6deaa8ad845c">
   <xsd:schema xmlns:xsd="http://www.w3.org/2001/XMLSchema" xmlns:p="http://schemas.microsoft.com/office/2006/metadata/properties" targetNamespace="http://schemas.microsoft.com/office/2006/metadata/properties" ma:root="true" ma:fieldsID="4aeb20c0e3442673af7ee10786458764">
     <xsd:element name="properties">
@@ -11992,10 +13934,32 @@
 </ct:contentTypeSchema>
 </file>
 
+<file path=customXml/item2.xml><?xml version="1.0" encoding="utf-8"?>
+<p:properties xmlns:p="http://schemas.microsoft.com/office/2006/metadata/properties" xmlns:xsi="http://www.w3.org/2001/XMLSchema-instance" xmlns:pc="http://schemas.microsoft.com/office/infopath/2007/PartnerControls">
+  <documentManagement/>
+</p:properties>
+</file>
+
+<file path=customXml/item3.xml><?xml version="1.0" encoding="utf-8"?>
+<?mso-contentType ?>
+<FormTemplates xmlns="http://schemas.microsoft.com/sharepoint/v3/contenttype/forms">
+  <Display>DocumentLibraryForm</Display>
+  <Edit>DocumentLibraryForm</Edit>
+  <New>DocumentLibraryForm</New>
+</FormTemplates>
+</file>
+
 <file path=customXml/itemProps1.xml><?xml version="1.0" encoding="utf-8"?>
-<ds:datastoreItem xmlns:ds="http://schemas.openxmlformats.org/officeDocument/2006/customXml" ds:itemID="{19E20559-B232-4371-8690-E3D8007EDB82}">
+<ds:datastoreItem xmlns:ds="http://schemas.openxmlformats.org/officeDocument/2006/customXml" ds:itemID="{E8DB7DEB-074E-4EE8-9B6E-FD277323109C}">
   <ds:schemaRefs>
-    <ds:schemaRef ds:uri="http://schemas.microsoft.com/sharepoint/v3/contenttype/forms"/>
+    <ds:schemaRef ds:uri="http://schemas.microsoft.com/office/2006/metadata/contentType"/>
+    <ds:schemaRef ds:uri="http://schemas.microsoft.com/office/2006/metadata/properties/metaAttributes"/>
+    <ds:schemaRef ds:uri="http://www.w3.org/2001/XMLSchema"/>
+    <ds:schemaRef ds:uri="http://schemas.microsoft.com/office/2006/metadata/properties"/>
+    <ds:schemaRef ds:uri="http://schemas.openxmlformats.org/package/2006/metadata/core-properties"/>
+    <ds:schemaRef ds:uri="http://purl.org/dc/elements/1.1/"/>
+    <ds:schemaRef ds:uri="http://purl.org/dc/terms/"/>
+    <ds:schemaRef ds:uri="http://schemas.microsoft.com/office/internal/2005/internalDocumentation"/>
   </ds:schemaRefs>
 </ds:datastoreItem>
 </file>
@@ -12016,16 +13980,9 @@
 </file>
 
 <file path=customXml/itemProps3.xml><?xml version="1.0" encoding="utf-8"?>
-<ds:datastoreItem xmlns:ds="http://schemas.openxmlformats.org/officeDocument/2006/customXml" ds:itemID="{E8DB7DEB-074E-4EE8-9B6E-FD277323109C}">
+<ds:datastoreItem xmlns:ds="http://schemas.openxmlformats.org/officeDocument/2006/customXml" ds:itemID="{19E20559-B232-4371-8690-E3D8007EDB82}">
   <ds:schemaRefs>
-    <ds:schemaRef ds:uri="http://schemas.microsoft.com/office/2006/metadata/contentType"/>
-    <ds:schemaRef ds:uri="http://schemas.microsoft.com/office/2006/metadata/properties/metaAttributes"/>
-    <ds:schemaRef ds:uri="http://www.w3.org/2001/XMLSchema"/>
-    <ds:schemaRef ds:uri="http://schemas.microsoft.com/office/2006/metadata/properties"/>
-    <ds:schemaRef ds:uri="http://schemas.openxmlformats.org/package/2006/metadata/core-properties"/>
-    <ds:schemaRef ds:uri="http://purl.org/dc/elements/1.1/"/>
-    <ds:schemaRef ds:uri="http://purl.org/dc/terms/"/>
-    <ds:schemaRef ds:uri="http://schemas.microsoft.com/office/internal/2005/internalDocumentation"/>
+    <ds:schemaRef ds:uri="http://schemas.microsoft.com/sharepoint/v3/contenttype/forms"/>
   </ds:schemaRefs>
 </ds:datastoreItem>
 </file>
</xml_diff>

<commit_message>
(Issue #132) Minor tweaks
</commit_message>
<xml_diff>
--- a/computational-expts.pptx
+++ b/computational-expts.pptx
@@ -283,7 +283,7 @@
           <a:p>
             <a:fld id="{0B842F42-2CE9-4E35-95C1-410DC08A50B1}" type="datetimeFigureOut">
               <a:rPr lang="en-US" smtClean="0"/>
-              <a:t>7/29/22</a:t>
+              <a:t>8/2/22</a:t>
             </a:fld>
             <a:endParaRPr lang="en-US"/>
           </a:p>
@@ -448,7 +448,7 @@
           <a:p>
             <a:fld id="{6F282904-F315-4730-8D91-37D99E141A6F}" type="datetimeFigureOut">
               <a:rPr lang="en-US" smtClean="0"/>
-              <a:t>7/29/22</a:t>
+              <a:t>8/2/22</a:t>
             </a:fld>
             <a:endParaRPr lang="en-US"/>
           </a:p>
@@ -5791,7 +5791,7 @@
         <p:spPr>
           <a:xfrm>
             <a:off x="3176924" y="2085870"/>
-            <a:ext cx="5910849" cy="936667"/>
+            <a:ext cx="6234399" cy="936667"/>
           </a:xfrm>
         </p:spPr>
         <p:txBody>
@@ -5808,18 +5808,14 @@
             </a:r>
             <a:r>
               <a:rPr lang="en-US" sz="2000" u="none" dirty="0"/>
-              <a:t>(he/him) &amp;</a:t>
-            </a:r>
-            <a:r>
-              <a:rPr lang="en-US" sz="2000" dirty="0"/>
-              <a:t> </a:t>
-            </a:r>
-            <a:r>
-              <a:rPr lang="en-US" sz="2000" dirty="0" err="1"/>
+              <a:t>(he/him) &amp; </a:t>
+            </a:r>
+            <a:r>
+              <a:rPr lang="en-US" dirty="0" err="1"/>
               <a:t>Anshu</a:t>
             </a:r>
             <a:r>
-              <a:rPr lang="en-US" sz="2000" dirty="0"/>
+              <a:rPr lang="en-US" dirty="0"/>
               <a:t> Dubey</a:t>
             </a:r>
             <a:r>
@@ -6455,7 +6451,7 @@
           <a:p>
             <a:r>
               <a:rPr lang="en-US" sz="1800" dirty="0"/>
-              <a:t>Testing and verification</a:t>
+              <a:t>Testing, verification, &amp; validation</a:t>
             </a:r>
           </a:p>
           <a:p>
@@ -13052,6 +13048,21 @@
 </file>
 
 <file path=customXml/item1.xml><?xml version="1.0" encoding="utf-8"?>
+<?mso-contentType ?>
+<FormTemplates xmlns="http://schemas.microsoft.com/sharepoint/v3/contenttype/forms">
+  <Display>DocumentLibraryForm</Display>
+  <Edit>DocumentLibraryForm</Edit>
+  <New>DocumentLibraryForm</New>
+</FormTemplates>
+</file>
+
+<file path=customXml/item2.xml><?xml version="1.0" encoding="utf-8"?>
+<p:properties xmlns:p="http://schemas.microsoft.com/office/2006/metadata/properties" xmlns:xsi="http://www.w3.org/2001/XMLSchema-instance" xmlns:pc="http://schemas.microsoft.com/office/infopath/2007/PartnerControls">
+  <documentManagement/>
+</p:properties>
+</file>
+
+<file path=customXml/item3.xml><?xml version="1.0" encoding="utf-8"?>
 <ct:contentTypeSchema xmlns:ct="http://schemas.microsoft.com/office/2006/metadata/contentType" xmlns:ma="http://schemas.microsoft.com/office/2006/metadata/properties/metaAttributes" ct:_="" ma:_="" ma:contentTypeName="Document" ma:contentTypeID="0x010100565464437F680748A68B85EB6594EA7D" ma:contentTypeVersion="0" ma:contentTypeDescription="Create a new document." ma:contentTypeScope="" ma:versionID="fe3f4dd58d5914c51cfc6deaa8ad845c">
   <xsd:schema xmlns:xsd="http://www.w3.org/2001/XMLSchema" xmlns:p="http://schemas.microsoft.com/office/2006/metadata/properties" targetNamespace="http://schemas.microsoft.com/office/2006/metadata/properties" ma:root="true" ma:fieldsID="4aeb20c0e3442673af7ee10786458764">
     <xsd:element name="properties">
@@ -13100,22 +13111,30 @@
 </ct:contentTypeSchema>
 </file>
 
-<file path=customXml/item2.xml><?xml version="1.0" encoding="utf-8"?>
-<?mso-contentType ?>
-<FormTemplates xmlns="http://schemas.microsoft.com/sharepoint/v3/contenttype/forms">
-  <Display>DocumentLibraryForm</Display>
-  <Edit>DocumentLibraryForm</Edit>
-  <New>DocumentLibraryForm</New>
-</FormTemplates>
+<file path=customXml/itemProps1.xml><?xml version="1.0" encoding="utf-8"?>
+<ds:datastoreItem xmlns:ds="http://schemas.openxmlformats.org/officeDocument/2006/customXml" ds:itemID="{19E20559-B232-4371-8690-E3D8007EDB82}">
+  <ds:schemaRefs>
+    <ds:schemaRef ds:uri="http://schemas.microsoft.com/sharepoint/v3/contenttype/forms"/>
+  </ds:schemaRefs>
+</ds:datastoreItem>
 </file>
 
-<file path=customXml/item3.xml><?xml version="1.0" encoding="utf-8"?>
-<p:properties xmlns:p="http://schemas.microsoft.com/office/2006/metadata/properties" xmlns:xsi="http://www.w3.org/2001/XMLSchema-instance" xmlns:pc="http://schemas.microsoft.com/office/infopath/2007/PartnerControls">
-  <documentManagement/>
-</p:properties>
+<file path=customXml/itemProps2.xml><?xml version="1.0" encoding="utf-8"?>
+<ds:datastoreItem xmlns:ds="http://schemas.openxmlformats.org/officeDocument/2006/customXml" ds:itemID="{A50EC660-24D0-43A0-AE5E-E274115E726B}">
+  <ds:schemaRefs>
+    <ds:schemaRef ds:uri="http://purl.org/dc/elements/1.1/"/>
+    <ds:schemaRef ds:uri="http://schemas.microsoft.com/office/2006/metadata/properties"/>
+    <ds:schemaRef ds:uri="http://purl.org/dc/terms/"/>
+    <ds:schemaRef ds:uri="http://schemas.openxmlformats.org/package/2006/metadata/core-properties"/>
+    <ds:schemaRef ds:uri="http://schemas.microsoft.com/office/2006/documentManagement/types"/>
+    <ds:schemaRef ds:uri="http://www.w3.org/XML/1998/namespace"/>
+    <ds:schemaRef ds:uri="http://purl.org/dc/dcmitype/"/>
+    <ds:schemaRef ds:uri="http://schemas.microsoft.com/office/infopath/2007/PartnerControls"/>
+  </ds:schemaRefs>
+</ds:datastoreItem>
 </file>
 
-<file path=customXml/itemProps1.xml><?xml version="1.0" encoding="utf-8"?>
+<file path=customXml/itemProps3.xml><?xml version="1.0" encoding="utf-8"?>
 <ds:datastoreItem xmlns:ds="http://schemas.openxmlformats.org/officeDocument/2006/customXml" ds:itemID="{E8DB7DEB-074E-4EE8-9B6E-FD277323109C}">
   <ds:schemaRefs>
     <ds:schemaRef ds:uri="http://schemas.microsoft.com/office/2006/metadata/contentType"/>
@@ -13128,27 +13147,4 @@
     <ds:schemaRef ds:uri="http://schemas.microsoft.com/office/internal/2005/internalDocumentation"/>
   </ds:schemaRefs>
 </ds:datastoreItem>
-</file>
-
-<file path=customXml/itemProps2.xml><?xml version="1.0" encoding="utf-8"?>
-<ds:datastoreItem xmlns:ds="http://schemas.openxmlformats.org/officeDocument/2006/customXml" ds:itemID="{19E20559-B232-4371-8690-E3D8007EDB82}">
-  <ds:schemaRefs>
-    <ds:schemaRef ds:uri="http://schemas.microsoft.com/sharepoint/v3/contenttype/forms"/>
-  </ds:schemaRefs>
-</ds:datastoreItem>
-</file>
-
-<file path=customXml/itemProps3.xml><?xml version="1.0" encoding="utf-8"?>
-<ds:datastoreItem xmlns:ds="http://schemas.openxmlformats.org/officeDocument/2006/customXml" ds:itemID="{A50EC660-24D0-43A0-AE5E-E274115E726B}">
-  <ds:schemaRefs>
-    <ds:schemaRef ds:uri="http://purl.org/dc/elements/1.1/"/>
-    <ds:schemaRef ds:uri="http://schemas.microsoft.com/office/2006/metadata/properties"/>
-    <ds:schemaRef ds:uri="http://purl.org/dc/terms/"/>
-    <ds:schemaRef ds:uri="http://schemas.openxmlformats.org/package/2006/metadata/core-properties"/>
-    <ds:schemaRef ds:uri="http://schemas.microsoft.com/office/2006/documentManagement/types"/>
-    <ds:schemaRef ds:uri="http://www.w3.org/XML/1998/namespace"/>
-    <ds:schemaRef ds:uri="http://purl.org/dc/dcmitype/"/>
-    <ds:schemaRef ds:uri="http://schemas.microsoft.com/office/infopath/2007/PartnerControls"/>
-  </ds:schemaRefs>
-</ds:datastoreItem>
 </file>
</xml_diff>

<commit_message>
(Issue #132) Added new documentation slide and link to example repo.
</commit_message>
<xml_diff>
--- a/computational-expts.pptx
+++ b/computational-expts.pptx
@@ -5,10 +5,10 @@
     <p:sldMasterId id="2147483935" r:id="rId4"/>
   </p:sldMasterIdLst>
   <p:notesMasterIdLst>
-    <p:notesMasterId r:id="rId34"/>
+    <p:notesMasterId r:id="rId35"/>
   </p:notesMasterIdLst>
   <p:handoutMasterIdLst>
-    <p:handoutMasterId r:id="rId35"/>
+    <p:handoutMasterId r:id="rId36"/>
   </p:handoutMasterIdLst>
   <p:sldIdLst>
     <p:sldId id="256" r:id="rId5"/>
@@ -25,21 +25,22 @@
     <p:sldId id="329" r:id="rId16"/>
     <p:sldId id="337" r:id="rId17"/>
     <p:sldId id="333" r:id="rId18"/>
-    <p:sldId id="336" r:id="rId19"/>
-    <p:sldId id="335" r:id="rId20"/>
-    <p:sldId id="338" r:id="rId21"/>
-    <p:sldId id="339" r:id="rId22"/>
-    <p:sldId id="343" r:id="rId23"/>
-    <p:sldId id="344" r:id="rId24"/>
-    <p:sldId id="345" r:id="rId25"/>
-    <p:sldId id="346" r:id="rId26"/>
-    <p:sldId id="347" r:id="rId27"/>
-    <p:sldId id="348" r:id="rId28"/>
-    <p:sldId id="349" r:id="rId29"/>
-    <p:sldId id="350" r:id="rId30"/>
-    <p:sldId id="351" r:id="rId31"/>
-    <p:sldId id="352" r:id="rId32"/>
-    <p:sldId id="353" r:id="rId33"/>
+    <p:sldId id="354" r:id="rId19"/>
+    <p:sldId id="336" r:id="rId20"/>
+    <p:sldId id="335" r:id="rId21"/>
+    <p:sldId id="338" r:id="rId22"/>
+    <p:sldId id="339" r:id="rId23"/>
+    <p:sldId id="343" r:id="rId24"/>
+    <p:sldId id="344" r:id="rId25"/>
+    <p:sldId id="345" r:id="rId26"/>
+    <p:sldId id="346" r:id="rId27"/>
+    <p:sldId id="347" r:id="rId28"/>
+    <p:sldId id="348" r:id="rId29"/>
+    <p:sldId id="349" r:id="rId30"/>
+    <p:sldId id="350" r:id="rId31"/>
+    <p:sldId id="351" r:id="rId32"/>
+    <p:sldId id="352" r:id="rId33"/>
+    <p:sldId id="353" r:id="rId34"/>
   </p:sldIdLst>
   <p:sldSz cx="12188825" cy="6858000"/>
   <p:notesSz cx="7010400" cy="9296400"/>
@@ -283,7 +284,7 @@
           <a:p>
             <a:fld id="{0B842F42-2CE9-4E35-95C1-410DC08A50B1}" type="datetimeFigureOut">
               <a:rPr lang="en-US" smtClean="0"/>
-              <a:t>8/2/22</a:t>
+              <a:t>8/3/22</a:t>
             </a:fld>
             <a:endParaRPr lang="en-US"/>
           </a:p>
@@ -448,7 +449,7 @@
           <a:p>
             <a:fld id="{6F282904-F315-4730-8D91-37D99E141A6F}" type="datetimeFigureOut">
               <a:rPr lang="en-US" smtClean="0"/>
-              <a:t>8/2/22</a:t>
+              <a:t>8/3/22</a:t>
             </a:fld>
             <a:endParaRPr lang="en-US"/>
           </a:p>
@@ -1035,7 +1036,7 @@
           <a:p>
             <a:fld id="{54E672D7-8E2D-4611-973D-F4591A707C34}" type="slidenum">
               <a:rPr lang="en-US" smtClean="0"/>
-              <a:t>17</a:t>
+              <a:t>18</a:t>
             </a:fld>
             <a:endParaRPr lang="en-US"/>
           </a:p>
@@ -6819,7 +6820,7 @@
           <p:cNvPr id="2" name="Title 1">
             <a:extLst>
               <a:ext uri="{FF2B5EF4-FFF2-40B4-BE49-F238E27FC236}">
-                <a16:creationId xmlns:a16="http://schemas.microsoft.com/office/drawing/2014/main" id="{138A0DB7-6EBE-EAE7-245C-E8CEB6C1B46B}"/>
+                <a16:creationId xmlns:a16="http://schemas.microsoft.com/office/drawing/2014/main" id="{F5BEE42B-63A3-D04F-DF9E-BB5B3AD53501}"/>
               </a:ext>
             </a:extLst>
           </p:cNvPr>
@@ -6837,7 +6838,7 @@
           <a:p>
             <a:r>
               <a:rPr lang="en-US" dirty="0"/>
-              <a:t>Documentation: Data context &amp; metadata</a:t>
+              <a:t>Documentation: Version Control Tools</a:t>
             </a:r>
           </a:p>
         </p:txBody>
@@ -6847,7 +6848,7 @@
           <p:cNvPr id="3" name="Content Placeholder 2">
             <a:extLst>
               <a:ext uri="{FF2B5EF4-FFF2-40B4-BE49-F238E27FC236}">
-                <a16:creationId xmlns:a16="http://schemas.microsoft.com/office/drawing/2014/main" id="{13CF6E62-D847-A61B-2158-E6AA4B34F17C}"/>
+                <a16:creationId xmlns:a16="http://schemas.microsoft.com/office/drawing/2014/main" id="{57645BD6-25F7-A3F2-523F-EE825B19A28F}"/>
               </a:ext>
             </a:extLst>
           </p:cNvPr>
@@ -6863,42 +6864,38 @@
           <a:bodyPr/>
           <a:lstStyle/>
           <a:p>
-            <a:r>
-              <a:rPr lang="en-US" dirty="0"/>
-              <a:t>Try to automate as much as possible</a:t>
-            </a:r>
-          </a:p>
-          <a:p>
-            <a:r>
-              <a:rPr lang="en-US" dirty="0"/>
-              <a:t>Build dates, user, system name, git hashes, configuration data in file headers</a:t>
-            </a:r>
-          </a:p>
-          <a:p>
-            <a:r>
-              <a:rPr lang="en-US" dirty="0"/>
-              <a:t>A lot of this comes from build &amp; job logs</a:t>
-            </a:r>
-          </a:p>
-          <a:p>
-            <a:pPr lvl="1"/>
-            <a:r>
-              <a:rPr lang="en-US" dirty="0"/>
-              <a:t>software environment info</a:t>
-            </a:r>
-          </a:p>
-          <a:p>
-            <a:pPr lvl="1"/>
-            <a:r>
-              <a:rPr lang="en-US" dirty="0"/>
-              <a:t>git diffs</a:t>
-            </a:r>
-          </a:p>
-          <a:p>
-            <a:pPr lvl="1"/>
-            <a:r>
-              <a:rPr lang="en-US" dirty="0"/>
-              <a:t>environment variables</a:t>
+            <a:pPr marL="0" indent="0">
+              <a:buNone/>
+            </a:pPr>
+            <a:r>
+              <a:rPr lang="en-US" dirty="0"/>
+              <a:t>Locate lab notes associated with code as close to code</a:t>
+            </a:r>
+          </a:p>
+          <a:p>
+            <a:r>
+              <a:rPr lang="en-US" dirty="0"/>
+              <a:t>Commit messages</a:t>
+            </a:r>
+          </a:p>
+          <a:p>
+            <a:r>
+              <a:rPr lang="en-US" dirty="0"/>
+              <a:t>Issues to capture design discussions &amp; requirements?</a:t>
+            </a:r>
+          </a:p>
+          <a:p>
+            <a:r>
+              <a:rPr lang="en-US" dirty="0"/>
+              <a:t>Pull requests to document code review, verification/validation, </a:t>
+            </a:r>
+            <a:r>
+              <a:rPr lang="en-US" i="1" dirty="0"/>
+              <a:t>etc</a:t>
+            </a:r>
+            <a:r>
+              <a:rPr lang="en-US" dirty="0"/>
+              <a:t>.?</a:t>
             </a:r>
           </a:p>
         </p:txBody>
@@ -6906,7 +6903,7 @@
     </p:spTree>
     <p:extLst>
       <p:ext uri="{BB962C8B-B14F-4D97-AF65-F5344CB8AC3E}">
-        <p14:creationId xmlns:p14="http://schemas.microsoft.com/office/powerpoint/2010/main" val="1750469919"/>
+        <p14:creationId xmlns:p14="http://schemas.microsoft.com/office/powerpoint/2010/main" val="2183488510"/>
       </p:ext>
     </p:extLst>
   </p:cSld>
@@ -6938,7 +6935,7 @@
           <p:cNvPr id="2" name="Title 1">
             <a:extLst>
               <a:ext uri="{FF2B5EF4-FFF2-40B4-BE49-F238E27FC236}">
-                <a16:creationId xmlns:a16="http://schemas.microsoft.com/office/drawing/2014/main" id="{E4019461-BF55-DC89-9FF1-089F0D96CE0F}"/>
+                <a16:creationId xmlns:a16="http://schemas.microsoft.com/office/drawing/2014/main" id="{138A0DB7-6EBE-EAE7-245C-E8CEB6C1B46B}"/>
               </a:ext>
             </a:extLst>
           </p:cNvPr>
@@ -6956,15 +6953,7 @@
           <a:p>
             <a:r>
               <a:rPr lang="en-US" dirty="0"/>
-              <a:t>Documentation: </a:t>
-            </a:r>
-            <a:r>
-              <a:rPr lang="en-US" dirty="0" err="1"/>
-              <a:t>Jupyter</a:t>
-            </a:r>
-            <a:r>
-              <a:rPr lang="en-US" dirty="0"/>
-              <a:t> notebooks</a:t>
+              <a:t>Documentation: Data context &amp; metadata</a:t>
             </a:r>
           </a:p>
         </p:txBody>
@@ -6974,7 +6963,7 @@
           <p:cNvPr id="3" name="Content Placeholder 2">
             <a:extLst>
               <a:ext uri="{FF2B5EF4-FFF2-40B4-BE49-F238E27FC236}">
-                <a16:creationId xmlns:a16="http://schemas.microsoft.com/office/drawing/2014/main" id="{4F38CB09-CA6C-8901-732E-A25A6FB14D84}"/>
+                <a16:creationId xmlns:a16="http://schemas.microsoft.com/office/drawing/2014/main" id="{13CF6E62-D847-A61B-2158-E6AA4B34F17C}"/>
               </a:ext>
             </a:extLst>
           </p:cNvPr>
@@ -6991,52 +6980,41 @@
           <a:lstStyle/>
           <a:p>
             <a:r>
-              <a:rPr lang="en-US" dirty="0" err="1"/>
-              <a:t>Jupyter</a:t>
-            </a:r>
-            <a:r>
-              <a:rPr lang="en-US" dirty="0"/>
-              <a:t> notebook can be put context &amp; metadata next to data.</a:t>
+              <a:rPr lang="en-US" dirty="0"/>
+              <a:t>Try to automate as much as possible</a:t>
+            </a:r>
+          </a:p>
+          <a:p>
+            <a:r>
+              <a:rPr lang="en-US" dirty="0"/>
+              <a:t>Build dates, user, system name, git hashes, configuration data in file headers</a:t>
+            </a:r>
+          </a:p>
+          <a:p>
+            <a:r>
+              <a:rPr lang="en-US" dirty="0"/>
+              <a:t>A lot of this comes from build &amp; job logs</a:t>
             </a:r>
           </a:p>
           <a:p>
             <a:pPr lvl="1"/>
             <a:r>
               <a:rPr lang="en-US" dirty="0"/>
-              <a:t>High-level design &amp; motivation up top</a:t>
+              <a:t>software environment info</a:t>
             </a:r>
           </a:p>
           <a:p>
             <a:pPr lvl="1"/>
             <a:r>
               <a:rPr lang="en-US" dirty="0"/>
-              <a:t>Low-level lab notes for acquiring data</a:t>
+              <a:t>git diffs</a:t>
             </a:r>
           </a:p>
           <a:p>
             <a:pPr lvl="1"/>
             <a:r>
               <a:rPr lang="en-US" dirty="0"/>
-              <a:t>Load &amp; use data</a:t>
-            </a:r>
-          </a:p>
-          <a:p>
-            <a:pPr lvl="1"/>
-            <a:r>
-              <a:rPr lang="en-US" dirty="0"/>
-              <a:t>Comment on results</a:t>
-            </a:r>
-          </a:p>
-          <a:p>
-            <a:r>
-              <a:rPr lang="en-US" dirty="0"/>
-              <a:t>Figuring how to structure work into notebooks helps structure whole study.</a:t>
-            </a:r>
-          </a:p>
-          <a:p>
-            <a:r>
-              <a:rPr lang="en-US" dirty="0"/>
-              <a:t>Where do the notebooks fit into the documentation hierarchy?</a:t>
+              <a:t>environment variables</a:t>
             </a:r>
           </a:p>
         </p:txBody>
@@ -7044,7 +7022,7 @@
     </p:spTree>
     <p:extLst>
       <p:ext uri="{BB962C8B-B14F-4D97-AF65-F5344CB8AC3E}">
-        <p14:creationId xmlns:p14="http://schemas.microsoft.com/office/powerpoint/2010/main" val="904306967"/>
+        <p14:creationId xmlns:p14="http://schemas.microsoft.com/office/powerpoint/2010/main" val="1750469919"/>
       </p:ext>
     </p:extLst>
   </p:cSld>
@@ -7076,7 +7054,7 @@
           <p:cNvPr id="2" name="Title 1">
             <a:extLst>
               <a:ext uri="{FF2B5EF4-FFF2-40B4-BE49-F238E27FC236}">
-                <a16:creationId xmlns:a16="http://schemas.microsoft.com/office/drawing/2014/main" id="{746A2D5A-6E35-F96F-5E79-5B41AC221D05}"/>
+                <a16:creationId xmlns:a16="http://schemas.microsoft.com/office/drawing/2014/main" id="{E4019461-BF55-DC89-9FF1-089F0D96CE0F}"/>
               </a:ext>
             </a:extLst>
           </p:cNvPr>
@@ -7094,7 +7072,15 @@
           <a:p>
             <a:r>
               <a:rPr lang="en-US" dirty="0"/>
-              <a:t>Is this working?</a:t>
+              <a:t>Documentation: </a:t>
+            </a:r>
+            <a:r>
+              <a:rPr lang="en-US" dirty="0" err="1"/>
+              <a:t>Jupyter</a:t>
+            </a:r>
+            <a:r>
+              <a:rPr lang="en-US" dirty="0"/>
+              <a:t> notebooks</a:t>
             </a:r>
           </a:p>
         </p:txBody>
@@ -7104,7 +7090,7 @@
           <p:cNvPr id="3" name="Content Placeholder 2">
             <a:extLst>
               <a:ext uri="{FF2B5EF4-FFF2-40B4-BE49-F238E27FC236}">
-                <a16:creationId xmlns:a16="http://schemas.microsoft.com/office/drawing/2014/main" id="{009BAE6A-1E32-3C4B-58A8-10D2890F201C}"/>
+                <a16:creationId xmlns:a16="http://schemas.microsoft.com/office/drawing/2014/main" id="{4F38CB09-CA6C-8901-732E-A25A6FB14D84}"/>
               </a:ext>
             </a:extLst>
           </p:cNvPr>
@@ -7121,92 +7107,52 @@
           <a:lstStyle/>
           <a:p>
             <a:r>
-              <a:rPr lang="en-US" dirty="0"/>
-              <a:t>It’s a work in progress (and always will be)</a:t>
-            </a:r>
-          </a:p>
-          <a:p>
-            <a:r>
-              <a:rPr lang="en-US" dirty="0"/>
-              <a:t>I use this for different types of studies across different projects</a:t>
-            </a:r>
-          </a:p>
-          <a:p>
-            <a:r>
-              <a:rPr lang="en-US" dirty="0"/>
-              <a:t>I’m not the only one</a:t>
+              <a:rPr lang="en-US" dirty="0" err="1"/>
+              <a:t>Jupyter</a:t>
+            </a:r>
+            <a:r>
+              <a:rPr lang="en-US" dirty="0"/>
+              <a:t> notebook can be put context &amp; metadata next to data.</a:t>
             </a:r>
           </a:p>
           <a:p>
             <a:pPr lvl="1"/>
             <a:r>
               <a:rPr lang="en-US" dirty="0"/>
-              <a:t>2018 BSSW Fellow </a:t>
-            </a:r>
-            <a:r>
-              <a:rPr lang="en-US" dirty="0">
-                <a:hlinkClick r:id="rId3"/>
-              </a:rPr>
-              <a:t>Ivo Jimenez</a:t>
-            </a:r>
-            <a:endParaRPr lang="en-US" dirty="0"/>
-          </a:p>
-          <a:p>
-            <a:pPr lvl="2"/>
-            <a:r>
-              <a:rPr lang="en-US" dirty="0">
-                <a:hlinkClick r:id="rId4"/>
-              </a:rPr>
-              <a:t>Popper</a:t>
-            </a:r>
-            <a:r>
-              <a:rPr lang="en-US" dirty="0"/>
-              <a:t> tool for implementing scientific exploration pipelines that yield reproducible results</a:t>
+              <a:t>High-level design &amp; motivation up top</a:t>
             </a:r>
           </a:p>
           <a:p>
             <a:pPr lvl="1"/>
             <a:r>
               <a:rPr lang="en-US" dirty="0"/>
-              <a:t>Aaron </a:t>
-            </a:r>
-            <a:r>
-              <a:rPr lang="en-US" dirty="0" err="1"/>
-              <a:t>Lentner</a:t>
-            </a:r>
-            <a:r>
-              <a:rPr lang="en-US" dirty="0"/>
-              <a:t> – George Washington University</a:t>
-            </a:r>
-          </a:p>
-          <a:p>
-            <a:pPr lvl="2"/>
-            <a:r>
-              <a:rPr lang="en-US" dirty="0">
-                <a:hlinkClick r:id="rId5"/>
-              </a:rPr>
-              <a:t>FlashKit</a:t>
-            </a:r>
-            <a:r>
-              <a:rPr lang="en-US" dirty="0"/>
-              <a:t> a high-level interface for helping users structure and manage research with Flash-X</a:t>
-            </a:r>
-          </a:p>
-          <a:p>
-            <a:pPr lvl="2"/>
-            <a:endParaRPr lang="en-US" dirty="0"/>
-          </a:p>
-          <a:p>
-            <a:pPr marL="0" indent="0" algn="ctr">
-              <a:buNone/>
-            </a:pPr>
-            <a:r>
-              <a:rPr lang="en-US" sz="1600" dirty="0">
-                <a:solidFill>
-                  <a:srgbClr val="FF0000"/>
-                </a:solidFill>
-              </a:rPr>
-              <a:t>TODO: Add in link to repo with example lab env.  Mention that I can walk through it with interested parties.</a:t>
+              <a:t>Low-level lab notes for acquiring data</a:t>
+            </a:r>
+          </a:p>
+          <a:p>
+            <a:pPr lvl="1"/>
+            <a:r>
+              <a:rPr lang="en-US" dirty="0"/>
+              <a:t>Load &amp; use data</a:t>
+            </a:r>
+          </a:p>
+          <a:p>
+            <a:pPr lvl="1"/>
+            <a:r>
+              <a:rPr lang="en-US" dirty="0"/>
+              <a:t>Comment on results</a:t>
+            </a:r>
+          </a:p>
+          <a:p>
+            <a:r>
+              <a:rPr lang="en-US" dirty="0"/>
+              <a:t>Figuring how to structure work into notebooks helps structure whole study.</a:t>
+            </a:r>
+          </a:p>
+          <a:p>
+            <a:r>
+              <a:rPr lang="en-US" dirty="0"/>
+              <a:t>Where do the notebooks fit into the documentation hierarchy?</a:t>
             </a:r>
           </a:p>
         </p:txBody>
@@ -7214,7 +7160,7 @@
     </p:spTree>
     <p:extLst>
       <p:ext uri="{BB962C8B-B14F-4D97-AF65-F5344CB8AC3E}">
-        <p14:creationId xmlns:p14="http://schemas.microsoft.com/office/powerpoint/2010/main" val="701917171"/>
+        <p14:creationId xmlns:p14="http://schemas.microsoft.com/office/powerpoint/2010/main" val="904306967"/>
       </p:ext>
     </p:extLst>
   </p:cSld>
@@ -7243,10 +7189,38 @@
       </p:grpSpPr>
       <p:sp>
         <p:nvSpPr>
+          <p:cNvPr id="2" name="Title 1">
+            <a:extLst>
+              <a:ext uri="{FF2B5EF4-FFF2-40B4-BE49-F238E27FC236}">
+                <a16:creationId xmlns:a16="http://schemas.microsoft.com/office/drawing/2014/main" id="{746A2D5A-6E35-F96F-5E79-5B41AC221D05}"/>
+              </a:ext>
+            </a:extLst>
+          </p:cNvPr>
+          <p:cNvSpPr>
+            <a:spLocks noGrp="1"/>
+          </p:cNvSpPr>
+          <p:nvPr>
+            <p:ph type="title"/>
+          </p:nvPr>
+        </p:nvSpPr>
+        <p:spPr/>
+        <p:txBody>
+          <a:bodyPr/>
+          <a:lstStyle/>
+          <a:p>
+            <a:r>
+              <a:rPr lang="en-US" dirty="0"/>
+              <a:t>Is this working?</a:t>
+            </a:r>
+          </a:p>
+        </p:txBody>
+      </p:sp>
+      <p:sp>
+        <p:nvSpPr>
           <p:cNvPr id="3" name="Content Placeholder 2">
             <a:extLst>
               <a:ext uri="{FF2B5EF4-FFF2-40B4-BE49-F238E27FC236}">
-                <a16:creationId xmlns:a16="http://schemas.microsoft.com/office/drawing/2014/main" id="{D4EC4D35-E2E4-FD59-2267-84D64A27E32C}"/>
+                <a16:creationId xmlns:a16="http://schemas.microsoft.com/office/drawing/2014/main" id="{009BAE6A-1E32-3C4B-58A8-10D2890F201C}"/>
               </a:ext>
             </a:extLst>
           </p:cNvPr>
@@ -7257,128 +7231,111 @@
             <p:ph idx="1"/>
           </p:nvPr>
         </p:nvSpPr>
-        <p:spPr>
-          <a:xfrm>
-            <a:off x="409507" y="1199477"/>
-            <a:ext cx="11369809" cy="4047778"/>
-          </a:xfrm>
-        </p:spPr>
+        <p:spPr/>
         <p:txBody>
           <a:bodyPr/>
           <a:lstStyle/>
           <a:p>
-            <a:pPr marL="0" indent="0">
-              <a:buNone/>
-            </a:pPr>
-            <a:r>
-              <a:rPr lang="en-US" dirty="0"/>
-              <a:t>So far we have talked about setting up the infrastructure that is needed to collect and analyze results.</a:t>
-            </a:r>
-          </a:p>
-          <a:p>
-            <a:pPr marL="0" indent="0">
-              <a:buNone/>
-            </a:pPr>
+            <a:r>
+              <a:rPr lang="en-US" dirty="0"/>
+              <a:t>It’s a work in progress (and always will be)</a:t>
+            </a:r>
+          </a:p>
+          <a:p>
+            <a:r>
+              <a:rPr lang="en-US" dirty="0"/>
+              <a:t>I use this for different types of studies across different projects</a:t>
+            </a:r>
+          </a:p>
+          <a:p>
+            <a:r>
+              <a:rPr lang="en-US" dirty="0"/>
+              <a:t>I’m not the only one</a:t>
+            </a:r>
+          </a:p>
+          <a:p>
+            <a:pPr lvl="1"/>
+            <a:r>
+              <a:rPr lang="en-US" dirty="0"/>
+              <a:t>2018 BSSW Fellow </a:t>
+            </a:r>
+            <a:r>
+              <a:rPr lang="en-US" dirty="0">
+                <a:hlinkClick r:id="rId3"/>
+              </a:rPr>
+              <a:t>Ivo Jimenez</a:t>
+            </a:r>
             <a:endParaRPr lang="en-US" dirty="0"/>
           </a:p>
           <a:p>
-            <a:pPr marL="0" indent="0">
-              <a:buNone/>
-            </a:pPr>
-            <a:r>
-              <a:rPr lang="en-US" dirty="0"/>
-              <a:t>We still haven’t talked about how to plan running the study/experiments</a:t>
-            </a:r>
-          </a:p>
-          <a:p>
-            <a:pPr marL="0" indent="0">
-              <a:buNone/>
-            </a:pPr>
+            <a:pPr lvl="2"/>
+            <a:r>
+              <a:rPr lang="en-US" dirty="0">
+                <a:hlinkClick r:id="rId4"/>
+              </a:rPr>
+              <a:t>Popper</a:t>
+            </a:r>
+            <a:r>
+              <a:rPr lang="en-US" dirty="0"/>
+              <a:t> tool for implementing scientific exploration pipelines that yield reproducible results</a:t>
+            </a:r>
+          </a:p>
+          <a:p>
+            <a:pPr lvl="1"/>
+            <a:r>
+              <a:rPr lang="en-US" dirty="0"/>
+              <a:t>Aaron </a:t>
+            </a:r>
+            <a:r>
+              <a:rPr lang="en-US" dirty="0" err="1"/>
+              <a:t>Lentner</a:t>
+            </a:r>
+            <a:r>
+              <a:rPr lang="en-US" dirty="0"/>
+              <a:t> – George Washington University</a:t>
+            </a:r>
+          </a:p>
+          <a:p>
+            <a:pPr lvl="2"/>
+            <a:r>
+              <a:rPr lang="en-US" dirty="0">
+                <a:hlinkClick r:id="rId5"/>
+              </a:rPr>
+              <a:t>FlashKit</a:t>
+            </a:r>
+            <a:r>
+              <a:rPr lang="en-US" dirty="0"/>
+              <a:t> a high-level interface for helping users structure and manage research with Flash-X</a:t>
+            </a:r>
+          </a:p>
+          <a:p>
+            <a:pPr lvl="2"/>
             <a:endParaRPr lang="en-US" dirty="0"/>
-          </a:p>
-          <a:p>
-            <a:pPr marL="0" indent="0">
-              <a:buNone/>
-            </a:pPr>
-            <a:r>
-              <a:rPr lang="en-US" dirty="0"/>
-              <a:t>This section talks about preparing for a successful simulation campaign</a:t>
-            </a:r>
           </a:p>
           <a:p>
             <a:pPr marL="0" indent="0" algn="ctr">
               <a:buNone/>
             </a:pPr>
             <a:r>
-              <a:rPr lang="en-US" dirty="0"/>
-              <a:t> </a:t>
-            </a:r>
-          </a:p>
-        </p:txBody>
-      </p:sp>
-      <p:sp>
-        <p:nvSpPr>
-          <p:cNvPr id="4" name="Rounded Rectangle 3">
-            <a:extLst>
-              <a:ext uri="{FF2B5EF4-FFF2-40B4-BE49-F238E27FC236}">
-                <a16:creationId xmlns:a16="http://schemas.microsoft.com/office/drawing/2014/main" id="{A05CF8D7-AE7E-0ECA-F80F-38A8FBCC26B6}"/>
-              </a:ext>
-            </a:extLst>
-          </p:cNvPr>
-          <p:cNvSpPr/>
-          <p:nvPr/>
-        </p:nvSpPr>
-        <p:spPr>
-          <a:xfrm>
-            <a:off x="1896034" y="4249269"/>
-            <a:ext cx="7826189" cy="1600201"/>
-          </a:xfrm>
-          <a:prstGeom prst="roundRect">
-            <a:avLst/>
-          </a:prstGeom>
-          <a:solidFill>
-            <a:schemeClr val="accent3"/>
-          </a:solidFill>
-          <a:ln>
-            <a:noFill/>
-          </a:ln>
-          <a:effectLst>
-            <a:outerShdw blurRad="44450" dist="27940" dir="5400000" algn="ctr">
-              <a:srgbClr val="000000">
-                <a:alpha val="32000"/>
-              </a:srgbClr>
-            </a:outerShdw>
-          </a:effectLst>
-        </p:spPr>
-        <p:txBody>
-          <a:bodyPr rot="0" spcFirstLastPara="0" vertOverflow="overflow" horzOverflow="overflow" vert="horz" wrap="square" lIns="121851" tIns="60925" rIns="121851" bIns="60925" numCol="1" spcCol="0" rtlCol="0" fromWordArt="0" anchor="ctr" anchorCtr="0" forceAA="0" compatLnSpc="1">
-            <a:prstTxWarp prst="textNoShape">
-              <a:avLst/>
-            </a:prstTxWarp>
-            <a:noAutofit/>
-          </a:bodyPr>
-          <a:lstStyle/>
-          <a:p>
-            <a:pPr algn="ctr">
-              <a:lnSpc>
-                <a:spcPct val="90000"/>
-              </a:lnSpc>
-            </a:pPr>
-            <a:r>
               <a:rPr lang="en-US" sz="2000" dirty="0">
-                <a:solidFill>
-                  <a:schemeClr val="bg1"/>
-                </a:solidFill>
+                <a:hlinkClick r:id="rId6">
+                  <a:extLst>
+                    <a:ext uri="{A12FA001-AC4F-418D-AE19-62706E023703}">
+                      <ahyp:hlinkClr xmlns:ahyp="http://schemas.microsoft.com/office/drawing/2018/hyperlinkcolor" val="tx"/>
+                    </a:ext>
+                  </a:extLst>
+                </a:hlinkClick>
               </a:rPr>
-              <a:t>Running simulations at large scales for science discovery is more of a craft and less of science. More than any other aspect of computational science it relies on experience and acquired wisdom that helps one develop a nose for fruitful possibilities.</a:t>
-            </a:r>
+              <a:t>Computational Lab Environment Example</a:t>
+            </a:r>
+            <a:endParaRPr lang="en-US" sz="2000" dirty="0"/>
           </a:p>
         </p:txBody>
       </p:sp>
     </p:spTree>
     <p:extLst>
       <p:ext uri="{BB962C8B-B14F-4D97-AF65-F5344CB8AC3E}">
-        <p14:creationId xmlns:p14="http://schemas.microsoft.com/office/powerpoint/2010/main" val="732654816"/>
+        <p14:creationId xmlns:p14="http://schemas.microsoft.com/office/powerpoint/2010/main" val="701917171"/>
       </p:ext>
     </p:extLst>
   </p:cSld>
@@ -7407,10 +7364,10 @@
       </p:grpSpPr>
       <p:sp>
         <p:nvSpPr>
-          <p:cNvPr id="2" name="Title 1">
+          <p:cNvPr id="3" name="Content Placeholder 2">
             <a:extLst>
               <a:ext uri="{FF2B5EF4-FFF2-40B4-BE49-F238E27FC236}">
-                <a16:creationId xmlns:a16="http://schemas.microsoft.com/office/drawing/2014/main" id="{C2376954-3703-3D5F-1556-493251ADA7D6}"/>
+                <a16:creationId xmlns:a16="http://schemas.microsoft.com/office/drawing/2014/main" id="{D4EC4D35-E2E4-FD59-2267-84D64A27E32C}"/>
               </a:ext>
             </a:extLst>
           </p:cNvPr>
@@ -7418,142 +7375,74 @@
             <a:spLocks noGrp="1"/>
           </p:cNvSpPr>
           <p:nvPr>
-            <p:ph type="title"/>
-          </p:nvPr>
-        </p:nvSpPr>
-        <p:spPr/>
+            <p:ph idx="1"/>
+          </p:nvPr>
+        </p:nvSpPr>
+        <p:spPr>
+          <a:xfrm>
+            <a:off x="409507" y="1199477"/>
+            <a:ext cx="11369809" cy="4047778"/>
+          </a:xfrm>
+        </p:spPr>
         <p:txBody>
           <a:bodyPr/>
           <a:lstStyle/>
           <a:p>
-            <a:r>
-              <a:rPr lang="en-US" dirty="0"/>
-              <a:t>Why do you need to plan?</a:t>
-            </a:r>
-          </a:p>
-        </p:txBody>
-      </p:sp>
-      <p:sp>
-        <p:nvSpPr>
-          <p:cNvPr id="3" name="Content Placeholder 2">
+            <a:pPr marL="0" indent="0">
+              <a:buNone/>
+            </a:pPr>
+            <a:r>
+              <a:rPr lang="en-US" dirty="0"/>
+              <a:t>So far we have talked about setting up the infrastructure that is needed to collect and analyze results.</a:t>
+            </a:r>
+          </a:p>
+          <a:p>
+            <a:pPr marL="0" indent="0">
+              <a:buNone/>
+            </a:pPr>
+            <a:endParaRPr lang="en-US" dirty="0"/>
+          </a:p>
+          <a:p>
+            <a:pPr marL="0" indent="0">
+              <a:buNone/>
+            </a:pPr>
+            <a:r>
+              <a:rPr lang="en-US" dirty="0"/>
+              <a:t>We still haven’t talked about how to plan running the study/experiments</a:t>
+            </a:r>
+          </a:p>
+          <a:p>
+            <a:pPr marL="0" indent="0">
+              <a:buNone/>
+            </a:pPr>
+            <a:endParaRPr lang="en-US" dirty="0"/>
+          </a:p>
+          <a:p>
+            <a:pPr marL="0" indent="0">
+              <a:buNone/>
+            </a:pPr>
+            <a:r>
+              <a:rPr lang="en-US" dirty="0"/>
+              <a:t>This section talks about preparing for a successful simulation campaign</a:t>
+            </a:r>
+          </a:p>
+          <a:p>
+            <a:pPr marL="0" indent="0" algn="ctr">
+              <a:buNone/>
+            </a:pPr>
+            <a:r>
+              <a:rPr lang="en-US" dirty="0"/>
+              <a:t> </a:t>
+            </a:r>
+          </a:p>
+        </p:txBody>
+      </p:sp>
+      <p:sp>
+        <p:nvSpPr>
+          <p:cNvPr id="4" name="Rounded Rectangle 3">
             <a:extLst>
               <a:ext uri="{FF2B5EF4-FFF2-40B4-BE49-F238E27FC236}">
-                <a16:creationId xmlns:a16="http://schemas.microsoft.com/office/drawing/2014/main" id="{4F3D57F9-5D12-25C5-A6B4-27E9D7E906C9}"/>
-              </a:ext>
-            </a:extLst>
-          </p:cNvPr>
-          <p:cNvSpPr>
-            <a:spLocks noGrp="1"/>
-          </p:cNvSpPr>
-          <p:nvPr>
-            <p:ph idx="1"/>
-          </p:nvPr>
-        </p:nvSpPr>
-        <p:spPr>
-          <a:xfrm>
-            <a:off x="365761" y="1325879"/>
-            <a:ext cx="9006840" cy="4402567"/>
-          </a:xfrm>
-        </p:spPr>
-        <p:txBody>
-          <a:bodyPr/>
-          <a:lstStyle/>
-          <a:p>
-            <a:r>
-              <a:rPr lang="en-US" dirty="0"/>
-              <a:t>Machines are expensive and rare resources</a:t>
-            </a:r>
-          </a:p>
-          <a:p>
-            <a:pPr lvl="1"/>
-            <a:r>
-              <a:rPr lang="en-US" dirty="0"/>
-              <a:t>Operating them is also very expensive</a:t>
-            </a:r>
-          </a:p>
-          <a:p>
-            <a:pPr lvl="2"/>
-            <a:r>
-              <a:rPr lang="en-US" dirty="0">
-                <a:solidFill>
-                  <a:srgbClr val="C00000"/>
-                </a:solidFill>
-              </a:rPr>
-              <a:t>If you made a mistake in your input parameters and got garbage results on a large scale run, you just wasted hundreds of thousands of dollars </a:t>
-            </a:r>
-          </a:p>
-          <a:p>
-            <a:pPr lvl="1"/>
-            <a:r>
-              <a:rPr lang="en-US" dirty="0"/>
-              <a:t>Many people are competing for these resources</a:t>
-            </a:r>
-          </a:p>
-          <a:p>
-            <a:pPr lvl="2"/>
-            <a:r>
-              <a:rPr lang="en-US" dirty="0">
-                <a:solidFill>
-                  <a:srgbClr val="C00000"/>
-                </a:solidFill>
-              </a:rPr>
-              <a:t>Your wasted run is likely to be either your or someone else’s opportunity lost</a:t>
-            </a:r>
-          </a:p>
-          <a:p>
-            <a:pPr lvl="1"/>
-            <a:r>
-              <a:rPr lang="en-US" dirty="0"/>
-              <a:t>You are likely charting new scientific territory</a:t>
-            </a:r>
-          </a:p>
-          <a:p>
-            <a:pPr lvl="2"/>
-            <a:r>
-              <a:rPr lang="en-US" dirty="0">
-                <a:solidFill>
-                  <a:srgbClr val="C00000"/>
-                </a:solidFill>
-              </a:rPr>
-              <a:t>Some aspect of using your code may not have been important before, but may become critical in the new study</a:t>
-            </a:r>
-          </a:p>
-          <a:p>
-            <a:pPr lvl="2"/>
-            <a:r>
-              <a:rPr lang="en-US" dirty="0">
-                <a:solidFill>
-                  <a:srgbClr val="C00000"/>
-                </a:solidFill>
-              </a:rPr>
-              <a:t>Some solver may run up against the limits of its validity</a:t>
-            </a:r>
-          </a:p>
-          <a:p>
-            <a:pPr lvl="2"/>
-            <a:r>
-              <a:rPr lang="en-US" dirty="0">
-                <a:solidFill>
-                  <a:srgbClr val="C00000"/>
-                </a:solidFill>
-              </a:rPr>
-              <a:t>Inflight correction may be needed to parameters to continue with the study</a:t>
-            </a:r>
-          </a:p>
-          <a:p>
-            <a:r>
-              <a:rPr lang="en-US" dirty="0"/>
-              <a:t>Aim for no surprises, but be prepared for them</a:t>
-            </a:r>
-          </a:p>
-        </p:txBody>
-      </p:sp>
-      <p:sp>
-        <p:nvSpPr>
-          <p:cNvPr id="5" name="Rectangle 4">
-            <a:extLst>
-              <a:ext uri="{FF2B5EF4-FFF2-40B4-BE49-F238E27FC236}">
-                <a16:creationId xmlns:a16="http://schemas.microsoft.com/office/drawing/2014/main" id="{6BAADB36-155B-3C6B-571D-C37BA88F887D}"/>
+                <a16:creationId xmlns:a16="http://schemas.microsoft.com/office/drawing/2014/main" id="{A05CF8D7-AE7E-0ECA-F80F-38A8FBCC26B6}"/>
               </a:ext>
             </a:extLst>
           </p:cNvPr>
@@ -7562,21 +7451,23 @@
         </p:nvSpPr>
         <p:spPr>
           <a:xfrm>
-            <a:off x="914400" y="2070847"/>
-            <a:ext cx="8458201" cy="699247"/>
+            <a:off x="1896034" y="4249269"/>
+            <a:ext cx="7826189" cy="1600201"/>
           </a:xfrm>
-          <a:prstGeom prst="rect">
+          <a:prstGeom prst="roundRect">
             <a:avLst/>
           </a:prstGeom>
           <a:solidFill>
-            <a:schemeClr val="bg1"/>
+            <a:schemeClr val="accent3"/>
           </a:solidFill>
           <a:ln>
             <a:noFill/>
           </a:ln>
           <a:effectLst>
-            <a:outerShdw sx="1000" sy="1000" algn="ctr">
-              <a:srgbClr val="000000"/>
+            <a:outerShdw blurRad="44450" dist="27940" dir="5400000" algn="ctr">
+              <a:srgbClr val="000000">
+                <a:alpha val="32000"/>
+              </a:srgbClr>
             </a:outerShdw>
           </a:effectLst>
         </p:spPr>
@@ -7594,126 +7485,21 @@
                 <a:spcPct val="90000"/>
               </a:lnSpc>
             </a:pPr>
-            <a:endParaRPr lang="en-US" sz="2000" dirty="0">
-              <a:solidFill>
-                <a:schemeClr val="bg1"/>
-              </a:solidFill>
-            </a:endParaRPr>
-          </a:p>
-        </p:txBody>
-      </p:sp>
-      <p:sp>
-        <p:nvSpPr>
-          <p:cNvPr id="6" name="Rectangle 5">
-            <a:extLst>
-              <a:ext uri="{FF2B5EF4-FFF2-40B4-BE49-F238E27FC236}">
-                <a16:creationId xmlns:a16="http://schemas.microsoft.com/office/drawing/2014/main" id="{5C3A25D7-7A00-664A-9949-1C0509FCC0AF}"/>
-              </a:ext>
-            </a:extLst>
-          </p:cNvPr>
-          <p:cNvSpPr/>
-          <p:nvPr/>
-        </p:nvSpPr>
-        <p:spPr>
-          <a:xfrm>
-            <a:off x="1093694" y="3079376"/>
-            <a:ext cx="8458201" cy="435685"/>
-          </a:xfrm>
-          <a:prstGeom prst="rect">
-            <a:avLst/>
-          </a:prstGeom>
-          <a:solidFill>
-            <a:schemeClr val="bg1"/>
-          </a:solidFill>
-          <a:ln>
-            <a:noFill/>
-          </a:ln>
-          <a:effectLst>
-            <a:outerShdw sx="1000" sy="1000" algn="ctr">
-              <a:srgbClr val="000000"/>
-            </a:outerShdw>
-          </a:effectLst>
-        </p:spPr>
-        <p:txBody>
-          <a:bodyPr rot="0" spcFirstLastPara="0" vertOverflow="overflow" horzOverflow="overflow" vert="horz" wrap="square" lIns="121851" tIns="60925" rIns="121851" bIns="60925" numCol="1" spcCol="0" rtlCol="0" fromWordArt="0" anchor="ctr" anchorCtr="0" forceAA="0" compatLnSpc="1">
-            <a:prstTxWarp prst="textNoShape">
-              <a:avLst/>
-            </a:prstTxWarp>
-            <a:noAutofit/>
-          </a:bodyPr>
-          <a:lstStyle/>
-          <a:p>
-            <a:pPr algn="ctr">
-              <a:lnSpc>
-                <a:spcPct val="90000"/>
-              </a:lnSpc>
-            </a:pPr>
-            <a:endParaRPr lang="en-US" sz="2000" dirty="0">
-              <a:solidFill>
-                <a:schemeClr val="bg1"/>
-              </a:solidFill>
-            </a:endParaRPr>
-          </a:p>
-        </p:txBody>
-      </p:sp>
-      <p:sp>
-        <p:nvSpPr>
-          <p:cNvPr id="7" name="Rectangle 6">
-            <a:extLst>
-              <a:ext uri="{FF2B5EF4-FFF2-40B4-BE49-F238E27FC236}">
-                <a16:creationId xmlns:a16="http://schemas.microsoft.com/office/drawing/2014/main" id="{5AD47328-D3FB-DAC1-8695-238EED7A2C6F}"/>
-              </a:ext>
-            </a:extLst>
-          </p:cNvPr>
-          <p:cNvSpPr/>
-          <p:nvPr/>
-        </p:nvSpPr>
-        <p:spPr>
-          <a:xfrm>
-            <a:off x="1093694" y="3824343"/>
-            <a:ext cx="8278908" cy="1272092"/>
-          </a:xfrm>
-          <a:prstGeom prst="rect">
-            <a:avLst/>
-          </a:prstGeom>
-          <a:solidFill>
-            <a:schemeClr val="bg1"/>
-          </a:solidFill>
-          <a:ln>
-            <a:noFill/>
-          </a:ln>
-          <a:effectLst>
-            <a:outerShdw sx="1000" sy="1000" algn="ctr">
-              <a:srgbClr val="000000"/>
-            </a:outerShdw>
-          </a:effectLst>
-        </p:spPr>
-        <p:txBody>
-          <a:bodyPr rot="0" spcFirstLastPara="0" vertOverflow="overflow" horzOverflow="overflow" vert="horz" wrap="square" lIns="121851" tIns="60925" rIns="121851" bIns="60925" numCol="1" spcCol="0" rtlCol="0" fromWordArt="0" anchor="ctr" anchorCtr="0" forceAA="0" compatLnSpc="1">
-            <a:prstTxWarp prst="textNoShape">
-              <a:avLst/>
-            </a:prstTxWarp>
-            <a:noAutofit/>
-          </a:bodyPr>
-          <a:lstStyle/>
-          <a:p>
-            <a:pPr algn="ctr">
-              <a:lnSpc>
-                <a:spcPct val="90000"/>
-              </a:lnSpc>
-            </a:pPr>
-            <a:endParaRPr lang="en-US" sz="2000" dirty="0">
-              <a:solidFill>
-                <a:schemeClr val="bg1"/>
-              </a:solidFill>
-            </a:endParaRPr>
+            <a:r>
+              <a:rPr lang="en-US" sz="2000" dirty="0">
+                <a:solidFill>
+                  <a:schemeClr val="bg1"/>
+                </a:solidFill>
+              </a:rPr>
+              <a:t>Running simulations at large scales for science discovery is more of a craft and less of science. More than any other aspect of computational science it relies on experience and acquired wisdom that helps one develop a nose for fruitful possibilities.</a:t>
+            </a:r>
           </a:p>
         </p:txBody>
       </p:sp>
     </p:spTree>
     <p:extLst>
       <p:ext uri="{BB962C8B-B14F-4D97-AF65-F5344CB8AC3E}">
-        <p14:creationId xmlns:p14="http://schemas.microsoft.com/office/powerpoint/2010/main" val="32320673"/>
+        <p14:creationId xmlns:p14="http://schemas.microsoft.com/office/powerpoint/2010/main" val="732654816"/>
       </p:ext>
     </p:extLst>
   </p:cSld>
@@ -7970,10 +7756,172 @@
           </a:p>
         </p:txBody>
       </p:sp>
+      <p:sp>
+        <p:nvSpPr>
+          <p:cNvPr id="5" name="Rectangle 4">
+            <a:extLst>
+              <a:ext uri="{FF2B5EF4-FFF2-40B4-BE49-F238E27FC236}">
+                <a16:creationId xmlns:a16="http://schemas.microsoft.com/office/drawing/2014/main" id="{6BAADB36-155B-3C6B-571D-C37BA88F887D}"/>
+              </a:ext>
+            </a:extLst>
+          </p:cNvPr>
+          <p:cNvSpPr/>
+          <p:nvPr/>
+        </p:nvSpPr>
+        <p:spPr>
+          <a:xfrm>
+            <a:off x="914400" y="2070847"/>
+            <a:ext cx="8458201" cy="699247"/>
+          </a:xfrm>
+          <a:prstGeom prst="rect">
+            <a:avLst/>
+          </a:prstGeom>
+          <a:solidFill>
+            <a:schemeClr val="bg1"/>
+          </a:solidFill>
+          <a:ln>
+            <a:noFill/>
+          </a:ln>
+          <a:effectLst>
+            <a:outerShdw sx="1000" sy="1000" algn="ctr">
+              <a:srgbClr val="000000"/>
+            </a:outerShdw>
+          </a:effectLst>
+        </p:spPr>
+        <p:txBody>
+          <a:bodyPr rot="0" spcFirstLastPara="0" vertOverflow="overflow" horzOverflow="overflow" vert="horz" wrap="square" lIns="121851" tIns="60925" rIns="121851" bIns="60925" numCol="1" spcCol="0" rtlCol="0" fromWordArt="0" anchor="ctr" anchorCtr="0" forceAA="0" compatLnSpc="1">
+            <a:prstTxWarp prst="textNoShape">
+              <a:avLst/>
+            </a:prstTxWarp>
+            <a:noAutofit/>
+          </a:bodyPr>
+          <a:lstStyle/>
+          <a:p>
+            <a:pPr algn="ctr">
+              <a:lnSpc>
+                <a:spcPct val="90000"/>
+              </a:lnSpc>
+            </a:pPr>
+            <a:endParaRPr lang="en-US" sz="2000" dirty="0">
+              <a:solidFill>
+                <a:schemeClr val="bg1"/>
+              </a:solidFill>
+            </a:endParaRPr>
+          </a:p>
+        </p:txBody>
+      </p:sp>
+      <p:sp>
+        <p:nvSpPr>
+          <p:cNvPr id="6" name="Rectangle 5">
+            <a:extLst>
+              <a:ext uri="{FF2B5EF4-FFF2-40B4-BE49-F238E27FC236}">
+                <a16:creationId xmlns:a16="http://schemas.microsoft.com/office/drawing/2014/main" id="{5C3A25D7-7A00-664A-9949-1C0509FCC0AF}"/>
+              </a:ext>
+            </a:extLst>
+          </p:cNvPr>
+          <p:cNvSpPr/>
+          <p:nvPr/>
+        </p:nvSpPr>
+        <p:spPr>
+          <a:xfrm>
+            <a:off x="1093694" y="3079376"/>
+            <a:ext cx="8458201" cy="435685"/>
+          </a:xfrm>
+          <a:prstGeom prst="rect">
+            <a:avLst/>
+          </a:prstGeom>
+          <a:solidFill>
+            <a:schemeClr val="bg1"/>
+          </a:solidFill>
+          <a:ln>
+            <a:noFill/>
+          </a:ln>
+          <a:effectLst>
+            <a:outerShdw sx="1000" sy="1000" algn="ctr">
+              <a:srgbClr val="000000"/>
+            </a:outerShdw>
+          </a:effectLst>
+        </p:spPr>
+        <p:txBody>
+          <a:bodyPr rot="0" spcFirstLastPara="0" vertOverflow="overflow" horzOverflow="overflow" vert="horz" wrap="square" lIns="121851" tIns="60925" rIns="121851" bIns="60925" numCol="1" spcCol="0" rtlCol="0" fromWordArt="0" anchor="ctr" anchorCtr="0" forceAA="0" compatLnSpc="1">
+            <a:prstTxWarp prst="textNoShape">
+              <a:avLst/>
+            </a:prstTxWarp>
+            <a:noAutofit/>
+          </a:bodyPr>
+          <a:lstStyle/>
+          <a:p>
+            <a:pPr algn="ctr">
+              <a:lnSpc>
+                <a:spcPct val="90000"/>
+              </a:lnSpc>
+            </a:pPr>
+            <a:endParaRPr lang="en-US" sz="2000" dirty="0">
+              <a:solidFill>
+                <a:schemeClr val="bg1"/>
+              </a:solidFill>
+            </a:endParaRPr>
+          </a:p>
+        </p:txBody>
+      </p:sp>
+      <p:sp>
+        <p:nvSpPr>
+          <p:cNvPr id="7" name="Rectangle 6">
+            <a:extLst>
+              <a:ext uri="{FF2B5EF4-FFF2-40B4-BE49-F238E27FC236}">
+                <a16:creationId xmlns:a16="http://schemas.microsoft.com/office/drawing/2014/main" id="{5AD47328-D3FB-DAC1-8695-238EED7A2C6F}"/>
+              </a:ext>
+            </a:extLst>
+          </p:cNvPr>
+          <p:cNvSpPr/>
+          <p:nvPr/>
+        </p:nvSpPr>
+        <p:spPr>
+          <a:xfrm>
+            <a:off x="1093694" y="3824343"/>
+            <a:ext cx="8278908" cy="1272092"/>
+          </a:xfrm>
+          <a:prstGeom prst="rect">
+            <a:avLst/>
+          </a:prstGeom>
+          <a:solidFill>
+            <a:schemeClr val="bg1"/>
+          </a:solidFill>
+          <a:ln>
+            <a:noFill/>
+          </a:ln>
+          <a:effectLst>
+            <a:outerShdw sx="1000" sy="1000" algn="ctr">
+              <a:srgbClr val="000000"/>
+            </a:outerShdw>
+          </a:effectLst>
+        </p:spPr>
+        <p:txBody>
+          <a:bodyPr rot="0" spcFirstLastPara="0" vertOverflow="overflow" horzOverflow="overflow" vert="horz" wrap="square" lIns="121851" tIns="60925" rIns="121851" bIns="60925" numCol="1" spcCol="0" rtlCol="0" fromWordArt="0" anchor="ctr" anchorCtr="0" forceAA="0" compatLnSpc="1">
+            <a:prstTxWarp prst="textNoShape">
+              <a:avLst/>
+            </a:prstTxWarp>
+            <a:noAutofit/>
+          </a:bodyPr>
+          <a:lstStyle/>
+          <a:p>
+            <a:pPr algn="ctr">
+              <a:lnSpc>
+                <a:spcPct val="90000"/>
+              </a:lnSpc>
+            </a:pPr>
+            <a:endParaRPr lang="en-US" sz="2000" dirty="0">
+              <a:solidFill>
+                <a:schemeClr val="bg1"/>
+              </a:solidFill>
+            </a:endParaRPr>
+          </a:p>
+        </p:txBody>
+      </p:sp>
     </p:spTree>
     <p:extLst>
       <p:ext uri="{BB962C8B-B14F-4D97-AF65-F5344CB8AC3E}">
-        <p14:creationId xmlns:p14="http://schemas.microsoft.com/office/powerpoint/2010/main" val="135586253"/>
+        <p14:creationId xmlns:p14="http://schemas.microsoft.com/office/powerpoint/2010/main" val="32320673"/>
       </p:ext>
     </p:extLst>
   </p:cSld>
@@ -8143,95 +8091,10 @@
           </a:p>
         </p:txBody>
       </p:sp>
-      <p:sp>
-        <p:nvSpPr>
-          <p:cNvPr id="4" name="Rectangle 3">
-            <a:extLst>
-              <a:ext uri="{FF2B5EF4-FFF2-40B4-BE49-F238E27FC236}">
-                <a16:creationId xmlns:a16="http://schemas.microsoft.com/office/drawing/2014/main" id="{F25F886C-EB2B-9191-6F30-62179A7DF7F1}"/>
-              </a:ext>
-            </a:extLst>
-          </p:cNvPr>
-          <p:cNvSpPr/>
-          <p:nvPr/>
-        </p:nvSpPr>
-        <p:spPr>
-          <a:xfrm>
-            <a:off x="9695329" y="1325880"/>
-            <a:ext cx="1869142" cy="4416014"/>
-          </a:xfrm>
-          <a:prstGeom prst="rect">
-            <a:avLst/>
-          </a:prstGeom>
-          <a:solidFill>
-            <a:schemeClr val="accent4">
-              <a:lumMod val="75000"/>
-            </a:schemeClr>
-          </a:solidFill>
-          <a:ln>
-            <a:noFill/>
-          </a:ln>
-          <a:effectLst>
-            <a:outerShdw blurRad="44450" dist="27940" dir="5400000" algn="ctr">
-              <a:srgbClr val="000000">
-                <a:alpha val="32000"/>
-              </a:srgbClr>
-            </a:outerShdw>
-          </a:effectLst>
-        </p:spPr>
-        <p:txBody>
-          <a:bodyPr rot="0" spcFirstLastPara="0" vertOverflow="overflow" horzOverflow="overflow" vert="horz" wrap="square" lIns="121851" tIns="60925" rIns="121851" bIns="60925" numCol="1" spcCol="0" rtlCol="0" fromWordArt="0" anchor="ctr" anchorCtr="0" forceAA="0" compatLnSpc="1">
-            <a:prstTxWarp prst="textNoShape">
-              <a:avLst/>
-            </a:prstTxWarp>
-            <a:noAutofit/>
-          </a:bodyPr>
-          <a:lstStyle/>
-          <a:p>
-            <a:pPr algn="ctr">
-              <a:lnSpc>
-                <a:spcPct val="90000"/>
-              </a:lnSpc>
-            </a:pPr>
-            <a:r>
-              <a:rPr lang="en-US" sz="2000" dirty="0">
-                <a:solidFill>
-                  <a:schemeClr val="bg1"/>
-                </a:solidFill>
-              </a:rPr>
-              <a:t>In the 2005 simulation mentioned earlier, out of 5 teams, ours was the only team that had success in getting good science outcome </a:t>
-            </a:r>
-          </a:p>
-          <a:p>
-            <a:pPr algn="ctr">
-              <a:lnSpc>
-                <a:spcPct val="90000"/>
-              </a:lnSpc>
-            </a:pPr>
-            <a:endParaRPr lang="en-US" sz="2000" dirty="0">
-              <a:solidFill>
-                <a:schemeClr val="bg1"/>
-              </a:solidFill>
-            </a:endParaRPr>
-          </a:p>
-          <a:p>
-            <a:pPr algn="ctr">
-              <a:lnSpc>
-                <a:spcPct val="90000"/>
-              </a:lnSpc>
-            </a:pPr>
-            <a:endParaRPr lang="en-US" sz="2000" dirty="0">
-              <a:solidFill>
-                <a:schemeClr val="bg1"/>
-              </a:solidFill>
-            </a:endParaRPr>
-          </a:p>
-        </p:txBody>
-      </p:sp>
     </p:spTree>
     <p:extLst>
       <p:ext uri="{BB962C8B-B14F-4D97-AF65-F5344CB8AC3E}">
-        <p14:creationId xmlns:p14="http://schemas.microsoft.com/office/powerpoint/2010/main" val="2324504081"/>
+        <p14:creationId xmlns:p14="http://schemas.microsoft.com/office/powerpoint/2010/main" val="135586253"/>
       </p:ext>
     </p:extLst>
   </p:cSld>
@@ -8263,7 +8126,7 @@
           <p:cNvPr id="2" name="Title 1">
             <a:extLst>
               <a:ext uri="{FF2B5EF4-FFF2-40B4-BE49-F238E27FC236}">
-                <a16:creationId xmlns:a16="http://schemas.microsoft.com/office/drawing/2014/main" id="{A5235A0F-203F-5BF7-7718-068E3B49D01A}"/>
+                <a16:creationId xmlns:a16="http://schemas.microsoft.com/office/drawing/2014/main" id="{C2376954-3703-3D5F-1556-493251ADA7D6}"/>
               </a:ext>
             </a:extLst>
           </p:cNvPr>
@@ -8281,7 +8144,7 @@
           <a:p>
             <a:r>
               <a:rPr lang="en-US" dirty="0"/>
-              <a:t>How do you plan</a:t>
+              <a:t>Why do you need to plan?</a:t>
             </a:r>
           </a:p>
         </p:txBody>
@@ -8291,7 +8154,7 @@
           <p:cNvPr id="3" name="Content Placeholder 2">
             <a:extLst>
               <a:ext uri="{FF2B5EF4-FFF2-40B4-BE49-F238E27FC236}">
-                <a16:creationId xmlns:a16="http://schemas.microsoft.com/office/drawing/2014/main" id="{B8E8927D-BD4A-178A-E7C6-FB6DB5E104CB}"/>
+                <a16:creationId xmlns:a16="http://schemas.microsoft.com/office/drawing/2014/main" id="{4F3D57F9-5D12-25C5-A6B4-27E9D7E906C9}"/>
               </a:ext>
             </a:extLst>
           </p:cNvPr>
@@ -8304,8 +8167,8 @@
         </p:nvSpPr>
         <p:spPr>
           <a:xfrm>
-            <a:off x="527125" y="1729291"/>
-            <a:ext cx="11369809" cy="4717229"/>
+            <a:off x="365761" y="1325879"/>
+            <a:ext cx="9006840" cy="4402567"/>
           </a:xfrm>
         </p:spPr>
         <p:txBody>
@@ -8314,46 +8177,182 @@
           <a:p>
             <a:r>
               <a:rPr lang="en-US" dirty="0"/>
-              <a:t>Focused verification of the target simulation on the target platform</a:t>
+              <a:t>Machines are expensive and rare resources</a:t>
             </a:r>
           </a:p>
           <a:p>
             <a:pPr lvl="1"/>
             <a:r>
               <a:rPr lang="en-US" dirty="0"/>
-              <a:t>Over and above regular testing </a:t>
+              <a:t>Operating them is also very expensive</a:t>
+            </a:r>
+          </a:p>
+          <a:p>
+            <a:pPr lvl="2"/>
+            <a:r>
+              <a:rPr lang="en-US" dirty="0">
+                <a:solidFill>
+                  <a:srgbClr val="C00000"/>
+                </a:solidFill>
+              </a:rPr>
+              <a:t>If you made a mistake in your input parameters and got garbage results on a large scale run, you just wasted hundreds of thousands of dollars </a:t>
             </a:r>
           </a:p>
           <a:p>
             <a:pPr lvl="1"/>
             <a:r>
               <a:rPr lang="en-US" dirty="0"/>
-              <a:t>Emphasis on understanding solver validity regime</a:t>
+              <a:t>Many people are competing for these resources</a:t>
+            </a:r>
+          </a:p>
+          <a:p>
+            <a:pPr lvl="2"/>
+            <a:r>
+              <a:rPr lang="en-US" dirty="0">
+                <a:solidFill>
+                  <a:srgbClr val="C00000"/>
+                </a:solidFill>
+              </a:rPr>
+              <a:t>Your wasted run is likely to be either your or someone else’s opportunity lost</a:t>
             </a:r>
           </a:p>
           <a:p>
             <a:pPr lvl="1"/>
-            <a:endParaRPr lang="en-US" dirty="0"/>
-          </a:p>
-          <a:p>
-            <a:r>
-              <a:rPr lang="en-US" dirty="0"/>
-              <a:t>Pathfinder runs to get a good estimate of needed resources</a:t>
-            </a:r>
-          </a:p>
-          <a:p>
-            <a:pPr lvl="1"/>
-            <a:r>
-              <a:rPr lang="en-US" dirty="0"/>
-              <a:t>Cost benefit analysis of fidelity Vs reaching science goals in allocated resources</a:t>
-            </a:r>
+            <a:r>
+              <a:rPr lang="en-US" dirty="0"/>
+              <a:t>You are likely charting new scientific territory</a:t>
+            </a:r>
+          </a:p>
+          <a:p>
+            <a:pPr lvl="2"/>
+            <a:r>
+              <a:rPr lang="en-US" dirty="0">
+                <a:solidFill>
+                  <a:srgbClr val="C00000"/>
+                </a:solidFill>
+              </a:rPr>
+              <a:t>Some aspect of using your code may not have been important before, but may become critical in the new study</a:t>
+            </a:r>
+          </a:p>
+          <a:p>
+            <a:pPr lvl="2"/>
+            <a:r>
+              <a:rPr lang="en-US" dirty="0">
+                <a:solidFill>
+                  <a:srgbClr val="C00000"/>
+                </a:solidFill>
+              </a:rPr>
+              <a:t>Some solver may run up against the limits of its validity</a:t>
+            </a:r>
+          </a:p>
+          <a:p>
+            <a:pPr lvl="2"/>
+            <a:r>
+              <a:rPr lang="en-US" dirty="0">
+                <a:solidFill>
+                  <a:srgbClr val="C00000"/>
+                </a:solidFill>
+              </a:rPr>
+              <a:t>Inflight correction may be needed to parameters to continue with the study</a:t>
+            </a:r>
+          </a:p>
+          <a:p>
+            <a:r>
+              <a:rPr lang="en-US" dirty="0"/>
+              <a:t>Aim for no surprises, but be prepared for them</a:t>
+            </a:r>
+          </a:p>
+        </p:txBody>
+      </p:sp>
+      <p:sp>
+        <p:nvSpPr>
+          <p:cNvPr id="4" name="Rectangle 3">
+            <a:extLst>
+              <a:ext uri="{FF2B5EF4-FFF2-40B4-BE49-F238E27FC236}">
+                <a16:creationId xmlns:a16="http://schemas.microsoft.com/office/drawing/2014/main" id="{F25F886C-EB2B-9191-6F30-62179A7DF7F1}"/>
+              </a:ext>
+            </a:extLst>
+          </p:cNvPr>
+          <p:cNvSpPr/>
+          <p:nvPr/>
+        </p:nvSpPr>
+        <p:spPr>
+          <a:xfrm>
+            <a:off x="9695329" y="1325880"/>
+            <a:ext cx="1869142" cy="4416014"/>
+          </a:xfrm>
+          <a:prstGeom prst="rect">
+            <a:avLst/>
+          </a:prstGeom>
+          <a:solidFill>
+            <a:schemeClr val="accent4">
+              <a:lumMod val="75000"/>
+            </a:schemeClr>
+          </a:solidFill>
+          <a:ln>
+            <a:noFill/>
+          </a:ln>
+          <a:effectLst>
+            <a:outerShdw blurRad="44450" dist="27940" dir="5400000" algn="ctr">
+              <a:srgbClr val="000000">
+                <a:alpha val="32000"/>
+              </a:srgbClr>
+            </a:outerShdw>
+          </a:effectLst>
+        </p:spPr>
+        <p:txBody>
+          <a:bodyPr rot="0" spcFirstLastPara="0" vertOverflow="overflow" horzOverflow="overflow" vert="horz" wrap="square" lIns="121851" tIns="60925" rIns="121851" bIns="60925" numCol="1" spcCol="0" rtlCol="0" fromWordArt="0" anchor="ctr" anchorCtr="0" forceAA="0" compatLnSpc="1">
+            <a:prstTxWarp prst="textNoShape">
+              <a:avLst/>
+            </a:prstTxWarp>
+            <a:noAutofit/>
+          </a:bodyPr>
+          <a:lstStyle/>
+          <a:p>
+            <a:pPr algn="ctr">
+              <a:lnSpc>
+                <a:spcPct val="90000"/>
+              </a:lnSpc>
+            </a:pPr>
+            <a:r>
+              <a:rPr lang="en-US" sz="2000" dirty="0">
+                <a:solidFill>
+                  <a:schemeClr val="bg1"/>
+                </a:solidFill>
+              </a:rPr>
+              <a:t>In the 2005 simulation mentioned earlier, out of 5 teams, ours was the only team that had success in getting good science outcome </a:t>
+            </a:r>
+          </a:p>
+          <a:p>
+            <a:pPr algn="ctr">
+              <a:lnSpc>
+                <a:spcPct val="90000"/>
+              </a:lnSpc>
+            </a:pPr>
+            <a:endParaRPr lang="en-US" sz="2000" dirty="0">
+              <a:solidFill>
+                <a:schemeClr val="bg1"/>
+              </a:solidFill>
+            </a:endParaRPr>
+          </a:p>
+          <a:p>
+            <a:pPr algn="ctr">
+              <a:lnSpc>
+                <a:spcPct val="90000"/>
+              </a:lnSpc>
+            </a:pPr>
+            <a:endParaRPr lang="en-US" sz="2000" dirty="0">
+              <a:solidFill>
+                <a:schemeClr val="bg1"/>
+              </a:solidFill>
+            </a:endParaRPr>
           </a:p>
         </p:txBody>
       </p:sp>
     </p:spTree>
     <p:extLst>
       <p:ext uri="{BB962C8B-B14F-4D97-AF65-F5344CB8AC3E}">
-        <p14:creationId xmlns:p14="http://schemas.microsoft.com/office/powerpoint/2010/main" val="3416025368"/>
+        <p14:creationId xmlns:p14="http://schemas.microsoft.com/office/powerpoint/2010/main" val="2324504081"/>
       </p:ext>
     </p:extLst>
   </p:cSld>
@@ -8426,7 +8425,7 @@
         </p:nvSpPr>
         <p:spPr>
           <a:xfrm>
-            <a:off x="365760" y="1159135"/>
+            <a:off x="527125" y="1729291"/>
             <a:ext cx="11369809" cy="4717229"/>
           </a:xfrm>
         </p:spPr>
@@ -8436,52 +8435,38 @@
           <a:p>
             <a:r>
               <a:rPr lang="en-US" dirty="0"/>
-              <a:t>Develop helpful diagnostics</a:t>
+              <a:t>Focused verification of the target simulation on the target platform</a:t>
             </a:r>
           </a:p>
           <a:p>
             <a:pPr lvl="1"/>
             <a:r>
               <a:rPr lang="en-US" dirty="0"/>
-              <a:t>Low overhead ways of confirming the health of the run</a:t>
-            </a:r>
-          </a:p>
-          <a:p>
-            <a:pPr lvl="2"/>
-            <a:r>
-              <a:rPr lang="en-US" dirty="0"/>
-              <a:t>Are conserved quantities conserved?</a:t>
-            </a:r>
-          </a:p>
-          <a:p>
-            <a:pPr lvl="2"/>
-            <a:r>
-              <a:rPr lang="en-US" dirty="0"/>
-              <a:t>Has any quantity become unphysical?</a:t>
-            </a:r>
-          </a:p>
-          <a:p>
-            <a:pPr lvl="2"/>
+              <a:t>Over and above regular testing </a:t>
+            </a:r>
+          </a:p>
+          <a:p>
+            <a:pPr lvl="1"/>
+            <a:r>
+              <a:rPr lang="en-US" dirty="0"/>
+              <a:t>Emphasis on understanding solver validity regime</a:t>
+            </a:r>
+          </a:p>
+          <a:p>
+            <a:pPr lvl="1"/>
             <a:endParaRPr lang="en-US" dirty="0"/>
           </a:p>
           <a:p>
             <a:r>
               <a:rPr lang="en-US" dirty="0"/>
-              <a:t>Develop hierarchy of analysis</a:t>
+              <a:t>Pathfinder runs to get a good estimate of needed resources</a:t>
             </a:r>
           </a:p>
           <a:p>
             <a:pPr lvl="1"/>
             <a:r>
               <a:rPr lang="en-US" dirty="0"/>
-              <a:t>Full analysis of runs is not feasible in flight</a:t>
-            </a:r>
-          </a:p>
-          <a:p>
-            <a:pPr lvl="1"/>
-            <a:r>
-              <a:rPr lang="en-US" dirty="0"/>
-              <a:t>Intermediate level runs can give further insight into health of the simulation</a:t>
+              <a:t>Cost benefit analysis of fidelity Vs reaching science goals in allocated resources</a:t>
             </a:r>
           </a:p>
         </p:txBody>
@@ -8489,7 +8474,7 @@
     </p:spTree>
     <p:extLst>
       <p:ext uri="{BB962C8B-B14F-4D97-AF65-F5344CB8AC3E}">
-        <p14:creationId xmlns:p14="http://schemas.microsoft.com/office/powerpoint/2010/main" val="3873864617"/>
+        <p14:creationId xmlns:p14="http://schemas.microsoft.com/office/powerpoint/2010/main" val="3416025368"/>
       </p:ext>
     </p:extLst>
   </p:cSld>
@@ -8521,7 +8506,7 @@
           <p:cNvPr id="2" name="Title 1">
             <a:extLst>
               <a:ext uri="{FF2B5EF4-FFF2-40B4-BE49-F238E27FC236}">
-                <a16:creationId xmlns:a16="http://schemas.microsoft.com/office/drawing/2014/main" id="{532AD9BB-395B-66A5-5D5E-B94329EF58ED}"/>
+                <a16:creationId xmlns:a16="http://schemas.microsoft.com/office/drawing/2014/main" id="{A5235A0F-203F-5BF7-7718-068E3B49D01A}"/>
               </a:ext>
             </a:extLst>
           </p:cNvPr>
@@ -8539,7 +8524,7 @@
           <a:p>
             <a:r>
               <a:rPr lang="en-US" dirty="0"/>
-              <a:t>Story of one simulation campaign</a:t>
+              <a:t>How do you plan</a:t>
             </a:r>
           </a:p>
         </p:txBody>
@@ -8549,7 +8534,7 @@
           <p:cNvPr id="3" name="Content Placeholder 2">
             <a:extLst>
               <a:ext uri="{FF2B5EF4-FFF2-40B4-BE49-F238E27FC236}">
-                <a16:creationId xmlns:a16="http://schemas.microsoft.com/office/drawing/2014/main" id="{13C86A4D-96BB-6C1B-67D4-D498DE9DAFF2}"/>
+                <a16:creationId xmlns:a16="http://schemas.microsoft.com/office/drawing/2014/main" id="{B8E8927D-BD4A-178A-E7C6-FB6DB5E104CB}"/>
               </a:ext>
             </a:extLst>
           </p:cNvPr>
@@ -8562,8 +8547,8 @@
         </p:nvSpPr>
         <p:spPr>
           <a:xfrm>
-            <a:off x="409507" y="1405111"/>
-            <a:ext cx="11369809" cy="4047778"/>
+            <a:off x="365760" y="1159135"/>
+            <a:ext cx="11369809" cy="4717229"/>
           </a:xfrm>
         </p:spPr>
         <p:txBody>
@@ -8572,77 +8557,52 @@
           <a:p>
             <a:r>
               <a:rPr lang="en-US" dirty="0"/>
-              <a:t>Theory of Type </a:t>
-            </a:r>
-            <a:r>
-              <a:rPr lang="en-US" dirty="0" err="1"/>
-              <a:t>Ia</a:t>
-            </a:r>
-            <a:r>
-              <a:rPr lang="en-US" dirty="0"/>
-              <a:t> supernova explosion – 2006/2007</a:t>
+              <a:t>Develop helpful diagnostics</a:t>
             </a:r>
           </a:p>
           <a:p>
             <a:pPr lvl="1"/>
             <a:r>
               <a:rPr lang="en-US" dirty="0"/>
-              <a:t>Evidence from observations: </a:t>
+              <a:t>Low overhead ways of confirming the health of the run</a:t>
             </a:r>
           </a:p>
           <a:p>
             <a:pPr lvl="2"/>
             <a:r>
               <a:rPr lang="en-US" dirty="0"/>
-              <a:t>Light curve powered by Ni56 decay</a:t>
+              <a:t>Are conserved quantities conserved?</a:t>
             </a:r>
           </a:p>
           <a:p>
             <a:pPr lvl="2"/>
             <a:r>
               <a:rPr lang="en-US" dirty="0"/>
-              <a:t>Evidence of medium weight elements, but in much smaller quantities</a:t>
+              <a:t>Has any quantity become unphysical?</a:t>
+            </a:r>
+          </a:p>
+          <a:p>
+            <a:pPr lvl="2"/>
+            <a:endParaRPr lang="en-US" dirty="0"/>
+          </a:p>
+          <a:p>
+            <a:r>
+              <a:rPr lang="en-US" dirty="0"/>
+              <a:t>Develop hierarchy of analysis</a:t>
             </a:r>
           </a:p>
           <a:p>
             <a:pPr lvl="1"/>
             <a:r>
               <a:rPr lang="en-US" dirty="0"/>
-              <a:t>Implied transition from deflagration to detonation</a:t>
-            </a:r>
-          </a:p>
-          <a:p>
-            <a:r>
-              <a:rPr lang="en-US" dirty="0"/>
-              <a:t>A 2D exploratory run had given a tantalizing answer to how?</a:t>
+              <a:t>Full analysis of runs is not feasible in flight</a:t>
             </a:r>
           </a:p>
           <a:p>
             <a:pPr lvl="1"/>
             <a:r>
               <a:rPr lang="en-US" dirty="0"/>
-              <a:t>To confirm a full 3D run was needed at good enough resolution</a:t>
-            </a:r>
-          </a:p>
-          <a:p>
-            <a:pPr lvl="1"/>
-            <a:r>
-              <a:rPr lang="en-US" dirty="0"/>
-              <a:t>It would be the largest run of its kind at the time – totally uncharted territory</a:t>
-            </a:r>
-          </a:p>
-          <a:p>
-            <a:pPr lvl="1"/>
-            <a:r>
-              <a:rPr lang="en-US" dirty="0"/>
-              <a:t>Until then 3D runs had been octants relying on symmetry</a:t>
-            </a:r>
-          </a:p>
-          <a:p>
-            <a:pPr lvl="2"/>
-            <a:r>
-              <a:rPr lang="en-US" dirty="0"/>
-              <a:t>The 2D run had shown that symmetry had to be avoided</a:t>
+              <a:t>Intermediate level runs can give further insight into health of the simulation</a:t>
             </a:r>
           </a:p>
         </p:txBody>
@@ -8650,7 +8610,7 @@
     </p:spTree>
     <p:extLst>
       <p:ext uri="{BB962C8B-B14F-4D97-AF65-F5344CB8AC3E}">
-        <p14:creationId xmlns:p14="http://schemas.microsoft.com/office/powerpoint/2010/main" val="936705717"/>
+        <p14:creationId xmlns:p14="http://schemas.microsoft.com/office/powerpoint/2010/main" val="3873864617"/>
       </p:ext>
     </p:extLst>
   </p:cSld>
@@ -8682,7 +8642,7 @@
           <p:cNvPr id="2" name="Title 1">
             <a:extLst>
               <a:ext uri="{FF2B5EF4-FFF2-40B4-BE49-F238E27FC236}">
-                <a16:creationId xmlns:a16="http://schemas.microsoft.com/office/drawing/2014/main" id="{3DAE27AA-E90C-9E73-9F78-A1907E2A009C}"/>
+                <a16:creationId xmlns:a16="http://schemas.microsoft.com/office/drawing/2014/main" id="{532AD9BB-395B-66A5-5D5E-B94329EF58ED}"/>
               </a:ext>
             </a:extLst>
           </p:cNvPr>
@@ -8700,7 +8660,7 @@
           <a:p>
             <a:r>
               <a:rPr lang="en-US" dirty="0"/>
-              <a:t>Preparation Steps</a:t>
+              <a:t>Story of one simulation campaign</a:t>
             </a:r>
           </a:p>
         </p:txBody>
@@ -8710,7 +8670,7 @@
           <p:cNvPr id="3" name="Content Placeholder 2">
             <a:extLst>
               <a:ext uri="{FF2B5EF4-FFF2-40B4-BE49-F238E27FC236}">
-                <a16:creationId xmlns:a16="http://schemas.microsoft.com/office/drawing/2014/main" id="{47F33A05-64E3-D838-EAB7-99CE5B676A05}"/>
+                <a16:creationId xmlns:a16="http://schemas.microsoft.com/office/drawing/2014/main" id="{13C86A4D-96BB-6C1B-67D4-D498DE9DAFF2}"/>
               </a:ext>
             </a:extLst>
           </p:cNvPr>
@@ -8721,66 +8681,97 @@
             <p:ph idx="1"/>
           </p:nvPr>
         </p:nvSpPr>
-        <p:spPr/>
+        <p:spPr>
+          <a:xfrm>
+            <a:off x="409507" y="1405111"/>
+            <a:ext cx="11369809" cy="4047778"/>
+          </a:xfrm>
+        </p:spPr>
         <p:txBody>
           <a:bodyPr/>
           <a:lstStyle/>
           <a:p>
             <a:r>
               <a:rPr lang="en-US" dirty="0"/>
-              <a:t>Step 1 – develop a test that represents the most complex physics interactions</a:t>
-            </a:r>
-          </a:p>
-          <a:p>
-            <a:r>
-              <a:rPr lang="en-US" dirty="0"/>
-              <a:t>Challenges:</a:t>
+              <a:t>Theory of Type </a:t>
+            </a:r>
+            <a:r>
+              <a:rPr lang="en-US" dirty="0" err="1"/>
+              <a:t>Ia</a:t>
+            </a:r>
+            <a:r>
+              <a:rPr lang="en-US" dirty="0"/>
+              <a:t> supernova explosion – 2006/2007</a:t>
             </a:r>
           </a:p>
           <a:p>
             <a:pPr lvl="1"/>
             <a:r>
               <a:rPr lang="en-US" dirty="0"/>
-              <a:t>Features take a long time to develop</a:t>
+              <a:t>Evidence from observations: </a:t>
+            </a:r>
+          </a:p>
+          <a:p>
+            <a:pPr lvl="2"/>
+            <a:r>
+              <a:rPr lang="en-US" dirty="0"/>
+              <a:t>Light curve powered by Ni56 decay</a:t>
+            </a:r>
+          </a:p>
+          <a:p>
+            <a:pPr lvl="2"/>
+            <a:r>
+              <a:rPr lang="en-US" dirty="0"/>
+              <a:t>Evidence of medium weight elements, but in much smaller quantities</a:t>
             </a:r>
           </a:p>
           <a:p>
             <a:pPr lvl="1"/>
             <a:r>
               <a:rPr lang="en-US" dirty="0"/>
-              <a:t>Want to ensure that at least one refinement step occurs during the test</a:t>
+              <a:t>Implied transition from deflagration to detonation</a:t>
+            </a:r>
+          </a:p>
+          <a:p>
+            <a:r>
+              <a:rPr lang="en-US" dirty="0"/>
+              <a:t>A 2D exploratory run had given a tantalizing answer to how?</a:t>
             </a:r>
           </a:p>
           <a:p>
             <a:pPr lvl="1"/>
             <a:r>
               <a:rPr lang="en-US" dirty="0"/>
-              <a:t>IO too slow to restart from a large checkpoint at late stage of the run</a:t>
+              <a:t>To confirm a full 3D run was needed at good enough resolution</a:t>
+            </a:r>
+          </a:p>
+          <a:p>
+            <a:pPr lvl="1"/>
+            <a:r>
+              <a:rPr lang="en-US" dirty="0"/>
+              <a:t>It would be the largest run of its kind at the time – totally uncharted territory</a:t>
+            </a:r>
+          </a:p>
+          <a:p>
+            <a:pPr lvl="1"/>
+            <a:r>
+              <a:rPr lang="en-US" dirty="0"/>
+              <a:t>Until then 3D runs had been octants relying on symmetry</a:t>
             </a:r>
           </a:p>
           <a:p>
             <a:pPr lvl="2"/>
             <a:r>
               <a:rPr lang="en-US" dirty="0"/>
-              <a:t>Also test would need a large chunk of the machine</a:t>
-            </a:r>
-          </a:p>
-          <a:p>
-            <a:r>
-              <a:rPr lang="en-US" dirty="0"/>
-              <a:t>Use physics understanding to create initial conditions that would quickly develop comparable complexity</a:t>
-            </a:r>
-          </a:p>
-          <a:p>
-            <a:pPr lvl="1"/>
-            <a:endParaRPr lang="en-US" dirty="0"/>
+              <a:t>The 2D run had shown that symmetry had to be avoided</a:t>
+            </a:r>
           </a:p>
         </p:txBody>
       </p:sp>
     </p:spTree>
     <p:extLst>
       <p:ext uri="{BB962C8B-B14F-4D97-AF65-F5344CB8AC3E}">
-        <p14:creationId xmlns:p14="http://schemas.microsoft.com/office/powerpoint/2010/main" val="1970226240"/>
+        <p14:creationId xmlns:p14="http://schemas.microsoft.com/office/powerpoint/2010/main" val="936705717"/>
       </p:ext>
     </p:extLst>
   </p:cSld>
@@ -8858,40 +8849,47 @@
           <a:p>
             <a:r>
               <a:rPr lang="en-US" dirty="0"/>
-              <a:t>Step 2 – Use the new test to characterize the performance behavior of the target platform</a:t>
-            </a:r>
-          </a:p>
-          <a:p>
-            <a:r>
-              <a:rPr lang="en-US" dirty="0"/>
-              <a:t>Motivation:</a:t>
+              <a:t>Step 1 – develop a test that represents the most complex physics interactions</a:t>
+            </a:r>
+          </a:p>
+          <a:p>
+            <a:r>
+              <a:rPr lang="en-US" dirty="0"/>
+              <a:t>Challenges:</a:t>
             </a:r>
           </a:p>
           <a:p>
             <a:pPr lvl="1"/>
             <a:r>
               <a:rPr lang="en-US" dirty="0"/>
-              <a:t>Standard performance studies could not give crucial information</a:t>
+              <a:t>Features take a long time to develop</a:t>
             </a:r>
           </a:p>
           <a:p>
             <a:pPr lvl="1"/>
             <a:r>
               <a:rPr lang="en-US" dirty="0"/>
-              <a:t>AMR refinement patterns make each application different</a:t>
+              <a:t>Want to ensure that at least one refinement step occurs during the test</a:t>
             </a:r>
           </a:p>
           <a:p>
             <a:pPr lvl="1"/>
             <a:r>
               <a:rPr lang="en-US" dirty="0"/>
-              <a:t>Interoperability and trade-off opportunities needed to explored in a closely resembling simulation behavior</a:t>
-            </a:r>
-          </a:p>
-          <a:p>
-            <a:r>
-              <a:rPr lang="en-US" dirty="0"/>
-              <a:t>Full fidelity 2D runs, and a set of runs of the new test provided enough information to extrapolate and estimate needed CPU hours </a:t>
+              <a:t>IO too slow to restart from a large checkpoint at late stage of the run</a:t>
+            </a:r>
+          </a:p>
+          <a:p>
+            <a:pPr lvl="2"/>
+            <a:r>
+              <a:rPr lang="en-US" dirty="0"/>
+              <a:t>Also test would need a large chunk of the machine</a:t>
+            </a:r>
+          </a:p>
+          <a:p>
+            <a:r>
+              <a:rPr lang="en-US" dirty="0"/>
+              <a:t>Use physics understanding to create initial conditions that would quickly develop comparable complexity</a:t>
             </a:r>
           </a:p>
           <a:p>
@@ -8903,7 +8901,7 @@
     </p:spTree>
     <p:extLst>
       <p:ext uri="{BB962C8B-B14F-4D97-AF65-F5344CB8AC3E}">
-        <p14:creationId xmlns:p14="http://schemas.microsoft.com/office/powerpoint/2010/main" val="1965150740"/>
+        <p14:creationId xmlns:p14="http://schemas.microsoft.com/office/powerpoint/2010/main" val="1970226240"/>
       </p:ext>
     </p:extLst>
   </p:cSld>
@@ -8974,19 +8972,14 @@
             <p:ph idx="1"/>
           </p:nvPr>
         </p:nvSpPr>
-        <p:spPr>
-          <a:xfrm>
-            <a:off x="365760" y="1737360"/>
-            <a:ext cx="11212158" cy="4047778"/>
-          </a:xfrm>
-        </p:spPr>
+        <p:spPr/>
         <p:txBody>
           <a:bodyPr/>
           <a:lstStyle/>
           <a:p>
             <a:r>
               <a:rPr lang="en-US" dirty="0"/>
-              <a:t>Step 3 – Look for trade-offs and optimization opportunities</a:t>
+              <a:t>Step 2 – Use the new test to characterize the performance behavior of the target platform</a:t>
             </a:r>
           </a:p>
           <a:p>
@@ -8999,103 +8992,39 @@
             <a:pPr lvl="1"/>
             <a:r>
               <a:rPr lang="en-US" dirty="0"/>
-              <a:t>Initial CPU estimates too high to complete the runs within allocations</a:t>
+              <a:t>Standard performance studies could not give crucial information</a:t>
             </a:r>
           </a:p>
           <a:p>
             <a:pPr lvl="1"/>
             <a:r>
               <a:rPr lang="en-US" dirty="0"/>
-              <a:t>Exploration of any parameter space needs to minimize individual run times</a:t>
-            </a:r>
-          </a:p>
-          <a:p>
-            <a:r>
-              <a:rPr lang="en-US" dirty="0"/>
-              <a:t>Many opportunities were found, documented in reference below. Some examples:</a:t>
+              <a:t>AMR refinement patterns make each application different</a:t>
             </a:r>
           </a:p>
           <a:p>
             <a:pPr lvl="1"/>
             <a:r>
               <a:rPr lang="en-US" dirty="0"/>
-              <a:t>Tilt the star along the direction of rising bubble to get symmetry in gravity computation</a:t>
+              <a:t>Interoperability and trade-off opportunities needed to explored in a closely resembling simulation behavior</a:t>
+            </a:r>
+          </a:p>
+          <a:p>
+            <a:r>
+              <a:rPr lang="en-US" dirty="0"/>
+              <a:t>Full fidelity 2D runs, and a set of runs of the new test provided enough information to extrapolate and estimate needed CPU hours </a:t>
             </a:r>
           </a:p>
           <a:p>
             <a:pPr lvl="1"/>
-            <a:r>
-              <a:rPr lang="en-US" dirty="0"/>
-              <a:t>Remove subsampling in gravity </a:t>
-            </a:r>
-          </a:p>
-          <a:p>
-            <a:pPr lvl="1"/>
-            <a:r>
-              <a:rPr lang="en-US" dirty="0"/>
-              <a:t>Offload nuclear burning to post-processing</a:t>
-            </a:r>
-          </a:p>
-          <a:p>
-            <a:pPr marL="0" indent="0">
-              <a:buNone/>
-            </a:pPr>
-            <a:r>
-              <a:rPr lang="en-US" dirty="0"/>
-              <a:t>    </a:t>
-            </a:r>
-            <a:endParaRPr lang="en-US" sz="1800" dirty="0"/>
-          </a:p>
-        </p:txBody>
-      </p:sp>
-      <p:sp>
-        <p:nvSpPr>
-          <p:cNvPr id="4" name="TextBox 3">
-            <a:extLst>
-              <a:ext uri="{FF2B5EF4-FFF2-40B4-BE49-F238E27FC236}">
-                <a16:creationId xmlns:a16="http://schemas.microsoft.com/office/drawing/2014/main" id="{D7C1379D-FEB9-988E-EB01-3C17171B996C}"/>
-              </a:ext>
-            </a:extLst>
-          </p:cNvPr>
-          <p:cNvSpPr txBox="1"/>
-          <p:nvPr/>
-        </p:nvSpPr>
-        <p:spPr>
-          <a:xfrm>
-            <a:off x="189603" y="5854986"/>
-            <a:ext cx="7636585" cy="683264"/>
-          </a:xfrm>
-          <a:prstGeom prst="rect">
-            <a:avLst/>
-          </a:prstGeom>
-          <a:noFill/>
-        </p:spPr>
-        <p:txBody>
-          <a:bodyPr wrap="square" lIns="118872" tIns="91440" rIns="118872" bIns="91440" rtlCol="0" anchor="ctr" anchorCtr="0">
-            <a:normAutofit fontScale="85000" lnSpcReduction="20000"/>
-          </a:bodyPr>
-          <a:lstStyle/>
-          <a:p>
-            <a:pPr>
-              <a:lnSpc>
-                <a:spcPct val="90000"/>
-              </a:lnSpc>
-            </a:pPr>
-            <a:r>
-              <a:rPr lang="en-US" dirty="0">
-                <a:solidFill>
-                  <a:srgbClr val="C00000"/>
-                </a:solidFill>
-              </a:rPr>
-              <a:t>Dubey A, Calder AC, Daley C, et al. Pragmatic optimizations for better scientific utilization of large supercomputers. The International Journal of High Performance Computing Applications. 2013;27(3):360-373. doi:10.1177/1094342012464404</a:t>
-            </a:r>
+            <a:endParaRPr lang="en-US" dirty="0"/>
           </a:p>
         </p:txBody>
       </p:sp>
     </p:spTree>
     <p:extLst>
       <p:ext uri="{BB962C8B-B14F-4D97-AF65-F5344CB8AC3E}">
-        <p14:creationId xmlns:p14="http://schemas.microsoft.com/office/powerpoint/2010/main" val="3984054953"/>
+        <p14:creationId xmlns:p14="http://schemas.microsoft.com/office/powerpoint/2010/main" val="1965150740"/>
       </p:ext>
     </p:extLst>
   </p:cSld>
@@ -9168,7 +9097,7 @@
         </p:nvSpPr>
         <p:spPr>
           <a:xfrm>
-            <a:off x="271631" y="1405111"/>
+            <a:off x="365760" y="1737360"/>
             <a:ext cx="11212158" cy="4047778"/>
           </a:xfrm>
         </p:spPr>
@@ -9178,68 +9107,116 @@
           <a:p>
             <a:r>
               <a:rPr lang="en-US" dirty="0"/>
-              <a:t>Step 4 – Prepare diagnostics and quick analysis mechanism</a:t>
-            </a:r>
-          </a:p>
-          <a:p>
-            <a:r>
-              <a:rPr lang="en-US" dirty="0"/>
-              <a:t>Examples-- diagnostics</a:t>
+              <a:t>Step 3 – Look for trade-offs and optimization opportunities</a:t>
+            </a:r>
+          </a:p>
+          <a:p>
+            <a:r>
+              <a:rPr lang="en-US" dirty="0"/>
+              <a:t>Motivation:</a:t>
             </a:r>
           </a:p>
           <a:p>
             <a:pPr lvl="1"/>
             <a:r>
               <a:rPr lang="en-US" dirty="0"/>
-              <a:t>Conservation of mass, momentum energy</a:t>
+              <a:t>Initial CPU estimates too high to complete the runs within allocations</a:t>
             </a:r>
           </a:p>
           <a:p>
             <a:pPr lvl="1"/>
             <a:r>
               <a:rPr lang="en-US" dirty="0"/>
-              <a:t>Changes in dt recorded in the logfiles</a:t>
+              <a:t>Exploration of any parameter space needs to minimize individual run times</a:t>
+            </a:r>
+          </a:p>
+          <a:p>
+            <a:r>
+              <a:rPr lang="en-US" dirty="0"/>
+              <a:t>Many opportunities were found, documented in reference below. Some examples:</a:t>
             </a:r>
           </a:p>
           <a:p>
             <a:pPr lvl="1"/>
             <a:r>
               <a:rPr lang="en-US" dirty="0"/>
-              <a:t>Spikes in variable values</a:t>
-            </a:r>
-          </a:p>
-          <a:p>
-            <a:r>
-              <a:rPr lang="en-US" dirty="0"/>
-              <a:t>Examples – quick analysis</a:t>
+              <a:t>Tilt the star along the direction of rising bubble to get symmetry in gravity computation</a:t>
             </a:r>
           </a:p>
           <a:p>
             <a:pPr lvl="1"/>
             <a:r>
               <a:rPr lang="en-US" dirty="0"/>
-              <a:t>Quick visualization of random 2D slices</a:t>
+              <a:t>Remove subsampling in gravity </a:t>
             </a:r>
           </a:p>
           <a:p>
             <a:pPr lvl="1"/>
             <a:r>
-              <a:rPr lang="en-US" sz="1800" dirty="0"/>
-              <a:t>Inspection of critical quantities in 1D</a:t>
-            </a:r>
-          </a:p>
-          <a:p>
-            <a:pPr marL="346075" lvl="1" indent="0">
+              <a:rPr lang="en-US" dirty="0"/>
+              <a:t>Offload nuclear burning to post-processing</a:t>
+            </a:r>
+          </a:p>
+          <a:p>
+            <a:pPr marL="0" indent="0">
               <a:buNone/>
             </a:pPr>
+            <a:r>
+              <a:rPr lang="en-US" dirty="0"/>
+              <a:t>    </a:t>
+            </a:r>
             <a:endParaRPr lang="en-US" sz="1800" dirty="0"/>
+          </a:p>
+        </p:txBody>
+      </p:sp>
+      <p:sp>
+        <p:nvSpPr>
+          <p:cNvPr id="4" name="TextBox 3">
+            <a:extLst>
+              <a:ext uri="{FF2B5EF4-FFF2-40B4-BE49-F238E27FC236}">
+                <a16:creationId xmlns:a16="http://schemas.microsoft.com/office/drawing/2014/main" id="{D7C1379D-FEB9-988E-EB01-3C17171B996C}"/>
+              </a:ext>
+            </a:extLst>
+          </p:cNvPr>
+          <p:cNvSpPr txBox="1"/>
+          <p:nvPr/>
+        </p:nvSpPr>
+        <p:spPr>
+          <a:xfrm>
+            <a:off x="189603" y="5854986"/>
+            <a:ext cx="7636585" cy="683264"/>
+          </a:xfrm>
+          <a:prstGeom prst="rect">
+            <a:avLst/>
+          </a:prstGeom>
+          <a:noFill/>
+        </p:spPr>
+        <p:txBody>
+          <a:bodyPr wrap="square" lIns="118872" tIns="91440" rIns="118872" bIns="91440" rtlCol="0" anchor="ctr" anchorCtr="0">
+            <a:normAutofit fontScale="85000" lnSpcReduction="20000"/>
+          </a:bodyPr>
+          <a:lstStyle/>
+          <a:p>
+            <a:pPr>
+              <a:lnSpc>
+                <a:spcPct val="90000"/>
+              </a:lnSpc>
+            </a:pPr>
+            <a:r>
+              <a:rPr lang="en-US" dirty="0">
+                <a:solidFill>
+                  <a:srgbClr val="C00000"/>
+                </a:solidFill>
+              </a:rPr>
+              <a:t>Dubey A, Calder AC, Daley C, et al. Pragmatic optimizations for better scientific utilization of large supercomputers. The International Journal of High Performance Computing Applications. 2013;27(3):360-373. doi:10.1177/1094342012464404</a:t>
+            </a:r>
           </a:p>
         </p:txBody>
       </p:sp>
     </p:spTree>
     <p:extLst>
       <p:ext uri="{BB962C8B-B14F-4D97-AF65-F5344CB8AC3E}">
-        <p14:creationId xmlns:p14="http://schemas.microsoft.com/office/powerpoint/2010/main" val="2623341437"/>
+        <p14:creationId xmlns:p14="http://schemas.microsoft.com/office/powerpoint/2010/main" val="3984054953"/>
       </p:ext>
     </p:extLst>
   </p:cSld>
@@ -9271,7 +9248,7 @@
           <p:cNvPr id="2" name="Title 1">
             <a:extLst>
               <a:ext uri="{FF2B5EF4-FFF2-40B4-BE49-F238E27FC236}">
-                <a16:creationId xmlns:a16="http://schemas.microsoft.com/office/drawing/2014/main" id="{05DA5443-06A3-D891-A1ED-0775C4969FCF}"/>
+                <a16:creationId xmlns:a16="http://schemas.microsoft.com/office/drawing/2014/main" id="{3DAE27AA-E90C-9E73-9F78-A1907E2A009C}"/>
               </a:ext>
             </a:extLst>
           </p:cNvPr>
@@ -9289,11 +9266,7 @@
           <a:p>
             <a:r>
               <a:rPr lang="en-US" dirty="0"/>
-              <a:t>Summary, Takeaway </a:t>
-            </a:r>
-            <a:r>
-              <a:rPr lang="en-US"/>
-              <a:t>and Resources</a:t>
+              <a:t>Preparation Steps</a:t>
             </a:r>
           </a:p>
         </p:txBody>
@@ -9303,7 +9276,7 @@
           <p:cNvPr id="3" name="Content Placeholder 2">
             <a:extLst>
               <a:ext uri="{FF2B5EF4-FFF2-40B4-BE49-F238E27FC236}">
-                <a16:creationId xmlns:a16="http://schemas.microsoft.com/office/drawing/2014/main" id="{CD6C7F32-4FC0-4D35-E8CC-D5A39F47C9BD}"/>
+                <a16:creationId xmlns:a16="http://schemas.microsoft.com/office/drawing/2014/main" id="{47F33A05-64E3-D838-EAB7-99CE5B676A05}"/>
               </a:ext>
             </a:extLst>
           </p:cNvPr>
@@ -9314,19 +9287,80 @@
             <p:ph idx="1"/>
           </p:nvPr>
         </p:nvSpPr>
-        <p:spPr/>
+        <p:spPr>
+          <a:xfrm>
+            <a:off x="271631" y="1405111"/>
+            <a:ext cx="11212158" cy="4047778"/>
+          </a:xfrm>
+        </p:spPr>
         <p:txBody>
           <a:bodyPr/>
           <a:lstStyle/>
           <a:p>
-            <a:endParaRPr lang="en-US"/>
+            <a:r>
+              <a:rPr lang="en-US" dirty="0"/>
+              <a:t>Step 4 – Prepare diagnostics and quick analysis mechanism</a:t>
+            </a:r>
+          </a:p>
+          <a:p>
+            <a:r>
+              <a:rPr lang="en-US" dirty="0"/>
+              <a:t>Examples-- diagnostics</a:t>
+            </a:r>
+          </a:p>
+          <a:p>
+            <a:pPr lvl="1"/>
+            <a:r>
+              <a:rPr lang="en-US" dirty="0"/>
+              <a:t>Conservation of mass, momentum energy</a:t>
+            </a:r>
+          </a:p>
+          <a:p>
+            <a:pPr lvl="1"/>
+            <a:r>
+              <a:rPr lang="en-US" dirty="0"/>
+              <a:t>Changes in dt recorded in the logfiles</a:t>
+            </a:r>
+          </a:p>
+          <a:p>
+            <a:pPr lvl="1"/>
+            <a:r>
+              <a:rPr lang="en-US" dirty="0"/>
+              <a:t>Spikes in variable values</a:t>
+            </a:r>
+          </a:p>
+          <a:p>
+            <a:r>
+              <a:rPr lang="en-US" dirty="0"/>
+              <a:t>Examples – quick analysis</a:t>
+            </a:r>
+          </a:p>
+          <a:p>
+            <a:pPr lvl="1"/>
+            <a:r>
+              <a:rPr lang="en-US" dirty="0"/>
+              <a:t>Quick visualization of random 2D slices</a:t>
+            </a:r>
+          </a:p>
+          <a:p>
+            <a:pPr lvl="1"/>
+            <a:r>
+              <a:rPr lang="en-US" sz="1800" dirty="0"/>
+              <a:t>Inspection of critical quantities in 1D</a:t>
+            </a:r>
+          </a:p>
+          <a:p>
+            <a:pPr marL="346075" lvl="1" indent="0">
+              <a:buNone/>
+            </a:pPr>
+            <a:endParaRPr lang="en-US" sz="1800" dirty="0"/>
           </a:p>
         </p:txBody>
       </p:sp>
     </p:spTree>
     <p:extLst>
       <p:ext uri="{BB962C8B-B14F-4D97-AF65-F5344CB8AC3E}">
-        <p14:creationId xmlns:p14="http://schemas.microsoft.com/office/powerpoint/2010/main" val="2035090352"/>
+        <p14:creationId xmlns:p14="http://schemas.microsoft.com/office/powerpoint/2010/main" val="2623341437"/>
       </p:ext>
     </p:extLst>
   </p:cSld>
@@ -9470,6 +9504,93 @@
     <p:extLst>
       <p:ext uri="{BB962C8B-B14F-4D97-AF65-F5344CB8AC3E}">
         <p14:creationId xmlns:p14="http://schemas.microsoft.com/office/powerpoint/2010/main" val="65008830"/>
+      </p:ext>
+    </p:extLst>
+  </p:cSld>
+  <p:clrMapOvr>
+    <a:masterClrMapping/>
+  </p:clrMapOvr>
+</p:sld>
+</file>
+
+<file path=ppt/slides/slide30.xml><?xml version="1.0" encoding="utf-8"?>
+<p:sld xmlns:a="http://schemas.openxmlformats.org/drawingml/2006/main" xmlns:r="http://schemas.openxmlformats.org/officeDocument/2006/relationships" xmlns:p="http://schemas.openxmlformats.org/presentationml/2006/main">
+  <p:cSld>
+    <p:spTree>
+      <p:nvGrpSpPr>
+        <p:cNvPr id="1" name=""/>
+        <p:cNvGrpSpPr/>
+        <p:nvPr/>
+      </p:nvGrpSpPr>
+      <p:grpSpPr>
+        <a:xfrm>
+          <a:off x="0" y="0"/>
+          <a:ext cx="0" cy="0"/>
+          <a:chOff x="0" y="0"/>
+          <a:chExt cx="0" cy="0"/>
+        </a:xfrm>
+      </p:grpSpPr>
+      <p:sp>
+        <p:nvSpPr>
+          <p:cNvPr id="2" name="Title 1">
+            <a:extLst>
+              <a:ext uri="{FF2B5EF4-FFF2-40B4-BE49-F238E27FC236}">
+                <a16:creationId xmlns:a16="http://schemas.microsoft.com/office/drawing/2014/main" id="{05DA5443-06A3-D891-A1ED-0775C4969FCF}"/>
+              </a:ext>
+            </a:extLst>
+          </p:cNvPr>
+          <p:cNvSpPr>
+            <a:spLocks noGrp="1"/>
+          </p:cNvSpPr>
+          <p:nvPr>
+            <p:ph type="title"/>
+          </p:nvPr>
+        </p:nvSpPr>
+        <p:spPr/>
+        <p:txBody>
+          <a:bodyPr/>
+          <a:lstStyle/>
+          <a:p>
+            <a:r>
+              <a:rPr lang="en-US" dirty="0"/>
+              <a:t>Summary, Takeaway </a:t>
+            </a:r>
+            <a:r>
+              <a:rPr lang="en-US"/>
+              <a:t>and Resources</a:t>
+            </a:r>
+          </a:p>
+        </p:txBody>
+      </p:sp>
+      <p:sp>
+        <p:nvSpPr>
+          <p:cNvPr id="3" name="Content Placeholder 2">
+            <a:extLst>
+              <a:ext uri="{FF2B5EF4-FFF2-40B4-BE49-F238E27FC236}">
+                <a16:creationId xmlns:a16="http://schemas.microsoft.com/office/drawing/2014/main" id="{CD6C7F32-4FC0-4D35-E8CC-D5A39F47C9BD}"/>
+              </a:ext>
+            </a:extLst>
+          </p:cNvPr>
+          <p:cNvSpPr>
+            <a:spLocks noGrp="1"/>
+          </p:cNvSpPr>
+          <p:nvPr>
+            <p:ph idx="1"/>
+          </p:nvPr>
+        </p:nvSpPr>
+        <p:spPr/>
+        <p:txBody>
+          <a:bodyPr/>
+          <a:lstStyle/>
+          <a:p>
+            <a:endParaRPr lang="en-US"/>
+          </a:p>
+        </p:txBody>
+      </p:sp>
+    </p:spTree>
+    <p:extLst>
+      <p:ext uri="{BB962C8B-B14F-4D97-AF65-F5344CB8AC3E}">
+        <p14:creationId xmlns:p14="http://schemas.microsoft.com/office/powerpoint/2010/main" val="2035090352"/>
       </p:ext>
     </p:extLst>
   </p:cSld>
@@ -13048,18 +13169,18 @@
 </file>
 
 <file path=customXml/item1.xml><?xml version="1.0" encoding="utf-8"?>
+<p:properties xmlns:p="http://schemas.microsoft.com/office/2006/metadata/properties" xmlns:xsi="http://www.w3.org/2001/XMLSchema-instance" xmlns:pc="http://schemas.microsoft.com/office/infopath/2007/PartnerControls">
+  <documentManagement/>
+</p:properties>
+</file>
+
+<file path=customXml/item2.xml><?xml version="1.0" encoding="utf-8"?>
 <?mso-contentType ?>
 <FormTemplates xmlns="http://schemas.microsoft.com/sharepoint/v3/contenttype/forms">
   <Display>DocumentLibraryForm</Display>
   <Edit>DocumentLibraryForm</Edit>
   <New>DocumentLibraryForm</New>
 </FormTemplates>
-</file>
-
-<file path=customXml/item2.xml><?xml version="1.0" encoding="utf-8"?>
-<p:properties xmlns:p="http://schemas.microsoft.com/office/2006/metadata/properties" xmlns:xsi="http://www.w3.org/2001/XMLSchema-instance" xmlns:pc="http://schemas.microsoft.com/office/infopath/2007/PartnerControls">
-  <documentManagement/>
-</p:properties>
 </file>
 
 <file path=customXml/item3.xml><?xml version="1.0" encoding="utf-8"?>
@@ -13112,14 +13233,6 @@
 </file>
 
 <file path=customXml/itemProps1.xml><?xml version="1.0" encoding="utf-8"?>
-<ds:datastoreItem xmlns:ds="http://schemas.openxmlformats.org/officeDocument/2006/customXml" ds:itemID="{19E20559-B232-4371-8690-E3D8007EDB82}">
-  <ds:schemaRefs>
-    <ds:schemaRef ds:uri="http://schemas.microsoft.com/sharepoint/v3/contenttype/forms"/>
-  </ds:schemaRefs>
-</ds:datastoreItem>
-</file>
-
-<file path=customXml/itemProps2.xml><?xml version="1.0" encoding="utf-8"?>
 <ds:datastoreItem xmlns:ds="http://schemas.openxmlformats.org/officeDocument/2006/customXml" ds:itemID="{A50EC660-24D0-43A0-AE5E-E274115E726B}">
   <ds:schemaRefs>
     <ds:schemaRef ds:uri="http://purl.org/dc/elements/1.1/"/>
@@ -13130,6 +13243,14 @@
     <ds:schemaRef ds:uri="http://www.w3.org/XML/1998/namespace"/>
     <ds:schemaRef ds:uri="http://purl.org/dc/dcmitype/"/>
     <ds:schemaRef ds:uri="http://schemas.microsoft.com/office/infopath/2007/PartnerControls"/>
+  </ds:schemaRefs>
+</ds:datastoreItem>
+</file>
+
+<file path=customXml/itemProps2.xml><?xml version="1.0" encoding="utf-8"?>
+<ds:datastoreItem xmlns:ds="http://schemas.openxmlformats.org/officeDocument/2006/customXml" ds:itemID="{19E20559-B232-4371-8690-E3D8007EDB82}">
+  <ds:schemaRefs>
+    <ds:schemaRef ds:uri="http://schemas.microsoft.com/sharepoint/v3/contenttype/forms"/>
   </ds:schemaRefs>
 </ds:datastoreItem>
 </file>

</xml_diff>

<commit_message>
(Issue #132) Finalized my part of presentation after dry run.
</commit_message>
<xml_diff>
--- a/computational-expts.pptx
+++ b/computational-expts.pptx
@@ -284,7 +284,7 @@
           <a:p>
             <a:fld id="{0B842F42-2CE9-4E35-95C1-410DC08A50B1}" type="datetimeFigureOut">
               <a:rPr lang="en-US" smtClean="0"/>
-              <a:t>8/3/22</a:t>
+              <a:t>8/4/22</a:t>
             </a:fld>
             <a:endParaRPr lang="en-US"/>
           </a:p>
@@ -449,7 +449,7 @@
           <a:p>
             <a:fld id="{6F282904-F315-4730-8D91-37D99E141A6F}" type="datetimeFigureOut">
               <a:rPr lang="en-US" smtClean="0"/>
-              <a:t>8/3/22</a:t>
+              <a:t>8/4/22</a:t>
             </a:fld>
             <a:endParaRPr lang="en-US"/>
           </a:p>
@@ -762,7 +762,7 @@
           <a:p>
             <a:r>
               <a:rPr lang="en-US" dirty="0"/>
-              <a:t>Co-location of people from same discipline =&gt; easy knowledge communication =&gt; less need for documentation.  At the observatory we had a team A and a team B and much work was multidisciplinary.  Therefore, need for documentation was greater.</a:t>
+              <a:t>Co-location of people from same discipline =&gt; easy knowledge generation &amp; communication =&gt; less need for documentation.  At the observatory we had a team A and a team B and much work was multidisciplinary.  Therefore, need for documentation was greater.  Distributed &amp; multidisciplinary nature of CSME demands more documentation.</a:t>
             </a:r>
           </a:p>
           <a:p>
@@ -771,7 +771,7 @@
           <a:p>
             <a:r>
               <a:rPr lang="en-US" dirty="0"/>
-              <a:t>Examples are difficulties of lab notebooks and documentation.  We have many tools to help us, but difficulties can grow when  N tools scaled out.    Extra layers of automation can add more effort and decrease maintainability.</a:t>
+              <a:t>Examples are difficulties of lab notebooks and documentation.  We have many tools to help us, but difficulties can grow when N tools scaled out.    Extra layers of automation can add more effort and decrease maintainability.</a:t>
             </a:r>
           </a:p>
           <a:p>
@@ -780,7 +780,7 @@
           <a:p>
             <a:r>
               <a:rPr lang="en-US" dirty="0"/>
-              <a:t>One thing that is easier is version control – time travel and reversibility!</a:t>
+              <a:t>One thing that is easier in CSME is version control – time travel and reversibility!</a:t>
             </a:r>
           </a:p>
         </p:txBody>
@@ -867,15 +867,24 @@
           <a:p>
             <a:r>
               <a:rPr lang="en-US" dirty="0"/>
-              <a:t>SW env should prefer platform-specific, </a:t>
+              <a:t>When mentioning that we do this upfront effort to avoid ”inflight airplane repair”, EMPHASIZE that you’ll never be perfect.  That will likely happen every now and then.  You just hope that it happens less frequently and is less catastrophic.  Also, that it’s likely a bad idea to over design your environment to absolutely avoid this.  This is necessary to mesh better with what </a:t>
             </a:r>
             <a:r>
               <a:rPr lang="en-US" dirty="0" err="1"/>
-              <a:t>exper</a:t>
-            </a:r>
-            <a:r>
-              <a:rPr lang="en-US" dirty="0"/>
-              <a:t>—built modules, then </a:t>
+              <a:t>Anshu</a:t>
+            </a:r>
+            <a:r>
+              <a:rPr lang="en-US" dirty="0"/>
+              <a:t> said on slide 19.</a:t>
+            </a:r>
+          </a:p>
+          <a:p>
+            <a:endParaRPr lang="en-US" dirty="0"/>
+          </a:p>
+          <a:p>
+            <a:r>
+              <a:rPr lang="en-US" dirty="0"/>
+              <a:t>SW env should prefer platform-specific, expert—built modules, then </a:t>
             </a:r>
             <a:r>
               <a:rPr lang="en-US" dirty="0" err="1"/>
@@ -892,7 +901,7 @@
           <a:p>
             <a:r>
               <a:rPr lang="en-US" dirty="0"/>
-              <a:t>Motivate folder structure naming convention in terms of observatory.</a:t>
+              <a:t>Motivate folder structure naming convention in terms of observatory.  Good tools allow for simple and cleaner file management.</a:t>
             </a:r>
           </a:p>
           <a:p>
@@ -1003,18 +1012,93 @@
           <a:bodyPr/>
           <a:lstStyle/>
           <a:p>
-            <a:r>
-              <a:rPr lang="en-US" dirty="0"/>
-              <a:t>While these creators might not call their tools lab environments, I see them as analogous or trying to manage the same issues.</a:t>
-            </a:r>
-          </a:p>
-          <a:p>
             <a:endParaRPr lang="en-US" dirty="0"/>
           </a:p>
-          <a:p>
-            <a:r>
-              <a:rPr lang="en-US" dirty="0"/>
-              <a:t>Based on conversations with Aaron, I believe that he also structures his repos as if he commit data to it, but doesn’t.</a:t>
+        </p:txBody>
+      </p:sp>
+      <p:sp>
+        <p:nvSpPr>
+          <p:cNvPr id="4" name="Slide Number Placeholder 3"/>
+          <p:cNvSpPr>
+            <a:spLocks noGrp="1"/>
+          </p:cNvSpPr>
+          <p:nvPr>
+            <p:ph type="sldNum" sz="quarter" idx="5"/>
+          </p:nvPr>
+        </p:nvSpPr>
+        <p:spPr/>
+        <p:txBody>
+          <a:bodyPr/>
+          <a:lstStyle/>
+          <a:p>
+            <a:fld id="{54E672D7-8E2D-4611-973D-F4591A707C34}" type="slidenum">
+              <a:rPr lang="en-US" smtClean="0"/>
+              <a:t>17</a:t>
+            </a:fld>
+            <a:endParaRPr lang="en-US"/>
+          </a:p>
+        </p:txBody>
+      </p:sp>
+    </p:spTree>
+    <p:extLst>
+      <p:ext uri="{BB962C8B-B14F-4D97-AF65-F5344CB8AC3E}">
+        <p14:creationId xmlns:p14="http://schemas.microsoft.com/office/powerpoint/2010/main" val="2430618202"/>
+      </p:ext>
+    </p:extLst>
+  </p:cSld>
+  <p:clrMapOvr>
+    <a:masterClrMapping/>
+  </p:clrMapOvr>
+</p:notes>
+</file>
+
+<file path=ppt/notesSlides/notesSlide12.xml><?xml version="1.0" encoding="utf-8"?>
+<p:notes xmlns:a="http://schemas.openxmlformats.org/drawingml/2006/main" xmlns:r="http://schemas.openxmlformats.org/officeDocument/2006/relationships" xmlns:p="http://schemas.openxmlformats.org/presentationml/2006/main">
+  <p:cSld>
+    <p:spTree>
+      <p:nvGrpSpPr>
+        <p:cNvPr id="1" name=""/>
+        <p:cNvGrpSpPr/>
+        <p:nvPr/>
+      </p:nvGrpSpPr>
+      <p:grpSpPr>
+        <a:xfrm>
+          <a:off x="0" y="0"/>
+          <a:ext cx="0" cy="0"/>
+          <a:chOff x="0" y="0"/>
+          <a:chExt cx="0" cy="0"/>
+        </a:xfrm>
+      </p:grpSpPr>
+      <p:sp>
+        <p:nvSpPr>
+          <p:cNvPr id="2" name="Slide Image Placeholder 1"/>
+          <p:cNvSpPr>
+            <a:spLocks noGrp="1" noRot="1" noChangeAspect="1"/>
+          </p:cNvSpPr>
+          <p:nvPr>
+            <p:ph type="sldImg"/>
+          </p:nvPr>
+        </p:nvSpPr>
+        <p:spPr/>
+      </p:sp>
+      <p:sp>
+        <p:nvSpPr>
+          <p:cNvPr id="3" name="Notes Placeholder 2"/>
+          <p:cNvSpPr>
+            <a:spLocks noGrp="1"/>
+          </p:cNvSpPr>
+          <p:nvPr>
+            <p:ph type="body" idx="1"/>
+          </p:nvPr>
+        </p:nvSpPr>
+        <p:spPr/>
+        <p:txBody>
+          <a:bodyPr/>
+          <a:lstStyle/>
+          <a:p>
+            <a:r>
+              <a:rPr lang="en-US" dirty="0"/>
+              <a:t>While these creators might not call their tools lab environments, I see them as analogous or trying to manage the same issues – create an environment/tool layer/workflow dedicated to EXECUTING work</a:t>
             </a:r>
           </a:p>
         </p:txBody>
@@ -1110,7 +1194,7 @@
           <a:p>
             <a:r>
               <a:rPr lang="en-US" dirty="0"/>
-              <a:t>Ask if people have heard these SW wisdoms.  Are they aware of others?</a:t>
+              <a:t>Ask if people have heard these SW wisdoms?  Are they aware of others?</a:t>
             </a:r>
           </a:p>
           <a:p>
@@ -1119,7 +1203,47 @@
           <a:p>
             <a:r>
               <a:rPr lang="en-US" dirty="0"/>
-              <a:t>In the spirit of searching for commonalities rather than differences, I have tried to adapt the experimental wisdoms to the computational world.  In other words, try to squeeze as much utility as we can from the accumulated wisdom of a different community.  It might be that only someone with my experience is capable of doing this initially, but if people engage in meaningful conversations with other and with an open mind, they might be able to.</a:t>
+              <a:t>In the spirit of searching for commonalities rather than differences, I have tried to adapt the experimental wisdoms to the computational world.  In other words, try to squeeze as much utility as we can from the accumulated wisdom of a different community.  It might be that only someone with my diverse experience is capable of doing this initially, but if people engage in meaningful conversations with other and with an open mind, they might be able to.</a:t>
+            </a:r>
+          </a:p>
+          <a:p>
+            <a:pPr marL="171450" indent="-171450">
+              <a:buFont typeface="Arial" panose="020B0604020202020204" pitchFamily="34" charset="0"/>
+              <a:buChar char="•"/>
+            </a:pPr>
+            <a:r>
+              <a:rPr lang="en-US" dirty="0"/>
+              <a:t>It’s easy to find differences</a:t>
+            </a:r>
+          </a:p>
+          <a:p>
+            <a:pPr marL="171450" indent="-171450">
+              <a:buFont typeface="Arial" panose="020B0604020202020204" pitchFamily="34" charset="0"/>
+              <a:buChar char="•"/>
+            </a:pPr>
+            <a:r>
+              <a:rPr lang="en-US" dirty="0"/>
+              <a:t>It’s harder to determine if those differences are important</a:t>
+            </a:r>
+          </a:p>
+          <a:p>
+            <a:pPr marL="171450" indent="-171450">
+              <a:buFont typeface="Arial" panose="020B0604020202020204" pitchFamily="34" charset="0"/>
+              <a:buChar char="•"/>
+            </a:pPr>
+            <a:r>
+              <a:rPr lang="en-US" dirty="0"/>
+              <a:t>It’s harder still to adapt commonalities to a different field</a:t>
+            </a:r>
+          </a:p>
+          <a:p>
+            <a:pPr marL="0" indent="0">
+              <a:buFont typeface="Arial" panose="020B0604020202020204" pitchFamily="34" charset="0"/>
+              <a:buNone/>
+            </a:pPr>
+            <a:r>
+              <a:rPr lang="en-US" dirty="0"/>
+              <a:t>Does this explain why people search out differences rather that commonalities?</a:t>
             </a:r>
           </a:p>
         </p:txBody>
@@ -1206,7 +1330,7 @@
           <a:p>
             <a:r>
               <a:rPr lang="en-US" dirty="0"/>
-              <a:t>One example are libraries with optional variables with no explanation of what they do or guidance about how to set them.  I have heard of cases where they might refer to an article, but that article doesn’t help.</a:t>
+              <a:t>I have heard of cases where documentation refer to an article to help explain role of ”optional” arguments, but that article doesn’t help.</a:t>
             </a:r>
           </a:p>
           <a:p>
@@ -1249,7 +1373,7 @@
             </a:r>
             <a:r>
               <a:rPr lang="en-US" dirty="0"/>
-              <a:t> last as this leads into next slide.  Should you only be able to use a container or </a:t>
+              <a:t>/containers last as this leads into next slide.  Should you only be able to use a container or </a:t>
             </a:r>
             <a:r>
               <a:rPr lang="en-US" dirty="0" err="1"/>
@@ -1257,7 +1381,7 @@
             </a:r>
             <a:r>
               <a:rPr lang="en-US" dirty="0"/>
-              <a:t> once you have understood all pitfalls associated with setting up a SW environment?  Should you only be able to use a container built and maintained by another person after you have learned to build and maintain a container yourself? This is analogous to the idea of an apprenticeship.  When someone wants to work with metal, they might be given a chunk of metal and metal file.  Their job is to work until they turn it into a cube with just the file.  After that, they can use more sophisticated tools.  Know your tools.</a:t>
+              <a:t> once you have understood all pitfalls associated with setting up a SW environment?  Should you only be able to use a container built and maintained by another person after you have learned to build and maintain a container yourself? This is analogous to the idea of an apprenticeship.  When someone wants to work with metal, they might be given a chunk of metal and metal file.  Their job is to work until they turn it into a cube with just the file.  After that, they can use more sophisticated tools.</a:t>
             </a:r>
           </a:p>
           <a:p>
@@ -1558,7 +1682,7 @@
             </a:r>
             <a:r>
               <a:rPr lang="en-US" dirty="0"/>
-              <a:t>/hour to run telescope.  Not so subtle hint to make sure that I not only knew that I could use the telescope/instrument to gather data but that I could maximize the use of the telescope and data to get maximal impact.  After using the telescopes I few time, I started to figure out what was “appropriate” level of planning.  This should sound like using ALCF or OLCF.</a:t>
+              <a:t>/hour to run telescope.  Not so subtle hint to make sure that I not only knew that I could use the telescope/instrument to gather data but that I could maximize the use of the telescope and data to get maximal impact.  After using the telescopes a few times, I started to figure out what was “appropriate” level of planning.  For example, I would do dress rehearsals during day.  This should sound like using ALCF or OLCF.</a:t>
             </a:r>
           </a:p>
           <a:p>
@@ -1814,7 +1938,7 @@
           <a:p>
             <a:r>
               <a:rPr lang="en-US" dirty="0"/>
-              <a:t>This is where we can talk about observatory environment.  It is an operational environment.  Everything is ready to go and we only concentrate on the task at hand.  If you are making big, decisions that require thought, something has gone deeply wrong.</a:t>
+              <a:t>This is where we can talk about observatory environment in which we just want to EXECUTE a study. It is an operational environment.  Everything is ready to go and we only concentrate on the task at hand.  If you are making big, decisions that require thought, something has gone deeply wrong.  From here forward, try to enforce that we are creating an operational environment for executing science. </a:t>
             </a:r>
           </a:p>
           <a:p>
@@ -1919,7 +2043,7 @@
           <a:p>
             <a:r>
               <a:rPr lang="en-US" dirty="0"/>
-              <a:t>Let’s say that I want to execute a study on the same system on which I have built up testing.  Can the study just use the external dependencies built up for testing?  Bad idea if the people who manage the tests aren’t involved in the study.  They might update the libraries without my knowledge in the middle of the study.  More work, but cleaner with obvious ownership and easier communication.</a:t>
+              <a:t>Let’s say that I want to execute a study on the same system on which I have built up testing.  Can the study just use the external dependencies built up for testing?  Bad idea if the people who manage the tests aren’t involved in the study.  They might update the libraries without my knowledge in the middle of my study.  More work, but cleaner with obvious ownership and less communication/coordination needed.</a:t>
             </a:r>
           </a:p>
           <a:p>
@@ -1946,7 +2070,7 @@
           <a:p>
             <a:r>
               <a:rPr lang="en-US" dirty="0"/>
-              <a:t>Development environment is potentially the least demanding and can be setup in accord with a particular persons work style and expertise.</a:t>
+              <a:t>Development environment is potentially the least demanding and can be setup in accord with a particular person’s work style and expertise.</a:t>
             </a:r>
           </a:p>
         </p:txBody>
@@ -6037,13 +6161,13 @@
             </a:pPr>
             <a:r>
               <a:rPr lang="en-US" dirty="0"/>
-              <a:t>Rather than a single lab, use many simple, minimal lab environments</a:t>
-            </a:r>
-          </a:p>
-          <a:p>
-            <a:r>
-              <a:rPr lang="en-US" dirty="0"/>
-              <a:t>Tailor formality, complexity, and automation to each team and each use case</a:t>
+              <a:t>Use many simple, minimal lab environments</a:t>
+            </a:r>
+          </a:p>
+          <a:p>
+            <a:r>
+              <a:rPr lang="en-US" dirty="0"/>
+              <a:t>Tailor formality, complexity, and automation to each use case</a:t>
             </a:r>
           </a:p>
           <a:p>
@@ -6197,7 +6321,7 @@
           <a:p>
             <a:r>
               <a:rPr lang="en-US" sz="2000" dirty="0"/>
-              <a:t>Systems of repos seem to be increasingly common</a:t>
+              <a:t>Systems of repos exist &amp; seem to be increasingly common</a:t>
             </a:r>
           </a:p>
         </p:txBody>
@@ -6376,7 +6500,7 @@
           <a:p>
             <a:r>
               <a:rPr lang="en-US" sz="1800" dirty="0"/>
-              <a:t>File storage, protection, maintenance, and sharing</a:t>
+              <a:t>File storage, protection, maintenance, &amp; sharing</a:t>
             </a:r>
           </a:p>
           <a:p>
@@ -6403,7 +6527,7 @@
             <a:pPr lvl="1"/>
             <a:r>
               <a:rPr lang="en-US" sz="1800" dirty="0"/>
-              <a:t>Compilation and libraries (</a:t>
+              <a:t>Compilation &amp; libraries (</a:t>
             </a:r>
             <a:r>
               <a:rPr lang="en-US" sz="1800" i="1" dirty="0"/>
@@ -6440,7 +6564,7 @@
           <a:p>
             <a:r>
               <a:rPr lang="en-US" sz="1800" dirty="0"/>
-              <a:t>Platform-specific build information</a:t>
+              <a:t>Platform-specific build systems</a:t>
             </a:r>
           </a:p>
           <a:p>
@@ -6464,7 +6588,7 @@
           <a:p>
             <a:r>
               <a:rPr lang="en-US" sz="1800" dirty="0"/>
-              <a:t>Documentation infrastructure &amp; scheme</a:t>
+              <a:t>Documentation infrastructure, &amp; workflow</a:t>
             </a:r>
           </a:p>
           <a:p>
@@ -6516,7 +6640,7 @@
             </a:pPr>
             <a:r>
               <a:rPr lang="en-US" sz="2000" dirty="0"/>
-              <a:t>Build, test, and officially verify.</a:t>
+              <a:t>Build, test, &amp; officially verify.</a:t>
             </a:r>
           </a:p>
           <a:p>
@@ -6624,7 +6748,7 @@
           <a:p>
             <a:r>
               <a:rPr lang="en-US" dirty="0"/>
-              <a:t>Lab notebook for changes to sci instrument.</a:t>
+              <a:t>Lab notebook for changes to sci instrument</a:t>
             </a:r>
           </a:p>
           <a:p>
@@ -6645,7 +6769,7 @@
             <a:pPr lvl="1"/>
             <a:r>
               <a:rPr lang="en-US" dirty="0"/>
-              <a:t>Changes to build/job files and build system</a:t>
+              <a:t>Changes to build/job files and build systems</a:t>
             </a:r>
           </a:p>
           <a:p>
@@ -6838,7 +6962,7 @@
           <a:p>
             <a:r>
               <a:rPr lang="en-US" dirty="0"/>
-              <a:t>Documentation: Version Control Tools</a:t>
+              <a:t>Documentation: Version control tools</a:t>
             </a:r>
           </a:p>
         </p:txBody>
@@ -6869,7 +6993,7 @@
             </a:pPr>
             <a:r>
               <a:rPr lang="en-US" dirty="0"/>
-              <a:t>Locate lab notes associated with code as close to code</a:t>
+              <a:t>Locate lab notes associated with code “next” to the instrument</a:t>
             </a:r>
           </a:p>
           <a:p>
@@ -6981,7 +7105,7 @@
           <a:p>
             <a:r>
               <a:rPr lang="en-US" dirty="0"/>
-              <a:t>Try to automate as much as possible</a:t>
+              <a:t>Automate as much as possible</a:t>
             </a:r>
           </a:p>
           <a:p>
@@ -6991,6 +7115,13 @@
             </a:r>
           </a:p>
           <a:p>
+            <a:pPr lvl="1"/>
+            <a:r>
+              <a:rPr lang="en-US" dirty="0"/>
+              <a:t>Self-documenting files</a:t>
+            </a:r>
+          </a:p>
+          <a:p>
             <a:r>
               <a:rPr lang="en-US" dirty="0"/>
               <a:t>A lot of this comes from build &amp; job logs</a:t>
@@ -7000,7 +7131,7 @@
             <a:pPr lvl="1"/>
             <a:r>
               <a:rPr lang="en-US" dirty="0"/>
-              <a:t>software environment info</a:t>
+              <a:t>Software environment info</a:t>
             </a:r>
           </a:p>
           <a:p>
@@ -7014,7 +7145,7 @@
             <a:pPr lvl="1"/>
             <a:r>
               <a:rPr lang="en-US" dirty="0"/>
-              <a:t>environment variables</a:t>
+              <a:t>Environment variables</a:t>
             </a:r>
           </a:p>
         </p:txBody>
@@ -7112,7 +7243,7 @@
             </a:r>
             <a:r>
               <a:rPr lang="en-US" dirty="0"/>
-              <a:t> notebook can be put context &amp; metadata next to data.</a:t>
+              <a:t> notebook can put context &amp; metadata next to data</a:t>
             </a:r>
           </a:p>
           <a:p>
@@ -7140,19 +7271,26 @@
             <a:pPr lvl="1"/>
             <a:r>
               <a:rPr lang="en-US" dirty="0"/>
+              <a:t>Generate visualizations in place</a:t>
+            </a:r>
+          </a:p>
+          <a:p>
+            <a:pPr lvl="1"/>
+            <a:r>
+              <a:rPr lang="en-US" dirty="0"/>
               <a:t>Comment on results</a:t>
             </a:r>
           </a:p>
           <a:p>
             <a:r>
               <a:rPr lang="en-US" dirty="0"/>
-              <a:t>Figuring how to structure work into notebooks helps structure whole study.</a:t>
-            </a:r>
-          </a:p>
-          <a:p>
-            <a:r>
-              <a:rPr lang="en-US" dirty="0"/>
-              <a:t>Where do the notebooks fit into the documentation hierarchy?</a:t>
+              <a:t>Figuring how to structure work into notebooks helps structure lab env</a:t>
+            </a:r>
+          </a:p>
+          <a:p>
+            <a:r>
+              <a:rPr lang="en-US" dirty="0"/>
+              <a:t>Where do notebooks fit into the documentation hierarchy?</a:t>
             </a:r>
           </a:p>
         </p:txBody>
@@ -7238,13 +7376,13 @@
           <a:p>
             <a:r>
               <a:rPr lang="en-US" dirty="0"/>
-              <a:t>It’s a work in progress (and always will be)</a:t>
-            </a:r>
-          </a:p>
-          <a:p>
-            <a:r>
-              <a:rPr lang="en-US" dirty="0"/>
-              <a:t>I use this for different types of studies across different projects</a:t>
+              <a:t>Work in progress (and always will be)</a:t>
+            </a:r>
+          </a:p>
+          <a:p>
+            <a:r>
+              <a:rPr lang="en-US" dirty="0"/>
+              <a:t>Used for different types of studies across different projects</a:t>
             </a:r>
           </a:p>
           <a:p>
@@ -10315,7 +10453,7 @@
           <a:p>
             <a:r>
               <a:rPr lang="en-US" dirty="0"/>
-              <a:t>Know your tools</a:t>
+              <a:t>Know your tools / Right tool for the job</a:t>
             </a:r>
           </a:p>
         </p:txBody>
@@ -10639,15 +10777,7 @@
           <a:p>
             <a:r>
               <a:rPr lang="en-US" dirty="0"/>
-              <a:t>Is it OK to use </a:t>
-            </a:r>
-            <a:r>
-              <a:rPr lang="en-US" dirty="0" err="1"/>
-              <a:t>Spack</a:t>
-            </a:r>
-            <a:r>
-              <a:rPr lang="en-US" dirty="0"/>
-              <a:t> and containers blindly?</a:t>
+              <a:t>Is it OK to use high-level productivity tools blindly?</a:t>
             </a:r>
           </a:p>
           <a:p>
@@ -11402,13 +11532,13 @@
           <a:p>
             <a:r>
               <a:rPr lang="en-US" dirty="0"/>
+              <a:t>Slow down!</a:t>
+            </a:r>
+          </a:p>
+          <a:p>
+            <a:r>
+              <a:rPr lang="en-US" dirty="0"/>
               <a:t>Think before you act</a:t>
-            </a:r>
-          </a:p>
-          <a:p>
-            <a:r>
-              <a:rPr lang="en-US" dirty="0"/>
-              <a:t>Slow down!</a:t>
             </a:r>
           </a:p>
           <a:p>
@@ -12067,7 +12197,7 @@
           <a:p>
             <a:r>
               <a:rPr lang="en-US" dirty="0"/>
-              <a:t>Maintain issues, PRs up-to-date, &amp; docs as you work</a:t>
+              <a:t>Maintain issues, PRs, &amp; docs up-to-date as you work</a:t>
             </a:r>
           </a:p>
           <a:p>
@@ -13169,18 +13299,18 @@
 </file>
 
 <file path=customXml/item1.xml><?xml version="1.0" encoding="utf-8"?>
-<p:properties xmlns:p="http://schemas.microsoft.com/office/2006/metadata/properties" xmlns:xsi="http://www.w3.org/2001/XMLSchema-instance" xmlns:pc="http://schemas.microsoft.com/office/infopath/2007/PartnerControls">
-  <documentManagement/>
-</p:properties>
-</file>
-
-<file path=customXml/item2.xml><?xml version="1.0" encoding="utf-8"?>
 <?mso-contentType ?>
 <FormTemplates xmlns="http://schemas.microsoft.com/sharepoint/v3/contenttype/forms">
   <Display>DocumentLibraryForm</Display>
   <Edit>DocumentLibraryForm</Edit>
   <New>DocumentLibraryForm</New>
 </FormTemplates>
+</file>
+
+<file path=customXml/item2.xml><?xml version="1.0" encoding="utf-8"?>
+<p:properties xmlns:p="http://schemas.microsoft.com/office/2006/metadata/properties" xmlns:xsi="http://www.w3.org/2001/XMLSchema-instance" xmlns:pc="http://schemas.microsoft.com/office/infopath/2007/PartnerControls">
+  <documentManagement/>
+</p:properties>
 </file>
 
 <file path=customXml/item3.xml><?xml version="1.0" encoding="utf-8"?>
@@ -13233,6 +13363,14 @@
 </file>
 
 <file path=customXml/itemProps1.xml><?xml version="1.0" encoding="utf-8"?>
+<ds:datastoreItem xmlns:ds="http://schemas.openxmlformats.org/officeDocument/2006/customXml" ds:itemID="{19E20559-B232-4371-8690-E3D8007EDB82}">
+  <ds:schemaRefs>
+    <ds:schemaRef ds:uri="http://schemas.microsoft.com/sharepoint/v3/contenttype/forms"/>
+  </ds:schemaRefs>
+</ds:datastoreItem>
+</file>
+
+<file path=customXml/itemProps2.xml><?xml version="1.0" encoding="utf-8"?>
 <ds:datastoreItem xmlns:ds="http://schemas.openxmlformats.org/officeDocument/2006/customXml" ds:itemID="{A50EC660-24D0-43A0-AE5E-E274115E726B}">
   <ds:schemaRefs>
     <ds:schemaRef ds:uri="http://purl.org/dc/elements/1.1/"/>
@@ -13243,14 +13381,6 @@
     <ds:schemaRef ds:uri="http://www.w3.org/XML/1998/namespace"/>
     <ds:schemaRef ds:uri="http://purl.org/dc/dcmitype/"/>
     <ds:schemaRef ds:uri="http://schemas.microsoft.com/office/infopath/2007/PartnerControls"/>
-  </ds:schemaRefs>
-</ds:datastoreItem>
-</file>
-
-<file path=customXml/itemProps2.xml><?xml version="1.0" encoding="utf-8"?>
-<ds:datastoreItem xmlns:ds="http://schemas.openxmlformats.org/officeDocument/2006/customXml" ds:itemID="{19E20559-B232-4371-8690-E3D8007EDB82}">
-  <ds:schemaRefs>
-    <ds:schemaRef ds:uri="http://schemas.microsoft.com/sharepoint/v3/contenttype/forms"/>
   </ds:schemaRefs>
 </ds:datastoreItem>
 </file>

</xml_diff>

<commit_message>
Minor issues caught in quality checks
</commit_message>
<xml_diff>
--- a/computational-expts.pptx
+++ b/computational-expts.pptx
@@ -7538,13 +7538,19 @@
             </a:r>
           </a:p>
           <a:p>
-            <a:pPr lvl="2"/>
+            <a:pPr marL="684212" lvl="2" indent="0">
+              <a:buNone/>
+            </a:pPr>
             <a:endParaRPr lang="en-US" dirty="0"/>
           </a:p>
           <a:p>
             <a:pPr marL="0" indent="0" algn="ctr">
               <a:buNone/>
             </a:pPr>
+            <a:r>
+              <a:rPr lang="en-US" sz="2000" dirty="0"/>
+              <a:t>For your exploration: </a:t>
+            </a:r>
             <a:r>
               <a:rPr lang="en-US" sz="2000" dirty="0">
                 <a:hlinkClick r:id="rId6">
@@ -9030,7 +9036,7 @@
             <a:pPr lvl="1"/>
             <a:r>
               <a:rPr lang="en-US" dirty="0"/>
-              <a:t>Cost benefit analysis of fidelity Vs reaching science goals in allocated resources</a:t>
+              <a:t>Cost benefit analysis of fidelity vs reaching science goals in allocated resources</a:t>
             </a:r>
           </a:p>
         </p:txBody>
@@ -12516,7 +12522,7 @@
         <p:spPr>
           <a:xfrm>
             <a:off x="2270760" y="6208392"/>
-            <a:ext cx="3379900" cy="378565"/>
+            <a:ext cx="4593373" cy="378565"/>
           </a:xfrm>
           <a:prstGeom prst="rect">
             <a:avLst/>
@@ -12536,7 +12542,7 @@
             </a:pPr>
             <a:r>
               <a:rPr lang="en-US" sz="1400" dirty="0"/>
-              <a:t>Yellow ellipses indicate snipped content</a:t>
+              <a:t>Yellow ellipses in library paths indicate snipped content</a:t>
             </a:r>
           </a:p>
         </p:txBody>
@@ -14409,18 +14415,18 @@
 </file>
 
 <file path=customXml/item1.xml><?xml version="1.0" encoding="utf-8"?>
+<p:properties xmlns:p="http://schemas.microsoft.com/office/2006/metadata/properties" xmlns:xsi="http://www.w3.org/2001/XMLSchema-instance" xmlns:pc="http://schemas.microsoft.com/office/infopath/2007/PartnerControls">
+  <documentManagement/>
+</p:properties>
+</file>
+
+<file path=customXml/item2.xml><?xml version="1.0" encoding="utf-8"?>
 <?mso-contentType ?>
 <FormTemplates xmlns="http://schemas.microsoft.com/sharepoint/v3/contenttype/forms">
   <Display>DocumentLibraryForm</Display>
   <Edit>DocumentLibraryForm</Edit>
   <New>DocumentLibraryForm</New>
 </FormTemplates>
-</file>
-
-<file path=customXml/item2.xml><?xml version="1.0" encoding="utf-8"?>
-<p:properties xmlns:p="http://schemas.microsoft.com/office/2006/metadata/properties" xmlns:xsi="http://www.w3.org/2001/XMLSchema-instance" xmlns:pc="http://schemas.microsoft.com/office/infopath/2007/PartnerControls">
-  <documentManagement/>
-</p:properties>
 </file>
 
 <file path=customXml/item3.xml><?xml version="1.0" encoding="utf-8"?>
@@ -14473,14 +14479,6 @@
 </file>
 
 <file path=customXml/itemProps1.xml><?xml version="1.0" encoding="utf-8"?>
-<ds:datastoreItem xmlns:ds="http://schemas.openxmlformats.org/officeDocument/2006/customXml" ds:itemID="{19E20559-B232-4371-8690-E3D8007EDB82}">
-  <ds:schemaRefs>
-    <ds:schemaRef ds:uri="http://schemas.microsoft.com/sharepoint/v3/contenttype/forms"/>
-  </ds:schemaRefs>
-</ds:datastoreItem>
-</file>
-
-<file path=customXml/itemProps2.xml><?xml version="1.0" encoding="utf-8"?>
 <ds:datastoreItem xmlns:ds="http://schemas.openxmlformats.org/officeDocument/2006/customXml" ds:itemID="{A50EC660-24D0-43A0-AE5E-E274115E726B}">
   <ds:schemaRefs>
     <ds:schemaRef ds:uri="http://purl.org/dc/elements/1.1/"/>
@@ -14491,6 +14489,14 @@
     <ds:schemaRef ds:uri="http://www.w3.org/XML/1998/namespace"/>
     <ds:schemaRef ds:uri="http://purl.org/dc/dcmitype/"/>
     <ds:schemaRef ds:uri="http://schemas.microsoft.com/office/infopath/2007/PartnerControls"/>
+  </ds:schemaRefs>
+</ds:datastoreItem>
+</file>
+
+<file path=customXml/itemProps2.xml><?xml version="1.0" encoding="utf-8"?>
+<ds:datastoreItem xmlns:ds="http://schemas.openxmlformats.org/officeDocument/2006/customXml" ds:itemID="{19E20559-B232-4371-8690-E3D8007EDB82}">
+  <ds:schemaRefs>
+    <ds:schemaRef ds:uri="http://schemas.microsoft.com/sharepoint/v3/contenttype/forms"/>
   </ds:schemaRefs>
 </ds:datastoreItem>
 </file>

</xml_diff>

<commit_message>
Final presentations for NOAA
</commit_message>
<xml_diff>
--- a/computational-expts.pptx
+++ b/computational-expts.pptx
@@ -5,28 +5,29 @@
     <p:sldMasterId id="2147483935" r:id="rId4"/>
   </p:sldMasterIdLst>
   <p:notesMasterIdLst>
-    <p:notesMasterId r:id="rId21"/>
+    <p:notesMasterId r:id="rId22"/>
   </p:notesMasterIdLst>
   <p:handoutMasterIdLst>
-    <p:handoutMasterId r:id="rId22"/>
+    <p:handoutMasterId r:id="rId23"/>
   </p:handoutMasterIdLst>
   <p:sldIdLst>
     <p:sldId id="256" r:id="rId5"/>
-    <p:sldId id="355" r:id="rId6"/>
-    <p:sldId id="343" r:id="rId7"/>
-    <p:sldId id="344" r:id="rId8"/>
-    <p:sldId id="345" r:id="rId9"/>
-    <p:sldId id="346" r:id="rId10"/>
-    <p:sldId id="347" r:id="rId11"/>
-    <p:sldId id="348" r:id="rId12"/>
-    <p:sldId id="349" r:id="rId13"/>
-    <p:sldId id="350" r:id="rId14"/>
-    <p:sldId id="351" r:id="rId15"/>
-    <p:sldId id="352" r:id="rId16"/>
-    <p:sldId id="356" r:id="rId17"/>
-    <p:sldId id="357" r:id="rId18"/>
-    <p:sldId id="358" r:id="rId19"/>
-    <p:sldId id="353" r:id="rId20"/>
+    <p:sldId id="320" r:id="rId6"/>
+    <p:sldId id="355" r:id="rId7"/>
+    <p:sldId id="343" r:id="rId8"/>
+    <p:sldId id="344" r:id="rId9"/>
+    <p:sldId id="345" r:id="rId10"/>
+    <p:sldId id="346" r:id="rId11"/>
+    <p:sldId id="347" r:id="rId12"/>
+    <p:sldId id="348" r:id="rId13"/>
+    <p:sldId id="349" r:id="rId14"/>
+    <p:sldId id="350" r:id="rId15"/>
+    <p:sldId id="351" r:id="rId16"/>
+    <p:sldId id="352" r:id="rId17"/>
+    <p:sldId id="356" r:id="rId18"/>
+    <p:sldId id="357" r:id="rId19"/>
+    <p:sldId id="358" r:id="rId20"/>
+    <p:sldId id="353" r:id="rId21"/>
   </p:sldIdLst>
   <p:sldSz cx="12188825" cy="6858000"/>
   <p:notesSz cx="7010400" cy="9296400"/>
@@ -270,7 +271,7 @@
           <a:p>
             <a:fld id="{0B842F42-2CE9-4E35-95C1-410DC08A50B1}" type="datetimeFigureOut">
               <a:rPr lang="en-US" smtClean="0"/>
-              <a:t>7/25/23</a:t>
+              <a:t>7/28/2023</a:t>
             </a:fld>
             <a:endParaRPr lang="en-US"/>
           </a:p>
@@ -435,7 +436,7 @@
           <a:p>
             <a:fld id="{6F282904-F315-4730-8D91-37D99E141A6F}" type="datetimeFigureOut">
               <a:rPr lang="en-US" smtClean="0"/>
-              <a:t>7/25/23</a:t>
+              <a:t>7/28/2023</a:t>
             </a:fld>
             <a:endParaRPr lang="en-US"/>
           </a:p>
@@ -770,7 +771,7 @@
           <a:p>
             <a:fld id="{54E672D7-8E2D-4611-973D-F4591A707C34}" type="slidenum">
               <a:rPr lang="en-US" smtClean="0"/>
-              <a:t>7</a:t>
+              <a:t>8</a:t>
             </a:fld>
             <a:endParaRPr lang="en-US"/>
           </a:p>
@@ -4557,19 +4558,15 @@
           <a:bodyPr/>
           <a:lstStyle/>
           <a:p>
-            <a:r>
-              <a:rPr lang="en-US" b="0" i="0" dirty="0">
-                <a:solidFill>
-                  <a:srgbClr val="111111"/>
-                </a:solidFill>
-                <a:effectLst/>
-                <a:latin typeface="+mj-lt"/>
-              </a:rPr>
-              <a:t>Better Scientific Software Tutorial @ NOAA</a:t>
-            </a:r>
-            <a:endParaRPr lang="en-US" dirty="0">
-              <a:latin typeface="+mj-lt"/>
-            </a:endParaRPr>
+            <a:pPr>
+              <a:spcBef>
+                <a:spcPts val="2800"/>
+              </a:spcBef>
+            </a:pPr>
+            <a:r>
+              <a:rPr lang="en-US" sz="2000" dirty="0"/>
+              <a:t>Better Scientific Software tutorial @ NOAA Global Systems Laboratory </a:t>
+            </a:r>
           </a:p>
         </p:txBody>
       </p:sp>
@@ -4695,40 +4692,47 @@
           <a:p>
             <a:r>
               <a:rPr lang="en-US" dirty="0"/>
-              <a:t>Step 2 – Use the new test to characterize the performance behavior of the target platform</a:t>
-            </a:r>
-          </a:p>
-          <a:p>
-            <a:r>
-              <a:rPr lang="en-US" dirty="0"/>
-              <a:t>Motivation:</a:t>
+              <a:t>Step 1 – develop a test that represents the most complex physics interactions</a:t>
+            </a:r>
+          </a:p>
+          <a:p>
+            <a:r>
+              <a:rPr lang="en-US" dirty="0"/>
+              <a:t>Challenges:</a:t>
             </a:r>
           </a:p>
           <a:p>
             <a:pPr lvl="1"/>
             <a:r>
               <a:rPr lang="en-US" dirty="0"/>
-              <a:t>Standard performance studies could not give crucial information</a:t>
+              <a:t>Features take a long time to develop</a:t>
             </a:r>
           </a:p>
           <a:p>
             <a:pPr lvl="1"/>
             <a:r>
               <a:rPr lang="en-US" dirty="0"/>
-              <a:t>AMR refinement patterns make each application different</a:t>
+              <a:t>Want to ensure that at least one refinement step occurs during the test</a:t>
             </a:r>
           </a:p>
           <a:p>
             <a:pPr lvl="1"/>
             <a:r>
               <a:rPr lang="en-US" dirty="0"/>
-              <a:t>Interoperability and trade-off opportunities needed to explored in a closely resembling simulation behavior</a:t>
-            </a:r>
-          </a:p>
-          <a:p>
-            <a:r>
-              <a:rPr lang="en-US" dirty="0"/>
-              <a:t>Full fidelity 2D runs, and a set of runs of the new test provided enough information to extrapolate and estimate needed CPU hours </a:t>
+              <a:t>IO too slow to restart from a large checkpoint at late stage of the run</a:t>
+            </a:r>
+          </a:p>
+          <a:p>
+            <a:pPr lvl="2"/>
+            <a:r>
+              <a:rPr lang="en-US" dirty="0"/>
+              <a:t>Also test would need a large chunk of the machine</a:t>
+            </a:r>
+          </a:p>
+          <a:p>
+            <a:r>
+              <a:rPr lang="en-US" dirty="0"/>
+              <a:t>Use physics understanding to create initial conditions that would quickly develop comparable complexity</a:t>
             </a:r>
           </a:p>
           <a:p>
@@ -4740,7 +4744,7 @@
     </p:spTree>
     <p:extLst>
       <p:ext uri="{BB962C8B-B14F-4D97-AF65-F5344CB8AC3E}">
-        <p14:creationId xmlns:p14="http://schemas.microsoft.com/office/powerpoint/2010/main" val="1965150740"/>
+        <p14:creationId xmlns:p14="http://schemas.microsoft.com/office/powerpoint/2010/main" val="1970226240"/>
       </p:ext>
     </p:extLst>
   </p:cSld>
@@ -4811,19 +4815,14 @@
             <p:ph idx="1"/>
           </p:nvPr>
         </p:nvSpPr>
-        <p:spPr>
-          <a:xfrm>
-            <a:off x="365760" y="1325880"/>
-            <a:ext cx="11212158" cy="4047778"/>
-          </a:xfrm>
-        </p:spPr>
+        <p:spPr/>
         <p:txBody>
           <a:bodyPr/>
           <a:lstStyle/>
           <a:p>
             <a:r>
               <a:rPr lang="en-US" dirty="0"/>
-              <a:t>Step 3 – Look for trade-offs and optimization opportunities</a:t>
+              <a:t>Step 2 – Use the new test to characterize the performance behavior of the target platform</a:t>
             </a:r>
           </a:p>
           <a:p>
@@ -4836,100 +4835,39 @@
             <a:pPr lvl="1"/>
             <a:r>
               <a:rPr lang="en-US" dirty="0"/>
-              <a:t>Initial CPU estimates too high to complete the runs within allocations</a:t>
+              <a:t>Standard performance studies could not give crucial information</a:t>
             </a:r>
           </a:p>
           <a:p>
             <a:pPr lvl="1"/>
             <a:r>
               <a:rPr lang="en-US" dirty="0"/>
-              <a:t>Exploration of any parameter space needs to minimize individual run times</a:t>
-            </a:r>
-          </a:p>
-          <a:p>
-            <a:r>
-              <a:rPr lang="en-US" dirty="0"/>
-              <a:t>Many opportunities were found, documented in reference below. </a:t>
-            </a:r>
-            <a:endParaRPr lang="en-US" sz="1400" dirty="0"/>
+              <a:t>AMR refinement patterns make each application different</a:t>
+            </a:r>
           </a:p>
           <a:p>
             <a:pPr lvl="1"/>
             <a:r>
               <a:rPr lang="en-US" dirty="0"/>
-              <a:t>Identify redundant refinement and get rid of it</a:t>
+              <a:t>Interoperability and trade-off opportunities needed to explored in a closely resembling simulation behavior</a:t>
+            </a:r>
+          </a:p>
+          <a:p>
+            <a:r>
+              <a:rPr lang="en-US" dirty="0"/>
+              <a:t>Full fidelity 2D runs, and a set of runs of the new test provided enough information to extrapolate and estimate needed CPU hours </a:t>
             </a:r>
           </a:p>
           <a:p>
             <a:pPr lvl="1"/>
-            <a:r>
-              <a:rPr lang="en-US" dirty="0"/>
-              <a:t>Coarsen computations for some physics</a:t>
-            </a:r>
-          </a:p>
-          <a:p>
-            <a:pPr lvl="1"/>
-            <a:r>
-              <a:rPr lang="en-US" dirty="0"/>
-              <a:t>Move some computations to post-processing</a:t>
-            </a:r>
-          </a:p>
-          <a:p>
-            <a:r>
-              <a:rPr lang="en-US" b="1" dirty="0"/>
-              <a:t>All optimizations were based on scientific and numerical intuitions</a:t>
-            </a:r>
-          </a:p>
-        </p:txBody>
-      </p:sp>
-      <p:sp>
-        <p:nvSpPr>
-          <p:cNvPr id="4" name="TextBox 3">
-            <a:extLst>
-              <a:ext uri="{FF2B5EF4-FFF2-40B4-BE49-F238E27FC236}">
-                <a16:creationId xmlns:a16="http://schemas.microsoft.com/office/drawing/2014/main" id="{D7C1379D-FEB9-988E-EB01-3C17171B996C}"/>
-              </a:ext>
-            </a:extLst>
-          </p:cNvPr>
-          <p:cNvSpPr txBox="1"/>
-          <p:nvPr/>
-        </p:nvSpPr>
-        <p:spPr>
-          <a:xfrm>
-            <a:off x="189603" y="5854986"/>
-            <a:ext cx="7636585" cy="683264"/>
-          </a:xfrm>
-          <a:prstGeom prst="rect">
-            <a:avLst/>
-          </a:prstGeom>
-          <a:noFill/>
-        </p:spPr>
-        <p:txBody>
-          <a:bodyPr wrap="square" lIns="118872" tIns="91440" rIns="118872" bIns="91440" rtlCol="0" anchor="ctr" anchorCtr="0">
-            <a:normAutofit fontScale="85000" lnSpcReduction="20000"/>
-          </a:bodyPr>
-          <a:lstStyle/>
-          <a:p>
-            <a:pPr>
-              <a:lnSpc>
-                <a:spcPct val="90000"/>
-              </a:lnSpc>
-            </a:pPr>
-            <a:r>
-              <a:rPr lang="en-US" dirty="0">
-                <a:solidFill>
-                  <a:srgbClr val="C00000"/>
-                </a:solidFill>
-              </a:rPr>
-              <a:t>Dubey A, Calder AC, Daley C, et al. Pragmatic optimizations for better scientific utilization of large supercomputers. The International Journal of High Performance Computing Applications. 2013;27(3):360-373. doi:10.1177/1094342012464404</a:t>
-            </a:r>
+            <a:endParaRPr lang="en-US" dirty="0"/>
           </a:p>
         </p:txBody>
       </p:sp>
     </p:spTree>
     <p:extLst>
       <p:ext uri="{BB962C8B-B14F-4D97-AF65-F5344CB8AC3E}">
-        <p14:creationId xmlns:p14="http://schemas.microsoft.com/office/powerpoint/2010/main" val="3984054953"/>
+        <p14:creationId xmlns:p14="http://schemas.microsoft.com/office/powerpoint/2010/main" val="1965150740"/>
       </p:ext>
     </p:extLst>
   </p:cSld>
@@ -5002,7 +4940,7 @@
         </p:nvSpPr>
         <p:spPr>
           <a:xfrm>
-            <a:off x="271631" y="1405111"/>
+            <a:off x="365760" y="1325880"/>
             <a:ext cx="11212158" cy="4047778"/>
           </a:xfrm>
         </p:spPr>
@@ -5012,68 +4950,113 @@
           <a:p>
             <a:r>
               <a:rPr lang="en-US" dirty="0"/>
-              <a:t>Step 4 – Prepare diagnostics and quick analysis mechanism</a:t>
-            </a:r>
-          </a:p>
-          <a:p>
-            <a:r>
-              <a:rPr lang="en-US" dirty="0"/>
-              <a:t>Examples-- diagnostics</a:t>
+              <a:t>Step 3 – Look for trade-offs and optimization opportunities</a:t>
+            </a:r>
+          </a:p>
+          <a:p>
+            <a:r>
+              <a:rPr lang="en-US" dirty="0"/>
+              <a:t>Motivation:</a:t>
             </a:r>
           </a:p>
           <a:p>
             <a:pPr lvl="1"/>
             <a:r>
               <a:rPr lang="en-US" dirty="0"/>
-              <a:t>Conservation of mass, momentum energy</a:t>
+              <a:t>Initial CPU estimates too high to complete the runs within allocations</a:t>
             </a:r>
           </a:p>
           <a:p>
             <a:pPr lvl="1"/>
             <a:r>
               <a:rPr lang="en-US" dirty="0"/>
-              <a:t>Changes in dt recorded in the logfiles</a:t>
-            </a:r>
+              <a:t>Exploration of any parameter space needs to minimize individual run times</a:t>
+            </a:r>
+          </a:p>
+          <a:p>
+            <a:r>
+              <a:rPr lang="en-US" dirty="0"/>
+              <a:t>Many opportunities were found, documented in reference below. </a:t>
+            </a:r>
+            <a:endParaRPr lang="en-US" sz="1400" dirty="0"/>
           </a:p>
           <a:p>
             <a:pPr lvl="1"/>
             <a:r>
               <a:rPr lang="en-US" dirty="0"/>
-              <a:t>Spikes in variable values</a:t>
-            </a:r>
-          </a:p>
-          <a:p>
-            <a:r>
-              <a:rPr lang="en-US" dirty="0"/>
-              <a:t>Examples – quick analysis</a:t>
+              <a:t>Identify redundant refinement and get rid of it</a:t>
             </a:r>
           </a:p>
           <a:p>
             <a:pPr lvl="1"/>
             <a:r>
               <a:rPr lang="en-US" dirty="0"/>
-              <a:t>Quick visualization of random 2D slices</a:t>
+              <a:t>Coarsen computations for some physics</a:t>
             </a:r>
           </a:p>
           <a:p>
             <a:pPr lvl="1"/>
             <a:r>
-              <a:rPr lang="en-US" sz="1800" dirty="0"/>
-              <a:t>Inspection of critical quantities in 1D</a:t>
-            </a:r>
-          </a:p>
-          <a:p>
-            <a:pPr marL="346075" lvl="1" indent="0">
-              <a:buNone/>
+              <a:rPr lang="en-US" dirty="0"/>
+              <a:t>Move some computations to post-processing</a:t>
+            </a:r>
+          </a:p>
+          <a:p>
+            <a:r>
+              <a:rPr lang="en-US" b="1" dirty="0"/>
+              <a:t>All optimizations were based on scientific and numerical intuitions</a:t>
+            </a:r>
+          </a:p>
+        </p:txBody>
+      </p:sp>
+      <p:sp>
+        <p:nvSpPr>
+          <p:cNvPr id="4" name="TextBox 3">
+            <a:extLst>
+              <a:ext uri="{FF2B5EF4-FFF2-40B4-BE49-F238E27FC236}">
+                <a16:creationId xmlns:a16="http://schemas.microsoft.com/office/drawing/2014/main" id="{D7C1379D-FEB9-988E-EB01-3C17171B996C}"/>
+              </a:ext>
+            </a:extLst>
+          </p:cNvPr>
+          <p:cNvSpPr txBox="1"/>
+          <p:nvPr/>
+        </p:nvSpPr>
+        <p:spPr>
+          <a:xfrm>
+            <a:off x="189603" y="5854986"/>
+            <a:ext cx="7636585" cy="683264"/>
+          </a:xfrm>
+          <a:prstGeom prst="rect">
+            <a:avLst/>
+          </a:prstGeom>
+          <a:noFill/>
+        </p:spPr>
+        <p:txBody>
+          <a:bodyPr wrap="square" lIns="118872" tIns="91440" rIns="118872" bIns="91440" rtlCol="0" anchor="ctr" anchorCtr="0">
+            <a:normAutofit fontScale="85000" lnSpcReduction="20000"/>
+          </a:bodyPr>
+          <a:lstStyle/>
+          <a:p>
+            <a:pPr>
+              <a:lnSpc>
+                <a:spcPct val="90000"/>
+              </a:lnSpc>
             </a:pPr>
-            <a:endParaRPr lang="en-US" sz="1800" dirty="0"/>
+            <a:r>
+              <a:rPr lang="en-US" dirty="0">
+                <a:solidFill>
+                  <a:srgbClr val="C00000"/>
+                </a:solidFill>
+              </a:rPr>
+              <a:t>Dubey A, Calder AC, Daley C, et al. Pragmatic optimizations for better scientific utilization of large supercomputers. The International Journal of High Performance Computing Applications. 2013;27(3):360-373. doi:10.1177/1094342012464404</a:t>
+            </a:r>
           </a:p>
         </p:txBody>
       </p:sp>
     </p:spTree>
     <p:extLst>
       <p:ext uri="{BB962C8B-B14F-4D97-AF65-F5344CB8AC3E}">
-        <p14:creationId xmlns:p14="http://schemas.microsoft.com/office/powerpoint/2010/main" val="2623341437"/>
+        <p14:creationId xmlns:p14="http://schemas.microsoft.com/office/powerpoint/2010/main" val="3984054953"/>
       </p:ext>
     </p:extLst>
   </p:cSld>
@@ -5214,191 +5197,10 @@
           </a:p>
         </p:txBody>
       </p:sp>
-      <p:sp>
-        <p:nvSpPr>
-          <p:cNvPr id="4" name="Rectangle 3">
-            <a:extLst>
-              <a:ext uri="{FF2B5EF4-FFF2-40B4-BE49-F238E27FC236}">
-                <a16:creationId xmlns:a16="http://schemas.microsoft.com/office/drawing/2014/main" id="{6D03DCBB-BDFD-F644-B051-DDF0518DDE62}"/>
-              </a:ext>
-            </a:extLst>
-          </p:cNvPr>
-          <p:cNvSpPr/>
-          <p:nvPr/>
-        </p:nvSpPr>
-        <p:spPr>
-          <a:xfrm>
-            <a:off x="6094412" y="2023889"/>
-            <a:ext cx="4829402" cy="3887054"/>
-          </a:xfrm>
-          <a:prstGeom prst="rect">
-            <a:avLst/>
-          </a:prstGeom>
-          <a:solidFill>
-            <a:schemeClr val="accent3"/>
-          </a:solidFill>
-          <a:ln>
-            <a:noFill/>
-          </a:ln>
-          <a:effectLst>
-            <a:outerShdw blurRad="44450" dist="27940" dir="5400000" algn="ctr">
-              <a:srgbClr val="000000">
-                <a:alpha val="32000"/>
-              </a:srgbClr>
-            </a:outerShdw>
-          </a:effectLst>
-        </p:spPr>
-        <p:txBody>
-          <a:bodyPr rot="0" spcFirstLastPara="0" vertOverflow="overflow" horzOverflow="overflow" vert="horz" wrap="square" lIns="121851" tIns="60925" rIns="121851" bIns="60925" numCol="1" spcCol="0" rtlCol="0" fromWordArt="0" anchor="ctr" anchorCtr="0" forceAA="0" compatLnSpc="1">
-            <a:prstTxWarp prst="textNoShape">
-              <a:avLst/>
-            </a:prstTxWarp>
-            <a:noAutofit/>
-          </a:bodyPr>
-          <a:lstStyle/>
-          <a:p>
-            <a:pPr>
-              <a:lnSpc>
-                <a:spcPct val="90000"/>
-              </a:lnSpc>
-            </a:pPr>
-            <a:r>
-              <a:rPr lang="en-US" sz="2000" b="1" dirty="0">
-                <a:solidFill>
-                  <a:schemeClr val="bg1"/>
-                </a:solidFill>
-              </a:rPr>
-              <a:t>Lab notebook artifacts</a:t>
-            </a:r>
-          </a:p>
-          <a:p>
-            <a:pPr>
-              <a:lnSpc>
-                <a:spcPct val="90000"/>
-              </a:lnSpc>
-            </a:pPr>
-            <a:endParaRPr lang="en-US" sz="2000" b="1" dirty="0">
-              <a:solidFill>
-                <a:schemeClr val="bg1"/>
-              </a:solidFill>
-            </a:endParaRPr>
-          </a:p>
-          <a:p>
-            <a:pPr marL="342900" indent="-342900">
-              <a:lnSpc>
-                <a:spcPct val="90000"/>
-              </a:lnSpc>
-              <a:buFont typeface="Arial" panose="020B0604020202020204" pitchFamily="34" charset="0"/>
-              <a:buChar char="•"/>
-            </a:pPr>
-            <a:r>
-              <a:rPr lang="en-US" sz="2000" dirty="0">
-                <a:solidFill>
-                  <a:schemeClr val="bg1"/>
-                </a:solidFill>
-              </a:rPr>
-              <a:t>every run registers all configurations and runtime parameters in a logfile.</a:t>
-            </a:r>
-          </a:p>
-          <a:p>
-            <a:pPr marL="342900" indent="-342900">
-              <a:lnSpc>
-                <a:spcPct val="90000"/>
-              </a:lnSpc>
-              <a:buFont typeface="Arial" panose="020B0604020202020204" pitchFamily="34" charset="0"/>
-              <a:buChar char="•"/>
-            </a:pPr>
-            <a:endParaRPr lang="en-US" sz="2000" dirty="0">
-              <a:solidFill>
-                <a:schemeClr val="bg1"/>
-              </a:solidFill>
-            </a:endParaRPr>
-          </a:p>
-          <a:p>
-            <a:pPr marL="342900" indent="-342900">
-              <a:lnSpc>
-                <a:spcPct val="90000"/>
-              </a:lnSpc>
-              <a:buFont typeface="Arial" panose="020B0604020202020204" pitchFamily="34" charset="0"/>
-              <a:buChar char="•"/>
-            </a:pPr>
-            <a:r>
-              <a:rPr lang="en-US" sz="2000" dirty="0">
-                <a:solidFill>
-                  <a:schemeClr val="bg1"/>
-                </a:solidFill>
-              </a:rPr>
-              <a:t>logfiles are cumulative </a:t>
-            </a:r>
-          </a:p>
-          <a:p>
-            <a:pPr marL="342900" indent="-342900">
-              <a:lnSpc>
-                <a:spcPct val="90000"/>
-              </a:lnSpc>
-              <a:buFont typeface="Arial" panose="020B0604020202020204" pitchFamily="34" charset="0"/>
-              <a:buChar char="•"/>
-            </a:pPr>
-            <a:endParaRPr lang="en-US" sz="2000" dirty="0">
-              <a:solidFill>
-                <a:schemeClr val="bg1"/>
-              </a:solidFill>
-            </a:endParaRPr>
-          </a:p>
-          <a:p>
-            <a:pPr marL="342900" indent="-342900">
-              <a:lnSpc>
-                <a:spcPct val="90000"/>
-              </a:lnSpc>
-              <a:buFont typeface="Arial" panose="020B0604020202020204" pitchFamily="34" charset="0"/>
-              <a:buChar char="•"/>
-            </a:pPr>
-            <a:r>
-              <a:rPr lang="en-US" sz="2000" dirty="0">
-                <a:solidFill>
-                  <a:schemeClr val="bg1"/>
-                </a:solidFill>
-              </a:rPr>
-              <a:t>dedicate space for storing all results in a preconfigured directory structure</a:t>
-            </a:r>
-          </a:p>
-          <a:p>
-            <a:pPr marL="342900" indent="-342900">
-              <a:lnSpc>
-                <a:spcPct val="90000"/>
-              </a:lnSpc>
-              <a:buFont typeface="Arial" panose="020B0604020202020204" pitchFamily="34" charset="0"/>
-              <a:buChar char="•"/>
-            </a:pPr>
-            <a:endParaRPr lang="en-US" sz="2000" dirty="0">
-              <a:solidFill>
-                <a:schemeClr val="bg1"/>
-              </a:solidFill>
-            </a:endParaRPr>
-          </a:p>
-          <a:p>
-            <a:pPr marL="342900" indent="-342900">
-              <a:lnSpc>
-                <a:spcPct val="90000"/>
-              </a:lnSpc>
-              <a:buFont typeface="Arial" panose="020B0604020202020204" pitchFamily="34" charset="0"/>
-              <a:buChar char="•"/>
-            </a:pPr>
-            <a:r>
-              <a:rPr lang="en-US" sz="2000" dirty="0">
-                <a:solidFill>
-                  <a:schemeClr val="bg1"/>
-                </a:solidFill>
-              </a:rPr>
-              <a:t>scripts to move output from scratch to the dedicated space</a:t>
-            </a:r>
-          </a:p>
-        </p:txBody>
-      </p:sp>
     </p:spTree>
     <p:extLst>
       <p:ext uri="{BB962C8B-B14F-4D97-AF65-F5344CB8AC3E}">
-        <p14:creationId xmlns:p14="http://schemas.microsoft.com/office/powerpoint/2010/main" val="4115728313"/>
+        <p14:creationId xmlns:p14="http://schemas.microsoft.com/office/powerpoint/2010/main" val="2623341437"/>
       </p:ext>
     </p:extLst>
   </p:cSld>
@@ -5430,7 +5232,7 @@
           <p:cNvPr id="2" name="Title 1">
             <a:extLst>
               <a:ext uri="{FF2B5EF4-FFF2-40B4-BE49-F238E27FC236}">
-                <a16:creationId xmlns:a16="http://schemas.microsoft.com/office/drawing/2014/main" id="{C5217296-5EEA-C053-E101-6F25F1AE1EF4}"/>
+                <a16:creationId xmlns:a16="http://schemas.microsoft.com/office/drawing/2014/main" id="{3DAE27AA-E90C-9E73-9F78-A1907E2A009C}"/>
               </a:ext>
             </a:extLst>
           </p:cNvPr>
@@ -5448,7 +5250,7 @@
           <a:p>
             <a:r>
               <a:rPr lang="en-US" dirty="0"/>
-              <a:t>Outcome</a:t>
+              <a:t>Preparation Steps</a:t>
             </a:r>
           </a:p>
         </p:txBody>
@@ -5458,7 +5260,7 @@
           <p:cNvPr id="3" name="Content Placeholder 2">
             <a:extLst>
               <a:ext uri="{FF2B5EF4-FFF2-40B4-BE49-F238E27FC236}">
-                <a16:creationId xmlns:a16="http://schemas.microsoft.com/office/drawing/2014/main" id="{AE8184FE-6932-7B46-11FB-E7DBE9489D43}"/>
+                <a16:creationId xmlns:a16="http://schemas.microsoft.com/office/drawing/2014/main" id="{47F33A05-64E3-D838-EAB7-99CE5B676A05}"/>
               </a:ext>
             </a:extLst>
           </p:cNvPr>
@@ -5469,55 +5271,261 @@
             <p:ph idx="1"/>
           </p:nvPr>
         </p:nvSpPr>
-        <p:spPr/>
+        <p:spPr>
+          <a:xfrm>
+            <a:off x="271631" y="1405111"/>
+            <a:ext cx="11212158" cy="4047778"/>
+          </a:xfrm>
+        </p:spPr>
         <p:txBody>
           <a:bodyPr/>
           <a:lstStyle/>
           <a:p>
             <a:r>
               <a:rPr lang="en-US" dirty="0"/>
-              <a:t>A successful campaign</a:t>
+              <a:t>Step 4 – Prepare diagnostics and quick analysis mechanism</a:t>
+            </a:r>
+          </a:p>
+          <a:p>
+            <a:r>
+              <a:rPr lang="en-US" dirty="0"/>
+              <a:t>Examples-- diagnostics</a:t>
             </a:r>
           </a:p>
           <a:p>
             <a:pPr lvl="1"/>
             <a:r>
               <a:rPr lang="en-US" dirty="0"/>
-              <a:t>But not without hitches</a:t>
-            </a:r>
-          </a:p>
-          <a:p>
-            <a:r>
-              <a:rPr lang="en-US" dirty="0"/>
-              <a:t>Optimization related runs were not given the same level of care</a:t>
+              <a:t>Conservation of mass, momentum energy</a:t>
             </a:r>
           </a:p>
           <a:p>
             <a:pPr lvl="1"/>
             <a:r>
               <a:rPr lang="en-US" dirty="0"/>
-              <a:t>Data was considered disposable</a:t>
+              <a:t>Changes in dt recorded in the logfiles</a:t>
             </a:r>
           </a:p>
           <a:p>
             <a:pPr lvl="1"/>
             <a:r>
               <a:rPr lang="en-US" dirty="0"/>
-              <a:t>Code changes were documented</a:t>
-            </a:r>
-          </a:p>
-          <a:p>
-            <a:pPr marL="0" indent="0">
+              <a:t>Spikes in variable values</a:t>
+            </a:r>
+          </a:p>
+          <a:p>
+            <a:r>
+              <a:rPr lang="en-US" dirty="0"/>
+              <a:t>Examples – quick analysis</a:t>
+            </a:r>
+          </a:p>
+          <a:p>
+            <a:pPr lvl="1"/>
+            <a:r>
+              <a:rPr lang="en-US" dirty="0"/>
+              <a:t>Quick visualization of random 2D slices</a:t>
+            </a:r>
+          </a:p>
+          <a:p>
+            <a:pPr lvl="1"/>
+            <a:r>
+              <a:rPr lang="en-US" sz="1800" dirty="0"/>
+              <a:t>Inspection of critical quantities in 1D</a:t>
+            </a:r>
+          </a:p>
+          <a:p>
+            <a:pPr marL="346075" lvl="1" indent="0">
               <a:buNone/>
             </a:pPr>
-            <a:endParaRPr lang="en-US" dirty="0"/>
+            <a:endParaRPr lang="en-US" sz="1800" dirty="0"/>
+          </a:p>
+        </p:txBody>
+      </p:sp>
+      <p:sp>
+        <p:nvSpPr>
+          <p:cNvPr id="4" name="Rectangle 3">
+            <a:extLst>
+              <a:ext uri="{FF2B5EF4-FFF2-40B4-BE49-F238E27FC236}">
+                <a16:creationId xmlns:a16="http://schemas.microsoft.com/office/drawing/2014/main" id="{6D03DCBB-BDFD-F644-B051-DDF0518DDE62}"/>
+              </a:ext>
+            </a:extLst>
+          </p:cNvPr>
+          <p:cNvSpPr/>
+          <p:nvPr/>
+        </p:nvSpPr>
+        <p:spPr>
+          <a:xfrm>
+            <a:off x="6094412" y="2023889"/>
+            <a:ext cx="4829402" cy="3887054"/>
+          </a:xfrm>
+          <a:prstGeom prst="rect">
+            <a:avLst/>
+          </a:prstGeom>
+          <a:solidFill>
+            <a:schemeClr val="accent3"/>
+          </a:solidFill>
+          <a:ln>
+            <a:noFill/>
+          </a:ln>
+          <a:effectLst>
+            <a:outerShdw blurRad="44450" dist="27940" dir="5400000" algn="ctr">
+              <a:srgbClr val="000000">
+                <a:alpha val="32000"/>
+              </a:srgbClr>
+            </a:outerShdw>
+          </a:effectLst>
+        </p:spPr>
+        <p:txBody>
+          <a:bodyPr rot="0" spcFirstLastPara="0" vertOverflow="overflow" horzOverflow="overflow" vert="horz" wrap="square" lIns="121851" tIns="60925" rIns="121851" bIns="60925" numCol="1" spcCol="0" rtlCol="0" fromWordArt="0" anchor="ctr" anchorCtr="0" forceAA="0" compatLnSpc="1">
+            <a:prstTxWarp prst="textNoShape">
+              <a:avLst/>
+            </a:prstTxWarp>
+            <a:noAutofit/>
+          </a:bodyPr>
+          <a:lstStyle/>
+          <a:p>
+            <a:pPr>
+              <a:lnSpc>
+                <a:spcPct val="90000"/>
+              </a:lnSpc>
+            </a:pPr>
+            <a:r>
+              <a:rPr lang="en-US" sz="2000" b="1" dirty="0">
+                <a:solidFill>
+                  <a:schemeClr val="bg1"/>
+                </a:solidFill>
+              </a:rPr>
+              <a:t>Lab notebook artifacts</a:t>
+            </a:r>
+          </a:p>
+          <a:p>
+            <a:pPr>
+              <a:lnSpc>
+                <a:spcPct val="90000"/>
+              </a:lnSpc>
+            </a:pPr>
+            <a:endParaRPr lang="en-US" sz="2000" b="1" dirty="0">
+              <a:solidFill>
+                <a:schemeClr val="bg1"/>
+              </a:solidFill>
+            </a:endParaRPr>
+          </a:p>
+          <a:p>
+            <a:pPr marL="342900" indent="-342900">
+              <a:lnSpc>
+                <a:spcPct val="90000"/>
+              </a:lnSpc>
+              <a:buFont typeface="Arial" panose="020B0604020202020204" pitchFamily="34" charset="0"/>
+              <a:buChar char="•"/>
+            </a:pPr>
+            <a:r>
+              <a:rPr lang="en-US" sz="2000" dirty="0">
+                <a:solidFill>
+                  <a:schemeClr val="bg1"/>
+                </a:solidFill>
+              </a:rPr>
+              <a:t>every run registers all configurations and runtime parameters in a logfile.</a:t>
+            </a:r>
+          </a:p>
+          <a:p>
+            <a:pPr marL="342900" indent="-342900">
+              <a:lnSpc>
+                <a:spcPct val="90000"/>
+              </a:lnSpc>
+              <a:buFont typeface="Arial" panose="020B0604020202020204" pitchFamily="34" charset="0"/>
+              <a:buChar char="•"/>
+            </a:pPr>
+            <a:endParaRPr lang="en-US" sz="2000" dirty="0">
+              <a:solidFill>
+                <a:schemeClr val="bg1"/>
+              </a:solidFill>
+            </a:endParaRPr>
+          </a:p>
+          <a:p>
+            <a:pPr marL="342900" indent="-342900">
+              <a:lnSpc>
+                <a:spcPct val="90000"/>
+              </a:lnSpc>
+              <a:buFont typeface="Arial" panose="020B0604020202020204" pitchFamily="34" charset="0"/>
+              <a:buChar char="•"/>
+            </a:pPr>
+            <a:r>
+              <a:rPr lang="en-US" sz="2000" dirty="0">
+                <a:solidFill>
+                  <a:schemeClr val="bg1"/>
+                </a:solidFill>
+              </a:rPr>
+              <a:t>logfiles are cumulative </a:t>
+            </a:r>
+          </a:p>
+          <a:p>
+            <a:pPr marL="342900" indent="-342900">
+              <a:lnSpc>
+                <a:spcPct val="90000"/>
+              </a:lnSpc>
+              <a:buFont typeface="Arial" panose="020B0604020202020204" pitchFamily="34" charset="0"/>
+              <a:buChar char="•"/>
+            </a:pPr>
+            <a:endParaRPr lang="en-US" sz="2000" dirty="0">
+              <a:solidFill>
+                <a:schemeClr val="bg1"/>
+              </a:solidFill>
+            </a:endParaRPr>
+          </a:p>
+          <a:p>
+            <a:pPr marL="342900" indent="-342900">
+              <a:lnSpc>
+                <a:spcPct val="90000"/>
+              </a:lnSpc>
+              <a:buFont typeface="Arial" panose="020B0604020202020204" pitchFamily="34" charset="0"/>
+              <a:buChar char="•"/>
+            </a:pPr>
+            <a:r>
+              <a:rPr lang="en-US" sz="2000" dirty="0">
+                <a:solidFill>
+                  <a:schemeClr val="bg1"/>
+                </a:solidFill>
+              </a:rPr>
+              <a:t>dedicate space for storing all results in a preconfigured directory structure</a:t>
+            </a:r>
+          </a:p>
+          <a:p>
+            <a:pPr marL="342900" indent="-342900">
+              <a:lnSpc>
+                <a:spcPct val="90000"/>
+              </a:lnSpc>
+              <a:buFont typeface="Arial" panose="020B0604020202020204" pitchFamily="34" charset="0"/>
+              <a:buChar char="•"/>
+            </a:pPr>
+            <a:endParaRPr lang="en-US" sz="2000" dirty="0">
+              <a:solidFill>
+                <a:schemeClr val="bg1"/>
+              </a:solidFill>
+            </a:endParaRPr>
+          </a:p>
+          <a:p>
+            <a:pPr marL="342900" indent="-342900">
+              <a:lnSpc>
+                <a:spcPct val="90000"/>
+              </a:lnSpc>
+              <a:buFont typeface="Arial" panose="020B0604020202020204" pitchFamily="34" charset="0"/>
+              <a:buChar char="•"/>
+            </a:pPr>
+            <a:r>
+              <a:rPr lang="en-US" sz="2000" dirty="0">
+                <a:solidFill>
+                  <a:schemeClr val="bg1"/>
+                </a:solidFill>
+              </a:rPr>
+              <a:t>scripts to move output from scratch to the dedicated space</a:t>
+            </a:r>
           </a:p>
         </p:txBody>
       </p:sp>
     </p:spTree>
     <p:extLst>
       <p:ext uri="{BB962C8B-B14F-4D97-AF65-F5344CB8AC3E}">
-        <p14:creationId xmlns:p14="http://schemas.microsoft.com/office/powerpoint/2010/main" val="2354399956"/>
+        <p14:creationId xmlns:p14="http://schemas.microsoft.com/office/powerpoint/2010/main" val="4115728313"/>
       </p:ext>
     </p:extLst>
   </p:cSld>
@@ -5626,31 +5634,17 @@
             </a:r>
           </a:p>
           <a:p>
-            <a:r>
-              <a:rPr lang="en-US" dirty="0"/>
-              <a:t>For the paper the referee asked for details from optimizations</a:t>
-            </a:r>
-          </a:p>
-          <a:p>
-            <a:pPr lvl="1"/>
-            <a:r>
-              <a:rPr lang="en-US" dirty="0"/>
-              <a:t>We did not have them</a:t>
-            </a:r>
-          </a:p>
-          <a:p>
-            <a:pPr lvl="1"/>
-            <a:r>
-              <a:rPr lang="en-US" dirty="0"/>
-              <a:t>Fortunately the referee was satisfied with reasoning and other supporting evidence we produced </a:t>
-            </a:r>
+            <a:pPr marL="0" indent="0">
+              <a:buNone/>
+            </a:pPr>
+            <a:endParaRPr lang="en-US" dirty="0"/>
           </a:p>
         </p:txBody>
       </p:sp>
     </p:spTree>
     <p:extLst>
       <p:ext uri="{BB962C8B-B14F-4D97-AF65-F5344CB8AC3E}">
-        <p14:creationId xmlns:p14="http://schemas.microsoft.com/office/powerpoint/2010/main" val="2437327347"/>
+        <p14:creationId xmlns:p14="http://schemas.microsoft.com/office/powerpoint/2010/main" val="2354399956"/>
       </p:ext>
     </p:extLst>
   </p:cSld>
@@ -5682,6 +5676,139 @@
           <p:cNvPr id="2" name="Title 1">
             <a:extLst>
               <a:ext uri="{FF2B5EF4-FFF2-40B4-BE49-F238E27FC236}">
+                <a16:creationId xmlns:a16="http://schemas.microsoft.com/office/drawing/2014/main" id="{C5217296-5EEA-C053-E101-6F25F1AE1EF4}"/>
+              </a:ext>
+            </a:extLst>
+          </p:cNvPr>
+          <p:cNvSpPr>
+            <a:spLocks noGrp="1"/>
+          </p:cNvSpPr>
+          <p:nvPr>
+            <p:ph type="title"/>
+          </p:nvPr>
+        </p:nvSpPr>
+        <p:spPr/>
+        <p:txBody>
+          <a:bodyPr/>
+          <a:lstStyle/>
+          <a:p>
+            <a:r>
+              <a:rPr lang="en-US" dirty="0"/>
+              <a:t>Outcome</a:t>
+            </a:r>
+          </a:p>
+        </p:txBody>
+      </p:sp>
+      <p:sp>
+        <p:nvSpPr>
+          <p:cNvPr id="3" name="Content Placeholder 2">
+            <a:extLst>
+              <a:ext uri="{FF2B5EF4-FFF2-40B4-BE49-F238E27FC236}">
+                <a16:creationId xmlns:a16="http://schemas.microsoft.com/office/drawing/2014/main" id="{AE8184FE-6932-7B46-11FB-E7DBE9489D43}"/>
+              </a:ext>
+            </a:extLst>
+          </p:cNvPr>
+          <p:cNvSpPr>
+            <a:spLocks noGrp="1"/>
+          </p:cNvSpPr>
+          <p:nvPr>
+            <p:ph idx="1"/>
+          </p:nvPr>
+        </p:nvSpPr>
+        <p:spPr/>
+        <p:txBody>
+          <a:bodyPr/>
+          <a:lstStyle/>
+          <a:p>
+            <a:r>
+              <a:rPr lang="en-US" dirty="0"/>
+              <a:t>A successful campaign</a:t>
+            </a:r>
+          </a:p>
+          <a:p>
+            <a:pPr lvl="1"/>
+            <a:r>
+              <a:rPr lang="en-US" dirty="0"/>
+              <a:t>But not without hitches</a:t>
+            </a:r>
+          </a:p>
+          <a:p>
+            <a:r>
+              <a:rPr lang="en-US" dirty="0"/>
+              <a:t>Optimization related runs were not given the same level of care</a:t>
+            </a:r>
+          </a:p>
+          <a:p>
+            <a:pPr lvl="1"/>
+            <a:r>
+              <a:rPr lang="en-US" dirty="0"/>
+              <a:t>Data was considered disposable</a:t>
+            </a:r>
+          </a:p>
+          <a:p>
+            <a:pPr lvl="1"/>
+            <a:r>
+              <a:rPr lang="en-US" dirty="0"/>
+              <a:t>Code changes were documented</a:t>
+            </a:r>
+          </a:p>
+          <a:p>
+            <a:r>
+              <a:rPr lang="en-US" dirty="0"/>
+              <a:t>For the paper the referee asked for details from optimizations</a:t>
+            </a:r>
+          </a:p>
+          <a:p>
+            <a:pPr lvl="1"/>
+            <a:r>
+              <a:rPr lang="en-US" dirty="0"/>
+              <a:t>We did not have them</a:t>
+            </a:r>
+          </a:p>
+          <a:p>
+            <a:pPr lvl="1"/>
+            <a:r>
+              <a:rPr lang="en-US" dirty="0"/>
+              <a:t>Fortunately the referee was satisfied with reasoning and other supporting evidence we produced </a:t>
+            </a:r>
+          </a:p>
+        </p:txBody>
+      </p:sp>
+    </p:spTree>
+    <p:extLst>
+      <p:ext uri="{BB962C8B-B14F-4D97-AF65-F5344CB8AC3E}">
+        <p14:creationId xmlns:p14="http://schemas.microsoft.com/office/powerpoint/2010/main" val="2437327347"/>
+      </p:ext>
+    </p:extLst>
+  </p:cSld>
+  <p:clrMapOvr>
+    <a:masterClrMapping/>
+  </p:clrMapOvr>
+</p:sld>
+</file>
+
+<file path=ppt/slides/slide17.xml><?xml version="1.0" encoding="utf-8"?>
+<p:sld xmlns:a="http://schemas.openxmlformats.org/drawingml/2006/main" xmlns:r="http://schemas.openxmlformats.org/officeDocument/2006/relationships" xmlns:p="http://schemas.openxmlformats.org/presentationml/2006/main">
+  <p:cSld>
+    <p:spTree>
+      <p:nvGrpSpPr>
+        <p:cNvPr id="1" name=""/>
+        <p:cNvGrpSpPr/>
+        <p:nvPr/>
+      </p:nvGrpSpPr>
+      <p:grpSpPr>
+        <a:xfrm>
+          <a:off x="0" y="0"/>
+          <a:ext cx="0" cy="0"/>
+          <a:chOff x="0" y="0"/>
+          <a:chExt cx="0" cy="0"/>
+        </a:xfrm>
+      </p:grpSpPr>
+      <p:sp>
+        <p:nvSpPr>
+          <p:cNvPr id="2" name="Title 1">
+            <a:extLst>
+              <a:ext uri="{FF2B5EF4-FFF2-40B4-BE49-F238E27FC236}">
                 <a16:creationId xmlns:a16="http://schemas.microsoft.com/office/drawing/2014/main" id="{05DA5443-06A3-D891-A1ED-0775C4969FCF}"/>
               </a:ext>
             </a:extLst>
@@ -5786,7 +5913,7 @@
         <p:spPr>
           <a:xfrm>
             <a:off x="620486" y="4364252"/>
-            <a:ext cx="10072886" cy="849463"/>
+            <a:ext cx="10569817" cy="849463"/>
           </a:xfrm>
           <a:prstGeom prst="rect">
             <a:avLst/>
@@ -5806,35 +5933,22 @@
             </a:pPr>
             <a:r>
               <a:rPr lang="en-US" sz="2400" dirty="0"/>
-              <a:t>https://</a:t>
-            </a:r>
-            <a:r>
-              <a:rPr lang="en-US" sz="2400" dirty="0" err="1"/>
-              <a:t>aip.scitation.org</a:t>
-            </a:r>
-            <a:r>
+              <a:t>"a parameter combination that induces erroneous results is easily selected“ </a:t>
+            </a:r>
+            <a:br>
               <a:rPr lang="en-US" sz="2400" dirty="0"/>
-              <a:t>/</a:t>
-            </a:r>
-            <a:r>
-              <a:rPr lang="en-US" sz="2400" dirty="0" err="1"/>
-              <a:t>doi</a:t>
-            </a:r>
+            </a:br>
             <a:r>
               <a:rPr lang="en-US" sz="2400" dirty="0"/>
-              <a:t>/10.1063/1.476021 "a parameter combination </a:t>
-            </a:r>
-          </a:p>
-          <a:p>
-            <a:pPr>
-              <a:lnSpc>
-                <a:spcPct val="90000"/>
-              </a:lnSpc>
-            </a:pPr>
-            <a:r>
-              <a:rPr lang="en-US" sz="2400" dirty="0"/>
-              <a:t>that induces erroneous results is easily selected"</a:t>
-            </a:r>
+              <a:t>- </a:t>
+            </a:r>
+            <a:r>
+              <a:rPr lang="en-US" sz="2400" dirty="0">
+                <a:hlinkClick r:id="rId2"/>
+              </a:rPr>
+              <a:t>https://doi.org/10.1063/1.476021</a:t>
+            </a:r>
+            <a:endParaRPr lang="en-US" sz="2400" dirty="0"/>
           </a:p>
         </p:txBody>
       </p:sp>
@@ -5870,75 +5984,309 @@
       </p:grpSpPr>
       <p:sp>
         <p:nvSpPr>
-          <p:cNvPr id="4" name="Rounded Rectangle 3">
+          <p:cNvPr id="2" name="Title 1">
             <a:extLst>
               <a:ext uri="{FF2B5EF4-FFF2-40B4-BE49-F238E27FC236}">
-                <a16:creationId xmlns:a16="http://schemas.microsoft.com/office/drawing/2014/main" id="{A05CF8D7-AE7E-0ECA-F80F-38A8FBCC26B6}"/>
+                <a16:creationId xmlns:a16="http://schemas.microsoft.com/office/drawing/2014/main" id="{6442C24D-D970-4D40-8F14-D70C10A96304}"/>
               </a:ext>
             </a:extLst>
           </p:cNvPr>
-          <p:cNvSpPr/>
-          <p:nvPr/>
+          <p:cNvSpPr>
+            <a:spLocks noGrp="1"/>
+          </p:cNvSpPr>
+          <p:nvPr>
+            <p:ph type="title"/>
+          </p:nvPr>
         </p:nvSpPr>
         <p:spPr>
           <a:xfrm>
-            <a:off x="1226562" y="1910442"/>
-            <a:ext cx="9289038" cy="2873829"/>
+            <a:off x="363096" y="112911"/>
+            <a:ext cx="11372473" cy="914400"/>
           </a:xfrm>
-          <a:prstGeom prst="roundRect">
+        </p:spPr>
+        <p:txBody>
+          <a:bodyPr/>
+          <a:lstStyle/>
+          <a:p>
+            <a:r>
+              <a:rPr lang="en-US" dirty="0"/>
+              <a:t>License, Citation and Acknowledgements</a:t>
+            </a:r>
+          </a:p>
+        </p:txBody>
+      </p:sp>
+      <p:sp>
+        <p:nvSpPr>
+          <p:cNvPr id="3" name="Content Placeholder 2">
+            <a:extLst>
+              <a:ext uri="{FF2B5EF4-FFF2-40B4-BE49-F238E27FC236}">
+                <a16:creationId xmlns:a16="http://schemas.microsoft.com/office/drawing/2014/main" id="{0385A3AB-B258-4D59-B407-F7D57545A163}"/>
+              </a:ext>
+            </a:extLst>
+          </p:cNvPr>
+          <p:cNvSpPr>
+            <a:spLocks noGrp="1"/>
+          </p:cNvSpPr>
+          <p:nvPr>
+            <p:ph idx="1"/>
+          </p:nvPr>
+        </p:nvSpPr>
+        <p:spPr>
+          <a:xfrm>
+            <a:off x="409507" y="570111"/>
+            <a:ext cx="11369809" cy="4047778"/>
+          </a:xfrm>
+        </p:spPr>
+        <p:txBody>
+          <a:bodyPr/>
+          <a:lstStyle/>
+          <a:p>
+            <a:pPr marL="0" indent="0">
+              <a:buNone/>
+            </a:pPr>
+            <a:r>
+              <a:rPr lang="en-US" sz="2000" b="1" dirty="0"/>
+              <a:t>License and Citation</a:t>
+            </a:r>
+          </a:p>
+          <a:p>
+            <a:pPr>
+              <a:spcBef>
+                <a:spcPts val="400"/>
+              </a:spcBef>
+            </a:pPr>
+            <a:r>
+              <a:rPr lang="en-US" sz="1600" dirty="0"/>
+              <a:t>This work is licensed under a </a:t>
+            </a:r>
+            <a:r>
+              <a:rPr lang="en-US" sz="1600" dirty="0">
+                <a:hlinkClick r:id="rId2"/>
+              </a:rPr>
+              <a:t>Creative</a:t>
+            </a:r>
+            <a:r>
+              <a:rPr lang="en-US" sz="1600" dirty="0">
+                <a:hlinkClick r:id="rId3"/>
+              </a:rPr>
+              <a:t> Commons Attribution 4.0 International License</a:t>
+            </a:r>
+            <a:r>
+              <a:rPr lang="en-US" sz="1600" dirty="0"/>
+              <a:t> (CC BY 4.0).</a:t>
+            </a:r>
+          </a:p>
+          <a:p>
+            <a:pPr>
+              <a:spcBef>
+                <a:spcPts val="400"/>
+              </a:spcBef>
+            </a:pPr>
+            <a:r>
+              <a:rPr lang="en-US" sz="1600" b="1" dirty="0"/>
+              <a:t>The requested citation the overall tutorial is: </a:t>
+            </a:r>
+            <a:r>
+              <a:rPr lang="en-US" sz="1600" b="0" i="0" dirty="0">
+                <a:solidFill>
+                  <a:srgbClr val="111111"/>
+                </a:solidFill>
+                <a:effectLst/>
+                <a:latin typeface="+mj-lt"/>
+              </a:rPr>
+              <a:t>David E. Bernholdt, Anshu Dubey, and Patricia A. Grubel, Better Scientific Software tutorial, in NOAA Global Systems Laboratory, Boulder, Colorado, 2023. DOI: </a:t>
+            </a:r>
+            <a:r>
+              <a:rPr lang="en-US" sz="1600" b="0" i="0" u="none" strike="noStrike" dirty="0">
+                <a:solidFill>
+                  <a:srgbClr val="2A7AE2"/>
+                </a:solidFill>
+                <a:effectLst/>
+                <a:latin typeface="+mj-lt"/>
+                <a:hlinkClick r:id="rId4"/>
+              </a:rPr>
+              <a:t>10.6084/m9.figshare.23796606</a:t>
+            </a:r>
+            <a:r>
+              <a:rPr lang="en-US" sz="1600" b="0" i="0" dirty="0">
+                <a:solidFill>
+                  <a:srgbClr val="111111"/>
+                </a:solidFill>
+                <a:effectLst/>
+                <a:latin typeface="+mj-lt"/>
+              </a:rPr>
+              <a:t>.</a:t>
+            </a:r>
+          </a:p>
+          <a:p>
+            <a:pPr>
+              <a:spcBef>
+                <a:spcPts val="400"/>
+              </a:spcBef>
+            </a:pPr>
+            <a:r>
+              <a:rPr lang="en-US" sz="1600" dirty="0"/>
+              <a:t>Individual modules may be cited as </a:t>
+            </a:r>
+            <a:r>
+              <a:rPr lang="en-US" sz="1600" i="1" dirty="0"/>
+              <a:t>Speaker, Module Title</a:t>
+            </a:r>
+            <a:r>
+              <a:rPr lang="en-US" sz="1600" dirty="0"/>
+              <a:t>, in </a:t>
+            </a:r>
+            <a:r>
+              <a:rPr lang="en-US" sz="1600" b="0" i="1" dirty="0">
+                <a:solidFill>
+                  <a:srgbClr val="111111"/>
+                </a:solidFill>
+                <a:effectLst/>
+                <a:latin typeface="+mn-lt"/>
+              </a:rPr>
+              <a:t>Tutorial Title</a:t>
+            </a:r>
+            <a:r>
+              <a:rPr lang="en-US" sz="1600" dirty="0"/>
+              <a:t>, …</a:t>
+            </a:r>
+          </a:p>
+          <a:p>
+            <a:pPr marL="0" indent="0">
+              <a:spcBef>
+                <a:spcPts val="800"/>
+              </a:spcBef>
+              <a:buNone/>
+            </a:pPr>
+            <a:r>
+              <a:rPr lang="en-US" sz="2000" b="1" dirty="0"/>
+              <a:t>Acknowledgements</a:t>
+            </a:r>
+          </a:p>
+          <a:p>
+            <a:pPr>
+              <a:spcBef>
+                <a:spcPts val="400"/>
+              </a:spcBef>
+            </a:pPr>
+            <a:r>
+              <a:rPr lang="en-US" sz="1400" dirty="0"/>
+              <a:t>This work was supported by the U.S. Department of Energy Office of Science, Office of Advanced Scientific Computing Research (ASCR), and by the Exascale Computing Project (17-SC-20-SC), a collaborative effort of the U.S. Department of Energy Office of Science and the National Nuclear Security Administration</a:t>
+            </a:r>
+            <a:r>
+              <a:rPr lang="en-US" sz="1400" i="1" dirty="0"/>
+              <a:t>.</a:t>
+            </a:r>
+            <a:endParaRPr lang="en-US" sz="1400" dirty="0"/>
+          </a:p>
+          <a:p>
+            <a:pPr>
+              <a:spcBef>
+                <a:spcPts val="400"/>
+              </a:spcBef>
+            </a:pPr>
+            <a:r>
+              <a:rPr lang="en-US" sz="1400" dirty="0"/>
+              <a:t>This work was performed in part at the Argonne National Laboratory, which is managed by UChicago Argonne, LLC for the U.S. Department of Energy under Contract No. DE-AC02-06CH11357.</a:t>
+            </a:r>
+          </a:p>
+          <a:p>
+            <a:pPr>
+              <a:spcBef>
+                <a:spcPts val="400"/>
+              </a:spcBef>
+            </a:pPr>
+            <a:r>
+              <a:rPr lang="en-US" sz="1400" dirty="0"/>
+              <a:t>This work was performed in part at the Lawrence Livermore National Laboratory, which is managed by Lawrence Livermore National Security, LLC for the U.S. Department of Energy under Contract No. DE-AC52-07NA27344.</a:t>
+            </a:r>
+          </a:p>
+          <a:p>
+            <a:pPr>
+              <a:spcBef>
+                <a:spcPts val="400"/>
+              </a:spcBef>
+            </a:pPr>
+            <a:r>
+              <a:rPr lang="en-US" sz="1400" dirty="0"/>
+              <a:t>This work was performed in part at the Los Alamos National Laboratory, which is managed by Triad National Security, LLC for the U.S. Department of Energy under Contract No.89233218CNA000001</a:t>
+            </a:r>
+          </a:p>
+          <a:p>
+            <a:pPr>
+              <a:spcBef>
+                <a:spcPts val="400"/>
+              </a:spcBef>
+            </a:pPr>
+            <a:r>
+              <a:rPr lang="en-US" sz="1400" dirty="0"/>
+              <a:t>This work was performed in part at the Oak Ridge National Laboratory, which is managed by UT-Battelle, LLC for the U.S. Department of Energy under Contract No. DE-AC05-00OR22725.</a:t>
+            </a:r>
+          </a:p>
+          <a:p>
+            <a:pPr>
+              <a:spcBef>
+                <a:spcPts val="400"/>
+              </a:spcBef>
+            </a:pPr>
+            <a:r>
+              <a:rPr lang="en-US" sz="1400" dirty="0"/>
+              <a:t>This work was performed in part at Sandia National Laboratories. Sandia National Laboratories is a multi-mission laboratory managed and operated by National Technology and Engineering Solutions of Sandia, LLC., a wholly owned subsidiary of Honeywell International, Inc., for the U.S. Department of Energy’s National Nuclear Security Administration under contract DE-NA0003525.</a:t>
+            </a:r>
+          </a:p>
+        </p:txBody>
+      </p:sp>
+      <p:pic>
+        <p:nvPicPr>
+          <p:cNvPr id="4" name="Picture 2" descr="https://licensebuttons.net/l/by/4.0/88x31.png">
+            <a:extLst>
+              <a:ext uri="{FF2B5EF4-FFF2-40B4-BE49-F238E27FC236}">
+                <a16:creationId xmlns:a16="http://schemas.microsoft.com/office/drawing/2014/main" id="{61840015-22A0-4634-A2DE-AA05F998FD3A}"/>
+              </a:ext>
+            </a:extLst>
+          </p:cNvPr>
+          <p:cNvPicPr>
+            <a:picLocks noChangeAspect="1" noChangeArrowheads="1"/>
+          </p:cNvPicPr>
+          <p:nvPr/>
+        </p:nvPicPr>
+        <p:blipFill>
+          <a:blip r:embed="rId5">
+            <a:extLst>
+              <a:ext uri="{28A0092B-C50C-407E-A947-70E740481C1C}">
+                <a14:useLocalDpi xmlns:a14="http://schemas.microsoft.com/office/drawing/2010/main" val="0"/>
+              </a:ext>
+            </a:extLst>
+          </a:blip>
+          <a:srcRect/>
+          <a:stretch>
+            <a:fillRect/>
+          </a:stretch>
+        </p:blipFill>
+        <p:spPr bwMode="auto">
+          <a:xfrm>
+            <a:off x="10230336" y="879673"/>
+            <a:ext cx="838200" cy="295275"/>
+          </a:xfrm>
+          <a:prstGeom prst="rect">
             <a:avLst/>
           </a:prstGeom>
-          <a:solidFill>
-            <a:schemeClr val="accent3"/>
-          </a:solidFill>
-          <a:ln>
-            <a:noFill/>
-          </a:ln>
-          <a:effectLst>
-            <a:outerShdw blurRad="44450" dist="27940" dir="5400000" algn="ctr">
-              <a:srgbClr val="000000">
-                <a:alpha val="32000"/>
-              </a:srgbClr>
-            </a:outerShdw>
-          </a:effectLst>
+          <a:noFill/>
+          <a:extLst>
+            <a:ext uri="{909E8E84-426E-40DD-AFC4-6F175D3DCCD1}">
+              <a14:hiddenFill xmlns:a14="http://schemas.microsoft.com/office/drawing/2010/main">
+                <a:solidFill>
+                  <a:srgbClr val="FFFFFF"/>
+                </a:solidFill>
+              </a14:hiddenFill>
+            </a:ext>
+          </a:extLst>
         </p:spPr>
-        <p:txBody>
-          <a:bodyPr rot="0" spcFirstLastPara="0" vertOverflow="overflow" horzOverflow="overflow" vert="horz" wrap="square" lIns="121851" tIns="60925" rIns="121851" bIns="60925" numCol="1" spcCol="0" rtlCol="0" fromWordArt="0" anchor="ctr" anchorCtr="0" forceAA="0" compatLnSpc="1">
-            <a:prstTxWarp prst="textNoShape">
-              <a:avLst/>
-            </a:prstTxWarp>
-            <a:noAutofit/>
-          </a:bodyPr>
-          <a:lstStyle/>
-          <a:p>
-            <a:pPr algn="ctr">
-              <a:lnSpc>
-                <a:spcPct val="90000"/>
-              </a:lnSpc>
-            </a:pPr>
-            <a:r>
-              <a:rPr lang="en-US" sz="3200" dirty="0">
-                <a:solidFill>
-                  <a:schemeClr val="bg1"/>
-                </a:solidFill>
-              </a:rPr>
-              <a:t>Running simulations for science discovery is more of a craft and less of science. More than any other aspect of computational science it relies on experience and acquired wisdom that helps one develop a nose for fruitful possibilities</a:t>
-            </a:r>
-            <a:r>
-              <a:rPr lang="en-US" sz="2000" dirty="0">
-                <a:solidFill>
-                  <a:schemeClr val="bg1"/>
-                </a:solidFill>
-              </a:rPr>
-              <a:t>.</a:t>
-            </a:r>
-          </a:p>
-        </p:txBody>
-      </p:sp>
+      </p:pic>
     </p:spTree>
     <p:extLst>
       <p:ext uri="{BB962C8B-B14F-4D97-AF65-F5344CB8AC3E}">
-        <p14:creationId xmlns:p14="http://schemas.microsoft.com/office/powerpoint/2010/main" val="2834191739"/>
+        <p14:creationId xmlns:p14="http://schemas.microsoft.com/office/powerpoint/2010/main" val="978726433"/>
       </p:ext>
     </p:extLst>
   </p:cSld>
@@ -5967,147 +6315,10 @@
       </p:grpSpPr>
       <p:sp>
         <p:nvSpPr>
-          <p:cNvPr id="2" name="Title 1">
+          <p:cNvPr id="4" name="Rounded Rectangle 3">
             <a:extLst>
               <a:ext uri="{FF2B5EF4-FFF2-40B4-BE49-F238E27FC236}">
-                <a16:creationId xmlns:a16="http://schemas.microsoft.com/office/drawing/2014/main" id="{C2376954-3703-3D5F-1556-493251ADA7D6}"/>
-              </a:ext>
-            </a:extLst>
-          </p:cNvPr>
-          <p:cNvSpPr>
-            <a:spLocks noGrp="1"/>
-          </p:cNvSpPr>
-          <p:nvPr>
-            <p:ph type="title"/>
-          </p:nvPr>
-        </p:nvSpPr>
-        <p:spPr/>
-        <p:txBody>
-          <a:bodyPr/>
-          <a:lstStyle/>
-          <a:p>
-            <a:r>
-              <a:rPr lang="en-US" dirty="0"/>
-              <a:t>Why do you need to plan?</a:t>
-            </a:r>
-          </a:p>
-        </p:txBody>
-      </p:sp>
-      <p:sp>
-        <p:nvSpPr>
-          <p:cNvPr id="3" name="Content Placeholder 2">
-            <a:extLst>
-              <a:ext uri="{FF2B5EF4-FFF2-40B4-BE49-F238E27FC236}">
-                <a16:creationId xmlns:a16="http://schemas.microsoft.com/office/drawing/2014/main" id="{4F3D57F9-5D12-25C5-A6B4-27E9D7E906C9}"/>
-              </a:ext>
-            </a:extLst>
-          </p:cNvPr>
-          <p:cNvSpPr>
-            <a:spLocks noGrp="1"/>
-          </p:cNvSpPr>
-          <p:nvPr>
-            <p:ph idx="1"/>
-          </p:nvPr>
-        </p:nvSpPr>
-        <p:spPr>
-          <a:xfrm>
-            <a:off x="365761" y="1325879"/>
-            <a:ext cx="9006840" cy="4402567"/>
-          </a:xfrm>
-        </p:spPr>
-        <p:txBody>
-          <a:bodyPr/>
-          <a:lstStyle/>
-          <a:p>
-            <a:r>
-              <a:rPr lang="en-US" dirty="0"/>
-              <a:t>Machines are expensive and rare resources</a:t>
-            </a:r>
-          </a:p>
-          <a:p>
-            <a:pPr lvl="1"/>
-            <a:r>
-              <a:rPr lang="en-US" dirty="0"/>
-              <a:t>Operating them is also very expensive</a:t>
-            </a:r>
-          </a:p>
-          <a:p>
-            <a:pPr lvl="2"/>
-            <a:r>
-              <a:rPr lang="en-US" dirty="0">
-                <a:solidFill>
-                  <a:srgbClr val="C00000"/>
-                </a:solidFill>
-              </a:rPr>
-              <a:t>If you made a mistake in your input parameters and got garbage results on a large scale run, you just wasted hundreds of thousands of dollars </a:t>
-            </a:r>
-          </a:p>
-          <a:p>
-            <a:pPr lvl="1"/>
-            <a:r>
-              <a:rPr lang="en-US" dirty="0"/>
-              <a:t>Many people are competing for these resources</a:t>
-            </a:r>
-          </a:p>
-          <a:p>
-            <a:pPr lvl="2"/>
-            <a:r>
-              <a:rPr lang="en-US" dirty="0">
-                <a:solidFill>
-                  <a:srgbClr val="C00000"/>
-                </a:solidFill>
-              </a:rPr>
-              <a:t>Your wasted run is likely to be either your or someone else’s opportunity lost</a:t>
-            </a:r>
-          </a:p>
-          <a:p>
-            <a:pPr lvl="1"/>
-            <a:r>
-              <a:rPr lang="en-US" dirty="0"/>
-              <a:t>You are likely charting new scientific territory</a:t>
-            </a:r>
-          </a:p>
-          <a:p>
-            <a:pPr lvl="2"/>
-            <a:r>
-              <a:rPr lang="en-US" dirty="0">
-                <a:solidFill>
-                  <a:srgbClr val="C00000"/>
-                </a:solidFill>
-              </a:rPr>
-              <a:t>Some aspect of using your code may not have been important before, but may become critical in the new study</a:t>
-            </a:r>
-          </a:p>
-          <a:p>
-            <a:pPr lvl="2"/>
-            <a:r>
-              <a:rPr lang="en-US" dirty="0">
-                <a:solidFill>
-                  <a:srgbClr val="C00000"/>
-                </a:solidFill>
-              </a:rPr>
-              <a:t>Some solver may run up against the limits of its validity</a:t>
-            </a:r>
-          </a:p>
-          <a:p>
-            <a:pPr lvl="2"/>
-            <a:r>
-              <a:rPr lang="en-US" dirty="0">
-                <a:solidFill>
-                  <a:srgbClr val="C00000"/>
-                </a:solidFill>
-              </a:rPr>
-              <a:t>Inflight correction may be needed to parameters to continue with the study</a:t>
-            </a:r>
-          </a:p>
-        </p:txBody>
-      </p:sp>
-      <p:sp>
-        <p:nvSpPr>
-          <p:cNvPr id="5" name="Rectangle 4">
-            <a:extLst>
-              <a:ext uri="{FF2B5EF4-FFF2-40B4-BE49-F238E27FC236}">
-                <a16:creationId xmlns:a16="http://schemas.microsoft.com/office/drawing/2014/main" id="{6BAADB36-155B-3C6B-571D-C37BA88F887D}"/>
+                <a16:creationId xmlns:a16="http://schemas.microsoft.com/office/drawing/2014/main" id="{A05CF8D7-AE7E-0ECA-F80F-38A8FBCC26B6}"/>
               </a:ext>
             </a:extLst>
           </p:cNvPr>
@@ -6116,21 +6327,23 @@
         </p:nvSpPr>
         <p:spPr>
           <a:xfrm>
-            <a:off x="914400" y="2070847"/>
-            <a:ext cx="8458201" cy="699247"/>
+            <a:off x="1226562" y="1910442"/>
+            <a:ext cx="9289038" cy="2873829"/>
           </a:xfrm>
-          <a:prstGeom prst="rect">
+          <a:prstGeom prst="roundRect">
             <a:avLst/>
           </a:prstGeom>
           <a:solidFill>
-            <a:schemeClr val="bg1"/>
+            <a:schemeClr val="accent3"/>
           </a:solidFill>
           <a:ln>
             <a:noFill/>
           </a:ln>
           <a:effectLst>
-            <a:outerShdw sx="1000" sy="1000" algn="ctr">
-              <a:srgbClr val="000000"/>
+            <a:outerShdw blurRad="44450" dist="27940" dir="5400000" algn="ctr">
+              <a:srgbClr val="000000">
+                <a:alpha val="32000"/>
+              </a:srgbClr>
             </a:outerShdw>
           </a:effectLst>
         </p:spPr>
@@ -6148,126 +6361,29 @@
                 <a:spcPct val="90000"/>
               </a:lnSpc>
             </a:pPr>
-            <a:endParaRPr lang="en-US" sz="2000" dirty="0">
-              <a:solidFill>
-                <a:schemeClr val="bg1"/>
-              </a:solidFill>
-            </a:endParaRPr>
-          </a:p>
-        </p:txBody>
-      </p:sp>
-      <p:sp>
-        <p:nvSpPr>
-          <p:cNvPr id="6" name="Rectangle 5">
-            <a:extLst>
-              <a:ext uri="{FF2B5EF4-FFF2-40B4-BE49-F238E27FC236}">
-                <a16:creationId xmlns:a16="http://schemas.microsoft.com/office/drawing/2014/main" id="{5C3A25D7-7A00-664A-9949-1C0509FCC0AF}"/>
-              </a:ext>
-            </a:extLst>
-          </p:cNvPr>
-          <p:cNvSpPr/>
-          <p:nvPr/>
-        </p:nvSpPr>
-        <p:spPr>
-          <a:xfrm>
-            <a:off x="1093694" y="3079376"/>
-            <a:ext cx="8458201" cy="435685"/>
-          </a:xfrm>
-          <a:prstGeom prst="rect">
-            <a:avLst/>
-          </a:prstGeom>
-          <a:solidFill>
-            <a:schemeClr val="bg1"/>
-          </a:solidFill>
-          <a:ln>
-            <a:noFill/>
-          </a:ln>
-          <a:effectLst>
-            <a:outerShdw sx="1000" sy="1000" algn="ctr">
-              <a:srgbClr val="000000"/>
-            </a:outerShdw>
-          </a:effectLst>
-        </p:spPr>
-        <p:txBody>
-          <a:bodyPr rot="0" spcFirstLastPara="0" vertOverflow="overflow" horzOverflow="overflow" vert="horz" wrap="square" lIns="121851" tIns="60925" rIns="121851" bIns="60925" numCol="1" spcCol="0" rtlCol="0" fromWordArt="0" anchor="ctr" anchorCtr="0" forceAA="0" compatLnSpc="1">
-            <a:prstTxWarp prst="textNoShape">
-              <a:avLst/>
-            </a:prstTxWarp>
-            <a:noAutofit/>
-          </a:bodyPr>
-          <a:lstStyle/>
-          <a:p>
-            <a:pPr algn="ctr">
-              <a:lnSpc>
-                <a:spcPct val="90000"/>
-              </a:lnSpc>
-            </a:pPr>
-            <a:endParaRPr lang="en-US" sz="2000" dirty="0">
-              <a:solidFill>
-                <a:schemeClr val="bg1"/>
-              </a:solidFill>
-            </a:endParaRPr>
-          </a:p>
-        </p:txBody>
-      </p:sp>
-      <p:sp>
-        <p:nvSpPr>
-          <p:cNvPr id="7" name="Rectangle 6">
-            <a:extLst>
-              <a:ext uri="{FF2B5EF4-FFF2-40B4-BE49-F238E27FC236}">
-                <a16:creationId xmlns:a16="http://schemas.microsoft.com/office/drawing/2014/main" id="{5AD47328-D3FB-DAC1-8695-238EED7A2C6F}"/>
-              </a:ext>
-            </a:extLst>
-          </p:cNvPr>
-          <p:cNvSpPr/>
-          <p:nvPr/>
-        </p:nvSpPr>
-        <p:spPr>
-          <a:xfrm>
-            <a:off x="1093694" y="3824343"/>
-            <a:ext cx="8278908" cy="1272092"/>
-          </a:xfrm>
-          <a:prstGeom prst="rect">
-            <a:avLst/>
-          </a:prstGeom>
-          <a:solidFill>
-            <a:schemeClr val="bg1"/>
-          </a:solidFill>
-          <a:ln>
-            <a:noFill/>
-          </a:ln>
-          <a:effectLst>
-            <a:outerShdw sx="1000" sy="1000" algn="ctr">
-              <a:srgbClr val="000000"/>
-            </a:outerShdw>
-          </a:effectLst>
-        </p:spPr>
-        <p:txBody>
-          <a:bodyPr rot="0" spcFirstLastPara="0" vertOverflow="overflow" horzOverflow="overflow" vert="horz" wrap="square" lIns="121851" tIns="60925" rIns="121851" bIns="60925" numCol="1" spcCol="0" rtlCol="0" fromWordArt="0" anchor="ctr" anchorCtr="0" forceAA="0" compatLnSpc="1">
-            <a:prstTxWarp prst="textNoShape">
-              <a:avLst/>
-            </a:prstTxWarp>
-            <a:noAutofit/>
-          </a:bodyPr>
-          <a:lstStyle/>
-          <a:p>
-            <a:pPr algn="ctr">
-              <a:lnSpc>
-                <a:spcPct val="90000"/>
-              </a:lnSpc>
-            </a:pPr>
-            <a:endParaRPr lang="en-US" sz="2000" dirty="0">
-              <a:solidFill>
-                <a:schemeClr val="bg1"/>
-              </a:solidFill>
-            </a:endParaRPr>
+            <a:r>
+              <a:rPr lang="en-US" sz="3200" dirty="0">
+                <a:solidFill>
+                  <a:schemeClr val="bg1"/>
+                </a:solidFill>
+              </a:rPr>
+              <a:t>Running simulations for science discovery is more of a craft and less of science. More than any other aspect of computational science it relies on experience and acquired wisdom that helps one develop a nose for fruitful possibilities</a:t>
+            </a:r>
+            <a:r>
+              <a:rPr lang="en-US" sz="2000" dirty="0">
+                <a:solidFill>
+                  <a:schemeClr val="bg1"/>
+                </a:solidFill>
+              </a:rPr>
+              <a:t>.</a:t>
+            </a:r>
           </a:p>
         </p:txBody>
       </p:sp>
     </p:spTree>
     <p:extLst>
       <p:ext uri="{BB962C8B-B14F-4D97-AF65-F5344CB8AC3E}">
-        <p14:creationId xmlns:p14="http://schemas.microsoft.com/office/powerpoint/2010/main" val="32320673"/>
+        <p14:creationId xmlns:p14="http://schemas.microsoft.com/office/powerpoint/2010/main" val="2834191739"/>
       </p:ext>
     </p:extLst>
   </p:cSld>
@@ -6429,18 +6545,174 @@
               <a:t>Inflight correction may be needed to parameters to continue with the study</a:t>
             </a:r>
           </a:p>
-          <a:p>
-            <a:r>
-              <a:rPr lang="en-US" dirty="0"/>
-              <a:t>Aim for no surprises, but be prepared for them</a:t>
-            </a:r>
+        </p:txBody>
+      </p:sp>
+      <p:sp>
+        <p:nvSpPr>
+          <p:cNvPr id="5" name="Rectangle 4">
+            <a:extLst>
+              <a:ext uri="{FF2B5EF4-FFF2-40B4-BE49-F238E27FC236}">
+                <a16:creationId xmlns:a16="http://schemas.microsoft.com/office/drawing/2014/main" id="{6BAADB36-155B-3C6B-571D-C37BA88F887D}"/>
+              </a:ext>
+            </a:extLst>
+          </p:cNvPr>
+          <p:cNvSpPr/>
+          <p:nvPr/>
+        </p:nvSpPr>
+        <p:spPr>
+          <a:xfrm>
+            <a:off x="914400" y="2070847"/>
+            <a:ext cx="8458201" cy="699247"/>
+          </a:xfrm>
+          <a:prstGeom prst="rect">
+            <a:avLst/>
+          </a:prstGeom>
+          <a:solidFill>
+            <a:schemeClr val="bg1"/>
+          </a:solidFill>
+          <a:ln>
+            <a:noFill/>
+          </a:ln>
+          <a:effectLst>
+            <a:outerShdw sx="1000" sy="1000" algn="ctr">
+              <a:srgbClr val="000000"/>
+            </a:outerShdw>
+          </a:effectLst>
+        </p:spPr>
+        <p:txBody>
+          <a:bodyPr rot="0" spcFirstLastPara="0" vertOverflow="overflow" horzOverflow="overflow" vert="horz" wrap="square" lIns="121851" tIns="60925" rIns="121851" bIns="60925" numCol="1" spcCol="0" rtlCol="0" fromWordArt="0" anchor="ctr" anchorCtr="0" forceAA="0" compatLnSpc="1">
+            <a:prstTxWarp prst="textNoShape">
+              <a:avLst/>
+            </a:prstTxWarp>
+            <a:noAutofit/>
+          </a:bodyPr>
+          <a:lstStyle/>
+          <a:p>
+            <a:pPr algn="ctr">
+              <a:lnSpc>
+                <a:spcPct val="90000"/>
+              </a:lnSpc>
+            </a:pPr>
+            <a:endParaRPr lang="en-US" sz="2000" dirty="0">
+              <a:solidFill>
+                <a:schemeClr val="bg1"/>
+              </a:solidFill>
+            </a:endParaRPr>
+          </a:p>
+        </p:txBody>
+      </p:sp>
+      <p:sp>
+        <p:nvSpPr>
+          <p:cNvPr id="6" name="Rectangle 5">
+            <a:extLst>
+              <a:ext uri="{FF2B5EF4-FFF2-40B4-BE49-F238E27FC236}">
+                <a16:creationId xmlns:a16="http://schemas.microsoft.com/office/drawing/2014/main" id="{5C3A25D7-7A00-664A-9949-1C0509FCC0AF}"/>
+              </a:ext>
+            </a:extLst>
+          </p:cNvPr>
+          <p:cNvSpPr/>
+          <p:nvPr/>
+        </p:nvSpPr>
+        <p:spPr>
+          <a:xfrm>
+            <a:off x="1093694" y="3079376"/>
+            <a:ext cx="8458201" cy="435685"/>
+          </a:xfrm>
+          <a:prstGeom prst="rect">
+            <a:avLst/>
+          </a:prstGeom>
+          <a:solidFill>
+            <a:schemeClr val="bg1"/>
+          </a:solidFill>
+          <a:ln>
+            <a:noFill/>
+          </a:ln>
+          <a:effectLst>
+            <a:outerShdw sx="1000" sy="1000" algn="ctr">
+              <a:srgbClr val="000000"/>
+            </a:outerShdw>
+          </a:effectLst>
+        </p:spPr>
+        <p:txBody>
+          <a:bodyPr rot="0" spcFirstLastPara="0" vertOverflow="overflow" horzOverflow="overflow" vert="horz" wrap="square" lIns="121851" tIns="60925" rIns="121851" bIns="60925" numCol="1" spcCol="0" rtlCol="0" fromWordArt="0" anchor="ctr" anchorCtr="0" forceAA="0" compatLnSpc="1">
+            <a:prstTxWarp prst="textNoShape">
+              <a:avLst/>
+            </a:prstTxWarp>
+            <a:noAutofit/>
+          </a:bodyPr>
+          <a:lstStyle/>
+          <a:p>
+            <a:pPr algn="ctr">
+              <a:lnSpc>
+                <a:spcPct val="90000"/>
+              </a:lnSpc>
+            </a:pPr>
+            <a:endParaRPr lang="en-US" sz="2000" dirty="0">
+              <a:solidFill>
+                <a:schemeClr val="bg1"/>
+              </a:solidFill>
+            </a:endParaRPr>
+          </a:p>
+        </p:txBody>
+      </p:sp>
+      <p:sp>
+        <p:nvSpPr>
+          <p:cNvPr id="7" name="Rectangle 6">
+            <a:extLst>
+              <a:ext uri="{FF2B5EF4-FFF2-40B4-BE49-F238E27FC236}">
+                <a16:creationId xmlns:a16="http://schemas.microsoft.com/office/drawing/2014/main" id="{5AD47328-D3FB-DAC1-8695-238EED7A2C6F}"/>
+              </a:ext>
+            </a:extLst>
+          </p:cNvPr>
+          <p:cNvSpPr/>
+          <p:nvPr/>
+        </p:nvSpPr>
+        <p:spPr>
+          <a:xfrm>
+            <a:off x="1093694" y="3824343"/>
+            <a:ext cx="8278908" cy="1272092"/>
+          </a:xfrm>
+          <a:prstGeom prst="rect">
+            <a:avLst/>
+          </a:prstGeom>
+          <a:solidFill>
+            <a:schemeClr val="bg1"/>
+          </a:solidFill>
+          <a:ln>
+            <a:noFill/>
+          </a:ln>
+          <a:effectLst>
+            <a:outerShdw sx="1000" sy="1000" algn="ctr">
+              <a:srgbClr val="000000"/>
+            </a:outerShdw>
+          </a:effectLst>
+        </p:spPr>
+        <p:txBody>
+          <a:bodyPr rot="0" spcFirstLastPara="0" vertOverflow="overflow" horzOverflow="overflow" vert="horz" wrap="square" lIns="121851" tIns="60925" rIns="121851" bIns="60925" numCol="1" spcCol="0" rtlCol="0" fromWordArt="0" anchor="ctr" anchorCtr="0" forceAA="0" compatLnSpc="1">
+            <a:prstTxWarp prst="textNoShape">
+              <a:avLst/>
+            </a:prstTxWarp>
+            <a:noAutofit/>
+          </a:bodyPr>
+          <a:lstStyle/>
+          <a:p>
+            <a:pPr algn="ctr">
+              <a:lnSpc>
+                <a:spcPct val="90000"/>
+              </a:lnSpc>
+            </a:pPr>
+            <a:endParaRPr lang="en-US" sz="2000" dirty="0">
+              <a:solidFill>
+                <a:schemeClr val="bg1"/>
+              </a:solidFill>
+            </a:endParaRPr>
           </a:p>
         </p:txBody>
       </p:sp>
     </p:spTree>
     <p:extLst>
       <p:ext uri="{BB962C8B-B14F-4D97-AF65-F5344CB8AC3E}">
-        <p14:creationId xmlns:p14="http://schemas.microsoft.com/office/powerpoint/2010/main" val="135586253"/>
+        <p14:creationId xmlns:p14="http://schemas.microsoft.com/office/powerpoint/2010/main" val="32320673"/>
       </p:ext>
     </p:extLst>
   </p:cSld>
@@ -6610,95 +6882,10 @@
           </a:p>
         </p:txBody>
       </p:sp>
-      <p:sp>
-        <p:nvSpPr>
-          <p:cNvPr id="4" name="Rectangle 3">
-            <a:extLst>
-              <a:ext uri="{FF2B5EF4-FFF2-40B4-BE49-F238E27FC236}">
-                <a16:creationId xmlns:a16="http://schemas.microsoft.com/office/drawing/2014/main" id="{F25F886C-EB2B-9191-6F30-62179A7DF7F1}"/>
-              </a:ext>
-            </a:extLst>
-          </p:cNvPr>
-          <p:cNvSpPr/>
-          <p:nvPr/>
-        </p:nvSpPr>
-        <p:spPr>
-          <a:xfrm>
-            <a:off x="9695329" y="1325880"/>
-            <a:ext cx="1869142" cy="4416014"/>
-          </a:xfrm>
-          <a:prstGeom prst="rect">
-            <a:avLst/>
-          </a:prstGeom>
-          <a:solidFill>
-            <a:schemeClr val="accent4">
-              <a:lumMod val="75000"/>
-            </a:schemeClr>
-          </a:solidFill>
-          <a:ln>
-            <a:noFill/>
-          </a:ln>
-          <a:effectLst>
-            <a:outerShdw blurRad="44450" dist="27940" dir="5400000" algn="ctr">
-              <a:srgbClr val="000000">
-                <a:alpha val="32000"/>
-              </a:srgbClr>
-            </a:outerShdw>
-          </a:effectLst>
-        </p:spPr>
-        <p:txBody>
-          <a:bodyPr rot="0" spcFirstLastPara="0" vertOverflow="overflow" horzOverflow="overflow" vert="horz" wrap="square" lIns="121851" tIns="60925" rIns="121851" bIns="60925" numCol="1" spcCol="0" rtlCol="0" fromWordArt="0" anchor="ctr" anchorCtr="0" forceAA="0" compatLnSpc="1">
-            <a:prstTxWarp prst="textNoShape">
-              <a:avLst/>
-            </a:prstTxWarp>
-            <a:noAutofit/>
-          </a:bodyPr>
-          <a:lstStyle/>
-          <a:p>
-            <a:pPr algn="ctr">
-              <a:lnSpc>
-                <a:spcPct val="90000"/>
-              </a:lnSpc>
-            </a:pPr>
-            <a:r>
-              <a:rPr lang="en-US" sz="2000" dirty="0">
-                <a:solidFill>
-                  <a:schemeClr val="bg1"/>
-                </a:solidFill>
-              </a:rPr>
-              <a:t>In the 2005 simulation mentioned earlier, out of 5 teams, ours was the only team that had success in getting  a good science outcome </a:t>
-            </a:r>
-          </a:p>
-          <a:p>
-            <a:pPr algn="ctr">
-              <a:lnSpc>
-                <a:spcPct val="90000"/>
-              </a:lnSpc>
-            </a:pPr>
-            <a:endParaRPr lang="en-US" sz="2000" dirty="0">
-              <a:solidFill>
-                <a:schemeClr val="bg1"/>
-              </a:solidFill>
-            </a:endParaRPr>
-          </a:p>
-          <a:p>
-            <a:pPr algn="ctr">
-              <a:lnSpc>
-                <a:spcPct val="90000"/>
-              </a:lnSpc>
-            </a:pPr>
-            <a:endParaRPr lang="en-US" sz="2000" dirty="0">
-              <a:solidFill>
-                <a:schemeClr val="bg1"/>
-              </a:solidFill>
-            </a:endParaRPr>
-          </a:p>
-        </p:txBody>
-      </p:sp>
     </p:spTree>
     <p:extLst>
       <p:ext uri="{BB962C8B-B14F-4D97-AF65-F5344CB8AC3E}">
-        <p14:creationId xmlns:p14="http://schemas.microsoft.com/office/powerpoint/2010/main" val="2324504081"/>
+        <p14:creationId xmlns:p14="http://schemas.microsoft.com/office/powerpoint/2010/main" val="135586253"/>
       </p:ext>
     </p:extLst>
   </p:cSld>
@@ -6730,7 +6917,7 @@
           <p:cNvPr id="2" name="Title 1">
             <a:extLst>
               <a:ext uri="{FF2B5EF4-FFF2-40B4-BE49-F238E27FC236}">
-                <a16:creationId xmlns:a16="http://schemas.microsoft.com/office/drawing/2014/main" id="{A5235A0F-203F-5BF7-7718-068E3B49D01A}"/>
+                <a16:creationId xmlns:a16="http://schemas.microsoft.com/office/drawing/2014/main" id="{C2376954-3703-3D5F-1556-493251ADA7D6}"/>
               </a:ext>
             </a:extLst>
           </p:cNvPr>
@@ -6748,7 +6935,7 @@
           <a:p>
             <a:r>
               <a:rPr lang="en-US" dirty="0"/>
-              <a:t>How do you plan</a:t>
+              <a:t>Why do you need to plan?</a:t>
             </a:r>
           </a:p>
         </p:txBody>
@@ -6758,7 +6945,7 @@
           <p:cNvPr id="3" name="Content Placeholder 2">
             <a:extLst>
               <a:ext uri="{FF2B5EF4-FFF2-40B4-BE49-F238E27FC236}">
-                <a16:creationId xmlns:a16="http://schemas.microsoft.com/office/drawing/2014/main" id="{B8E8927D-BD4A-178A-E7C6-FB6DB5E104CB}"/>
+                <a16:creationId xmlns:a16="http://schemas.microsoft.com/office/drawing/2014/main" id="{4F3D57F9-5D12-25C5-A6B4-27E9D7E906C9}"/>
               </a:ext>
             </a:extLst>
           </p:cNvPr>
@@ -6771,8 +6958,8 @@
         </p:nvSpPr>
         <p:spPr>
           <a:xfrm>
-            <a:off x="527125" y="1729291"/>
-            <a:ext cx="11369809" cy="4717229"/>
+            <a:off x="365761" y="1325879"/>
+            <a:ext cx="9006840" cy="4402567"/>
           </a:xfrm>
         </p:spPr>
         <p:txBody>
@@ -6781,46 +6968,182 @@
           <a:p>
             <a:r>
               <a:rPr lang="en-US" dirty="0"/>
-              <a:t>Focused verification of the target simulation on the target platform</a:t>
+              <a:t>Machines are expensive and rare resources</a:t>
             </a:r>
           </a:p>
           <a:p>
             <a:pPr lvl="1"/>
             <a:r>
               <a:rPr lang="en-US" dirty="0"/>
-              <a:t>Over and above regular testing </a:t>
+              <a:t>Operating them is also very expensive</a:t>
+            </a:r>
+          </a:p>
+          <a:p>
+            <a:pPr lvl="2"/>
+            <a:r>
+              <a:rPr lang="en-US" dirty="0">
+                <a:solidFill>
+                  <a:srgbClr val="C00000"/>
+                </a:solidFill>
+              </a:rPr>
+              <a:t>If you made a mistake in your input parameters and got garbage results on a large scale run, you just wasted hundreds of thousands of dollars </a:t>
             </a:r>
           </a:p>
           <a:p>
             <a:pPr lvl="1"/>
             <a:r>
               <a:rPr lang="en-US" dirty="0"/>
-              <a:t>Emphasis on understanding solver validity regime</a:t>
+              <a:t>Many people are competing for these resources</a:t>
+            </a:r>
+          </a:p>
+          <a:p>
+            <a:pPr lvl="2"/>
+            <a:r>
+              <a:rPr lang="en-US" dirty="0">
+                <a:solidFill>
+                  <a:srgbClr val="C00000"/>
+                </a:solidFill>
+              </a:rPr>
+              <a:t>Your wasted run is likely to be either your or someone else’s opportunity lost</a:t>
             </a:r>
           </a:p>
           <a:p>
             <a:pPr lvl="1"/>
-            <a:endParaRPr lang="en-US" dirty="0"/>
-          </a:p>
-          <a:p>
-            <a:r>
-              <a:rPr lang="en-US" dirty="0"/>
-              <a:t>Pathfinder runs to get a good estimate of needed resources</a:t>
-            </a:r>
-          </a:p>
-          <a:p>
-            <a:pPr lvl="1"/>
-            <a:r>
-              <a:rPr lang="en-US" dirty="0"/>
-              <a:t>Cost benefit analysis of fidelity vs reaching science goals in allocated resources</a:t>
-            </a:r>
+            <a:r>
+              <a:rPr lang="en-US" dirty="0"/>
+              <a:t>You are likely charting new scientific territory</a:t>
+            </a:r>
+          </a:p>
+          <a:p>
+            <a:pPr lvl="2"/>
+            <a:r>
+              <a:rPr lang="en-US" dirty="0">
+                <a:solidFill>
+                  <a:srgbClr val="C00000"/>
+                </a:solidFill>
+              </a:rPr>
+              <a:t>Some aspect of using your code may not have been important before, but may become critical in the new study</a:t>
+            </a:r>
+          </a:p>
+          <a:p>
+            <a:pPr lvl="2"/>
+            <a:r>
+              <a:rPr lang="en-US" dirty="0">
+                <a:solidFill>
+                  <a:srgbClr val="C00000"/>
+                </a:solidFill>
+              </a:rPr>
+              <a:t>Some solver may run up against the limits of its validity</a:t>
+            </a:r>
+          </a:p>
+          <a:p>
+            <a:pPr lvl="2"/>
+            <a:r>
+              <a:rPr lang="en-US" dirty="0">
+                <a:solidFill>
+                  <a:srgbClr val="C00000"/>
+                </a:solidFill>
+              </a:rPr>
+              <a:t>Inflight correction may be needed to parameters to continue with the study</a:t>
+            </a:r>
+          </a:p>
+          <a:p>
+            <a:r>
+              <a:rPr lang="en-US" dirty="0"/>
+              <a:t>Aim for no surprises, but be prepared for them</a:t>
+            </a:r>
+          </a:p>
+        </p:txBody>
+      </p:sp>
+      <p:sp>
+        <p:nvSpPr>
+          <p:cNvPr id="4" name="Rectangle 3">
+            <a:extLst>
+              <a:ext uri="{FF2B5EF4-FFF2-40B4-BE49-F238E27FC236}">
+                <a16:creationId xmlns:a16="http://schemas.microsoft.com/office/drawing/2014/main" id="{F25F886C-EB2B-9191-6F30-62179A7DF7F1}"/>
+              </a:ext>
+            </a:extLst>
+          </p:cNvPr>
+          <p:cNvSpPr/>
+          <p:nvPr/>
+        </p:nvSpPr>
+        <p:spPr>
+          <a:xfrm>
+            <a:off x="9695329" y="1325880"/>
+            <a:ext cx="1869142" cy="4416014"/>
+          </a:xfrm>
+          <a:prstGeom prst="rect">
+            <a:avLst/>
+          </a:prstGeom>
+          <a:solidFill>
+            <a:schemeClr val="accent4">
+              <a:lumMod val="75000"/>
+            </a:schemeClr>
+          </a:solidFill>
+          <a:ln>
+            <a:noFill/>
+          </a:ln>
+          <a:effectLst>
+            <a:outerShdw blurRad="44450" dist="27940" dir="5400000" algn="ctr">
+              <a:srgbClr val="000000">
+                <a:alpha val="32000"/>
+              </a:srgbClr>
+            </a:outerShdw>
+          </a:effectLst>
+        </p:spPr>
+        <p:txBody>
+          <a:bodyPr rot="0" spcFirstLastPara="0" vertOverflow="overflow" horzOverflow="overflow" vert="horz" wrap="square" lIns="121851" tIns="60925" rIns="121851" bIns="60925" numCol="1" spcCol="0" rtlCol="0" fromWordArt="0" anchor="ctr" anchorCtr="0" forceAA="0" compatLnSpc="1">
+            <a:prstTxWarp prst="textNoShape">
+              <a:avLst/>
+            </a:prstTxWarp>
+            <a:noAutofit/>
+          </a:bodyPr>
+          <a:lstStyle/>
+          <a:p>
+            <a:pPr algn="ctr">
+              <a:lnSpc>
+                <a:spcPct val="90000"/>
+              </a:lnSpc>
+            </a:pPr>
+            <a:r>
+              <a:rPr lang="en-US" sz="2000" dirty="0">
+                <a:solidFill>
+                  <a:schemeClr val="bg1"/>
+                </a:solidFill>
+              </a:rPr>
+              <a:t>In the 2005 simulation mentioned earlier, out of 5 teams, ours was the only team that had success in getting  a good science outcome </a:t>
+            </a:r>
+          </a:p>
+          <a:p>
+            <a:pPr algn="ctr">
+              <a:lnSpc>
+                <a:spcPct val="90000"/>
+              </a:lnSpc>
+            </a:pPr>
+            <a:endParaRPr lang="en-US" sz="2000" dirty="0">
+              <a:solidFill>
+                <a:schemeClr val="bg1"/>
+              </a:solidFill>
+            </a:endParaRPr>
+          </a:p>
+          <a:p>
+            <a:pPr algn="ctr">
+              <a:lnSpc>
+                <a:spcPct val="90000"/>
+              </a:lnSpc>
+            </a:pPr>
+            <a:endParaRPr lang="en-US" sz="2000" dirty="0">
+              <a:solidFill>
+                <a:schemeClr val="bg1"/>
+              </a:solidFill>
+            </a:endParaRPr>
           </a:p>
         </p:txBody>
       </p:sp>
     </p:spTree>
     <p:extLst>
       <p:ext uri="{BB962C8B-B14F-4D97-AF65-F5344CB8AC3E}">
-        <p14:creationId xmlns:p14="http://schemas.microsoft.com/office/powerpoint/2010/main" val="3416025368"/>
+        <p14:creationId xmlns:p14="http://schemas.microsoft.com/office/powerpoint/2010/main" val="2324504081"/>
       </p:ext>
     </p:extLst>
   </p:cSld>
@@ -6893,7 +7216,7 @@
         </p:nvSpPr>
         <p:spPr>
           <a:xfrm>
-            <a:off x="365760" y="1159135"/>
+            <a:off x="527125" y="1729291"/>
             <a:ext cx="11369809" cy="4717229"/>
           </a:xfrm>
         </p:spPr>
@@ -6903,58 +7226,38 @@
           <a:p>
             <a:r>
               <a:rPr lang="en-US" dirty="0"/>
-              <a:t>Develop helpful diagnostics</a:t>
+              <a:t>Focused verification of the target simulation on the target platform</a:t>
             </a:r>
           </a:p>
           <a:p>
             <a:pPr lvl="1"/>
             <a:r>
               <a:rPr lang="en-US" dirty="0"/>
-              <a:t>Low overhead ways of confirming the health of the run</a:t>
-            </a:r>
-          </a:p>
-          <a:p>
-            <a:pPr lvl="2"/>
-            <a:r>
-              <a:rPr lang="en-US" dirty="0"/>
-              <a:t>Are conserved quantities conserved?</a:t>
-            </a:r>
-          </a:p>
-          <a:p>
-            <a:pPr lvl="2"/>
-            <a:r>
-              <a:rPr lang="en-US" dirty="0"/>
-              <a:t>Has any quantity become unphysical?</a:t>
-            </a:r>
-          </a:p>
-          <a:p>
-            <a:pPr marL="684212" lvl="2" indent="0">
-              <a:buNone/>
-            </a:pPr>
+              <a:t>Over and above regular testing </a:t>
+            </a:r>
+          </a:p>
+          <a:p>
+            <a:pPr lvl="1"/>
+            <a:r>
+              <a:rPr lang="en-US" dirty="0"/>
+              <a:t>Emphasis on understanding solver validity regime</a:t>
+            </a:r>
+          </a:p>
+          <a:p>
+            <a:pPr lvl="1"/>
             <a:endParaRPr lang="en-US" dirty="0"/>
           </a:p>
           <a:p>
-            <a:pPr lvl="2"/>
-            <a:endParaRPr lang="en-US" dirty="0"/>
-          </a:p>
-          <a:p>
-            <a:r>
-              <a:rPr lang="en-US" dirty="0"/>
-              <a:t>Develop hierarchy of analysis</a:t>
+            <a:r>
+              <a:rPr lang="en-US" dirty="0"/>
+              <a:t>Pathfinder runs to get a good estimate of needed resources</a:t>
             </a:r>
           </a:p>
           <a:p>
             <a:pPr lvl="1"/>
             <a:r>
               <a:rPr lang="en-US" dirty="0"/>
-              <a:t>Full analysis of runs is not feasible in flight</a:t>
-            </a:r>
-          </a:p>
-          <a:p>
-            <a:pPr lvl="1"/>
-            <a:r>
-              <a:rPr lang="en-US" dirty="0"/>
-              <a:t>Intermediate level analysis can give further insight into health of the simulation</a:t>
+              <a:t>Cost benefit analysis of fidelity vs reaching science goals in allocated resources</a:t>
             </a:r>
           </a:p>
         </p:txBody>
@@ -6962,7 +7265,7 @@
     </p:spTree>
     <p:extLst>
       <p:ext uri="{BB962C8B-B14F-4D97-AF65-F5344CB8AC3E}">
-        <p14:creationId xmlns:p14="http://schemas.microsoft.com/office/powerpoint/2010/main" val="3873864617"/>
+        <p14:creationId xmlns:p14="http://schemas.microsoft.com/office/powerpoint/2010/main" val="3416025368"/>
       </p:ext>
     </p:extLst>
   </p:cSld>
@@ -6994,7 +7297,7 @@
           <p:cNvPr id="2" name="Title 1">
             <a:extLst>
               <a:ext uri="{FF2B5EF4-FFF2-40B4-BE49-F238E27FC236}">
-                <a16:creationId xmlns:a16="http://schemas.microsoft.com/office/drawing/2014/main" id="{532AD9BB-395B-66A5-5D5E-B94329EF58ED}"/>
+                <a16:creationId xmlns:a16="http://schemas.microsoft.com/office/drawing/2014/main" id="{A5235A0F-203F-5BF7-7718-068E3B49D01A}"/>
               </a:ext>
             </a:extLst>
           </p:cNvPr>
@@ -7012,7 +7315,7 @@
           <a:p>
             <a:r>
               <a:rPr lang="en-US" dirty="0"/>
-              <a:t>Story of one simulation campaign</a:t>
+              <a:t>How do you plan</a:t>
             </a:r>
           </a:p>
         </p:txBody>
@@ -7022,7 +7325,7 @@
           <p:cNvPr id="3" name="Content Placeholder 2">
             <a:extLst>
               <a:ext uri="{FF2B5EF4-FFF2-40B4-BE49-F238E27FC236}">
-                <a16:creationId xmlns:a16="http://schemas.microsoft.com/office/drawing/2014/main" id="{13C86A4D-96BB-6C1B-67D4-D498DE9DAFF2}"/>
+                <a16:creationId xmlns:a16="http://schemas.microsoft.com/office/drawing/2014/main" id="{B8E8927D-BD4A-178A-E7C6-FB6DB5E104CB}"/>
               </a:ext>
             </a:extLst>
           </p:cNvPr>
@@ -7035,8 +7338,8 @@
         </p:nvSpPr>
         <p:spPr>
           <a:xfrm>
-            <a:off x="409507" y="1405111"/>
-            <a:ext cx="11369809" cy="4047778"/>
+            <a:off x="365760" y="1159135"/>
+            <a:ext cx="11369809" cy="4717229"/>
           </a:xfrm>
         </p:spPr>
         <p:txBody>
@@ -7045,77 +7348,58 @@
           <a:p>
             <a:r>
               <a:rPr lang="en-US" dirty="0"/>
-              <a:t>Theory of Type </a:t>
-            </a:r>
-            <a:r>
-              <a:rPr lang="en-US" dirty="0" err="1"/>
-              <a:t>Ia</a:t>
-            </a:r>
-            <a:r>
-              <a:rPr lang="en-US" dirty="0"/>
-              <a:t> supernova explosion – 2006/2007</a:t>
+              <a:t>Develop helpful diagnostics</a:t>
             </a:r>
           </a:p>
           <a:p>
             <a:pPr lvl="1"/>
             <a:r>
               <a:rPr lang="en-US" dirty="0"/>
-              <a:t>Evidence from observations: </a:t>
+              <a:t>Low overhead ways of confirming the health of the run</a:t>
             </a:r>
           </a:p>
           <a:p>
             <a:pPr lvl="2"/>
             <a:r>
               <a:rPr lang="en-US" dirty="0"/>
-              <a:t>Light curve powered by Ni56 decay</a:t>
+              <a:t>Are conserved quantities conserved?</a:t>
             </a:r>
           </a:p>
           <a:p>
             <a:pPr lvl="2"/>
             <a:r>
               <a:rPr lang="en-US" dirty="0"/>
-              <a:t>Evidence of medium weight elements, but in much smaller quantities</a:t>
+              <a:t>Has any quantity become unphysical?</a:t>
+            </a:r>
+          </a:p>
+          <a:p>
+            <a:pPr marL="684212" lvl="2" indent="0">
+              <a:buNone/>
+            </a:pPr>
+            <a:endParaRPr lang="en-US" dirty="0"/>
+          </a:p>
+          <a:p>
+            <a:pPr lvl="2"/>
+            <a:endParaRPr lang="en-US" dirty="0"/>
+          </a:p>
+          <a:p>
+            <a:r>
+              <a:rPr lang="en-US" dirty="0"/>
+              <a:t>Develop hierarchy of analysis</a:t>
             </a:r>
           </a:p>
           <a:p>
             <a:pPr lvl="1"/>
             <a:r>
               <a:rPr lang="en-US" dirty="0"/>
-              <a:t>Implied transition from deflagration to detonation</a:t>
-            </a:r>
-          </a:p>
-          <a:p>
-            <a:r>
-              <a:rPr lang="en-US" dirty="0"/>
-              <a:t>A 2D exploratory run had given a tantalizing answer to how?</a:t>
+              <a:t>Full analysis of runs is not feasible in flight</a:t>
             </a:r>
           </a:p>
           <a:p>
             <a:pPr lvl="1"/>
             <a:r>
               <a:rPr lang="en-US" dirty="0"/>
-              <a:t>To confirm a full 3D run was needed at good enough resolution</a:t>
-            </a:r>
-          </a:p>
-          <a:p>
-            <a:pPr lvl="1"/>
-            <a:r>
-              <a:rPr lang="en-US" dirty="0"/>
-              <a:t>It would be the largest run of its kind at the time – totally uncharted territory</a:t>
-            </a:r>
-          </a:p>
-          <a:p>
-            <a:pPr lvl="1"/>
-            <a:r>
-              <a:rPr lang="en-US" dirty="0"/>
-              <a:t>Until then 3D runs had been octants relying on symmetry</a:t>
-            </a:r>
-          </a:p>
-          <a:p>
-            <a:pPr lvl="2"/>
-            <a:r>
-              <a:rPr lang="en-US" dirty="0"/>
-              <a:t>The 2D run had shown that symmetry had to be avoided</a:t>
+              <a:t>Intermediate level analysis can give further insight into health of the simulation</a:t>
             </a:r>
           </a:p>
         </p:txBody>
@@ -7123,7 +7407,7 @@
     </p:spTree>
     <p:extLst>
       <p:ext uri="{BB962C8B-B14F-4D97-AF65-F5344CB8AC3E}">
-        <p14:creationId xmlns:p14="http://schemas.microsoft.com/office/powerpoint/2010/main" val="936705717"/>
+        <p14:creationId xmlns:p14="http://schemas.microsoft.com/office/powerpoint/2010/main" val="3873864617"/>
       </p:ext>
     </p:extLst>
   </p:cSld>
@@ -7155,7 +7439,7 @@
           <p:cNvPr id="2" name="Title 1">
             <a:extLst>
               <a:ext uri="{FF2B5EF4-FFF2-40B4-BE49-F238E27FC236}">
-                <a16:creationId xmlns:a16="http://schemas.microsoft.com/office/drawing/2014/main" id="{3DAE27AA-E90C-9E73-9F78-A1907E2A009C}"/>
+                <a16:creationId xmlns:a16="http://schemas.microsoft.com/office/drawing/2014/main" id="{532AD9BB-395B-66A5-5D5E-B94329EF58ED}"/>
               </a:ext>
             </a:extLst>
           </p:cNvPr>
@@ -7173,7 +7457,7 @@
           <a:p>
             <a:r>
               <a:rPr lang="en-US" dirty="0"/>
-              <a:t>Preparation Steps</a:t>
+              <a:t>Story of one simulation campaign</a:t>
             </a:r>
           </a:p>
         </p:txBody>
@@ -7183,7 +7467,7 @@
           <p:cNvPr id="3" name="Content Placeholder 2">
             <a:extLst>
               <a:ext uri="{FF2B5EF4-FFF2-40B4-BE49-F238E27FC236}">
-                <a16:creationId xmlns:a16="http://schemas.microsoft.com/office/drawing/2014/main" id="{47F33A05-64E3-D838-EAB7-99CE5B676A05}"/>
+                <a16:creationId xmlns:a16="http://schemas.microsoft.com/office/drawing/2014/main" id="{13C86A4D-96BB-6C1B-67D4-D498DE9DAFF2}"/>
               </a:ext>
             </a:extLst>
           </p:cNvPr>
@@ -7194,66 +7478,97 @@
             <p:ph idx="1"/>
           </p:nvPr>
         </p:nvSpPr>
-        <p:spPr/>
+        <p:spPr>
+          <a:xfrm>
+            <a:off x="409507" y="1405111"/>
+            <a:ext cx="11369809" cy="4047778"/>
+          </a:xfrm>
+        </p:spPr>
         <p:txBody>
           <a:bodyPr/>
           <a:lstStyle/>
           <a:p>
             <a:r>
               <a:rPr lang="en-US" dirty="0"/>
-              <a:t>Step 1 – develop a test that represents the most complex physics interactions</a:t>
-            </a:r>
-          </a:p>
-          <a:p>
-            <a:r>
-              <a:rPr lang="en-US" dirty="0"/>
-              <a:t>Challenges:</a:t>
+              <a:t>Theory of Type </a:t>
+            </a:r>
+            <a:r>
+              <a:rPr lang="en-US" dirty="0" err="1"/>
+              <a:t>Ia</a:t>
+            </a:r>
+            <a:r>
+              <a:rPr lang="en-US" dirty="0"/>
+              <a:t> supernova explosion – 2006/2007</a:t>
             </a:r>
           </a:p>
           <a:p>
             <a:pPr lvl="1"/>
             <a:r>
               <a:rPr lang="en-US" dirty="0"/>
-              <a:t>Features take a long time to develop</a:t>
+              <a:t>Evidence from observations: </a:t>
+            </a:r>
+          </a:p>
+          <a:p>
+            <a:pPr lvl="2"/>
+            <a:r>
+              <a:rPr lang="en-US" dirty="0"/>
+              <a:t>Light curve powered by Ni56 decay</a:t>
+            </a:r>
+          </a:p>
+          <a:p>
+            <a:pPr lvl="2"/>
+            <a:r>
+              <a:rPr lang="en-US" dirty="0"/>
+              <a:t>Evidence of medium weight elements, but in much smaller quantities</a:t>
             </a:r>
           </a:p>
           <a:p>
             <a:pPr lvl="1"/>
             <a:r>
               <a:rPr lang="en-US" dirty="0"/>
-              <a:t>Want to ensure that at least one refinement step occurs during the test</a:t>
+              <a:t>Implied transition from deflagration to detonation</a:t>
+            </a:r>
+          </a:p>
+          <a:p>
+            <a:r>
+              <a:rPr lang="en-US" dirty="0"/>
+              <a:t>A 2D exploratory run had given a tantalizing answer to how?</a:t>
             </a:r>
           </a:p>
           <a:p>
             <a:pPr lvl="1"/>
             <a:r>
               <a:rPr lang="en-US" dirty="0"/>
-              <a:t>IO too slow to restart from a large checkpoint at late stage of the run</a:t>
+              <a:t>To confirm a full 3D run was needed at good enough resolution</a:t>
+            </a:r>
+          </a:p>
+          <a:p>
+            <a:pPr lvl="1"/>
+            <a:r>
+              <a:rPr lang="en-US" dirty="0"/>
+              <a:t>It would be the largest run of its kind at the time – totally uncharted territory</a:t>
+            </a:r>
+          </a:p>
+          <a:p>
+            <a:pPr lvl="1"/>
+            <a:r>
+              <a:rPr lang="en-US" dirty="0"/>
+              <a:t>Until then 3D runs had been octants relying on symmetry</a:t>
             </a:r>
           </a:p>
           <a:p>
             <a:pPr lvl="2"/>
             <a:r>
               <a:rPr lang="en-US" dirty="0"/>
-              <a:t>Also test would need a large chunk of the machine</a:t>
-            </a:r>
-          </a:p>
-          <a:p>
-            <a:r>
-              <a:rPr lang="en-US" dirty="0"/>
-              <a:t>Use physics understanding to create initial conditions that would quickly develop comparable complexity</a:t>
-            </a:r>
-          </a:p>
-          <a:p>
-            <a:pPr lvl="1"/>
-            <a:endParaRPr lang="en-US" dirty="0"/>
+              <a:t>The 2D run had shown that symmetry had to be avoided</a:t>
+            </a:r>
           </a:p>
         </p:txBody>
       </p:sp>
     </p:spTree>
     <p:extLst>
       <p:ext uri="{BB962C8B-B14F-4D97-AF65-F5344CB8AC3E}">
-        <p14:creationId xmlns:p14="http://schemas.microsoft.com/office/powerpoint/2010/main" val="1970226240"/>
+        <p14:creationId xmlns:p14="http://schemas.microsoft.com/office/powerpoint/2010/main" val="936705717"/>
       </p:ext>
     </p:extLst>
   </p:cSld>
@@ -8176,12 +8491,6 @@
 </file>
 
 <file path=customXml/item1.xml><?xml version="1.0" encoding="utf-8"?>
-<p:properties xmlns:p="http://schemas.microsoft.com/office/2006/metadata/properties" xmlns:xsi="http://www.w3.org/2001/XMLSchema-instance" xmlns:pc="http://schemas.microsoft.com/office/infopath/2007/PartnerControls">
-  <documentManagement/>
-</p:properties>
-</file>
-
-<file path=customXml/item2.xml><?xml version="1.0" encoding="utf-8"?>
 <ct:contentTypeSchema xmlns:ct="http://schemas.microsoft.com/office/2006/metadata/contentType" xmlns:ma="http://schemas.microsoft.com/office/2006/metadata/properties/metaAttributes" ct:_="" ma:_="" ma:contentTypeName="Document" ma:contentTypeID="0x010100565464437F680748A68B85EB6594EA7D" ma:contentTypeVersion="0" ma:contentTypeDescription="Create a new document." ma:contentTypeScope="" ma:versionID="fe3f4dd58d5914c51cfc6deaa8ad845c">
   <xsd:schema xmlns:xsd="http://www.w3.org/2001/XMLSchema" xmlns:p="http://schemas.microsoft.com/office/2006/metadata/properties" targetNamespace="http://schemas.microsoft.com/office/2006/metadata/properties" ma:root="true" ma:fieldsID="4aeb20c0e3442673af7ee10786458764">
     <xsd:element name="properties">
@@ -8230,6 +8539,12 @@
 </ct:contentTypeSchema>
 </file>
 
+<file path=customXml/item2.xml><?xml version="1.0" encoding="utf-8"?>
+<p:properties xmlns:p="http://schemas.microsoft.com/office/2006/metadata/properties" xmlns:xsi="http://www.w3.org/2001/XMLSchema-instance" xmlns:pc="http://schemas.microsoft.com/office/infopath/2007/PartnerControls">
+  <documentManagement/>
+</p:properties>
+</file>
+
 <file path=customXml/item3.xml><?xml version="1.0" encoding="utf-8"?>
 <?mso-contentType ?>
 <FormTemplates xmlns="http://schemas.microsoft.com/sharepoint/v3/contenttype/forms">
@@ -8240,6 +8555,21 @@
 </file>
 
 <file path=customXml/itemProps1.xml><?xml version="1.0" encoding="utf-8"?>
+<ds:datastoreItem xmlns:ds="http://schemas.openxmlformats.org/officeDocument/2006/customXml" ds:itemID="{E8DB7DEB-074E-4EE8-9B6E-FD277323109C}">
+  <ds:schemaRefs>
+    <ds:schemaRef ds:uri="http://schemas.microsoft.com/office/2006/metadata/contentType"/>
+    <ds:schemaRef ds:uri="http://schemas.microsoft.com/office/2006/metadata/properties/metaAttributes"/>
+    <ds:schemaRef ds:uri="http://www.w3.org/2001/XMLSchema"/>
+    <ds:schemaRef ds:uri="http://schemas.microsoft.com/office/2006/metadata/properties"/>
+    <ds:schemaRef ds:uri="http://schemas.openxmlformats.org/package/2006/metadata/core-properties"/>
+    <ds:schemaRef ds:uri="http://purl.org/dc/elements/1.1/"/>
+    <ds:schemaRef ds:uri="http://purl.org/dc/terms/"/>
+    <ds:schemaRef ds:uri="http://schemas.microsoft.com/office/internal/2005/internalDocumentation"/>
+  </ds:schemaRefs>
+</ds:datastoreItem>
+</file>
+
+<file path=customXml/itemProps2.xml><?xml version="1.0" encoding="utf-8"?>
 <ds:datastoreItem xmlns:ds="http://schemas.openxmlformats.org/officeDocument/2006/customXml" ds:itemID="{A50EC660-24D0-43A0-AE5E-E274115E726B}">
   <ds:schemaRefs>
     <ds:schemaRef ds:uri="http://purl.org/dc/elements/1.1/"/>
@@ -8254,21 +8584,6 @@
 </ds:datastoreItem>
 </file>
 
-<file path=customXml/itemProps2.xml><?xml version="1.0" encoding="utf-8"?>
-<ds:datastoreItem xmlns:ds="http://schemas.openxmlformats.org/officeDocument/2006/customXml" ds:itemID="{E8DB7DEB-074E-4EE8-9B6E-FD277323109C}">
-  <ds:schemaRefs>
-    <ds:schemaRef ds:uri="http://schemas.microsoft.com/office/2006/metadata/contentType"/>
-    <ds:schemaRef ds:uri="http://schemas.microsoft.com/office/2006/metadata/properties/metaAttributes"/>
-    <ds:schemaRef ds:uri="http://www.w3.org/2001/XMLSchema"/>
-    <ds:schemaRef ds:uri="http://schemas.microsoft.com/office/2006/metadata/properties"/>
-    <ds:schemaRef ds:uri="http://schemas.openxmlformats.org/package/2006/metadata/core-properties"/>
-    <ds:schemaRef ds:uri="http://purl.org/dc/elements/1.1/"/>
-    <ds:schemaRef ds:uri="http://purl.org/dc/terms/"/>
-    <ds:schemaRef ds:uri="http://schemas.microsoft.com/office/internal/2005/internalDocumentation"/>
-  </ds:schemaRefs>
-</ds:datastoreItem>
-</file>
-
 <file path=customXml/itemProps3.xml><?xml version="1.0" encoding="utf-8"?>
 <ds:datastoreItem xmlns:ds="http://schemas.openxmlformats.org/officeDocument/2006/customXml" ds:itemID="{19E20559-B232-4371-8690-E3D8007EDB82}">
   <ds:schemaRefs>

</xml_diff>